<commit_message>
- add updated presentation - add yarn/npm section
</commit_message>
<xml_diff>
--- a/presentations/Practical Web Dev.pptx
+++ b/presentations/Practical Web Dev.pptx
@@ -5,7 +5,7 @@
     <p:sldMasterId id="2147483648" r:id="rId1"/>
   </p:sldMasterIdLst>
   <p:notesMasterIdLst>
-    <p:notesMasterId r:id="rId17"/>
+    <p:notesMasterId r:id="rId25"/>
   </p:notesMasterIdLst>
   <p:sldIdLst>
     <p:sldId id="256" r:id="rId2"/>
@@ -22,7 +22,15 @@
     <p:sldId id="376" r:id="rId13"/>
     <p:sldId id="374" r:id="rId14"/>
     <p:sldId id="379" r:id="rId15"/>
-    <p:sldId id="377" r:id="rId16"/>
+    <p:sldId id="380" r:id="rId16"/>
+    <p:sldId id="377" r:id="rId17"/>
+    <p:sldId id="383" r:id="rId18"/>
+    <p:sldId id="382" r:id="rId19"/>
+    <p:sldId id="384" r:id="rId20"/>
+    <p:sldId id="385" r:id="rId21"/>
+    <p:sldId id="386" r:id="rId22"/>
+    <p:sldId id="387" r:id="rId23"/>
+    <p:sldId id="381" r:id="rId24"/>
   </p:sldIdLst>
   <p:sldSz cx="12192000" cy="6858000"/>
   <p:notesSz cx="6858000" cy="9144000"/>
@@ -140,7 +148,15 @@
             <p14:sldId id="376"/>
             <p14:sldId id="374"/>
             <p14:sldId id="379"/>
+            <p14:sldId id="380"/>
             <p14:sldId id="377"/>
+            <p14:sldId id="383"/>
+            <p14:sldId id="382"/>
+            <p14:sldId id="384"/>
+            <p14:sldId id="385"/>
+            <p14:sldId id="386"/>
+            <p14:sldId id="387"/>
+            <p14:sldId id="381"/>
           </p14:sldIdLst>
         </p14:section>
         <p14:section name="Untitled Section" id="{C1D0E545-2C7D-473A-832A-0A18554C7EAE}">
@@ -248,7 +264,7 @@
           <a:p>
             <a:fld id="{B53C1D94-E0DD-4250-8C1B-3D8C3DA9B2B6}" type="datetimeFigureOut">
               <a:rPr lang="he-IL" smtClean="0"/>
-              <a:t>ה'/אדר א/תשע"ט</a:t>
+              <a:t>י"ט/אדר א/תשע"ט</a:t>
             </a:fld>
             <a:endParaRPr lang="he-IL"/>
           </a:p>
@@ -2267,11 +2283,103 @@
           <a:bodyPr/>
           <a:lstStyle/>
           <a:p>
+            <a:pPr algn="l" rtl="0"/>
+            <a:r>
+              <a:rPr lang="en-US" b="1" dirty="0">
+                <a:solidFill>
+                  <a:schemeClr val="bg1"/>
+                </a:solidFill>
+              </a:rPr>
+              <a:t>Where TS is inserted in our JS?</a:t>
+            </a:r>
+          </a:p>
+          <a:p>
+            <a:pPr algn="l" rtl="0"/>
+            <a:r>
+              <a:rPr lang="en-US" sz="1200" b="0" i="0" kern="1200" dirty="0">
+                <a:solidFill>
+                  <a:schemeClr val="tx1"/>
+                </a:solidFill>
+                <a:effectLst/>
+                <a:latin typeface="+mn-lt"/>
+                <a:ea typeface="+mn-ea"/>
+                <a:cs typeface="+mn-cs"/>
+              </a:rPr>
+              <a:t>TS is </a:t>
+            </a:r>
+            <a:r>
+              <a:rPr lang="en-US" sz="1200" b="0" i="0" kern="1200" dirty="0" err="1">
+                <a:solidFill>
+                  <a:schemeClr val="tx1"/>
+                </a:solidFill>
+                <a:effectLst/>
+                <a:latin typeface="+mn-lt"/>
+                <a:ea typeface="+mn-ea"/>
+                <a:cs typeface="+mn-cs"/>
+              </a:rPr>
+              <a:t>whrapping</a:t>
+            </a:r>
+            <a:r>
+              <a:rPr lang="en-US" sz="1200" b="0" i="0" kern="1200" dirty="0">
+                <a:solidFill>
+                  <a:schemeClr val="tx1"/>
+                </a:solidFill>
+                <a:effectLst/>
+                <a:latin typeface="+mn-lt"/>
+                <a:ea typeface="+mn-ea"/>
+                <a:cs typeface="+mn-cs"/>
+              </a:rPr>
+              <a:t> our latest </a:t>
+            </a:r>
+            <a:r>
+              <a:rPr lang="en-US" sz="1200" dirty="0">
+                <a:solidFill>
+                  <a:schemeClr val="bg1"/>
+                </a:solidFill>
+              </a:rPr>
+              <a:t>ECMAScript implementation, and also having some features from </a:t>
+            </a:r>
+            <a:r>
+              <a:rPr lang="en-US" sz="1200" dirty="0" err="1">
+                <a:solidFill>
+                  <a:schemeClr val="bg1"/>
+                </a:solidFill>
+              </a:rPr>
+              <a:t>ESNext</a:t>
+            </a:r>
+            <a:r>
+              <a:rPr lang="en-US" sz="1200" dirty="0">
+                <a:solidFill>
+                  <a:schemeClr val="bg1"/>
+                </a:solidFill>
+              </a:rPr>
+              <a:t> and some features (like auto completion) which we don’t have in ECMAScript.</a:t>
+            </a:r>
+          </a:p>
+          <a:p>
+            <a:pPr algn="l" rtl="0"/>
+            <a:r>
+              <a:rPr lang="en-US" sz="1200" dirty="0">
+                <a:solidFill>
+                  <a:schemeClr val="bg1"/>
+                </a:solidFill>
+              </a:rPr>
+              <a:t>Using Babel is for downgrade our code from TS to target ECMAScript version.</a:t>
+            </a:r>
+          </a:p>
+          <a:p>
+            <a:pPr algn="l" rtl="0"/>
+            <a:endParaRPr lang="en-US" dirty="0"/>
+          </a:p>
+          <a:p>
             <a:pPr marL="171450" indent="-171450" algn="l" rtl="0">
               <a:buFontTx/>
               <a:buChar char="-"/>
             </a:pPr>
-            <a:endParaRPr lang="en-US" b="0" dirty="0"/>
+            <a:r>
+              <a:rPr lang="en-US" dirty="0"/>
+              <a:t>https://www.geeksforgeeks.org/difference-between-typescript-and-javascript/</a:t>
+            </a:r>
           </a:p>
         </p:txBody>
       </p:sp>
@@ -2301,7 +2409,3221 @@
     </p:spTree>
     <p:extLst>
       <p:ext uri="{BB962C8B-B14F-4D97-AF65-F5344CB8AC3E}">
+        <p14:creationId xmlns:p14="http://schemas.microsoft.com/office/powerpoint/2010/main" val="2404147824"/>
+      </p:ext>
+    </p:extLst>
+  </p:cSld>
+  <p:clrMapOvr>
+    <a:masterClrMapping/>
+  </p:clrMapOvr>
+</p:notes>
+</file>
+
+<file path=ppt/notesSlides/notesSlide14.xml><?xml version="1.0" encoding="utf-8"?>
+<p:notes xmlns:a="http://schemas.openxmlformats.org/drawingml/2006/main" xmlns:r="http://schemas.openxmlformats.org/officeDocument/2006/relationships" xmlns:p="http://schemas.openxmlformats.org/presentationml/2006/main">
+  <p:cSld>
+    <p:spTree>
+      <p:nvGrpSpPr>
+        <p:cNvPr id="1" name=""/>
+        <p:cNvGrpSpPr/>
+        <p:nvPr/>
+      </p:nvGrpSpPr>
+      <p:grpSpPr>
+        <a:xfrm>
+          <a:off x="0" y="0"/>
+          <a:ext cx="0" cy="0"/>
+          <a:chOff x="0" y="0"/>
+          <a:chExt cx="0" cy="0"/>
+        </a:xfrm>
+      </p:grpSpPr>
+      <p:sp>
+        <p:nvSpPr>
+          <p:cNvPr id="2" name="Slide Image Placeholder 1"/>
+          <p:cNvSpPr>
+            <a:spLocks noGrp="1" noRot="1" noChangeAspect="1"/>
+          </p:cNvSpPr>
+          <p:nvPr>
+            <p:ph type="sldImg"/>
+          </p:nvPr>
+        </p:nvSpPr>
+        <p:spPr/>
+      </p:sp>
+      <p:sp>
+        <p:nvSpPr>
+          <p:cNvPr id="3" name="Notes Placeholder 2"/>
+          <p:cNvSpPr>
+            <a:spLocks noGrp="1"/>
+          </p:cNvSpPr>
+          <p:nvPr>
+            <p:ph type="body" idx="1"/>
+          </p:nvPr>
+        </p:nvSpPr>
+        <p:spPr/>
+        <p:txBody>
+          <a:bodyPr/>
+          <a:lstStyle/>
+          <a:p>
+            <a:pPr algn="l" rtl="0"/>
+            <a:r>
+              <a:rPr lang="en-US" sz="1200" dirty="0">
+                <a:solidFill>
+                  <a:schemeClr val="bg1"/>
+                </a:solidFill>
+              </a:rPr>
+              <a:t>What is </a:t>
+            </a:r>
+            <a:r>
+              <a:rPr lang="en-US" sz="1200" dirty="0" err="1">
+                <a:solidFill>
+                  <a:schemeClr val="bg1"/>
+                </a:solidFill>
+              </a:rPr>
+              <a:t>WebPack</a:t>
+            </a:r>
+            <a:r>
+              <a:rPr lang="en-US" sz="1200" dirty="0">
+                <a:solidFill>
+                  <a:schemeClr val="bg1"/>
+                </a:solidFill>
+              </a:rPr>
+              <a:t>?</a:t>
+            </a:r>
+          </a:p>
+          <a:p>
+            <a:pPr algn="l" rtl="0"/>
+            <a:endParaRPr lang="en-US" sz="1200" b="0" u="none" strike="noStrike" kern="1200" cap="all" dirty="0">
+              <a:solidFill>
+                <a:schemeClr val="tx1"/>
+              </a:solidFill>
+              <a:effectLst/>
+              <a:latin typeface="+mn-lt"/>
+              <a:ea typeface="+mn-ea"/>
+              <a:cs typeface="+mn-cs"/>
+            </a:endParaRPr>
+          </a:p>
+          <a:p>
+            <a:pPr algn="l" rtl="0"/>
+            <a:r>
+              <a:rPr lang="en-US" sz="1200" b="0" i="0" kern="1200" dirty="0">
+                <a:solidFill>
+                  <a:schemeClr val="tx1"/>
+                </a:solidFill>
+                <a:effectLst/>
+                <a:latin typeface="+mn-lt"/>
+                <a:ea typeface="+mn-ea"/>
+                <a:cs typeface="+mn-cs"/>
+              </a:rPr>
+              <a:t>Webpack is a tool that lets you compile JavaScript modules, also known as </a:t>
+            </a:r>
+            <a:r>
+              <a:rPr lang="en-US" sz="1200" b="1" i="0" kern="1200" dirty="0">
+                <a:solidFill>
+                  <a:schemeClr val="tx1"/>
+                </a:solidFill>
+                <a:effectLst/>
+                <a:latin typeface="+mn-lt"/>
+                <a:ea typeface="+mn-ea"/>
+                <a:cs typeface="+mn-cs"/>
+              </a:rPr>
+              <a:t>module bundler</a:t>
+            </a:r>
+            <a:r>
+              <a:rPr lang="en-US" sz="1200" b="0" i="0" kern="1200" dirty="0">
+                <a:solidFill>
+                  <a:schemeClr val="tx1"/>
+                </a:solidFill>
+                <a:effectLst/>
+                <a:latin typeface="+mn-lt"/>
+                <a:ea typeface="+mn-ea"/>
+                <a:cs typeface="+mn-cs"/>
+              </a:rPr>
+              <a:t>.</a:t>
+            </a:r>
+          </a:p>
+          <a:p>
+            <a:pPr algn="l" rtl="0"/>
+            <a:endParaRPr lang="en-US" sz="1200" b="0" i="0" kern="1200" dirty="0">
+              <a:solidFill>
+                <a:schemeClr val="tx1"/>
+              </a:solidFill>
+              <a:effectLst/>
+              <a:latin typeface="+mn-lt"/>
+              <a:ea typeface="+mn-ea"/>
+              <a:cs typeface="+mn-cs"/>
+            </a:endParaRPr>
+          </a:p>
+          <a:p>
+            <a:pPr algn="l" rtl="0"/>
+            <a:r>
+              <a:rPr lang="en-US" sz="1200" b="0" i="0" kern="1200" dirty="0">
+                <a:solidFill>
+                  <a:schemeClr val="tx1"/>
+                </a:solidFill>
+                <a:effectLst/>
+                <a:latin typeface="+mn-lt"/>
+                <a:ea typeface="+mn-ea"/>
+                <a:cs typeface="+mn-cs"/>
+              </a:rPr>
+              <a:t>Given a large number of files, it generates a single file (or a few files) that run your app.</a:t>
+            </a:r>
+          </a:p>
+          <a:p>
+            <a:pPr algn="l" rtl="0"/>
+            <a:endParaRPr lang="en-US" sz="1200" b="0" i="0" kern="1200" dirty="0">
+              <a:solidFill>
+                <a:schemeClr val="tx1"/>
+              </a:solidFill>
+              <a:effectLst/>
+              <a:latin typeface="+mn-lt"/>
+              <a:ea typeface="+mn-ea"/>
+              <a:cs typeface="+mn-cs"/>
+            </a:endParaRPr>
+          </a:p>
+          <a:p>
+            <a:pPr algn="l" rtl="0"/>
+            <a:r>
+              <a:rPr lang="en-US" sz="1200" b="0" i="0" kern="1200" dirty="0">
+                <a:solidFill>
+                  <a:schemeClr val="tx1"/>
+                </a:solidFill>
+                <a:effectLst/>
+                <a:latin typeface="+mn-lt"/>
+                <a:ea typeface="+mn-ea"/>
+                <a:cs typeface="+mn-cs"/>
+              </a:rPr>
+              <a:t>It can perform many operations:</a:t>
+            </a:r>
+          </a:p>
+          <a:p>
+            <a:pPr marL="171450" indent="-171450" algn="l" rtl="0">
+              <a:buFontTx/>
+              <a:buChar char="-"/>
+            </a:pPr>
+            <a:r>
+              <a:rPr lang="en-US" sz="1200" b="0" i="0" kern="1200" dirty="0">
+                <a:solidFill>
+                  <a:schemeClr val="tx1"/>
+                </a:solidFill>
+                <a:effectLst/>
+                <a:latin typeface="+mn-lt"/>
+                <a:ea typeface="+mn-ea"/>
+                <a:cs typeface="+mn-cs"/>
+              </a:rPr>
+              <a:t>helps you bundle your resources.</a:t>
+            </a:r>
+          </a:p>
+          <a:p>
+            <a:pPr marL="171450" indent="-171450" algn="l" rtl="0">
+              <a:buFontTx/>
+              <a:buChar char="-"/>
+            </a:pPr>
+            <a:r>
+              <a:rPr lang="en-US" sz="1200" b="0" i="0" kern="1200" dirty="0" err="1">
+                <a:solidFill>
+                  <a:schemeClr val="tx1"/>
+                </a:solidFill>
+                <a:effectLst/>
+                <a:latin typeface="+mn-lt"/>
+                <a:ea typeface="+mn-ea"/>
+                <a:cs typeface="+mn-cs"/>
+              </a:rPr>
+              <a:t>Chunck</a:t>
+            </a:r>
+            <a:r>
+              <a:rPr lang="en-US" sz="1200" b="0" i="0" kern="1200" dirty="0">
+                <a:solidFill>
+                  <a:schemeClr val="tx1"/>
+                </a:solidFill>
+                <a:effectLst/>
+                <a:latin typeface="+mn-lt"/>
+                <a:ea typeface="+mn-ea"/>
+                <a:cs typeface="+mn-cs"/>
+              </a:rPr>
+              <a:t>/</a:t>
+            </a:r>
+            <a:r>
+              <a:rPr lang="en-US" sz="1200" b="0" i="0" kern="1200" dirty="0" err="1">
+                <a:solidFill>
+                  <a:schemeClr val="tx1"/>
+                </a:solidFill>
+                <a:effectLst/>
+                <a:latin typeface="+mn-lt"/>
+                <a:ea typeface="+mn-ea"/>
+                <a:cs typeface="+mn-cs"/>
+              </a:rPr>
+              <a:t>LazyLoading</a:t>
+            </a:r>
+            <a:r>
+              <a:rPr lang="en-US" sz="1200" b="0" i="0" kern="1200" dirty="0">
+                <a:solidFill>
+                  <a:schemeClr val="tx1"/>
+                </a:solidFill>
+                <a:effectLst/>
+                <a:latin typeface="+mn-lt"/>
+                <a:ea typeface="+mn-ea"/>
+                <a:cs typeface="+mn-cs"/>
+              </a:rPr>
+              <a:t> - can split the output files into multiple files, to avoid having a huge </a:t>
+            </a:r>
+            <a:r>
+              <a:rPr lang="en-US" sz="1200" b="0" i="0" kern="1200" dirty="0" err="1">
+                <a:solidFill>
+                  <a:schemeClr val="tx1"/>
+                </a:solidFill>
+                <a:effectLst/>
+                <a:latin typeface="+mn-lt"/>
+                <a:ea typeface="+mn-ea"/>
+                <a:cs typeface="+mn-cs"/>
+              </a:rPr>
+              <a:t>js</a:t>
+            </a:r>
+            <a:r>
+              <a:rPr lang="en-US" sz="1200" b="0" i="0" kern="1200" dirty="0">
+                <a:solidFill>
+                  <a:schemeClr val="tx1"/>
+                </a:solidFill>
+                <a:effectLst/>
+                <a:latin typeface="+mn-lt"/>
+                <a:ea typeface="+mn-ea"/>
+                <a:cs typeface="+mn-cs"/>
+              </a:rPr>
+              <a:t> file to load in the first page hit.</a:t>
+            </a:r>
+          </a:p>
+          <a:p>
+            <a:pPr marL="171450" indent="-171450" algn="l" rtl="0">
+              <a:buFontTx/>
+              <a:buChar char="-"/>
+            </a:pPr>
+            <a:r>
+              <a:rPr lang="en-US" sz="1200" b="0" i="0" kern="1200" dirty="0">
+                <a:solidFill>
+                  <a:schemeClr val="tx1"/>
+                </a:solidFill>
+                <a:effectLst/>
+                <a:latin typeface="+mn-lt"/>
+                <a:ea typeface="+mn-ea"/>
+                <a:cs typeface="+mn-cs"/>
+              </a:rPr>
+              <a:t>can perform </a:t>
+            </a:r>
+            <a:r>
+              <a:rPr lang="en-US" sz="1200" b="1" i="0" u="none" strike="noStrike" kern="1200" dirty="0">
+                <a:solidFill>
+                  <a:schemeClr val="tx1"/>
+                </a:solidFill>
+                <a:effectLst/>
+                <a:latin typeface="+mn-lt"/>
+                <a:ea typeface="+mn-ea"/>
+                <a:cs typeface="+mn-cs"/>
+                <a:hlinkClick r:id="rId3"/>
+              </a:rPr>
+              <a:t>tree shaking</a:t>
+            </a:r>
+            <a:r>
+              <a:rPr lang="en-US" sz="1200" b="0" i="0" kern="1200" dirty="0">
+                <a:solidFill>
+                  <a:schemeClr val="tx1"/>
+                </a:solidFill>
+                <a:effectLst/>
+                <a:latin typeface="+mn-lt"/>
+                <a:ea typeface="+mn-ea"/>
+                <a:cs typeface="+mn-cs"/>
+              </a:rPr>
+              <a:t>.</a:t>
+            </a:r>
+          </a:p>
+          <a:p>
+            <a:pPr marL="171450" indent="-171450" algn="l" rtl="0">
+              <a:buFontTx/>
+              <a:buChar char="-"/>
+            </a:pPr>
+            <a:r>
+              <a:rPr lang="en-US" sz="1200" b="0" i="0" kern="1200" dirty="0">
+                <a:solidFill>
+                  <a:schemeClr val="tx1"/>
+                </a:solidFill>
+                <a:effectLst/>
+                <a:latin typeface="+mn-lt"/>
+                <a:ea typeface="+mn-ea"/>
+                <a:cs typeface="+mn-cs"/>
+              </a:rPr>
+              <a:t>watches for changes and re-runs the tasks.</a:t>
+            </a:r>
+          </a:p>
+          <a:p>
+            <a:pPr marL="171450" indent="-171450" algn="l" rtl="0">
+              <a:buFontTx/>
+              <a:buChar char="-"/>
+            </a:pPr>
+            <a:r>
+              <a:rPr lang="en-US" sz="1200" b="0" i="0" kern="1200" dirty="0">
+                <a:solidFill>
+                  <a:schemeClr val="tx1"/>
+                </a:solidFill>
+                <a:effectLst/>
+                <a:latin typeface="+mn-lt"/>
+                <a:ea typeface="+mn-ea"/>
+                <a:cs typeface="+mn-cs"/>
+              </a:rPr>
+              <a:t>can run Babel </a:t>
+            </a:r>
+            <a:r>
+              <a:rPr lang="en-US" sz="1200" b="0" i="0" kern="1200" dirty="0" err="1">
+                <a:solidFill>
+                  <a:schemeClr val="tx1"/>
+                </a:solidFill>
+                <a:effectLst/>
+                <a:latin typeface="+mn-lt"/>
+                <a:ea typeface="+mn-ea"/>
+                <a:cs typeface="+mn-cs"/>
+              </a:rPr>
+              <a:t>transpilation</a:t>
+            </a:r>
+            <a:r>
+              <a:rPr lang="en-US" sz="1200" b="0" i="0" kern="1200" dirty="0">
+                <a:solidFill>
+                  <a:schemeClr val="tx1"/>
+                </a:solidFill>
+                <a:effectLst/>
+                <a:latin typeface="+mn-lt"/>
+                <a:ea typeface="+mn-ea"/>
+                <a:cs typeface="+mn-cs"/>
+              </a:rPr>
+              <a:t> to ES5, allowing you to use the latest </a:t>
+            </a:r>
+            <a:r>
+              <a:rPr lang="en-US" sz="1200" b="0" i="0" u="none" strike="noStrike" kern="1200" dirty="0">
+                <a:solidFill>
+                  <a:schemeClr val="tx1"/>
+                </a:solidFill>
+                <a:effectLst/>
+                <a:latin typeface="+mn-lt"/>
+                <a:ea typeface="+mn-ea"/>
+                <a:cs typeface="+mn-cs"/>
+                <a:hlinkClick r:id="rId4"/>
+              </a:rPr>
+              <a:t>JavaScript</a:t>
+            </a:r>
+            <a:r>
+              <a:rPr lang="en-US" sz="1200" b="0" i="0" kern="1200" dirty="0">
+                <a:solidFill>
+                  <a:schemeClr val="tx1"/>
+                </a:solidFill>
+                <a:effectLst/>
+                <a:latin typeface="+mn-lt"/>
+                <a:ea typeface="+mn-ea"/>
+                <a:cs typeface="+mn-cs"/>
+              </a:rPr>
+              <a:t> features without worrying about browser support. </a:t>
+            </a:r>
+          </a:p>
+          <a:p>
+            <a:pPr marL="171450" indent="-171450" algn="l" rtl="0">
+              <a:buFontTx/>
+              <a:buChar char="-"/>
+            </a:pPr>
+            <a:r>
+              <a:rPr lang="en-US" sz="1200" b="0" i="0" kern="1200" dirty="0">
+                <a:solidFill>
+                  <a:schemeClr val="tx1"/>
+                </a:solidFill>
+                <a:effectLst/>
+                <a:latin typeface="+mn-lt"/>
+                <a:ea typeface="+mn-ea"/>
+                <a:cs typeface="+mn-cs"/>
+              </a:rPr>
+              <a:t>can convert inline images to data URIs.</a:t>
+            </a:r>
+          </a:p>
+          <a:p>
+            <a:pPr marL="171450" indent="-171450" algn="l" rtl="0">
+              <a:buFontTx/>
+              <a:buChar char="-"/>
+            </a:pPr>
+            <a:r>
+              <a:rPr lang="en-US" sz="1200" b="0" i="0" kern="1200" dirty="0">
+                <a:solidFill>
+                  <a:schemeClr val="tx1"/>
+                </a:solidFill>
+                <a:effectLst/>
+                <a:latin typeface="+mn-lt"/>
+                <a:ea typeface="+mn-ea"/>
+                <a:cs typeface="+mn-cs"/>
+              </a:rPr>
+              <a:t>allows you to use require() for CSS files.</a:t>
+            </a:r>
+          </a:p>
+          <a:p>
+            <a:pPr marL="171450" indent="-171450" algn="l" rtl="0">
+              <a:buFontTx/>
+              <a:buChar char="-"/>
+            </a:pPr>
+            <a:r>
+              <a:rPr lang="en-US" sz="1200" b="0" i="0" kern="1200" dirty="0">
+                <a:solidFill>
+                  <a:schemeClr val="tx1"/>
+                </a:solidFill>
+                <a:effectLst/>
+                <a:latin typeface="+mn-lt"/>
+                <a:ea typeface="+mn-ea"/>
+                <a:cs typeface="+mn-cs"/>
+              </a:rPr>
+              <a:t>can run a development webserver.</a:t>
+            </a:r>
+          </a:p>
+          <a:p>
+            <a:pPr marL="171450" indent="-171450" algn="l" rtl="0">
+              <a:buFontTx/>
+              <a:buChar char="-"/>
+            </a:pPr>
+            <a:r>
+              <a:rPr lang="en-US" sz="1200" b="0" i="0" kern="1200" dirty="0">
+                <a:solidFill>
+                  <a:schemeClr val="tx1"/>
+                </a:solidFill>
+                <a:effectLst/>
+                <a:latin typeface="+mn-lt"/>
+                <a:ea typeface="+mn-ea"/>
+                <a:cs typeface="+mn-cs"/>
+              </a:rPr>
+              <a:t>HMR - can handle hot module replacement.</a:t>
+            </a:r>
+          </a:p>
+          <a:p>
+            <a:pPr marL="171450" indent="-171450" algn="l" rtl="0">
+              <a:buFontTx/>
+              <a:buChar char="-"/>
+            </a:pPr>
+            <a:endParaRPr lang="en-US" sz="1200" b="0" i="0" kern="1200" dirty="0">
+              <a:solidFill>
+                <a:schemeClr val="tx1"/>
+              </a:solidFill>
+              <a:effectLst/>
+              <a:latin typeface="+mn-lt"/>
+              <a:ea typeface="+mn-ea"/>
+              <a:cs typeface="+mn-cs"/>
+            </a:endParaRPr>
+          </a:p>
+          <a:p>
+            <a:pPr marL="171450" indent="-171450" algn="l" rtl="0">
+              <a:buFontTx/>
+              <a:buChar char="-"/>
+            </a:pPr>
+            <a:endParaRPr lang="en-US" sz="1200" b="0" i="0" kern="1200" dirty="0">
+              <a:solidFill>
+                <a:schemeClr val="tx1"/>
+              </a:solidFill>
+              <a:effectLst/>
+              <a:latin typeface="+mn-lt"/>
+              <a:ea typeface="+mn-ea"/>
+              <a:cs typeface="+mn-cs"/>
+            </a:endParaRPr>
+          </a:p>
+          <a:p>
+            <a:pPr marL="171450" indent="-171450" algn="l" rtl="0">
+              <a:buFontTx/>
+              <a:buChar char="-"/>
+            </a:pPr>
+            <a:endParaRPr lang="en-US" sz="1200" b="0" i="0" kern="1200" dirty="0">
+              <a:solidFill>
+                <a:schemeClr val="tx1"/>
+              </a:solidFill>
+              <a:effectLst/>
+              <a:latin typeface="+mn-lt"/>
+              <a:ea typeface="+mn-ea"/>
+              <a:cs typeface="+mn-cs"/>
+            </a:endParaRPr>
+          </a:p>
+          <a:p>
+            <a:pPr marL="171450" indent="-171450" algn="l" rtl="0">
+              <a:buFontTx/>
+              <a:buChar char="-"/>
+            </a:pPr>
+            <a:endParaRPr lang="en-US" sz="1200" b="0" i="0" kern="1200" dirty="0">
+              <a:solidFill>
+                <a:schemeClr val="tx1"/>
+              </a:solidFill>
+              <a:effectLst/>
+              <a:latin typeface="+mn-lt"/>
+              <a:ea typeface="+mn-ea"/>
+              <a:cs typeface="+mn-cs"/>
+            </a:endParaRPr>
+          </a:p>
+          <a:p>
+            <a:pPr marL="171450" indent="-171450" algn="l" rtl="0">
+              <a:buFontTx/>
+              <a:buChar char="-"/>
+            </a:pPr>
+            <a:endParaRPr lang="en-US" sz="1200" b="0" i="0" kern="1200" dirty="0">
+              <a:solidFill>
+                <a:schemeClr val="tx1"/>
+              </a:solidFill>
+              <a:effectLst/>
+              <a:latin typeface="+mn-lt"/>
+              <a:ea typeface="+mn-ea"/>
+              <a:cs typeface="+mn-cs"/>
+            </a:endParaRPr>
+          </a:p>
+          <a:p>
+            <a:pPr marL="171450" indent="-171450" algn="l" rtl="0">
+              <a:buFontTx/>
+              <a:buChar char="-"/>
+            </a:pPr>
+            <a:endParaRPr lang="en-US" sz="1200" b="0" i="0" kern="1200" dirty="0">
+              <a:solidFill>
+                <a:schemeClr val="tx1"/>
+              </a:solidFill>
+              <a:effectLst/>
+              <a:latin typeface="+mn-lt"/>
+              <a:ea typeface="+mn-ea"/>
+              <a:cs typeface="+mn-cs"/>
+            </a:endParaRPr>
+          </a:p>
+          <a:p>
+            <a:pPr marL="171450" indent="-171450" algn="l" rtl="0">
+              <a:buFontTx/>
+              <a:buChar char="-"/>
+            </a:pPr>
+            <a:r>
+              <a:rPr lang="en-US" sz="1200" b="0" i="0" kern="1200" dirty="0">
+                <a:solidFill>
+                  <a:schemeClr val="tx1"/>
+                </a:solidFill>
+                <a:effectLst/>
+                <a:latin typeface="+mn-lt"/>
+                <a:ea typeface="+mn-ea"/>
+                <a:cs typeface="+mn-cs"/>
+              </a:rPr>
+              <a:t>https://flaviocopes.com/webpack/</a:t>
+            </a:r>
+            <a:endParaRPr lang="en-US" sz="1200" b="0" u="none" strike="noStrike" kern="1200" cap="all" dirty="0">
+              <a:solidFill>
+                <a:schemeClr val="tx1"/>
+              </a:solidFill>
+              <a:effectLst/>
+              <a:latin typeface="+mn-lt"/>
+              <a:ea typeface="+mn-ea"/>
+              <a:cs typeface="+mn-cs"/>
+            </a:endParaRPr>
+          </a:p>
+        </p:txBody>
+      </p:sp>
+      <p:sp>
+        <p:nvSpPr>
+          <p:cNvPr id="4" name="Slide Number Placeholder 3"/>
+          <p:cNvSpPr>
+            <a:spLocks noGrp="1"/>
+          </p:cNvSpPr>
+          <p:nvPr>
+            <p:ph type="sldNum" sz="quarter" idx="10"/>
+          </p:nvPr>
+        </p:nvSpPr>
+        <p:spPr/>
+        <p:txBody>
+          <a:bodyPr/>
+          <a:lstStyle/>
+          <a:p>
+            <a:fld id="{595D0871-5AD0-4670-BDA8-FBE649F625DD}" type="slidenum">
+              <a:rPr lang="he-IL" smtClean="0"/>
+              <a:t>16</a:t>
+            </a:fld>
+            <a:endParaRPr lang="he-IL"/>
+          </a:p>
+        </p:txBody>
+      </p:sp>
+    </p:spTree>
+    <p:extLst>
+      <p:ext uri="{BB962C8B-B14F-4D97-AF65-F5344CB8AC3E}">
         <p14:creationId xmlns:p14="http://schemas.microsoft.com/office/powerpoint/2010/main" val="2767432236"/>
+      </p:ext>
+    </p:extLst>
+  </p:cSld>
+  <p:clrMapOvr>
+    <a:masterClrMapping/>
+  </p:clrMapOvr>
+</p:notes>
+</file>
+
+<file path=ppt/notesSlides/notesSlide15.xml><?xml version="1.0" encoding="utf-8"?>
+<p:notes xmlns:a="http://schemas.openxmlformats.org/drawingml/2006/main" xmlns:r="http://schemas.openxmlformats.org/officeDocument/2006/relationships" xmlns:p="http://schemas.openxmlformats.org/presentationml/2006/main">
+  <p:cSld>
+    <p:spTree>
+      <p:nvGrpSpPr>
+        <p:cNvPr id="1" name=""/>
+        <p:cNvGrpSpPr/>
+        <p:nvPr/>
+      </p:nvGrpSpPr>
+      <p:grpSpPr>
+        <a:xfrm>
+          <a:off x="0" y="0"/>
+          <a:ext cx="0" cy="0"/>
+          <a:chOff x="0" y="0"/>
+          <a:chExt cx="0" cy="0"/>
+        </a:xfrm>
+      </p:grpSpPr>
+      <p:sp>
+        <p:nvSpPr>
+          <p:cNvPr id="2" name="Slide Image Placeholder 1"/>
+          <p:cNvSpPr>
+            <a:spLocks noGrp="1" noRot="1" noChangeAspect="1"/>
+          </p:cNvSpPr>
+          <p:nvPr>
+            <p:ph type="sldImg"/>
+          </p:nvPr>
+        </p:nvSpPr>
+        <p:spPr/>
+      </p:sp>
+      <p:sp>
+        <p:nvSpPr>
+          <p:cNvPr id="3" name="Notes Placeholder 2"/>
+          <p:cNvSpPr>
+            <a:spLocks noGrp="1"/>
+          </p:cNvSpPr>
+          <p:nvPr>
+            <p:ph type="body" idx="1"/>
+          </p:nvPr>
+        </p:nvSpPr>
+        <p:spPr/>
+        <p:txBody>
+          <a:bodyPr/>
+          <a:lstStyle/>
+          <a:p>
+            <a:pPr algn="l" rtl="0"/>
+            <a:r>
+              <a:rPr lang="en-US" sz="1200" b="0" i="0" kern="1200" dirty="0">
+                <a:solidFill>
+                  <a:schemeClr val="tx1"/>
+                </a:solidFill>
+                <a:effectLst/>
+                <a:latin typeface="+mn-lt"/>
+                <a:ea typeface="+mn-ea"/>
+                <a:cs typeface="+mn-cs"/>
+              </a:rPr>
+              <a:t>There are lots of similarities in what those and Webpack can do,</a:t>
+            </a:r>
+          </a:p>
+          <a:p>
+            <a:pPr algn="l" rtl="0"/>
+            <a:r>
+              <a:rPr lang="en-US" sz="1200" b="0" i="0" kern="1200" dirty="0">
+                <a:solidFill>
+                  <a:schemeClr val="tx1"/>
+                </a:solidFill>
+                <a:effectLst/>
+                <a:latin typeface="+mn-lt"/>
+                <a:ea typeface="+mn-ea"/>
+                <a:cs typeface="+mn-cs"/>
+              </a:rPr>
+              <a:t>but the main difference is that those are known as </a:t>
+            </a:r>
+            <a:r>
+              <a:rPr lang="en-US" sz="1200" b="1" i="0" kern="1200" dirty="0">
+                <a:solidFill>
+                  <a:schemeClr val="tx1"/>
+                </a:solidFill>
+                <a:effectLst/>
+                <a:latin typeface="+mn-lt"/>
+                <a:ea typeface="+mn-ea"/>
+                <a:cs typeface="+mn-cs"/>
+              </a:rPr>
+              <a:t>task runners</a:t>
+            </a:r>
+            <a:r>
+              <a:rPr lang="en-US" sz="1200" b="0" i="0" kern="1200" dirty="0">
+                <a:solidFill>
+                  <a:schemeClr val="tx1"/>
+                </a:solidFill>
+                <a:effectLst/>
+                <a:latin typeface="+mn-lt"/>
+                <a:ea typeface="+mn-ea"/>
+                <a:cs typeface="+mn-cs"/>
+              </a:rPr>
+              <a:t>, while webpack was born as a module bundler.</a:t>
+            </a:r>
+          </a:p>
+          <a:p>
+            <a:pPr algn="l" rtl="0"/>
+            <a:endParaRPr lang="en-US" sz="1200" b="0" i="0" kern="1200" dirty="0">
+              <a:solidFill>
+                <a:schemeClr val="tx1"/>
+              </a:solidFill>
+              <a:effectLst/>
+              <a:latin typeface="+mn-lt"/>
+              <a:ea typeface="+mn-ea"/>
+              <a:cs typeface="+mn-cs"/>
+            </a:endParaRPr>
+          </a:p>
+          <a:p>
+            <a:pPr algn="l" rtl="0"/>
+            <a:r>
+              <a:rPr lang="en-US" sz="1200" b="0" i="0" kern="1200" dirty="0">
+                <a:solidFill>
+                  <a:schemeClr val="tx1"/>
+                </a:solidFill>
+                <a:effectLst/>
+                <a:latin typeface="+mn-lt"/>
+                <a:ea typeface="+mn-ea"/>
+                <a:cs typeface="+mn-cs"/>
+              </a:rPr>
+              <a:t>It’s a more focused tool: you specify an entry point to your app (it could even be an HTML file with script tags) and webpack analyzes the files and bundles all you need to run the app in a single JavaScript output file (or in more files if you use code splitting).</a:t>
+            </a:r>
+          </a:p>
+          <a:p>
+            <a:pPr algn="l" rtl="0"/>
+            <a:endParaRPr lang="en-US" sz="1200" b="0" i="0" kern="1200" dirty="0">
+              <a:solidFill>
+                <a:schemeClr val="tx1"/>
+              </a:solidFill>
+              <a:effectLst/>
+              <a:latin typeface="+mn-lt"/>
+              <a:ea typeface="+mn-ea"/>
+              <a:cs typeface="+mn-cs"/>
+            </a:endParaRPr>
+          </a:p>
+          <a:p>
+            <a:pPr algn="l" rtl="0"/>
+            <a:endParaRPr lang="en-US" sz="1200" b="0" i="0" kern="1200" dirty="0">
+              <a:solidFill>
+                <a:schemeClr val="tx1"/>
+              </a:solidFill>
+              <a:effectLst/>
+              <a:latin typeface="+mn-lt"/>
+              <a:ea typeface="+mn-ea"/>
+              <a:cs typeface="+mn-cs"/>
+            </a:endParaRPr>
+          </a:p>
+          <a:p>
+            <a:pPr marL="171450" indent="-171450" algn="l" rtl="0">
+              <a:buFontTx/>
+              <a:buChar char="-"/>
+            </a:pPr>
+            <a:r>
+              <a:rPr lang="en-US" sz="1200" b="0" i="0" kern="1200" dirty="0">
+                <a:solidFill>
+                  <a:schemeClr val="tx1"/>
+                </a:solidFill>
+                <a:effectLst/>
+                <a:latin typeface="+mn-lt"/>
+                <a:ea typeface="+mn-ea"/>
+                <a:cs typeface="+mn-cs"/>
+              </a:rPr>
+              <a:t>https://flaviocopes.com/webpack/</a:t>
+            </a:r>
+          </a:p>
+          <a:p>
+            <a:pPr marL="171450" indent="-171450" algn="l" rtl="0">
+              <a:buFontTx/>
+              <a:buChar char="-"/>
+            </a:pPr>
+            <a:r>
+              <a:rPr lang="en-US" sz="1200" b="0" i="0" kern="1200" dirty="0">
+                <a:solidFill>
+                  <a:schemeClr val="tx1"/>
+                </a:solidFill>
+                <a:effectLst/>
+                <a:latin typeface="+mn-lt"/>
+                <a:ea typeface="+mn-ea"/>
+                <a:cs typeface="+mn-cs"/>
+              </a:rPr>
+              <a:t>https://da-14.com/blog/gulp-vs-grunt-vs-webpack-comparison-build-tools-task-runners</a:t>
+            </a:r>
+          </a:p>
+          <a:p>
+            <a:pPr marL="171450" indent="-171450" algn="l" rtl="0">
+              <a:buFontTx/>
+              <a:buChar char="-"/>
+            </a:pPr>
+            <a:endParaRPr lang="en-US" sz="1200" b="0" i="0" kern="1200" dirty="0">
+              <a:solidFill>
+                <a:schemeClr val="tx1"/>
+              </a:solidFill>
+              <a:effectLst/>
+              <a:latin typeface="+mn-lt"/>
+              <a:ea typeface="+mn-ea"/>
+              <a:cs typeface="+mn-cs"/>
+            </a:endParaRPr>
+          </a:p>
+        </p:txBody>
+      </p:sp>
+      <p:sp>
+        <p:nvSpPr>
+          <p:cNvPr id="4" name="Slide Number Placeholder 3"/>
+          <p:cNvSpPr>
+            <a:spLocks noGrp="1"/>
+          </p:cNvSpPr>
+          <p:nvPr>
+            <p:ph type="sldNum" sz="quarter" idx="10"/>
+          </p:nvPr>
+        </p:nvSpPr>
+        <p:spPr/>
+        <p:txBody>
+          <a:bodyPr/>
+          <a:lstStyle/>
+          <a:p>
+            <a:fld id="{595D0871-5AD0-4670-BDA8-FBE649F625DD}" type="slidenum">
+              <a:rPr lang="he-IL" smtClean="0"/>
+              <a:t>17</a:t>
+            </a:fld>
+            <a:endParaRPr lang="he-IL"/>
+          </a:p>
+        </p:txBody>
+      </p:sp>
+    </p:spTree>
+    <p:extLst>
+      <p:ext uri="{BB962C8B-B14F-4D97-AF65-F5344CB8AC3E}">
+        <p14:creationId xmlns:p14="http://schemas.microsoft.com/office/powerpoint/2010/main" val="879785727"/>
+      </p:ext>
+    </p:extLst>
+  </p:cSld>
+  <p:clrMapOvr>
+    <a:masterClrMapping/>
+  </p:clrMapOvr>
+</p:notes>
+</file>
+
+<file path=ppt/notesSlides/notesSlide16.xml><?xml version="1.0" encoding="utf-8"?>
+<p:notes xmlns:a="http://schemas.openxmlformats.org/drawingml/2006/main" xmlns:r="http://schemas.openxmlformats.org/officeDocument/2006/relationships" xmlns:p="http://schemas.openxmlformats.org/presentationml/2006/main">
+  <p:cSld>
+    <p:spTree>
+      <p:nvGrpSpPr>
+        <p:cNvPr id="1" name=""/>
+        <p:cNvGrpSpPr/>
+        <p:nvPr/>
+      </p:nvGrpSpPr>
+      <p:grpSpPr>
+        <a:xfrm>
+          <a:off x="0" y="0"/>
+          <a:ext cx="0" cy="0"/>
+          <a:chOff x="0" y="0"/>
+          <a:chExt cx="0" cy="0"/>
+        </a:xfrm>
+      </p:grpSpPr>
+      <p:sp>
+        <p:nvSpPr>
+          <p:cNvPr id="2" name="Slide Image Placeholder 1"/>
+          <p:cNvSpPr>
+            <a:spLocks noGrp="1" noRot="1" noChangeAspect="1"/>
+          </p:cNvSpPr>
+          <p:nvPr>
+            <p:ph type="sldImg"/>
+          </p:nvPr>
+        </p:nvSpPr>
+        <p:spPr/>
+      </p:sp>
+      <p:sp>
+        <p:nvSpPr>
+          <p:cNvPr id="3" name="Notes Placeholder 2"/>
+          <p:cNvSpPr>
+            <a:spLocks noGrp="1"/>
+          </p:cNvSpPr>
+          <p:nvPr>
+            <p:ph type="body" idx="1"/>
+          </p:nvPr>
+        </p:nvSpPr>
+        <p:spPr/>
+        <p:txBody>
+          <a:bodyPr/>
+          <a:lstStyle/>
+          <a:p>
+            <a:pPr algn="l" rtl="0"/>
+            <a:r>
+              <a:rPr lang="en-US" sz="1200" b="0" u="none" strike="noStrike" kern="1200" cap="all" dirty="0">
+                <a:solidFill>
+                  <a:schemeClr val="tx1"/>
+                </a:solidFill>
+                <a:effectLst/>
+                <a:latin typeface="+mn-lt"/>
+                <a:ea typeface="+mn-ea"/>
+                <a:cs typeface="+mn-cs"/>
+                <a:hlinkClick r:id="rId3"/>
+              </a:rPr>
+              <a:t>WHAT IS AN EVERGREEN BROWSER?</a:t>
+            </a:r>
+          </a:p>
+          <a:p>
+            <a:pPr algn="l" rtl="0"/>
+            <a:endParaRPr lang="en-US" sz="1200" b="0" u="none" strike="noStrike" kern="1200" cap="all" dirty="0">
+              <a:solidFill>
+                <a:schemeClr val="tx1"/>
+              </a:solidFill>
+              <a:effectLst/>
+              <a:latin typeface="+mn-lt"/>
+              <a:ea typeface="+mn-ea"/>
+              <a:cs typeface="+mn-cs"/>
+              <a:hlinkClick r:id="rId3"/>
+            </a:endParaRPr>
+          </a:p>
+          <a:p>
+            <a:pPr algn="l"/>
+            <a:r>
+              <a:rPr lang="en-US" sz="1200" b="0" i="0" kern="1200" dirty="0">
+                <a:solidFill>
+                  <a:schemeClr val="tx1"/>
+                </a:solidFill>
+                <a:effectLst/>
+                <a:latin typeface="+mn-lt"/>
+                <a:ea typeface="+mn-ea"/>
+                <a:cs typeface="+mn-cs"/>
+              </a:rPr>
+              <a:t>The term "evergreen" refers to the release strategy. Evergreen browsers are updated frequently (</a:t>
+            </a:r>
+            <a:r>
+              <a:rPr lang="en-US" sz="1200" b="0" i="0" u="none" strike="noStrike" kern="1200" dirty="0">
+                <a:solidFill>
+                  <a:schemeClr val="tx1"/>
+                </a:solidFill>
+                <a:effectLst/>
+                <a:latin typeface="+mn-lt"/>
+                <a:ea typeface="+mn-ea"/>
+                <a:cs typeface="+mn-cs"/>
+                <a:hlinkClick r:id="rId4"/>
+              </a:rPr>
+              <a:t>Microsoft Edge Changelog</a:t>
+            </a:r>
+            <a:r>
+              <a:rPr lang="en-US" sz="1200" b="0" i="0" kern="1200" dirty="0">
+                <a:solidFill>
+                  <a:schemeClr val="tx1"/>
+                </a:solidFill>
+                <a:effectLst/>
+                <a:latin typeface="+mn-lt"/>
+                <a:ea typeface="+mn-ea"/>
+                <a:cs typeface="+mn-cs"/>
+              </a:rPr>
+              <a:t>, </a:t>
+            </a:r>
+            <a:r>
+              <a:rPr lang="en-US" sz="1200" b="0" i="0" u="none" strike="noStrike" kern="1200" dirty="0">
+                <a:solidFill>
+                  <a:schemeClr val="tx1"/>
+                </a:solidFill>
+                <a:effectLst/>
+                <a:latin typeface="+mn-lt"/>
+                <a:ea typeface="+mn-ea"/>
+                <a:cs typeface="+mn-cs"/>
+                <a:hlinkClick r:id="rId5"/>
+              </a:rPr>
+              <a:t>Firefox Release Calendar</a:t>
+            </a:r>
+            <a:r>
+              <a:rPr lang="en-US" sz="1200" b="0" i="0" kern="1200" dirty="0">
+                <a:solidFill>
+                  <a:schemeClr val="tx1"/>
+                </a:solidFill>
+                <a:effectLst/>
+                <a:latin typeface="+mn-lt"/>
+                <a:ea typeface="+mn-ea"/>
+                <a:cs typeface="+mn-cs"/>
+              </a:rPr>
+              <a:t>, </a:t>
+            </a:r>
+            <a:r>
+              <a:rPr lang="en-US" sz="1200" b="0" i="0" u="none" strike="noStrike" kern="1200" dirty="0">
+                <a:solidFill>
+                  <a:schemeClr val="tx1"/>
+                </a:solidFill>
+                <a:effectLst/>
+                <a:latin typeface="+mn-lt"/>
+                <a:ea typeface="+mn-ea"/>
+                <a:cs typeface="+mn-cs"/>
+                <a:hlinkClick r:id="rId6"/>
+              </a:rPr>
+              <a:t>Chrome Release Schedule</a:t>
+            </a:r>
+            <a:r>
+              <a:rPr lang="en-US" sz="1200" b="0" i="0" kern="1200" dirty="0">
+                <a:solidFill>
+                  <a:schemeClr val="tx1"/>
+                </a:solidFill>
+                <a:effectLst/>
+                <a:latin typeface="+mn-lt"/>
+                <a:ea typeface="+mn-ea"/>
+                <a:cs typeface="+mn-cs"/>
+              </a:rPr>
+              <a:t>) in background, constantly updating their compliance with </a:t>
+            </a:r>
+            <a:r>
+              <a:rPr lang="en-US" sz="1200" b="0" i="0" u="none" strike="noStrike" kern="1200" dirty="0">
+                <a:solidFill>
+                  <a:schemeClr val="tx1"/>
+                </a:solidFill>
+                <a:effectLst/>
+                <a:latin typeface="+mn-lt"/>
+                <a:ea typeface="+mn-ea"/>
+                <a:cs typeface="+mn-cs"/>
+                <a:hlinkClick r:id="rId7"/>
+              </a:rPr>
+              <a:t>Web Standards</a:t>
+            </a:r>
+            <a:r>
+              <a:rPr lang="en-US" sz="1200" b="0" i="0" kern="1200" dirty="0">
+                <a:solidFill>
+                  <a:schemeClr val="tx1"/>
+                </a:solidFill>
+                <a:effectLst/>
+                <a:latin typeface="+mn-lt"/>
+                <a:ea typeface="+mn-ea"/>
+                <a:cs typeface="+mn-cs"/>
+              </a:rPr>
+              <a:t> and also adding proprietary features.</a:t>
+            </a:r>
+          </a:p>
+          <a:p>
+            <a:pPr marL="0" indent="0" algn="l" rtl="0">
+              <a:buFontTx/>
+              <a:buNone/>
+            </a:pPr>
+            <a:endParaRPr lang="en-US" b="0" dirty="0"/>
+          </a:p>
+          <a:p>
+            <a:pPr marL="0" indent="0" algn="l" rtl="0">
+              <a:buFontTx/>
+              <a:buNone/>
+            </a:pPr>
+            <a:r>
+              <a:rPr lang="en-US" b="0" dirty="0"/>
+              <a:t>Edge, Chrome, FF, Safari are supported by evergreen</a:t>
+            </a:r>
+          </a:p>
+          <a:p>
+            <a:pPr marL="0" indent="0" algn="l" rtl="0">
+              <a:buFontTx/>
+              <a:buNone/>
+            </a:pPr>
+            <a:r>
+              <a:rPr lang="en-US" b="0" dirty="0"/>
+              <a:t>IE11 - </a:t>
+            </a:r>
+            <a:r>
+              <a:rPr lang="en-US" sz="1200" b="0" i="0" kern="1200" dirty="0">
+                <a:solidFill>
+                  <a:schemeClr val="tx1"/>
+                </a:solidFill>
+                <a:effectLst/>
+                <a:latin typeface="+mn-lt"/>
+                <a:ea typeface="+mn-ea"/>
+                <a:cs typeface="+mn-cs"/>
+              </a:rPr>
+              <a:t> Microsoft does not support it because it’s going to be dead soon so it’s not ever green and will have slow upgrades.</a:t>
+            </a:r>
+            <a:endParaRPr lang="en-US" b="0" dirty="0"/>
+          </a:p>
+          <a:p>
+            <a:pPr marL="0" indent="0" algn="l" rtl="0">
+              <a:buFontTx/>
+              <a:buNone/>
+            </a:pPr>
+            <a:r>
+              <a:rPr lang="en-US" b="0" dirty="0"/>
+              <a:t>IE10 – don’t have at all any updates</a:t>
+            </a:r>
+          </a:p>
+          <a:p>
+            <a:pPr marL="0" indent="0" algn="l" rtl="0">
+              <a:buFontTx/>
+              <a:buNone/>
+            </a:pPr>
+            <a:endParaRPr lang="en-US" b="0" dirty="0"/>
+          </a:p>
+          <a:p>
+            <a:pPr marL="171450" indent="-171450" algn="l" rtl="0">
+              <a:buFontTx/>
+              <a:buChar char="-"/>
+            </a:pPr>
+            <a:r>
+              <a:rPr lang="en-US" b="0" dirty="0"/>
+              <a:t>http://www.adam-bien.com/roller/abien/entry/what_is_an_evergreen_browser</a:t>
+            </a:r>
+          </a:p>
+          <a:p>
+            <a:pPr marL="171450" indent="-171450" algn="l" rtl="0">
+              <a:buFontTx/>
+              <a:buChar char="-"/>
+            </a:pPr>
+            <a:r>
+              <a:rPr lang="en-US" b="0" dirty="0"/>
+              <a:t>https://www.deskdirector.com/technical-blog/the-future-of-deskdirector-on-ie-11</a:t>
+            </a:r>
+          </a:p>
+          <a:p>
+            <a:pPr marL="0" indent="0" algn="l" rtl="0">
+              <a:buFontTx/>
+              <a:buNone/>
+            </a:pPr>
+            <a:r>
+              <a:rPr lang="en-US" b="0" dirty="0"/>
+              <a:t>	</a:t>
+            </a:r>
+          </a:p>
+        </p:txBody>
+      </p:sp>
+      <p:sp>
+        <p:nvSpPr>
+          <p:cNvPr id="4" name="Slide Number Placeholder 3"/>
+          <p:cNvSpPr>
+            <a:spLocks noGrp="1"/>
+          </p:cNvSpPr>
+          <p:nvPr>
+            <p:ph type="sldNum" sz="quarter" idx="10"/>
+          </p:nvPr>
+        </p:nvSpPr>
+        <p:spPr/>
+        <p:txBody>
+          <a:bodyPr/>
+          <a:lstStyle/>
+          <a:p>
+            <a:fld id="{595D0871-5AD0-4670-BDA8-FBE649F625DD}" type="slidenum">
+              <a:rPr lang="he-IL" smtClean="0"/>
+              <a:t>18</a:t>
+            </a:fld>
+            <a:endParaRPr lang="he-IL"/>
+          </a:p>
+        </p:txBody>
+      </p:sp>
+    </p:spTree>
+    <p:extLst>
+      <p:ext uri="{BB962C8B-B14F-4D97-AF65-F5344CB8AC3E}">
+        <p14:creationId xmlns:p14="http://schemas.microsoft.com/office/powerpoint/2010/main" val="3938553295"/>
+      </p:ext>
+    </p:extLst>
+  </p:cSld>
+  <p:clrMapOvr>
+    <a:masterClrMapping/>
+  </p:clrMapOvr>
+</p:notes>
+</file>
+
+<file path=ppt/notesSlides/notesSlide17.xml><?xml version="1.0" encoding="utf-8"?>
+<p:notes xmlns:a="http://schemas.openxmlformats.org/drawingml/2006/main" xmlns:r="http://schemas.openxmlformats.org/officeDocument/2006/relationships" xmlns:p="http://schemas.openxmlformats.org/presentationml/2006/main">
+  <p:cSld>
+    <p:spTree>
+      <p:nvGrpSpPr>
+        <p:cNvPr id="1" name=""/>
+        <p:cNvGrpSpPr/>
+        <p:nvPr/>
+      </p:nvGrpSpPr>
+      <p:grpSpPr>
+        <a:xfrm>
+          <a:off x="0" y="0"/>
+          <a:ext cx="0" cy="0"/>
+          <a:chOff x="0" y="0"/>
+          <a:chExt cx="0" cy="0"/>
+        </a:xfrm>
+      </p:grpSpPr>
+      <p:sp>
+        <p:nvSpPr>
+          <p:cNvPr id="2" name="Slide Image Placeholder 1"/>
+          <p:cNvSpPr>
+            <a:spLocks noGrp="1" noRot="1" noChangeAspect="1"/>
+          </p:cNvSpPr>
+          <p:nvPr>
+            <p:ph type="sldImg"/>
+          </p:nvPr>
+        </p:nvSpPr>
+        <p:spPr/>
+      </p:sp>
+      <p:sp>
+        <p:nvSpPr>
+          <p:cNvPr id="3" name="Notes Placeholder 2"/>
+          <p:cNvSpPr>
+            <a:spLocks noGrp="1"/>
+          </p:cNvSpPr>
+          <p:nvPr>
+            <p:ph type="body" idx="1"/>
+          </p:nvPr>
+        </p:nvSpPr>
+        <p:spPr/>
+        <p:txBody>
+          <a:bodyPr/>
+          <a:lstStyle/>
+          <a:p>
+            <a:pPr algn="l" rtl="0"/>
+            <a:r>
+              <a:rPr lang="en-US" sz="1200" b="0" i="0" kern="1200" dirty="0">
+                <a:solidFill>
+                  <a:schemeClr val="tx1"/>
+                </a:solidFill>
+                <a:effectLst/>
+                <a:latin typeface="+mn-lt"/>
+                <a:ea typeface="+mn-ea"/>
+                <a:cs typeface="+mn-cs"/>
+              </a:rPr>
+              <a:t>What is NPM?</a:t>
+            </a:r>
+          </a:p>
+          <a:p>
+            <a:pPr algn="l" rtl="0"/>
+            <a:endParaRPr lang="en-US" sz="1200" b="0" u="none" strike="noStrike" kern="1200" cap="all" dirty="0">
+              <a:solidFill>
+                <a:schemeClr val="tx1"/>
+              </a:solidFill>
+              <a:effectLst/>
+              <a:latin typeface="+mn-lt"/>
+              <a:ea typeface="+mn-ea"/>
+              <a:cs typeface="+mn-cs"/>
+              <a:hlinkClick r:id="rId3"/>
+            </a:endParaRPr>
+          </a:p>
+          <a:p>
+            <a:pPr algn="l" rtl="0"/>
+            <a:r>
+              <a:rPr lang="en-US" sz="1200" b="1" i="0" kern="1200" dirty="0" err="1">
+                <a:solidFill>
+                  <a:schemeClr val="tx1"/>
+                </a:solidFill>
+                <a:effectLst/>
+                <a:latin typeface="+mn-lt"/>
+                <a:ea typeface="+mn-ea"/>
+                <a:cs typeface="+mn-cs"/>
+              </a:rPr>
+              <a:t>npm</a:t>
+            </a:r>
+            <a:r>
+              <a:rPr lang="en-US" sz="1200" b="0" i="0" kern="1200" dirty="0">
+                <a:solidFill>
+                  <a:schemeClr val="tx1"/>
+                </a:solidFill>
+                <a:effectLst/>
+                <a:latin typeface="+mn-lt"/>
+                <a:ea typeface="+mn-ea"/>
+                <a:cs typeface="+mn-cs"/>
+              </a:rPr>
+              <a:t> is the world's largest </a:t>
+            </a:r>
+            <a:r>
+              <a:rPr lang="en-US" sz="1200" b="1" i="0" kern="1200" dirty="0">
+                <a:solidFill>
+                  <a:schemeClr val="tx1"/>
+                </a:solidFill>
+                <a:effectLst/>
+                <a:latin typeface="+mn-lt"/>
+                <a:ea typeface="+mn-ea"/>
+                <a:cs typeface="+mn-cs"/>
+              </a:rPr>
+              <a:t>Software Registry,</a:t>
+            </a:r>
+            <a:r>
+              <a:rPr lang="en-US" sz="1200" b="0" i="0" kern="1200" dirty="0">
+                <a:solidFill>
+                  <a:schemeClr val="tx1"/>
+                </a:solidFill>
+                <a:effectLst/>
+                <a:latin typeface="+mn-lt"/>
+                <a:ea typeface="+mn-ea"/>
+                <a:cs typeface="+mn-cs"/>
+              </a:rPr>
+              <a:t> in other words package manager for node.</a:t>
+            </a:r>
+          </a:p>
+          <a:p>
+            <a:pPr algn="l" rtl="0"/>
+            <a:r>
+              <a:rPr lang="en-US" sz="1200" b="0" i="0" kern="1200" dirty="0">
+                <a:solidFill>
+                  <a:schemeClr val="tx1"/>
+                </a:solidFill>
+                <a:effectLst/>
+                <a:latin typeface="+mn-lt"/>
+                <a:ea typeface="+mn-ea"/>
+                <a:cs typeface="+mn-cs"/>
+              </a:rPr>
+              <a:t>The registry contains over 800,000 </a:t>
+            </a:r>
+            <a:r>
+              <a:rPr lang="en-US" sz="1200" b="1" i="0" kern="1200" dirty="0">
+                <a:solidFill>
+                  <a:schemeClr val="tx1"/>
+                </a:solidFill>
+                <a:effectLst/>
+                <a:latin typeface="+mn-lt"/>
+                <a:ea typeface="+mn-ea"/>
+                <a:cs typeface="+mn-cs"/>
+              </a:rPr>
+              <a:t>code packages</a:t>
+            </a:r>
+            <a:r>
+              <a:rPr lang="en-US" sz="1200" b="0" i="0" kern="1200" dirty="0">
+                <a:solidFill>
+                  <a:schemeClr val="tx1"/>
+                </a:solidFill>
+                <a:effectLst/>
+                <a:latin typeface="+mn-lt"/>
+                <a:ea typeface="+mn-ea"/>
+                <a:cs typeface="+mn-cs"/>
+              </a:rPr>
+              <a:t>.</a:t>
+            </a:r>
+          </a:p>
+          <a:p>
+            <a:pPr algn="l" rtl="0"/>
+            <a:r>
+              <a:rPr lang="en-US" sz="1200" b="1" i="0" kern="1200" dirty="0">
+                <a:solidFill>
+                  <a:schemeClr val="tx1"/>
+                </a:solidFill>
+                <a:effectLst/>
+                <a:latin typeface="+mn-lt"/>
+                <a:ea typeface="+mn-ea"/>
+                <a:cs typeface="+mn-cs"/>
+              </a:rPr>
+              <a:t>Open-source</a:t>
+            </a:r>
+            <a:r>
+              <a:rPr lang="en-US" sz="1200" b="0" i="0" kern="1200" dirty="0">
+                <a:solidFill>
+                  <a:schemeClr val="tx1"/>
+                </a:solidFill>
+                <a:effectLst/>
+                <a:latin typeface="+mn-lt"/>
+                <a:ea typeface="+mn-ea"/>
+                <a:cs typeface="+mn-cs"/>
+              </a:rPr>
+              <a:t> developers use </a:t>
+            </a:r>
+            <a:r>
+              <a:rPr lang="en-US" sz="1200" b="1" i="0" kern="1200" dirty="0" err="1">
+                <a:solidFill>
+                  <a:schemeClr val="tx1"/>
+                </a:solidFill>
+                <a:effectLst/>
+                <a:latin typeface="+mn-lt"/>
+                <a:ea typeface="+mn-ea"/>
+                <a:cs typeface="+mn-cs"/>
+              </a:rPr>
+              <a:t>npm</a:t>
+            </a:r>
+            <a:r>
+              <a:rPr lang="en-US" sz="1200" b="0" i="0" kern="1200" dirty="0">
+                <a:solidFill>
+                  <a:schemeClr val="tx1"/>
+                </a:solidFill>
+                <a:effectLst/>
+                <a:latin typeface="+mn-lt"/>
+                <a:ea typeface="+mn-ea"/>
+                <a:cs typeface="+mn-cs"/>
+              </a:rPr>
+              <a:t> to </a:t>
+            </a:r>
+            <a:r>
+              <a:rPr lang="en-US" sz="1200" b="1" i="0" kern="1200" dirty="0">
+                <a:solidFill>
+                  <a:schemeClr val="tx1"/>
+                </a:solidFill>
+                <a:effectLst/>
+                <a:latin typeface="+mn-lt"/>
+                <a:ea typeface="+mn-ea"/>
+                <a:cs typeface="+mn-cs"/>
+              </a:rPr>
+              <a:t>share</a:t>
+            </a:r>
+            <a:r>
+              <a:rPr lang="en-US" sz="1200" b="0" i="0" kern="1200" dirty="0">
+                <a:solidFill>
+                  <a:schemeClr val="tx1"/>
+                </a:solidFill>
+                <a:effectLst/>
+                <a:latin typeface="+mn-lt"/>
+                <a:ea typeface="+mn-ea"/>
+                <a:cs typeface="+mn-cs"/>
+              </a:rPr>
+              <a:t> software.</a:t>
+            </a:r>
+          </a:p>
+          <a:p>
+            <a:pPr algn="l" rtl="0"/>
+            <a:endParaRPr lang="en-US" sz="1200" b="0" i="0" kern="1200" dirty="0">
+              <a:solidFill>
+                <a:schemeClr val="tx1"/>
+              </a:solidFill>
+              <a:effectLst/>
+              <a:latin typeface="+mn-lt"/>
+              <a:ea typeface="+mn-ea"/>
+              <a:cs typeface="+mn-cs"/>
+            </a:endParaRPr>
+          </a:p>
+          <a:p>
+            <a:pPr algn="l" rtl="0"/>
+            <a:r>
+              <a:rPr lang="en-US" sz="1200" b="0" i="0" kern="1200" dirty="0">
+                <a:solidFill>
+                  <a:schemeClr val="tx1"/>
+                </a:solidFill>
+                <a:effectLst/>
+                <a:latin typeface="+mn-lt"/>
+                <a:ea typeface="+mn-ea"/>
+                <a:cs typeface="+mn-cs"/>
+              </a:rPr>
+              <a:t>We can search for package via google or official </a:t>
+            </a:r>
+            <a:r>
+              <a:rPr lang="en-US" sz="1200" b="0" i="0" kern="1200" dirty="0" err="1">
+                <a:solidFill>
+                  <a:schemeClr val="tx1"/>
+                </a:solidFill>
+                <a:effectLst/>
+                <a:latin typeface="+mn-lt"/>
+                <a:ea typeface="+mn-ea"/>
+                <a:cs typeface="+mn-cs"/>
+              </a:rPr>
+              <a:t>npm</a:t>
+            </a:r>
+            <a:r>
+              <a:rPr lang="en-US" sz="1200" b="0" i="0" kern="1200" dirty="0">
+                <a:solidFill>
+                  <a:schemeClr val="tx1"/>
+                </a:solidFill>
+                <a:effectLst/>
+                <a:latin typeface="+mn-lt"/>
+                <a:ea typeface="+mn-ea"/>
+                <a:cs typeface="+mn-cs"/>
+              </a:rPr>
+              <a:t> web site</a:t>
+            </a:r>
+          </a:p>
+          <a:p>
+            <a:pPr algn="l" rtl="0"/>
+            <a:endParaRPr lang="en-US" sz="1200" b="0" i="0" kern="1200" dirty="0">
+              <a:solidFill>
+                <a:schemeClr val="tx1"/>
+              </a:solidFill>
+              <a:effectLst/>
+              <a:latin typeface="+mn-lt"/>
+              <a:ea typeface="+mn-ea"/>
+              <a:cs typeface="+mn-cs"/>
+            </a:endParaRPr>
+          </a:p>
+          <a:p>
+            <a:pPr algn="l" rtl="0"/>
+            <a:endParaRPr lang="en-US" sz="1200" b="0" i="0" kern="1200" dirty="0">
+              <a:solidFill>
+                <a:schemeClr val="tx1"/>
+              </a:solidFill>
+              <a:effectLst/>
+              <a:latin typeface="+mn-lt"/>
+              <a:ea typeface="+mn-ea"/>
+              <a:cs typeface="+mn-cs"/>
+            </a:endParaRPr>
+          </a:p>
+          <a:p>
+            <a:pPr algn="l" rtl="0"/>
+            <a:r>
+              <a:rPr lang="en-US" sz="1200" b="0" i="0" kern="1200" dirty="0">
+                <a:solidFill>
+                  <a:schemeClr val="tx1"/>
+                </a:solidFill>
+                <a:effectLst/>
+                <a:latin typeface="+mn-lt"/>
+                <a:ea typeface="+mn-ea"/>
+                <a:cs typeface="+mn-cs"/>
+              </a:rPr>
+              <a:t>We have also other package mangers like </a:t>
+            </a:r>
+            <a:r>
+              <a:rPr lang="en-US" sz="1200" b="0" i="0" kern="1200" dirty="0" err="1">
+                <a:solidFill>
+                  <a:schemeClr val="tx1"/>
+                </a:solidFill>
+                <a:effectLst/>
+                <a:latin typeface="+mn-lt"/>
+                <a:ea typeface="+mn-ea"/>
+                <a:cs typeface="+mn-cs"/>
+              </a:rPr>
+              <a:t>Verdaccio</a:t>
+            </a:r>
+            <a:r>
+              <a:rPr lang="en-US" sz="1200" b="0" i="0" kern="1200" dirty="0">
+                <a:solidFill>
+                  <a:schemeClr val="tx1"/>
+                </a:solidFill>
+                <a:effectLst/>
+                <a:latin typeface="+mn-lt"/>
+                <a:ea typeface="+mn-ea"/>
+                <a:cs typeface="+mn-cs"/>
+              </a:rPr>
+              <a:t>, </a:t>
+            </a:r>
+            <a:r>
+              <a:rPr lang="en-US" sz="1200" b="0" i="0" kern="1200" dirty="0" err="1">
+                <a:solidFill>
+                  <a:schemeClr val="tx1"/>
+                </a:solidFill>
+                <a:effectLst/>
+                <a:latin typeface="+mn-lt"/>
+                <a:ea typeface="+mn-ea"/>
+                <a:cs typeface="+mn-cs"/>
+              </a:rPr>
+              <a:t>Sinopia</a:t>
+            </a:r>
+            <a:endParaRPr lang="en-US" sz="1200" b="0" i="0" kern="1200" dirty="0">
+              <a:solidFill>
+                <a:schemeClr val="tx1"/>
+              </a:solidFill>
+              <a:effectLst/>
+              <a:latin typeface="+mn-lt"/>
+              <a:ea typeface="+mn-ea"/>
+              <a:cs typeface="+mn-cs"/>
+            </a:endParaRPr>
+          </a:p>
+          <a:p>
+            <a:pPr algn="l" rtl="0"/>
+            <a:endParaRPr lang="en-US" sz="1200" b="0" i="0" kern="1200" dirty="0">
+              <a:solidFill>
+                <a:schemeClr val="tx1"/>
+              </a:solidFill>
+              <a:effectLst/>
+              <a:latin typeface="+mn-lt"/>
+              <a:ea typeface="+mn-ea"/>
+              <a:cs typeface="+mn-cs"/>
+            </a:endParaRPr>
+          </a:p>
+        </p:txBody>
+      </p:sp>
+      <p:sp>
+        <p:nvSpPr>
+          <p:cNvPr id="4" name="Slide Number Placeholder 3"/>
+          <p:cNvSpPr>
+            <a:spLocks noGrp="1"/>
+          </p:cNvSpPr>
+          <p:nvPr>
+            <p:ph type="sldNum" sz="quarter" idx="10"/>
+          </p:nvPr>
+        </p:nvSpPr>
+        <p:spPr/>
+        <p:txBody>
+          <a:bodyPr/>
+          <a:lstStyle/>
+          <a:p>
+            <a:fld id="{595D0871-5AD0-4670-BDA8-FBE649F625DD}" type="slidenum">
+              <a:rPr lang="he-IL" smtClean="0"/>
+              <a:t>19</a:t>
+            </a:fld>
+            <a:endParaRPr lang="he-IL"/>
+          </a:p>
+        </p:txBody>
+      </p:sp>
+    </p:spTree>
+    <p:extLst>
+      <p:ext uri="{BB962C8B-B14F-4D97-AF65-F5344CB8AC3E}">
+        <p14:creationId xmlns:p14="http://schemas.microsoft.com/office/powerpoint/2010/main" val="122892736"/>
+      </p:ext>
+    </p:extLst>
+  </p:cSld>
+  <p:clrMapOvr>
+    <a:masterClrMapping/>
+  </p:clrMapOvr>
+</p:notes>
+</file>
+
+<file path=ppt/notesSlides/notesSlide18.xml><?xml version="1.0" encoding="utf-8"?>
+<p:notes xmlns:a="http://schemas.openxmlformats.org/drawingml/2006/main" xmlns:r="http://schemas.openxmlformats.org/officeDocument/2006/relationships" xmlns:p="http://schemas.openxmlformats.org/presentationml/2006/main">
+  <p:cSld>
+    <p:spTree>
+      <p:nvGrpSpPr>
+        <p:cNvPr id="1" name=""/>
+        <p:cNvGrpSpPr/>
+        <p:nvPr/>
+      </p:nvGrpSpPr>
+      <p:grpSpPr>
+        <a:xfrm>
+          <a:off x="0" y="0"/>
+          <a:ext cx="0" cy="0"/>
+          <a:chOff x="0" y="0"/>
+          <a:chExt cx="0" cy="0"/>
+        </a:xfrm>
+      </p:grpSpPr>
+      <p:sp>
+        <p:nvSpPr>
+          <p:cNvPr id="2" name="Slide Image Placeholder 1"/>
+          <p:cNvSpPr>
+            <a:spLocks noGrp="1" noRot="1" noChangeAspect="1"/>
+          </p:cNvSpPr>
+          <p:nvPr>
+            <p:ph type="sldImg"/>
+          </p:nvPr>
+        </p:nvSpPr>
+        <p:spPr/>
+      </p:sp>
+      <p:sp>
+        <p:nvSpPr>
+          <p:cNvPr id="3" name="Notes Placeholder 2"/>
+          <p:cNvSpPr>
+            <a:spLocks noGrp="1"/>
+          </p:cNvSpPr>
+          <p:nvPr>
+            <p:ph type="body" idx="1"/>
+          </p:nvPr>
+        </p:nvSpPr>
+        <p:spPr/>
+        <p:txBody>
+          <a:bodyPr/>
+          <a:lstStyle/>
+          <a:p>
+            <a:pPr algn="l" rtl="0"/>
+            <a:r>
+              <a:rPr lang="en-US" sz="1200" b="0" i="0" kern="1200" dirty="0">
+                <a:solidFill>
+                  <a:schemeClr val="tx1"/>
+                </a:solidFill>
+                <a:effectLst/>
+                <a:latin typeface="+mn-lt"/>
+                <a:ea typeface="+mn-ea"/>
+                <a:cs typeface="+mn-cs"/>
+              </a:rPr>
+              <a:t>What is Yarn?</a:t>
+            </a:r>
+          </a:p>
+          <a:p>
+            <a:pPr algn="l" rtl="0"/>
+            <a:r>
+              <a:rPr lang="en-US" sz="1200" b="0" i="0" kern="1200" dirty="0">
+                <a:solidFill>
+                  <a:schemeClr val="tx1"/>
+                </a:solidFill>
+                <a:effectLst/>
+                <a:latin typeface="+mn-lt"/>
+                <a:ea typeface="+mn-ea"/>
+                <a:cs typeface="+mn-cs"/>
+              </a:rPr>
+              <a:t>Yarn is a new package manager that replaces the existing workflow for the </a:t>
+            </a:r>
+            <a:r>
+              <a:rPr lang="en-US" sz="1200" b="0" i="0" kern="1200" dirty="0" err="1">
+                <a:solidFill>
+                  <a:schemeClr val="tx1"/>
+                </a:solidFill>
+                <a:effectLst/>
+                <a:latin typeface="+mn-lt"/>
+                <a:ea typeface="+mn-ea"/>
+                <a:cs typeface="+mn-cs"/>
+              </a:rPr>
+              <a:t>npm</a:t>
+            </a:r>
+            <a:r>
+              <a:rPr lang="en-US" sz="1200" b="0" i="0" kern="1200" dirty="0">
+                <a:solidFill>
+                  <a:schemeClr val="tx1"/>
+                </a:solidFill>
+                <a:effectLst/>
+                <a:latin typeface="+mn-lt"/>
+                <a:ea typeface="+mn-ea"/>
+                <a:cs typeface="+mn-cs"/>
+              </a:rPr>
+              <a:t> client or other package managers while remaining compatible with the </a:t>
+            </a:r>
+            <a:r>
+              <a:rPr lang="en-US" sz="1200" b="0" i="0" kern="1200" dirty="0" err="1">
+                <a:solidFill>
+                  <a:schemeClr val="tx1"/>
+                </a:solidFill>
+                <a:effectLst/>
+                <a:latin typeface="+mn-lt"/>
+                <a:ea typeface="+mn-ea"/>
+                <a:cs typeface="+mn-cs"/>
+              </a:rPr>
+              <a:t>npm</a:t>
+            </a:r>
+            <a:r>
+              <a:rPr lang="en-US" sz="1200" b="0" i="0" kern="1200" dirty="0">
+                <a:solidFill>
+                  <a:schemeClr val="tx1"/>
+                </a:solidFill>
+                <a:effectLst/>
+                <a:latin typeface="+mn-lt"/>
+                <a:ea typeface="+mn-ea"/>
+                <a:cs typeface="+mn-cs"/>
+              </a:rPr>
+              <a:t> registry.</a:t>
+            </a:r>
+          </a:p>
+          <a:p>
+            <a:pPr algn="l" rtl="0"/>
+            <a:r>
+              <a:rPr lang="en-US" sz="1200" b="0" i="0" kern="1200" dirty="0">
+                <a:solidFill>
+                  <a:schemeClr val="tx1"/>
+                </a:solidFill>
+                <a:effectLst/>
+                <a:latin typeface="+mn-lt"/>
+                <a:ea typeface="+mn-ea"/>
+                <a:cs typeface="+mn-cs"/>
+              </a:rPr>
+              <a:t>It has the same feature set as existing workflows while operating faster, more securely, and more reliably.</a:t>
+            </a:r>
+          </a:p>
+          <a:p>
+            <a:pPr algn="l" rtl="0"/>
+            <a:endParaRPr lang="en-US" sz="1200" b="0" i="0" kern="1200" dirty="0">
+              <a:solidFill>
+                <a:schemeClr val="tx1"/>
+              </a:solidFill>
+              <a:effectLst/>
+              <a:latin typeface="+mn-lt"/>
+              <a:ea typeface="+mn-ea"/>
+              <a:cs typeface="+mn-cs"/>
+            </a:endParaRPr>
+          </a:p>
+          <a:p>
+            <a:pPr algn="l" rtl="0"/>
+            <a:r>
+              <a:rPr lang="en-US" sz="1200" b="0" i="0" kern="1200" dirty="0">
+                <a:solidFill>
+                  <a:schemeClr val="tx1"/>
+                </a:solidFill>
+                <a:effectLst/>
+                <a:latin typeface="+mn-lt"/>
+                <a:ea typeface="+mn-ea"/>
+                <a:cs typeface="+mn-cs"/>
+              </a:rPr>
+              <a:t>It use the same registry as </a:t>
+            </a:r>
+            <a:r>
+              <a:rPr lang="en-US" sz="1200" b="0" i="0" kern="1200" dirty="0" err="1">
+                <a:solidFill>
+                  <a:schemeClr val="tx1"/>
+                </a:solidFill>
+                <a:effectLst/>
+                <a:latin typeface="+mn-lt"/>
+                <a:ea typeface="+mn-ea"/>
+                <a:cs typeface="+mn-cs"/>
+              </a:rPr>
+              <a:t>npm</a:t>
+            </a:r>
+            <a:r>
+              <a:rPr lang="en-US" sz="1200" b="0" i="0" kern="1200" dirty="0">
+                <a:solidFill>
+                  <a:schemeClr val="tx1"/>
+                </a:solidFill>
+                <a:effectLst/>
+                <a:latin typeface="+mn-lt"/>
+                <a:ea typeface="+mn-ea"/>
+                <a:cs typeface="+mn-cs"/>
+              </a:rPr>
+              <a:t>.</a:t>
+            </a:r>
+          </a:p>
+          <a:p>
+            <a:pPr algn="l" rtl="0"/>
+            <a:endParaRPr lang="en-US" sz="1200" b="0" i="0" kern="1200" dirty="0">
+              <a:solidFill>
+                <a:schemeClr val="tx1"/>
+              </a:solidFill>
+              <a:effectLst/>
+              <a:latin typeface="+mn-lt"/>
+              <a:ea typeface="+mn-ea"/>
+              <a:cs typeface="+mn-cs"/>
+            </a:endParaRPr>
+          </a:p>
+          <a:p>
+            <a:pPr algn="l" rtl="0"/>
+            <a:r>
+              <a:rPr lang="en-US" sz="1200" b="0" i="0" kern="1200" dirty="0">
+                <a:solidFill>
+                  <a:schemeClr val="tx1"/>
+                </a:solidFill>
+                <a:effectLst/>
+                <a:latin typeface="+mn-lt"/>
+                <a:ea typeface="+mn-ea"/>
+                <a:cs typeface="+mn-cs"/>
+              </a:rPr>
+              <a:t>So NPM or Yarn?</a:t>
+            </a:r>
+          </a:p>
+          <a:p>
+            <a:pPr algn="l" rtl="0"/>
+            <a:r>
+              <a:rPr lang="en-US" sz="1200" b="0" i="0" kern="1200" dirty="0">
+                <a:solidFill>
+                  <a:schemeClr val="tx1"/>
+                </a:solidFill>
+                <a:effectLst/>
+                <a:latin typeface="+mn-lt"/>
+                <a:ea typeface="+mn-ea"/>
+                <a:cs typeface="+mn-cs"/>
+              </a:rPr>
+              <a:t>In the past yarn was recommended but today it doesn’t matter, the team should secede what to use when starting a project, why? Next slide</a:t>
+            </a:r>
+          </a:p>
+          <a:p>
+            <a:pPr marL="171450" indent="-171450" algn="l" rtl="0">
+              <a:buFontTx/>
+              <a:buChar char="-"/>
+            </a:pPr>
+            <a:r>
+              <a:rPr lang="en-US" sz="1200" b="0" i="0" kern="1200" dirty="0">
+                <a:solidFill>
+                  <a:schemeClr val="tx1"/>
+                </a:solidFill>
+                <a:effectLst/>
+                <a:latin typeface="+mn-lt"/>
+                <a:ea typeface="+mn-ea"/>
+                <a:cs typeface="+mn-cs"/>
+              </a:rPr>
+              <a:t>Yarn was faster using parallel and not sync installation</a:t>
+            </a:r>
+          </a:p>
+          <a:p>
+            <a:pPr marL="171450" indent="-171450" algn="l" rtl="0">
+              <a:buFontTx/>
+              <a:buChar char="-"/>
+            </a:pPr>
+            <a:r>
+              <a:rPr lang="en-US" sz="1200" b="0" i="0" kern="1200" dirty="0">
+                <a:solidFill>
+                  <a:schemeClr val="tx1"/>
+                </a:solidFill>
+                <a:effectLst/>
+                <a:latin typeface="+mn-lt"/>
+                <a:ea typeface="+mn-ea"/>
+                <a:cs typeface="+mn-cs"/>
+              </a:rPr>
+              <a:t>Yarn was more secure</a:t>
+            </a:r>
+          </a:p>
+          <a:p>
+            <a:pPr marL="171450" indent="-171450" algn="l" rtl="0">
+              <a:buFontTx/>
+              <a:buChar char="-"/>
+            </a:pPr>
+            <a:r>
+              <a:rPr lang="en-US" sz="1200" b="0" i="0" kern="1200" dirty="0">
+                <a:solidFill>
+                  <a:schemeClr val="tx1"/>
+                </a:solidFill>
+                <a:effectLst/>
+                <a:latin typeface="+mn-lt"/>
+                <a:ea typeface="+mn-ea"/>
+                <a:cs typeface="+mn-cs"/>
+              </a:rPr>
+              <a:t>Yarn was using caching and </a:t>
+            </a:r>
+            <a:r>
+              <a:rPr lang="en-US" sz="1200" b="0" i="0" kern="1200" dirty="0" err="1">
+                <a:solidFill>
+                  <a:schemeClr val="tx1"/>
+                </a:solidFill>
+                <a:effectLst/>
+                <a:latin typeface="+mn-lt"/>
+                <a:ea typeface="+mn-ea"/>
+                <a:cs typeface="+mn-cs"/>
+              </a:rPr>
+              <a:t>npm</a:t>
+            </a:r>
+            <a:r>
+              <a:rPr lang="en-US" sz="1200" b="0" i="0" kern="1200" dirty="0">
+                <a:solidFill>
+                  <a:schemeClr val="tx1"/>
+                </a:solidFill>
+                <a:effectLst/>
+                <a:latin typeface="+mn-lt"/>
+                <a:ea typeface="+mn-ea"/>
+                <a:cs typeface="+mn-cs"/>
+              </a:rPr>
+              <a:t> not</a:t>
+            </a:r>
+          </a:p>
+          <a:p>
+            <a:pPr marL="171450" indent="-171450" algn="l" rtl="0">
+              <a:buFontTx/>
+              <a:buChar char="-"/>
+            </a:pPr>
+            <a:r>
+              <a:rPr lang="en-US" dirty="0"/>
+              <a:t>License checks - </a:t>
+            </a:r>
+            <a:r>
+              <a:rPr lang="en-US" sz="1200" b="0" i="0" kern="1200" dirty="0">
+                <a:solidFill>
+                  <a:schemeClr val="tx1"/>
+                </a:solidFill>
+                <a:effectLst/>
+                <a:latin typeface="+mn-lt"/>
+                <a:ea typeface="+mn-ea"/>
+                <a:cs typeface="+mn-cs"/>
+              </a:rPr>
+              <a:t>Yarn comes with a handy license checker, which can become really powerful in case you have to check the licenses of all the modules you depend on</a:t>
+            </a:r>
+            <a:br>
+              <a:rPr lang="en-US" dirty="0"/>
+            </a:br>
+            <a:endParaRPr lang="en-US" sz="1200" b="0" i="0" kern="1200" dirty="0">
+              <a:solidFill>
+                <a:schemeClr val="tx1"/>
+              </a:solidFill>
+              <a:effectLst/>
+              <a:latin typeface="+mn-lt"/>
+              <a:ea typeface="+mn-ea"/>
+              <a:cs typeface="+mn-cs"/>
+            </a:endParaRPr>
+          </a:p>
+          <a:p>
+            <a:pPr marL="171450" indent="-171450" algn="l" rtl="0">
+              <a:buFontTx/>
+              <a:buChar char="-"/>
+            </a:pPr>
+            <a:endParaRPr lang="en-US" sz="1200" b="0" i="0" kern="1200" dirty="0">
+              <a:solidFill>
+                <a:schemeClr val="tx1"/>
+              </a:solidFill>
+              <a:effectLst/>
+              <a:latin typeface="+mn-lt"/>
+              <a:ea typeface="+mn-ea"/>
+              <a:cs typeface="+mn-cs"/>
+            </a:endParaRPr>
+          </a:p>
+          <a:p>
+            <a:pPr algn="l" rtl="0"/>
+            <a:endParaRPr lang="en-US" sz="1200" b="0" i="0" kern="1200" dirty="0">
+              <a:solidFill>
+                <a:schemeClr val="tx1"/>
+              </a:solidFill>
+              <a:effectLst/>
+              <a:latin typeface="+mn-lt"/>
+              <a:ea typeface="+mn-ea"/>
+              <a:cs typeface="+mn-cs"/>
+            </a:endParaRPr>
+          </a:p>
+          <a:p>
+            <a:pPr algn="l" rtl="0"/>
+            <a:endParaRPr lang="en-US" sz="1200" b="0" i="0" kern="1200" dirty="0">
+              <a:solidFill>
+                <a:schemeClr val="tx1"/>
+              </a:solidFill>
+              <a:effectLst/>
+              <a:latin typeface="+mn-lt"/>
+              <a:ea typeface="+mn-ea"/>
+              <a:cs typeface="+mn-cs"/>
+            </a:endParaRPr>
+          </a:p>
+          <a:p>
+            <a:pPr algn="l" rtl="0"/>
+            <a:endParaRPr lang="en-US" sz="1200" b="0" i="0" kern="1200" dirty="0">
+              <a:solidFill>
+                <a:schemeClr val="tx1"/>
+              </a:solidFill>
+              <a:effectLst/>
+              <a:latin typeface="+mn-lt"/>
+              <a:ea typeface="+mn-ea"/>
+              <a:cs typeface="+mn-cs"/>
+            </a:endParaRPr>
+          </a:p>
+          <a:p>
+            <a:pPr marL="171450" indent="-171450" algn="l" rtl="0">
+              <a:buFontTx/>
+              <a:buChar char="-"/>
+            </a:pPr>
+            <a:r>
+              <a:rPr lang="en-US" sz="1200" b="0" i="0" kern="1200" dirty="0">
+                <a:solidFill>
+                  <a:schemeClr val="tx1"/>
+                </a:solidFill>
+                <a:effectLst/>
+                <a:latin typeface="+mn-lt"/>
+                <a:ea typeface="+mn-ea"/>
+                <a:cs typeface="+mn-cs"/>
+              </a:rPr>
+              <a:t>https://code.fb.com/web/yarn-a-new-package-manager-for-javascript/</a:t>
+            </a:r>
+          </a:p>
+          <a:p>
+            <a:pPr marL="171450" indent="-171450" algn="l" rtl="0">
+              <a:buFontTx/>
+              <a:buChar char="-"/>
+            </a:pPr>
+            <a:r>
+              <a:rPr lang="en-US" sz="1200" b="0" i="0" kern="1200" dirty="0">
+                <a:solidFill>
+                  <a:schemeClr val="tx1"/>
+                </a:solidFill>
+                <a:effectLst/>
+                <a:latin typeface="+mn-lt"/>
+                <a:ea typeface="+mn-ea"/>
+                <a:cs typeface="+mn-cs"/>
+              </a:rPr>
+              <a:t>https://iamturns.com/yarn-vs-npm-2018/</a:t>
+            </a:r>
+          </a:p>
+          <a:p>
+            <a:pPr marL="171450" indent="-171450" algn="l" rtl="0">
+              <a:buFontTx/>
+              <a:buChar char="-"/>
+            </a:pPr>
+            <a:endParaRPr lang="en-US" sz="1200" b="0" i="0" kern="1200" dirty="0">
+              <a:solidFill>
+                <a:schemeClr val="tx1"/>
+              </a:solidFill>
+              <a:effectLst/>
+              <a:latin typeface="+mn-lt"/>
+              <a:ea typeface="+mn-ea"/>
+              <a:cs typeface="+mn-cs"/>
+            </a:endParaRPr>
+          </a:p>
+        </p:txBody>
+      </p:sp>
+      <p:sp>
+        <p:nvSpPr>
+          <p:cNvPr id="4" name="Slide Number Placeholder 3"/>
+          <p:cNvSpPr>
+            <a:spLocks noGrp="1"/>
+          </p:cNvSpPr>
+          <p:nvPr>
+            <p:ph type="sldNum" sz="quarter" idx="10"/>
+          </p:nvPr>
+        </p:nvSpPr>
+        <p:spPr/>
+        <p:txBody>
+          <a:bodyPr/>
+          <a:lstStyle/>
+          <a:p>
+            <a:fld id="{595D0871-5AD0-4670-BDA8-FBE649F625DD}" type="slidenum">
+              <a:rPr lang="he-IL" smtClean="0"/>
+              <a:t>20</a:t>
+            </a:fld>
+            <a:endParaRPr lang="he-IL"/>
+          </a:p>
+        </p:txBody>
+      </p:sp>
+    </p:spTree>
+    <p:extLst>
+      <p:ext uri="{BB962C8B-B14F-4D97-AF65-F5344CB8AC3E}">
+        <p14:creationId xmlns:p14="http://schemas.microsoft.com/office/powerpoint/2010/main" val="2690482100"/>
+      </p:ext>
+    </p:extLst>
+  </p:cSld>
+  <p:clrMapOvr>
+    <a:masterClrMapping/>
+  </p:clrMapOvr>
+</p:notes>
+</file>
+
+<file path=ppt/notesSlides/notesSlide19.xml><?xml version="1.0" encoding="utf-8"?>
+<p:notes xmlns:a="http://schemas.openxmlformats.org/drawingml/2006/main" xmlns:r="http://schemas.openxmlformats.org/officeDocument/2006/relationships" xmlns:p="http://schemas.openxmlformats.org/presentationml/2006/main">
+  <p:cSld>
+    <p:spTree>
+      <p:nvGrpSpPr>
+        <p:cNvPr id="1" name=""/>
+        <p:cNvGrpSpPr/>
+        <p:nvPr/>
+      </p:nvGrpSpPr>
+      <p:grpSpPr>
+        <a:xfrm>
+          <a:off x="0" y="0"/>
+          <a:ext cx="0" cy="0"/>
+          <a:chOff x="0" y="0"/>
+          <a:chExt cx="0" cy="0"/>
+        </a:xfrm>
+      </p:grpSpPr>
+      <p:sp>
+        <p:nvSpPr>
+          <p:cNvPr id="2" name="Slide Image Placeholder 1"/>
+          <p:cNvSpPr>
+            <a:spLocks noGrp="1" noRot="1" noChangeAspect="1"/>
+          </p:cNvSpPr>
+          <p:nvPr>
+            <p:ph type="sldImg"/>
+          </p:nvPr>
+        </p:nvSpPr>
+        <p:spPr/>
+      </p:sp>
+      <p:sp>
+        <p:nvSpPr>
+          <p:cNvPr id="3" name="Notes Placeholder 2"/>
+          <p:cNvSpPr>
+            <a:spLocks noGrp="1"/>
+          </p:cNvSpPr>
+          <p:nvPr>
+            <p:ph type="body" idx="1"/>
+          </p:nvPr>
+        </p:nvSpPr>
+        <p:spPr/>
+        <p:txBody>
+          <a:bodyPr/>
+          <a:lstStyle/>
+          <a:p>
+            <a:pPr algn="l" rtl="0"/>
+            <a:r>
+              <a:rPr lang="en-US" sz="1200" b="0" i="0" kern="1200" dirty="0">
+                <a:solidFill>
+                  <a:schemeClr val="tx1"/>
+                </a:solidFill>
+                <a:effectLst/>
+                <a:latin typeface="+mn-lt"/>
+                <a:ea typeface="+mn-ea"/>
+                <a:cs typeface="+mn-cs"/>
+              </a:rPr>
+              <a:t>What is lock file?</a:t>
+            </a:r>
+          </a:p>
+          <a:p>
+            <a:pPr algn="l" rtl="0"/>
+            <a:r>
+              <a:rPr lang="en-US" sz="1200" b="0" i="0" kern="1200" dirty="0">
+                <a:solidFill>
+                  <a:schemeClr val="tx1"/>
+                </a:solidFill>
+                <a:effectLst/>
+                <a:latin typeface="+mn-lt"/>
+                <a:ea typeface="+mn-ea"/>
+                <a:cs typeface="+mn-cs"/>
+              </a:rPr>
+              <a:t>When we are </a:t>
+            </a:r>
+            <a:r>
+              <a:rPr lang="en-US" sz="1200" b="0" i="0" kern="1200" dirty="0" err="1">
+                <a:solidFill>
+                  <a:schemeClr val="tx1"/>
+                </a:solidFill>
+                <a:effectLst/>
+                <a:latin typeface="+mn-lt"/>
+                <a:ea typeface="+mn-ea"/>
+                <a:cs typeface="+mn-cs"/>
+              </a:rPr>
+              <a:t>runningfor</a:t>
+            </a:r>
+            <a:r>
+              <a:rPr lang="en-US" sz="1200" b="0" i="0" kern="1200" dirty="0">
+                <a:solidFill>
+                  <a:schemeClr val="tx1"/>
+                </a:solidFill>
+                <a:effectLst/>
+                <a:latin typeface="+mn-lt"/>
+                <a:ea typeface="+mn-ea"/>
+                <a:cs typeface="+mn-cs"/>
+              </a:rPr>
+              <a:t> the first time </a:t>
+            </a:r>
+            <a:r>
+              <a:rPr lang="en-US" sz="1200" b="1" i="0" kern="1200" dirty="0" err="1">
+                <a:solidFill>
+                  <a:schemeClr val="tx1"/>
+                </a:solidFill>
+                <a:effectLst/>
+                <a:latin typeface="+mn-lt"/>
+                <a:ea typeface="+mn-ea"/>
+                <a:cs typeface="+mn-cs"/>
+              </a:rPr>
+              <a:t>npm</a:t>
+            </a:r>
+            <a:r>
+              <a:rPr lang="en-US" sz="1200" b="1" i="0" kern="1200" dirty="0">
+                <a:solidFill>
+                  <a:schemeClr val="tx1"/>
+                </a:solidFill>
+                <a:effectLst/>
+                <a:latin typeface="+mn-lt"/>
+                <a:ea typeface="+mn-ea"/>
+                <a:cs typeface="+mn-cs"/>
+              </a:rPr>
+              <a:t> install </a:t>
+            </a:r>
+            <a:r>
+              <a:rPr lang="en-US" sz="1200" b="0" i="0" kern="1200" dirty="0">
+                <a:solidFill>
+                  <a:schemeClr val="tx1"/>
+                </a:solidFill>
+                <a:effectLst/>
+                <a:latin typeface="+mn-lt"/>
+                <a:ea typeface="+mn-ea"/>
+                <a:cs typeface="+mn-cs"/>
+              </a:rPr>
+              <a:t>a</a:t>
+            </a:r>
+            <a:r>
+              <a:rPr lang="en-US" sz="1200" b="1" i="0" kern="1200" dirty="0">
+                <a:solidFill>
+                  <a:schemeClr val="tx1"/>
+                </a:solidFill>
+                <a:effectLst/>
+                <a:latin typeface="+mn-lt"/>
+                <a:ea typeface="+mn-ea"/>
+                <a:cs typeface="+mn-cs"/>
+              </a:rPr>
+              <a:t> package-</a:t>
+            </a:r>
+            <a:r>
+              <a:rPr lang="en-US" sz="1200" b="1" i="0" kern="1200" dirty="0" err="1">
+                <a:solidFill>
+                  <a:schemeClr val="tx1"/>
+                </a:solidFill>
+                <a:effectLst/>
+                <a:latin typeface="+mn-lt"/>
+                <a:ea typeface="+mn-ea"/>
+                <a:cs typeface="+mn-cs"/>
+              </a:rPr>
+              <a:t>lock.json</a:t>
+            </a:r>
+            <a:r>
+              <a:rPr lang="en-US" sz="1200" b="0" i="0" kern="1200" dirty="0">
+                <a:solidFill>
+                  <a:schemeClr val="tx1"/>
+                </a:solidFill>
+                <a:effectLst/>
+                <a:latin typeface="+mn-lt"/>
+                <a:ea typeface="+mn-ea"/>
+                <a:cs typeface="+mn-cs"/>
+              </a:rPr>
+              <a:t> file is created.</a:t>
+            </a:r>
+          </a:p>
+          <a:p>
+            <a:pPr algn="l" rtl="0"/>
+            <a:r>
+              <a:rPr lang="en-US" sz="1200" b="0" i="0" kern="1200" dirty="0">
+                <a:solidFill>
+                  <a:schemeClr val="tx1"/>
+                </a:solidFill>
+                <a:effectLst/>
+                <a:latin typeface="+mn-lt"/>
+                <a:ea typeface="+mn-ea"/>
+                <a:cs typeface="+mn-cs"/>
+              </a:rPr>
+              <a:t>For </a:t>
+            </a:r>
+            <a:r>
+              <a:rPr lang="en-US" sz="1200" b="1" i="0" kern="1200" dirty="0">
+                <a:solidFill>
+                  <a:schemeClr val="tx1"/>
+                </a:solidFill>
+                <a:effectLst/>
+                <a:latin typeface="+mn-lt"/>
+                <a:ea typeface="+mn-ea"/>
+                <a:cs typeface="+mn-cs"/>
+              </a:rPr>
+              <a:t>yarn install</a:t>
+            </a:r>
+            <a:r>
+              <a:rPr lang="en-US" sz="1200" b="0" i="0" kern="1200" dirty="0">
+                <a:solidFill>
+                  <a:schemeClr val="tx1"/>
+                </a:solidFill>
+                <a:effectLst/>
+                <a:latin typeface="+mn-lt"/>
+                <a:ea typeface="+mn-ea"/>
+                <a:cs typeface="+mn-cs"/>
+              </a:rPr>
+              <a:t> a </a:t>
+            </a:r>
+            <a:r>
+              <a:rPr lang="en-US" sz="1200" b="1" i="0" kern="1200" dirty="0" err="1">
+                <a:solidFill>
+                  <a:schemeClr val="tx1"/>
+                </a:solidFill>
+                <a:effectLst/>
+                <a:latin typeface="+mn-lt"/>
+                <a:ea typeface="+mn-ea"/>
+                <a:cs typeface="+mn-cs"/>
+              </a:rPr>
+              <a:t>yarn.lock</a:t>
+            </a:r>
+            <a:r>
+              <a:rPr lang="en-US" sz="1200" b="1" i="0" kern="1200" dirty="0">
+                <a:solidFill>
+                  <a:schemeClr val="tx1"/>
+                </a:solidFill>
+                <a:effectLst/>
+                <a:latin typeface="+mn-lt"/>
+                <a:ea typeface="+mn-ea"/>
+                <a:cs typeface="+mn-cs"/>
+              </a:rPr>
+              <a:t> </a:t>
+            </a:r>
+            <a:r>
+              <a:rPr lang="en-US" sz="1200" b="0" i="0" kern="1200" dirty="0">
+                <a:solidFill>
+                  <a:schemeClr val="tx1"/>
+                </a:solidFill>
+                <a:effectLst/>
+                <a:latin typeface="+mn-lt"/>
+                <a:ea typeface="+mn-ea"/>
+                <a:cs typeface="+mn-cs"/>
+              </a:rPr>
+              <a:t>file is created.</a:t>
+            </a:r>
+          </a:p>
+          <a:p>
+            <a:pPr algn="l" rtl="0"/>
+            <a:r>
+              <a:rPr lang="en-US" sz="1200" b="0" i="0" kern="1200" dirty="0">
+                <a:solidFill>
+                  <a:schemeClr val="tx1"/>
+                </a:solidFill>
+                <a:effectLst/>
+                <a:latin typeface="+mn-lt"/>
+                <a:ea typeface="+mn-ea"/>
+                <a:cs typeface="+mn-cs"/>
+              </a:rPr>
+              <a:t>What this file is stand for?</a:t>
+            </a:r>
+          </a:p>
+          <a:p>
+            <a:pPr algn="l" rtl="0"/>
+            <a:endParaRPr lang="en-US" sz="1200" b="0" i="0" kern="1200" dirty="0">
+              <a:solidFill>
+                <a:schemeClr val="tx1"/>
+              </a:solidFill>
+              <a:effectLst/>
+              <a:latin typeface="+mn-lt"/>
+              <a:ea typeface="+mn-ea"/>
+              <a:cs typeface="+mn-cs"/>
+            </a:endParaRPr>
+          </a:p>
+          <a:p>
+            <a:pPr algn="l" rtl="0"/>
+            <a:r>
+              <a:rPr lang="en-US" sz="1200" b="0" i="0" kern="1200" dirty="0">
+                <a:solidFill>
+                  <a:schemeClr val="tx1"/>
+                </a:solidFill>
+                <a:effectLst/>
+                <a:latin typeface="+mn-lt"/>
+                <a:ea typeface="+mn-ea"/>
+                <a:cs typeface="+mn-cs"/>
+              </a:rPr>
+              <a:t>Say you’re working on a project and you have v1.4.0 of “Foo” installed as a dependency. In your </a:t>
+            </a:r>
+            <a:r>
+              <a:rPr lang="en-US" sz="1200" b="0" i="0" kern="1200" dirty="0" err="1">
+                <a:solidFill>
+                  <a:schemeClr val="tx1"/>
+                </a:solidFill>
+                <a:effectLst/>
+                <a:latin typeface="+mn-lt"/>
+                <a:ea typeface="+mn-ea"/>
+                <a:cs typeface="+mn-cs"/>
+              </a:rPr>
+              <a:t>package.json</a:t>
+            </a:r>
+            <a:r>
+              <a:rPr lang="en-US" sz="1200" b="0" i="0" kern="1200" dirty="0">
+                <a:solidFill>
+                  <a:schemeClr val="tx1"/>
+                </a:solidFill>
+                <a:effectLst/>
+                <a:latin typeface="+mn-lt"/>
+                <a:ea typeface="+mn-ea"/>
+                <a:cs typeface="+mn-cs"/>
+              </a:rPr>
+              <a:t> file, you have “Foo” listed as a dependency using </a:t>
+            </a:r>
+            <a:r>
+              <a:rPr lang="en-US" sz="1200" b="0" i="0" kern="1200" dirty="0" err="1">
+                <a:solidFill>
+                  <a:schemeClr val="tx1"/>
+                </a:solidFill>
+                <a:effectLst/>
+                <a:latin typeface="+mn-lt"/>
+                <a:ea typeface="+mn-ea"/>
+                <a:cs typeface="+mn-cs"/>
+              </a:rPr>
+              <a:t>semver</a:t>
+            </a:r>
+            <a:r>
+              <a:rPr lang="en-US" sz="1200" b="0" i="0" kern="1200" dirty="0">
+                <a:solidFill>
+                  <a:schemeClr val="tx1"/>
+                </a:solidFill>
+                <a:effectLst/>
+                <a:latin typeface="+mn-lt"/>
+                <a:ea typeface="+mn-ea"/>
+                <a:cs typeface="+mn-cs"/>
+              </a:rPr>
+              <a:t>: </a:t>
+            </a:r>
+            <a:r>
+              <a:rPr lang="en-US" dirty="0"/>
+              <a:t>"Foo": ^1.0.0</a:t>
+            </a:r>
+            <a:r>
+              <a:rPr lang="en-US" sz="1200" b="0" i="0" kern="1200" dirty="0">
+                <a:solidFill>
+                  <a:schemeClr val="tx1"/>
+                </a:solidFill>
+                <a:effectLst/>
+                <a:latin typeface="+mn-lt"/>
+                <a:ea typeface="+mn-ea"/>
+                <a:cs typeface="+mn-cs"/>
+              </a:rPr>
+              <a:t>. You develop your feature and push it to the remote branch. Your coworker then pulls your feature, runs </a:t>
+            </a:r>
+            <a:r>
+              <a:rPr lang="en-US" dirty="0" err="1"/>
+              <a:t>npm</a:t>
+            </a:r>
+            <a:r>
+              <a:rPr lang="en-US" dirty="0"/>
+              <a:t> install</a:t>
+            </a:r>
+            <a:r>
+              <a:rPr lang="en-US" sz="1200" b="0" i="0" kern="1200" dirty="0">
+                <a:solidFill>
+                  <a:schemeClr val="tx1"/>
+                </a:solidFill>
+                <a:effectLst/>
+                <a:latin typeface="+mn-lt"/>
+                <a:ea typeface="+mn-ea"/>
+                <a:cs typeface="+mn-cs"/>
+              </a:rPr>
+              <a:t>, but the feature you’ve just built doesn’t work. You simply look to him, shrug and say, “It works on my machine”. After some investigation you find that your coworker has version 1.7.0 of “Foo” installed which works a little different from the earlier 1.4.0 version you were using when developing. Because the package is using the </a:t>
+            </a:r>
+            <a:r>
+              <a:rPr lang="en-US" dirty="0"/>
+              <a:t>^</a:t>
+            </a:r>
+            <a:r>
+              <a:rPr lang="en-US" sz="1200" b="0" i="0" kern="1200" dirty="0">
+                <a:solidFill>
+                  <a:schemeClr val="tx1"/>
+                </a:solidFill>
+                <a:effectLst/>
+                <a:latin typeface="+mn-lt"/>
+                <a:ea typeface="+mn-ea"/>
+                <a:cs typeface="+mn-cs"/>
+              </a:rPr>
+              <a:t>symbol in your </a:t>
+            </a:r>
+            <a:r>
+              <a:rPr lang="en-US" sz="1200" b="0" i="0" kern="1200" dirty="0" err="1">
+                <a:solidFill>
+                  <a:schemeClr val="tx1"/>
+                </a:solidFill>
+                <a:effectLst/>
+                <a:latin typeface="+mn-lt"/>
+                <a:ea typeface="+mn-ea"/>
+                <a:cs typeface="+mn-cs"/>
+              </a:rPr>
+              <a:t>package.json</a:t>
+            </a:r>
+            <a:r>
+              <a:rPr lang="en-US" sz="1200" b="0" i="0" kern="1200" dirty="0">
+                <a:solidFill>
+                  <a:schemeClr val="tx1"/>
+                </a:solidFill>
+                <a:effectLst/>
+                <a:latin typeface="+mn-lt"/>
+                <a:ea typeface="+mn-ea"/>
+                <a:cs typeface="+mn-cs"/>
+              </a:rPr>
+              <a:t>, it will install the latest minor version which is why your coworker is on version 1.7.0 when he ran `</a:t>
+            </a:r>
+            <a:r>
+              <a:rPr lang="en-US" sz="1200" b="0" i="0" kern="1200" dirty="0" err="1">
+                <a:solidFill>
+                  <a:schemeClr val="tx1"/>
+                </a:solidFill>
+                <a:effectLst/>
+                <a:latin typeface="+mn-lt"/>
+                <a:ea typeface="+mn-ea"/>
+                <a:cs typeface="+mn-cs"/>
+              </a:rPr>
+              <a:t>npm</a:t>
+            </a:r>
+            <a:r>
+              <a:rPr lang="en-US" sz="1200" b="0" i="0" kern="1200" dirty="0">
+                <a:solidFill>
+                  <a:schemeClr val="tx1"/>
+                </a:solidFill>
+                <a:effectLst/>
+                <a:latin typeface="+mn-lt"/>
+                <a:ea typeface="+mn-ea"/>
+                <a:cs typeface="+mn-cs"/>
+              </a:rPr>
+              <a:t> install`.</a:t>
+            </a:r>
+          </a:p>
+          <a:p>
+            <a:pPr algn="l" rtl="0"/>
+            <a:endParaRPr lang="en-US" sz="1200" b="0" i="0" kern="1200" dirty="0">
+              <a:solidFill>
+                <a:schemeClr val="tx1"/>
+              </a:solidFill>
+              <a:effectLst/>
+              <a:latin typeface="+mn-lt"/>
+              <a:ea typeface="+mn-ea"/>
+              <a:cs typeface="+mn-cs"/>
+            </a:endParaRPr>
+          </a:p>
+          <a:p>
+            <a:pPr algn="l" rtl="0"/>
+            <a:r>
+              <a:rPr lang="en-US" sz="1200" b="0" i="0" kern="1200" dirty="0">
+                <a:solidFill>
+                  <a:schemeClr val="tx1"/>
+                </a:solidFill>
+                <a:effectLst/>
+                <a:latin typeface="+mn-lt"/>
+                <a:ea typeface="+mn-ea"/>
+                <a:cs typeface="+mn-cs"/>
+              </a:rPr>
+              <a:t>Why this happened? Because we don’t commit </a:t>
+            </a:r>
+            <a:r>
+              <a:rPr lang="en-US" sz="1200" b="0" i="0" kern="1200" dirty="0" err="1">
+                <a:solidFill>
+                  <a:schemeClr val="tx1"/>
+                </a:solidFill>
+                <a:effectLst/>
+                <a:latin typeface="+mn-lt"/>
+                <a:ea typeface="+mn-ea"/>
+                <a:cs typeface="+mn-cs"/>
+              </a:rPr>
+              <a:t>ower</a:t>
+            </a:r>
+            <a:r>
+              <a:rPr lang="en-US" sz="1200" b="0" i="0" kern="1200" dirty="0">
+                <a:solidFill>
+                  <a:schemeClr val="tx1"/>
+                </a:solidFill>
+                <a:effectLst/>
+                <a:latin typeface="+mn-lt"/>
+                <a:ea typeface="+mn-ea"/>
+                <a:cs typeface="+mn-cs"/>
+              </a:rPr>
+              <a:t> </a:t>
+            </a:r>
+            <a:r>
+              <a:rPr lang="en-US" sz="1200" b="0" i="0" kern="1200" dirty="0" err="1">
+                <a:solidFill>
+                  <a:schemeClr val="tx1"/>
+                </a:solidFill>
+                <a:effectLst/>
+                <a:latin typeface="+mn-lt"/>
+                <a:ea typeface="+mn-ea"/>
+                <a:cs typeface="+mn-cs"/>
+              </a:rPr>
+              <a:t>node_modules</a:t>
+            </a:r>
+            <a:r>
+              <a:rPr lang="en-US" sz="1200" b="0" i="0" kern="1200" dirty="0">
+                <a:solidFill>
+                  <a:schemeClr val="tx1"/>
+                </a:solidFill>
+                <a:effectLst/>
+                <a:latin typeface="+mn-lt"/>
+                <a:ea typeface="+mn-ea"/>
+                <a:cs typeface="+mn-cs"/>
+              </a:rPr>
+              <a:t> to our git repository (which is generally huge),</a:t>
+            </a:r>
+          </a:p>
+          <a:p>
+            <a:pPr algn="l" rtl="0"/>
+            <a:endParaRPr lang="en-US" sz="1200" b="0" i="0" kern="1200" dirty="0">
+              <a:solidFill>
+                <a:schemeClr val="tx1"/>
+              </a:solidFill>
+              <a:effectLst/>
+              <a:latin typeface="+mn-lt"/>
+              <a:ea typeface="+mn-ea"/>
+              <a:cs typeface="+mn-cs"/>
+            </a:endParaRPr>
+          </a:p>
+          <a:p>
+            <a:pPr algn="l" rtl="0"/>
+            <a:r>
+              <a:rPr lang="en-US" sz="1200" b="0" i="0" kern="1200" dirty="0">
+                <a:solidFill>
+                  <a:schemeClr val="tx1"/>
+                </a:solidFill>
+                <a:effectLst/>
+                <a:latin typeface="+mn-lt"/>
+                <a:ea typeface="+mn-ea"/>
+                <a:cs typeface="+mn-cs"/>
+              </a:rPr>
+              <a:t>The </a:t>
+            </a:r>
+            <a:r>
+              <a:rPr lang="en-US" b="1" dirty="0"/>
+              <a:t>package-</a:t>
+            </a:r>
+            <a:r>
+              <a:rPr lang="en-US" b="1" dirty="0" err="1"/>
+              <a:t>lock.json</a:t>
+            </a:r>
+            <a:r>
+              <a:rPr lang="en-US" sz="1200" b="1" i="0" kern="1200" dirty="0">
+                <a:solidFill>
+                  <a:schemeClr val="tx1"/>
+                </a:solidFill>
+                <a:effectLst/>
+                <a:latin typeface="+mn-lt"/>
+                <a:ea typeface="+mn-ea"/>
+                <a:cs typeface="+mn-cs"/>
+              </a:rPr>
+              <a:t> </a:t>
+            </a:r>
+            <a:r>
+              <a:rPr lang="en-US" sz="1200" b="0" i="0" kern="1200" dirty="0">
+                <a:solidFill>
+                  <a:schemeClr val="tx1"/>
+                </a:solidFill>
+                <a:effectLst/>
+                <a:latin typeface="+mn-lt"/>
+                <a:ea typeface="+mn-ea"/>
+                <a:cs typeface="+mn-cs"/>
+              </a:rPr>
+              <a:t>sets your currently installed version of each package </a:t>
+            </a:r>
+            <a:r>
+              <a:rPr lang="en-US" sz="1200" b="1" i="0" kern="1200" dirty="0">
+                <a:solidFill>
+                  <a:schemeClr val="tx1"/>
+                </a:solidFill>
+                <a:effectLst/>
+                <a:latin typeface="+mn-lt"/>
+                <a:ea typeface="+mn-ea"/>
+                <a:cs typeface="+mn-cs"/>
+              </a:rPr>
+              <a:t>in stone</a:t>
+            </a:r>
+            <a:r>
+              <a:rPr lang="en-US" sz="1200" b="0" i="0" kern="1200" dirty="0">
+                <a:solidFill>
+                  <a:schemeClr val="tx1"/>
+                </a:solidFill>
+                <a:effectLst/>
+                <a:latin typeface="+mn-lt"/>
+                <a:ea typeface="+mn-ea"/>
+                <a:cs typeface="+mn-cs"/>
+              </a:rPr>
+              <a:t>, and </a:t>
+            </a:r>
+            <a:r>
+              <a:rPr lang="en-US" b="1" dirty="0" err="1"/>
+              <a:t>npm</a:t>
+            </a:r>
+            <a:r>
+              <a:rPr lang="en-US" sz="1200" b="0" i="0" kern="1200" dirty="0">
+                <a:solidFill>
+                  <a:schemeClr val="tx1"/>
+                </a:solidFill>
+                <a:effectLst/>
+                <a:latin typeface="+mn-lt"/>
+                <a:ea typeface="+mn-ea"/>
+                <a:cs typeface="+mn-cs"/>
+              </a:rPr>
+              <a:t> will use those exact versions when running </a:t>
+            </a:r>
+            <a:r>
+              <a:rPr lang="en-US" b="1" dirty="0" err="1"/>
+              <a:t>npm</a:t>
+            </a:r>
+            <a:r>
+              <a:rPr lang="en-US" b="1" dirty="0"/>
+              <a:t> install</a:t>
+            </a:r>
+            <a:r>
+              <a:rPr lang="en-US" sz="1200" b="0" i="0" kern="1200" dirty="0">
+                <a:solidFill>
+                  <a:schemeClr val="tx1"/>
+                </a:solidFill>
+                <a:effectLst/>
+                <a:latin typeface="+mn-lt"/>
+                <a:ea typeface="+mn-ea"/>
+                <a:cs typeface="+mn-cs"/>
+              </a:rPr>
+              <a:t>.</a:t>
+            </a:r>
+          </a:p>
+          <a:p>
+            <a:pPr algn="l" rtl="0"/>
+            <a:endParaRPr lang="en-US" sz="1200" b="0" i="0" kern="1200" dirty="0">
+              <a:solidFill>
+                <a:schemeClr val="tx1"/>
+              </a:solidFill>
+              <a:effectLst/>
+              <a:latin typeface="+mn-lt"/>
+              <a:ea typeface="+mn-ea"/>
+              <a:cs typeface="+mn-cs"/>
+            </a:endParaRPr>
+          </a:p>
+          <a:p>
+            <a:pPr algn="l" rtl="0"/>
+            <a:endParaRPr lang="en-US" sz="1200" b="0" i="0" kern="1200" dirty="0">
+              <a:solidFill>
+                <a:schemeClr val="tx1"/>
+              </a:solidFill>
+              <a:effectLst/>
+              <a:latin typeface="+mn-lt"/>
+              <a:ea typeface="+mn-ea"/>
+              <a:cs typeface="+mn-cs"/>
+            </a:endParaRPr>
+          </a:p>
+          <a:p>
+            <a:pPr algn="l" rtl="0"/>
+            <a:r>
+              <a:rPr lang="en-US" sz="1200" b="1" i="0" kern="1200" dirty="0">
+                <a:solidFill>
+                  <a:schemeClr val="tx1"/>
+                </a:solidFill>
+                <a:effectLst/>
+                <a:latin typeface="+mn-lt"/>
+                <a:ea typeface="+mn-ea"/>
+                <a:cs typeface="+mn-cs"/>
+              </a:rPr>
+              <a:t>Summary:</a:t>
+            </a:r>
+          </a:p>
+          <a:p>
+            <a:pPr marL="171450" indent="-171450" algn="l" rtl="0">
+              <a:buFontTx/>
+              <a:buChar char="-"/>
+            </a:pPr>
+            <a:r>
+              <a:rPr lang="en-US" sz="1200" b="0" i="0" kern="1200" dirty="0">
+                <a:solidFill>
+                  <a:schemeClr val="tx1"/>
+                </a:solidFill>
+                <a:effectLst/>
+                <a:latin typeface="+mn-lt"/>
+                <a:ea typeface="+mn-ea"/>
+                <a:cs typeface="+mn-cs"/>
+              </a:rPr>
+              <a:t>If you’re using </a:t>
+            </a:r>
+            <a:r>
+              <a:rPr lang="en-US" sz="1200" b="0" i="0" kern="1200" dirty="0" err="1">
+                <a:solidFill>
+                  <a:schemeClr val="tx1"/>
+                </a:solidFill>
+                <a:effectLst/>
+                <a:latin typeface="+mn-lt"/>
+                <a:ea typeface="+mn-ea"/>
+                <a:cs typeface="+mn-cs"/>
+              </a:rPr>
+              <a:t>npm</a:t>
+            </a:r>
+            <a:r>
+              <a:rPr lang="en-US" sz="1200" b="0" i="0" kern="1200" dirty="0">
+                <a:solidFill>
+                  <a:schemeClr val="tx1"/>
+                </a:solidFill>
+                <a:effectLst/>
+                <a:latin typeface="+mn-lt"/>
+                <a:ea typeface="+mn-ea"/>
+                <a:cs typeface="+mn-cs"/>
+              </a:rPr>
+              <a:t> ^5.x.x, by default a package-</a:t>
+            </a:r>
+            <a:r>
+              <a:rPr lang="en-US" sz="1200" b="0" i="0" kern="1200" dirty="0" err="1">
+                <a:solidFill>
+                  <a:schemeClr val="tx1"/>
+                </a:solidFill>
+                <a:effectLst/>
+                <a:latin typeface="+mn-lt"/>
+                <a:ea typeface="+mn-ea"/>
+                <a:cs typeface="+mn-cs"/>
+              </a:rPr>
+              <a:t>lock.json</a:t>
+            </a:r>
+            <a:r>
+              <a:rPr lang="en-US" sz="1200" b="0" i="0" kern="1200" dirty="0">
+                <a:solidFill>
+                  <a:schemeClr val="tx1"/>
+                </a:solidFill>
+                <a:effectLst/>
+                <a:latin typeface="+mn-lt"/>
+                <a:ea typeface="+mn-ea"/>
+                <a:cs typeface="+mn-cs"/>
+              </a:rPr>
+              <a:t> will be generated for you.</a:t>
+            </a:r>
+          </a:p>
+          <a:p>
+            <a:pPr marL="171450" indent="-171450" algn="l" rtl="0">
+              <a:buFontTx/>
+              <a:buChar char="-"/>
+            </a:pPr>
+            <a:r>
+              <a:rPr lang="en-US" sz="1200" b="0" i="0" kern="1200" dirty="0">
+                <a:solidFill>
+                  <a:schemeClr val="tx1"/>
+                </a:solidFill>
+                <a:effectLst/>
+                <a:latin typeface="+mn-lt"/>
+                <a:ea typeface="+mn-ea"/>
+                <a:cs typeface="+mn-cs"/>
+              </a:rPr>
+              <a:t>You should use package-lock to ensure a consistent install and compatible dependencies.</a:t>
+            </a:r>
+          </a:p>
+          <a:p>
+            <a:pPr marL="171450" indent="-171450" algn="l" rtl="0">
+              <a:buFontTx/>
+              <a:buChar char="-"/>
+            </a:pPr>
+            <a:r>
+              <a:rPr lang="en-US" sz="1200" b="0" i="0" kern="1200" dirty="0">
+                <a:solidFill>
+                  <a:schemeClr val="tx1"/>
+                </a:solidFill>
+                <a:effectLst/>
+                <a:latin typeface="+mn-lt"/>
+                <a:ea typeface="+mn-ea"/>
+                <a:cs typeface="+mn-cs"/>
+              </a:rPr>
+              <a:t>You </a:t>
+            </a:r>
+            <a:r>
+              <a:rPr lang="en-US" sz="1200" b="1" i="0" kern="1200" dirty="0">
+                <a:solidFill>
+                  <a:schemeClr val="tx1"/>
+                </a:solidFill>
+                <a:effectLst/>
+                <a:latin typeface="+mn-lt"/>
+                <a:ea typeface="+mn-ea"/>
+                <a:cs typeface="+mn-cs"/>
+              </a:rPr>
+              <a:t>SHOULD</a:t>
+            </a:r>
+            <a:r>
+              <a:rPr lang="en-US" sz="1200" b="0" i="0" kern="1200" dirty="0">
+                <a:solidFill>
+                  <a:schemeClr val="tx1"/>
+                </a:solidFill>
+                <a:effectLst/>
+                <a:latin typeface="+mn-lt"/>
+                <a:ea typeface="+mn-ea"/>
+                <a:cs typeface="+mn-cs"/>
+              </a:rPr>
+              <a:t> commit your package-lock to source control</a:t>
+            </a:r>
+          </a:p>
+          <a:p>
+            <a:pPr marL="171450" indent="-171450" algn="l" rtl="0">
+              <a:buFontTx/>
+              <a:buChar char="-"/>
+            </a:pPr>
+            <a:r>
+              <a:rPr lang="en-US" sz="1200" b="0" i="0" kern="1200" dirty="0">
+                <a:solidFill>
+                  <a:schemeClr val="tx1"/>
+                </a:solidFill>
+                <a:effectLst/>
+                <a:latin typeface="+mn-lt"/>
+                <a:ea typeface="+mn-ea"/>
+                <a:cs typeface="+mn-cs"/>
+              </a:rPr>
+              <a:t>As of </a:t>
+            </a:r>
+            <a:r>
+              <a:rPr lang="en-US" sz="1200" b="0" i="0" kern="1200" dirty="0" err="1">
+                <a:solidFill>
+                  <a:schemeClr val="tx1"/>
+                </a:solidFill>
+                <a:effectLst/>
+                <a:latin typeface="+mn-lt"/>
+                <a:ea typeface="+mn-ea"/>
+                <a:cs typeface="+mn-cs"/>
+              </a:rPr>
+              <a:t>npm</a:t>
+            </a:r>
+            <a:r>
+              <a:rPr lang="en-US" sz="1200" b="0" i="0" kern="1200" dirty="0">
+                <a:solidFill>
+                  <a:schemeClr val="tx1"/>
+                </a:solidFill>
+                <a:effectLst/>
+                <a:latin typeface="+mn-lt"/>
+                <a:ea typeface="+mn-ea"/>
+                <a:cs typeface="+mn-cs"/>
+              </a:rPr>
+              <a:t> ^5.1.x, </a:t>
+            </a:r>
+            <a:r>
+              <a:rPr lang="en-US" sz="1200" b="0" i="0" kern="1200" dirty="0" err="1">
+                <a:solidFill>
+                  <a:schemeClr val="tx1"/>
+                </a:solidFill>
+                <a:effectLst/>
+                <a:latin typeface="+mn-lt"/>
+                <a:ea typeface="+mn-ea"/>
+                <a:cs typeface="+mn-cs"/>
+              </a:rPr>
+              <a:t>package.json</a:t>
+            </a:r>
+            <a:r>
+              <a:rPr lang="en-US" sz="1200" b="0" i="0" kern="1200" dirty="0">
+                <a:solidFill>
+                  <a:schemeClr val="tx1"/>
+                </a:solidFill>
+                <a:effectLst/>
+                <a:latin typeface="+mn-lt"/>
+                <a:ea typeface="+mn-ea"/>
+                <a:cs typeface="+mn-cs"/>
+              </a:rPr>
+              <a:t> is now able to trump package-</a:t>
+            </a:r>
+            <a:r>
+              <a:rPr lang="en-US" sz="1200" b="0" i="0" kern="1200" dirty="0" err="1">
+                <a:solidFill>
+                  <a:schemeClr val="tx1"/>
+                </a:solidFill>
+                <a:effectLst/>
+                <a:latin typeface="+mn-lt"/>
+                <a:ea typeface="+mn-ea"/>
+                <a:cs typeface="+mn-cs"/>
+              </a:rPr>
+              <a:t>lock.json</a:t>
+            </a:r>
+            <a:r>
+              <a:rPr lang="en-US" sz="1200" b="0" i="0" kern="1200" dirty="0">
+                <a:solidFill>
+                  <a:schemeClr val="tx1"/>
+                </a:solidFill>
+                <a:effectLst/>
+                <a:latin typeface="+mn-lt"/>
+                <a:ea typeface="+mn-ea"/>
+                <a:cs typeface="+mn-cs"/>
+              </a:rPr>
+              <a:t>, so you should experience much less of a headache</a:t>
+            </a:r>
+          </a:p>
+          <a:p>
+            <a:pPr marL="171450" indent="-171450" algn="l" rtl="0">
+              <a:buFontTx/>
+              <a:buChar char="-"/>
+            </a:pPr>
+            <a:r>
+              <a:rPr lang="en-US" sz="1200" b="0" i="0" kern="1200" dirty="0">
+                <a:solidFill>
+                  <a:schemeClr val="tx1"/>
+                </a:solidFill>
+                <a:effectLst/>
+                <a:latin typeface="+mn-lt"/>
+                <a:ea typeface="+mn-ea"/>
+                <a:cs typeface="+mn-cs"/>
+              </a:rPr>
+              <a:t>No more deleting that package-lock just to run `</a:t>
+            </a:r>
+            <a:r>
+              <a:rPr lang="en-US" sz="1200" b="0" i="0" kern="1200" dirty="0" err="1">
+                <a:solidFill>
+                  <a:schemeClr val="tx1"/>
+                </a:solidFill>
+                <a:effectLst/>
+                <a:latin typeface="+mn-lt"/>
+                <a:ea typeface="+mn-ea"/>
+                <a:cs typeface="+mn-cs"/>
+              </a:rPr>
+              <a:t>npm</a:t>
+            </a:r>
+            <a:r>
+              <a:rPr lang="en-US" sz="1200" b="0" i="0" kern="1200" dirty="0">
+                <a:solidFill>
+                  <a:schemeClr val="tx1"/>
+                </a:solidFill>
+                <a:effectLst/>
+                <a:latin typeface="+mn-lt"/>
+                <a:ea typeface="+mn-ea"/>
+                <a:cs typeface="+mn-cs"/>
+              </a:rPr>
+              <a:t> install` and regenerate it</a:t>
+            </a:r>
+          </a:p>
+          <a:p>
+            <a:pPr marL="171450" indent="-171450" algn="l" rtl="0">
+              <a:buFontTx/>
+              <a:buChar char="-"/>
+            </a:pPr>
+            <a:r>
+              <a:rPr lang="en-US" sz="1200" b="0" i="0" kern="1200" dirty="0">
+                <a:solidFill>
+                  <a:schemeClr val="tx1"/>
+                </a:solidFill>
+                <a:effectLst/>
+                <a:latin typeface="+mn-lt"/>
+                <a:ea typeface="+mn-ea"/>
+                <a:cs typeface="+mn-cs"/>
+              </a:rPr>
+              <a:t>Use </a:t>
+            </a:r>
+            <a:r>
+              <a:rPr lang="en-US" sz="1200" b="0" i="0" kern="1200" dirty="0" err="1">
+                <a:solidFill>
+                  <a:schemeClr val="tx1"/>
+                </a:solidFill>
+                <a:effectLst/>
+                <a:latin typeface="+mn-lt"/>
+                <a:ea typeface="+mn-ea"/>
+                <a:cs typeface="+mn-cs"/>
+              </a:rPr>
+              <a:t>semver</a:t>
+            </a:r>
+            <a:r>
+              <a:rPr lang="en-US" sz="1200" b="0" i="0" kern="1200" dirty="0">
+                <a:solidFill>
+                  <a:schemeClr val="tx1"/>
+                </a:solidFill>
+                <a:effectLst/>
+                <a:latin typeface="+mn-lt"/>
+                <a:ea typeface="+mn-ea"/>
+                <a:cs typeface="+mn-cs"/>
+              </a:rPr>
+              <a:t> if your app offers an API, and adhere to the rules of </a:t>
+            </a:r>
+            <a:r>
+              <a:rPr lang="en-US" sz="1200" b="0" i="0" kern="1200" dirty="0" err="1">
+                <a:solidFill>
+                  <a:schemeClr val="tx1"/>
+                </a:solidFill>
+                <a:effectLst/>
+                <a:latin typeface="+mn-lt"/>
+                <a:ea typeface="+mn-ea"/>
+                <a:cs typeface="+mn-cs"/>
+              </a:rPr>
+              <a:t>semver</a:t>
+            </a:r>
+            <a:r>
+              <a:rPr lang="en-US" sz="1200" b="0" i="0" kern="1200" dirty="0">
+                <a:solidFill>
+                  <a:schemeClr val="tx1"/>
+                </a:solidFill>
+                <a:effectLst/>
+                <a:latin typeface="+mn-lt"/>
+                <a:ea typeface="+mn-ea"/>
+                <a:cs typeface="+mn-cs"/>
+              </a:rPr>
+              <a:t>.</a:t>
+            </a:r>
+          </a:p>
+          <a:p>
+            <a:pPr marL="0" indent="0" algn="l" rtl="0">
+              <a:buFontTx/>
+              <a:buNone/>
+            </a:pPr>
+            <a:endParaRPr lang="en-US" sz="1200" b="0" i="0" kern="1200" dirty="0">
+              <a:solidFill>
+                <a:schemeClr val="tx1"/>
+              </a:solidFill>
+              <a:effectLst/>
+              <a:latin typeface="+mn-lt"/>
+              <a:ea typeface="+mn-ea"/>
+              <a:cs typeface="+mn-cs"/>
+            </a:endParaRPr>
+          </a:p>
+          <a:p>
+            <a:pPr marL="0" indent="0" algn="l" rtl="0">
+              <a:buFontTx/>
+              <a:buNone/>
+            </a:pPr>
+            <a:endParaRPr lang="en-US" sz="1200" b="0" i="0" kern="1200" dirty="0">
+              <a:solidFill>
+                <a:schemeClr val="tx1"/>
+              </a:solidFill>
+              <a:effectLst/>
+              <a:latin typeface="+mn-lt"/>
+              <a:ea typeface="+mn-ea"/>
+              <a:cs typeface="+mn-cs"/>
+            </a:endParaRPr>
+          </a:p>
+          <a:p>
+            <a:pPr algn="l" rtl="0"/>
+            <a:endParaRPr lang="en-US" sz="1200" b="0" i="0" kern="1200" dirty="0">
+              <a:solidFill>
+                <a:schemeClr val="tx1"/>
+              </a:solidFill>
+              <a:effectLst/>
+              <a:latin typeface="+mn-lt"/>
+              <a:ea typeface="+mn-ea"/>
+              <a:cs typeface="+mn-cs"/>
+            </a:endParaRPr>
+          </a:p>
+          <a:p>
+            <a:pPr marL="171450" indent="-171450" algn="l" rtl="0">
+              <a:buFontTx/>
+              <a:buChar char="-"/>
+            </a:pPr>
+            <a:r>
+              <a:rPr lang="en-US" sz="1200" b="0" i="0" kern="1200" dirty="0">
+                <a:solidFill>
+                  <a:schemeClr val="tx1"/>
+                </a:solidFill>
+                <a:effectLst/>
+                <a:latin typeface="+mn-lt"/>
+                <a:ea typeface="+mn-ea"/>
+                <a:cs typeface="+mn-cs"/>
+              </a:rPr>
+              <a:t>https://medium.com/@vincentnewkirk/npm-vs-yarn-2019-e88757b17038#aa85</a:t>
+            </a:r>
+          </a:p>
+          <a:p>
+            <a:pPr marL="171450" indent="-171450" algn="l" rtl="0">
+              <a:buFontTx/>
+              <a:buChar char="-"/>
+            </a:pPr>
+            <a:r>
+              <a:rPr lang="en-US" sz="1200" b="0" i="0" kern="1200" dirty="0">
+                <a:solidFill>
+                  <a:schemeClr val="tx1"/>
+                </a:solidFill>
+                <a:effectLst/>
+                <a:latin typeface="+mn-lt"/>
+                <a:ea typeface="+mn-ea"/>
+                <a:cs typeface="+mn-cs"/>
+              </a:rPr>
+              <a:t>https://medium.com/coinmonks/everything-you-wanted-to-know-about-package-lock-json-b81911aa8ab8</a:t>
+            </a:r>
+          </a:p>
+          <a:p>
+            <a:pPr marL="171450" indent="-171450" algn="l" rtl="0">
+              <a:buFontTx/>
+              <a:buChar char="-"/>
+            </a:pPr>
+            <a:r>
+              <a:rPr lang="en-US" sz="1200" b="0" i="0" kern="1200" dirty="0">
+                <a:solidFill>
+                  <a:schemeClr val="tx1"/>
+                </a:solidFill>
+                <a:effectLst/>
+                <a:latin typeface="+mn-lt"/>
+                <a:ea typeface="+mn-ea"/>
+                <a:cs typeface="+mn-cs"/>
+              </a:rPr>
+              <a:t>https://flaviocopes.com/package-lock-json/</a:t>
+            </a:r>
+          </a:p>
+          <a:p>
+            <a:pPr algn="l" rtl="0"/>
+            <a:endParaRPr lang="en-US" sz="1200" b="0" i="0" kern="1200" dirty="0">
+              <a:solidFill>
+                <a:schemeClr val="tx1"/>
+              </a:solidFill>
+              <a:effectLst/>
+              <a:latin typeface="+mn-lt"/>
+              <a:ea typeface="+mn-ea"/>
+              <a:cs typeface="+mn-cs"/>
+            </a:endParaRPr>
+          </a:p>
+        </p:txBody>
+      </p:sp>
+      <p:sp>
+        <p:nvSpPr>
+          <p:cNvPr id="4" name="Slide Number Placeholder 3"/>
+          <p:cNvSpPr>
+            <a:spLocks noGrp="1"/>
+          </p:cNvSpPr>
+          <p:nvPr>
+            <p:ph type="sldNum" sz="quarter" idx="10"/>
+          </p:nvPr>
+        </p:nvSpPr>
+        <p:spPr/>
+        <p:txBody>
+          <a:bodyPr/>
+          <a:lstStyle/>
+          <a:p>
+            <a:fld id="{595D0871-5AD0-4670-BDA8-FBE649F625DD}" type="slidenum">
+              <a:rPr lang="he-IL" smtClean="0"/>
+              <a:t>21</a:t>
+            </a:fld>
+            <a:endParaRPr lang="he-IL"/>
+          </a:p>
+        </p:txBody>
+      </p:sp>
+    </p:spTree>
+    <p:extLst>
+      <p:ext uri="{BB962C8B-B14F-4D97-AF65-F5344CB8AC3E}">
+        <p14:creationId xmlns:p14="http://schemas.microsoft.com/office/powerpoint/2010/main" val="3999984840"/>
       </p:ext>
     </p:extLst>
   </p:cSld>
@@ -2401,6 +5723,310 @@
     <p:extLst>
       <p:ext uri="{BB962C8B-B14F-4D97-AF65-F5344CB8AC3E}">
         <p14:creationId xmlns:p14="http://schemas.microsoft.com/office/powerpoint/2010/main" val="886165338"/>
+      </p:ext>
+    </p:extLst>
+  </p:cSld>
+  <p:clrMapOvr>
+    <a:masterClrMapping/>
+  </p:clrMapOvr>
+</p:notes>
+</file>
+
+<file path=ppt/notesSlides/notesSlide20.xml><?xml version="1.0" encoding="utf-8"?>
+<p:notes xmlns:a="http://schemas.openxmlformats.org/drawingml/2006/main" xmlns:r="http://schemas.openxmlformats.org/officeDocument/2006/relationships" xmlns:p="http://schemas.openxmlformats.org/presentationml/2006/main">
+  <p:cSld>
+    <p:spTree>
+      <p:nvGrpSpPr>
+        <p:cNvPr id="1" name=""/>
+        <p:cNvGrpSpPr/>
+        <p:nvPr/>
+      </p:nvGrpSpPr>
+      <p:grpSpPr>
+        <a:xfrm>
+          <a:off x="0" y="0"/>
+          <a:ext cx="0" cy="0"/>
+          <a:chOff x="0" y="0"/>
+          <a:chExt cx="0" cy="0"/>
+        </a:xfrm>
+      </p:grpSpPr>
+      <p:sp>
+        <p:nvSpPr>
+          <p:cNvPr id="2" name="Slide Image Placeholder 1"/>
+          <p:cNvSpPr>
+            <a:spLocks noGrp="1" noRot="1" noChangeAspect="1"/>
+          </p:cNvSpPr>
+          <p:nvPr>
+            <p:ph type="sldImg"/>
+          </p:nvPr>
+        </p:nvSpPr>
+        <p:spPr/>
+      </p:sp>
+      <p:sp>
+        <p:nvSpPr>
+          <p:cNvPr id="3" name="Notes Placeholder 2"/>
+          <p:cNvSpPr>
+            <a:spLocks noGrp="1"/>
+          </p:cNvSpPr>
+          <p:nvPr>
+            <p:ph type="body" idx="1"/>
+          </p:nvPr>
+        </p:nvSpPr>
+        <p:spPr/>
+        <p:txBody>
+          <a:bodyPr/>
+          <a:lstStyle/>
+          <a:p>
+            <a:pPr algn="l" rtl="0"/>
+            <a:r>
+              <a:rPr lang="en-US" sz="1200" b="0" i="0" kern="1200" dirty="0">
+                <a:solidFill>
+                  <a:schemeClr val="tx1"/>
+                </a:solidFill>
+                <a:effectLst/>
+                <a:latin typeface="+mn-lt"/>
+                <a:ea typeface="+mn-ea"/>
+                <a:cs typeface="+mn-cs"/>
+              </a:rPr>
+              <a:t>For development, a package can be linked into another project. This is often useful to test out new features or when trying to debug an issue in a package that manifests itself in another project.</a:t>
+            </a:r>
+          </a:p>
+          <a:p>
+            <a:pPr algn="l" rtl="0"/>
+            <a:r>
+              <a:rPr lang="en-US" sz="1200" b="0" i="0" kern="1200" dirty="0">
+                <a:solidFill>
+                  <a:schemeClr val="tx1"/>
+                </a:solidFill>
+                <a:effectLst/>
+                <a:latin typeface="+mn-lt"/>
+                <a:ea typeface="+mn-ea"/>
+                <a:cs typeface="+mn-cs"/>
+              </a:rPr>
+              <a:t>Example of IDSE project</a:t>
+            </a:r>
+          </a:p>
+          <a:p>
+            <a:pPr algn="l" rtl="0"/>
+            <a:endParaRPr lang="en-US" sz="1200" b="0" i="0" kern="1200" dirty="0">
+              <a:solidFill>
+                <a:schemeClr val="tx1"/>
+              </a:solidFill>
+              <a:effectLst/>
+              <a:latin typeface="+mn-lt"/>
+              <a:ea typeface="+mn-ea"/>
+              <a:cs typeface="+mn-cs"/>
+            </a:endParaRPr>
+          </a:p>
+          <a:p>
+            <a:pPr algn="l" rtl="0"/>
+            <a:endParaRPr lang="en-US" sz="1200" b="0" i="0" kern="1200" dirty="0">
+              <a:solidFill>
+                <a:schemeClr val="tx1"/>
+              </a:solidFill>
+              <a:effectLst/>
+              <a:latin typeface="+mn-lt"/>
+              <a:ea typeface="+mn-ea"/>
+              <a:cs typeface="+mn-cs"/>
+            </a:endParaRPr>
+          </a:p>
+          <a:p>
+            <a:pPr marL="171450" indent="-171450" algn="l" rtl="0">
+              <a:buFontTx/>
+              <a:buChar char="-"/>
+            </a:pPr>
+            <a:r>
+              <a:rPr lang="en-US" sz="1200" b="0" i="0" kern="1200" dirty="0">
+                <a:solidFill>
+                  <a:schemeClr val="tx1"/>
+                </a:solidFill>
+                <a:effectLst/>
+                <a:latin typeface="+mn-lt"/>
+                <a:ea typeface="+mn-ea"/>
+                <a:cs typeface="+mn-cs"/>
+              </a:rPr>
+              <a:t>https://docs.npmjs.com/cli/link.html</a:t>
+            </a:r>
+          </a:p>
+          <a:p>
+            <a:pPr marL="171450" indent="-171450" algn="l" rtl="0">
+              <a:buFontTx/>
+              <a:buChar char="-"/>
+            </a:pPr>
+            <a:r>
+              <a:rPr lang="en-US" sz="1200" b="0" i="0" kern="1200" dirty="0">
+                <a:solidFill>
+                  <a:schemeClr val="tx1"/>
+                </a:solidFill>
+                <a:effectLst/>
+                <a:latin typeface="+mn-lt"/>
+                <a:ea typeface="+mn-ea"/>
+                <a:cs typeface="+mn-cs"/>
+              </a:rPr>
+              <a:t>https://yarnpkg.com/lang/en/docs/cli/link/</a:t>
+            </a:r>
+          </a:p>
+          <a:p>
+            <a:pPr marL="171450" indent="-171450" algn="l" rtl="0">
+              <a:buFontTx/>
+              <a:buChar char="-"/>
+            </a:pPr>
+            <a:r>
+              <a:rPr lang="en-US" sz="1200" b="0" i="0" kern="1200" dirty="0">
+                <a:solidFill>
+                  <a:schemeClr val="tx1"/>
+                </a:solidFill>
+                <a:effectLst/>
+                <a:latin typeface="+mn-lt"/>
+                <a:ea typeface="+mn-ea"/>
+                <a:cs typeface="+mn-cs"/>
+              </a:rPr>
+              <a:t>https://medium.com/dailyjs/how-to-use-npm-link-7375b6219557</a:t>
+            </a:r>
+          </a:p>
+          <a:p>
+            <a:pPr marL="171450" indent="-171450" algn="l" rtl="0">
+              <a:buFontTx/>
+              <a:buChar char="-"/>
+            </a:pPr>
+            <a:endParaRPr lang="en-US" sz="1200" b="0" i="0" kern="1200" dirty="0">
+              <a:solidFill>
+                <a:schemeClr val="tx1"/>
+              </a:solidFill>
+              <a:effectLst/>
+              <a:latin typeface="+mn-lt"/>
+              <a:ea typeface="+mn-ea"/>
+              <a:cs typeface="+mn-cs"/>
+            </a:endParaRPr>
+          </a:p>
+          <a:p>
+            <a:pPr marL="171450" indent="-171450" algn="l" rtl="0">
+              <a:buFontTx/>
+              <a:buChar char="-"/>
+            </a:pPr>
+            <a:endParaRPr lang="en-US" sz="1200" b="0" i="0" kern="1200" dirty="0">
+              <a:solidFill>
+                <a:schemeClr val="tx1"/>
+              </a:solidFill>
+              <a:effectLst/>
+              <a:latin typeface="+mn-lt"/>
+              <a:ea typeface="+mn-ea"/>
+              <a:cs typeface="+mn-cs"/>
+            </a:endParaRPr>
+          </a:p>
+        </p:txBody>
+      </p:sp>
+      <p:sp>
+        <p:nvSpPr>
+          <p:cNvPr id="4" name="Slide Number Placeholder 3"/>
+          <p:cNvSpPr>
+            <a:spLocks noGrp="1"/>
+          </p:cNvSpPr>
+          <p:nvPr>
+            <p:ph type="sldNum" sz="quarter" idx="10"/>
+          </p:nvPr>
+        </p:nvSpPr>
+        <p:spPr/>
+        <p:txBody>
+          <a:bodyPr/>
+          <a:lstStyle/>
+          <a:p>
+            <a:fld id="{595D0871-5AD0-4670-BDA8-FBE649F625DD}" type="slidenum">
+              <a:rPr lang="he-IL" smtClean="0"/>
+              <a:t>22</a:t>
+            </a:fld>
+            <a:endParaRPr lang="he-IL"/>
+          </a:p>
+        </p:txBody>
+      </p:sp>
+    </p:spTree>
+    <p:extLst>
+      <p:ext uri="{BB962C8B-B14F-4D97-AF65-F5344CB8AC3E}">
+        <p14:creationId xmlns:p14="http://schemas.microsoft.com/office/powerpoint/2010/main" val="656375540"/>
+      </p:ext>
+    </p:extLst>
+  </p:cSld>
+  <p:clrMapOvr>
+    <a:masterClrMapping/>
+  </p:clrMapOvr>
+</p:notes>
+</file>
+
+<file path=ppt/notesSlides/notesSlide21.xml><?xml version="1.0" encoding="utf-8"?>
+<p:notes xmlns:a="http://schemas.openxmlformats.org/drawingml/2006/main" xmlns:r="http://schemas.openxmlformats.org/officeDocument/2006/relationships" xmlns:p="http://schemas.openxmlformats.org/presentationml/2006/main">
+  <p:cSld>
+    <p:spTree>
+      <p:nvGrpSpPr>
+        <p:cNvPr id="1" name=""/>
+        <p:cNvGrpSpPr/>
+        <p:nvPr/>
+      </p:nvGrpSpPr>
+      <p:grpSpPr>
+        <a:xfrm>
+          <a:off x="0" y="0"/>
+          <a:ext cx="0" cy="0"/>
+          <a:chOff x="0" y="0"/>
+          <a:chExt cx="0" cy="0"/>
+        </a:xfrm>
+      </p:grpSpPr>
+      <p:sp>
+        <p:nvSpPr>
+          <p:cNvPr id="2" name="Slide Image Placeholder 1"/>
+          <p:cNvSpPr>
+            <a:spLocks noGrp="1" noRot="1" noChangeAspect="1"/>
+          </p:cNvSpPr>
+          <p:nvPr>
+            <p:ph type="sldImg"/>
+          </p:nvPr>
+        </p:nvSpPr>
+        <p:spPr/>
+      </p:sp>
+      <p:sp>
+        <p:nvSpPr>
+          <p:cNvPr id="3" name="Notes Placeholder 2"/>
+          <p:cNvSpPr>
+            <a:spLocks noGrp="1"/>
+          </p:cNvSpPr>
+          <p:nvPr>
+            <p:ph type="body" idx="1"/>
+          </p:nvPr>
+        </p:nvSpPr>
+        <p:spPr/>
+        <p:txBody>
+          <a:bodyPr/>
+          <a:lstStyle/>
+          <a:p>
+            <a:pPr algn="l" rtl="0"/>
+            <a:endParaRPr lang="en-US" b="0" dirty="0"/>
+          </a:p>
+        </p:txBody>
+      </p:sp>
+      <p:sp>
+        <p:nvSpPr>
+          <p:cNvPr id="4" name="Slide Number Placeholder 3"/>
+          <p:cNvSpPr>
+            <a:spLocks noGrp="1"/>
+          </p:cNvSpPr>
+          <p:nvPr>
+            <p:ph type="sldNum" sz="quarter" idx="10"/>
+          </p:nvPr>
+        </p:nvSpPr>
+        <p:spPr/>
+        <p:txBody>
+          <a:bodyPr/>
+          <a:lstStyle/>
+          <a:p>
+            <a:fld id="{595D0871-5AD0-4670-BDA8-FBE649F625DD}" type="slidenum">
+              <a:rPr lang="he-IL" smtClean="0"/>
+              <a:t>23</a:t>
+            </a:fld>
+            <a:endParaRPr lang="he-IL"/>
+          </a:p>
+        </p:txBody>
+      </p:sp>
+    </p:spTree>
+    <p:extLst>
+      <p:ext uri="{BB962C8B-B14F-4D97-AF65-F5344CB8AC3E}">
+        <p14:creationId xmlns:p14="http://schemas.microsoft.com/office/powerpoint/2010/main" val="4181460238"/>
       </p:ext>
     </p:extLst>
   </p:cSld>
@@ -5054,7 +8680,7 @@
           <a:p>
             <a:fld id="{F472E424-CC75-4448-A1B5-6FCA6BFEE599}" type="datetimeFigureOut">
               <a:rPr lang="he-IL" smtClean="0"/>
-              <a:t>ה'/אדר א/תשע"ט</a:t>
+              <a:t>י"ט/אדר א/תשע"ט</a:t>
             </a:fld>
             <a:endParaRPr lang="he-IL"/>
           </a:p>
@@ -5222,7 +8848,7 @@
           <a:p>
             <a:fld id="{F472E424-CC75-4448-A1B5-6FCA6BFEE599}" type="datetimeFigureOut">
               <a:rPr lang="he-IL" smtClean="0"/>
-              <a:t>ה'/אדר א/תשע"ט</a:t>
+              <a:t>י"ט/אדר א/תשע"ט</a:t>
             </a:fld>
             <a:endParaRPr lang="he-IL"/>
           </a:p>
@@ -5400,7 +9026,7 @@
           <a:p>
             <a:fld id="{F472E424-CC75-4448-A1B5-6FCA6BFEE599}" type="datetimeFigureOut">
               <a:rPr lang="he-IL" smtClean="0"/>
-              <a:t>ה'/אדר א/תשע"ט</a:t>
+              <a:t>י"ט/אדר א/תשע"ט</a:t>
             </a:fld>
             <a:endParaRPr lang="he-IL"/>
           </a:p>
@@ -5784,7 +9410,7 @@
           <a:p>
             <a:fld id="{F472E424-CC75-4448-A1B5-6FCA6BFEE599}" type="datetimeFigureOut">
               <a:rPr lang="he-IL" smtClean="0"/>
-              <a:t>ה'/אדר א/תשע"ט</a:t>
+              <a:t>י"ט/אדר א/תשע"ט</a:t>
             </a:fld>
             <a:endParaRPr lang="he-IL"/>
           </a:p>
@@ -6029,7 +9655,7 @@
           <a:p>
             <a:fld id="{F472E424-CC75-4448-A1B5-6FCA6BFEE599}" type="datetimeFigureOut">
               <a:rPr lang="he-IL" smtClean="0"/>
-              <a:t>ה'/אדר א/תשע"ט</a:t>
+              <a:t>י"ט/אדר א/תשע"ט</a:t>
             </a:fld>
             <a:endParaRPr lang="he-IL"/>
           </a:p>
@@ -6258,7 +9884,7 @@
           <a:p>
             <a:fld id="{F472E424-CC75-4448-A1B5-6FCA6BFEE599}" type="datetimeFigureOut">
               <a:rPr lang="he-IL" smtClean="0"/>
-              <a:t>ה'/אדר א/תשע"ט</a:t>
+              <a:t>י"ט/אדר א/תשע"ט</a:t>
             </a:fld>
             <a:endParaRPr lang="he-IL"/>
           </a:p>
@@ -6622,7 +10248,7 @@
           <a:p>
             <a:fld id="{F472E424-CC75-4448-A1B5-6FCA6BFEE599}" type="datetimeFigureOut">
               <a:rPr lang="he-IL" smtClean="0"/>
-              <a:t>ה'/אדר א/תשע"ט</a:t>
+              <a:t>י"ט/אדר א/תשע"ט</a:t>
             </a:fld>
             <a:endParaRPr lang="he-IL"/>
           </a:p>
@@ -6739,7 +10365,7 @@
           <a:p>
             <a:fld id="{F472E424-CC75-4448-A1B5-6FCA6BFEE599}" type="datetimeFigureOut">
               <a:rPr lang="he-IL" smtClean="0"/>
-              <a:t>ה'/אדר א/תשע"ט</a:t>
+              <a:t>י"ט/אדר א/תשע"ט</a:t>
             </a:fld>
             <a:endParaRPr lang="he-IL"/>
           </a:p>
@@ -6834,7 +10460,7 @@
           <a:p>
             <a:fld id="{F472E424-CC75-4448-A1B5-6FCA6BFEE599}" type="datetimeFigureOut">
               <a:rPr lang="he-IL" smtClean="0"/>
-              <a:t>ה'/אדר א/תשע"ט</a:t>
+              <a:t>י"ט/אדר א/תשע"ט</a:t>
             </a:fld>
             <a:endParaRPr lang="he-IL"/>
           </a:p>
@@ -7109,7 +10735,7 @@
           <a:p>
             <a:fld id="{F472E424-CC75-4448-A1B5-6FCA6BFEE599}" type="datetimeFigureOut">
               <a:rPr lang="he-IL" smtClean="0"/>
-              <a:t>ה'/אדר א/תשע"ט</a:t>
+              <a:t>י"ט/אדר א/תשע"ט</a:t>
             </a:fld>
             <a:endParaRPr lang="he-IL"/>
           </a:p>
@@ -7361,7 +10987,7 @@
           <a:p>
             <a:fld id="{F472E424-CC75-4448-A1B5-6FCA6BFEE599}" type="datetimeFigureOut">
               <a:rPr lang="he-IL" smtClean="0"/>
-              <a:t>ה'/אדר א/תשע"ט</a:t>
+              <a:t>י"ט/אדר א/תשע"ט</a:t>
             </a:fld>
             <a:endParaRPr lang="he-IL"/>
           </a:p>
@@ -7572,7 +11198,7 @@
           <a:p>
             <a:fld id="{F472E424-CC75-4448-A1B5-6FCA6BFEE599}" type="datetimeFigureOut">
               <a:rPr lang="he-IL" smtClean="0"/>
-              <a:t>ה'/אדר א/תשע"ט</a:t>
+              <a:t>י"ט/אדר א/תשע"ט</a:t>
             </a:fld>
             <a:endParaRPr lang="he-IL"/>
           </a:p>
@@ -8834,6 +12460,128 @@
           </a:bodyPr>
           <a:lstStyle/>
           <a:p>
+            <a:pPr algn="ctr" rtl="0"/>
+            <a:r>
+              <a:rPr lang="en-US" b="1" dirty="0">
+                <a:solidFill>
+                  <a:schemeClr val="bg1"/>
+                </a:solidFill>
+              </a:rPr>
+              <a:t>Where TS in JS? </a:t>
+            </a:r>
+          </a:p>
+        </p:txBody>
+      </p:sp>
+    </p:spTree>
+    <p:extLst>
+      <p:ext uri="{BB962C8B-B14F-4D97-AF65-F5344CB8AC3E}">
+        <p14:creationId xmlns:p14="http://schemas.microsoft.com/office/powerpoint/2010/main" val="2966267434"/>
+      </p:ext>
+    </p:extLst>
+  </p:cSld>
+  <p:clrMapOvr>
+    <a:masterClrMapping/>
+  </p:clrMapOvr>
+  <mc:AlternateContent xmlns:mc="http://schemas.openxmlformats.org/markup-compatibility/2006" xmlns:p14="http://schemas.microsoft.com/office/powerpoint/2010/main">
+    <mc:Choice Requires="p14">
+      <p:transition spd="med" p14:dur="700">
+        <p:fade/>
+      </p:transition>
+    </mc:Choice>
+    <mc:Fallback xmlns="">
+      <p:transition xmlns:p14="http://schemas.microsoft.com/office/powerpoint/2010/main" spd="med">
+        <p:fade/>
+      </p:transition>
+    </mc:Fallback>
+  </mc:AlternateContent>
+</p:sld>
+</file>
+
+<file path=ppt/slides/slide16.xml><?xml version="1.0" encoding="utf-8"?>
+<p:sld xmlns:a="http://schemas.openxmlformats.org/drawingml/2006/main" xmlns:r="http://schemas.openxmlformats.org/officeDocument/2006/relationships" xmlns:p="http://schemas.openxmlformats.org/presentationml/2006/main">
+  <p:cSld>
+    <p:spTree>
+      <p:nvGrpSpPr>
+        <p:cNvPr id="1" name=""/>
+        <p:cNvGrpSpPr/>
+        <p:nvPr/>
+      </p:nvGrpSpPr>
+      <p:grpSpPr>
+        <a:xfrm>
+          <a:off x="0" y="0"/>
+          <a:ext cx="0" cy="0"/>
+          <a:chOff x="0" y="0"/>
+          <a:chExt cx="0" cy="0"/>
+        </a:xfrm>
+      </p:grpSpPr>
+      <p:sp>
+        <p:nvSpPr>
+          <p:cNvPr id="6" name="Rectangle 5"/>
+          <p:cNvSpPr/>
+          <p:nvPr/>
+        </p:nvSpPr>
+        <p:spPr>
+          <a:xfrm>
+            <a:off x="-215115" y="0"/>
+            <a:ext cx="12407115" cy="6858000"/>
+          </a:xfrm>
+          <a:prstGeom prst="rect">
+            <a:avLst/>
+          </a:prstGeom>
+          <a:solidFill>
+            <a:schemeClr val="accent1">
+              <a:lumMod val="75000"/>
+            </a:schemeClr>
+          </a:solidFill>
+          <a:ln>
+            <a:noFill/>
+          </a:ln>
+        </p:spPr>
+        <p:style>
+          <a:lnRef idx="1">
+            <a:schemeClr val="accent1"/>
+          </a:lnRef>
+          <a:fillRef idx="3">
+            <a:schemeClr val="accent1"/>
+          </a:fillRef>
+          <a:effectRef idx="2">
+            <a:schemeClr val="accent1"/>
+          </a:effectRef>
+          <a:fontRef idx="minor">
+            <a:schemeClr val="lt1"/>
+          </a:fontRef>
+        </p:style>
+        <p:txBody>
+          <a:bodyPr rtlCol="0" anchor="ctr"/>
+          <a:lstStyle/>
+          <a:p>
+            <a:pPr algn="ctr"/>
+            <a:endParaRPr lang="en-US" sz="2400"/>
+          </a:p>
+        </p:txBody>
+      </p:sp>
+      <p:sp>
+        <p:nvSpPr>
+          <p:cNvPr id="24" name="Title 1"/>
+          <p:cNvSpPr>
+            <a:spLocks noGrp="1"/>
+          </p:cNvSpPr>
+          <p:nvPr>
+            <p:ph type="title"/>
+          </p:nvPr>
+        </p:nvSpPr>
+        <p:spPr>
+          <a:xfrm>
+            <a:off x="502042" y="1936377"/>
+            <a:ext cx="10972800" cy="2985246"/>
+          </a:xfrm>
+        </p:spPr>
+        <p:txBody>
+          <a:bodyPr>
+            <a:noAutofit/>
+          </a:bodyPr>
+          <a:lstStyle/>
+          <a:p>
             <a:pPr algn="ctr" rtl="0" eaLnBrk="0" fontAlgn="base" hangingPunct="0">
               <a:spcAft>
                 <a:spcPct val="0"/>
@@ -8845,7 +12593,7 @@
                   <a:schemeClr val="bg1"/>
                 </a:solidFill>
               </a:rPr>
-              <a:t>EverGreen</a:t>
+              <a:t>WebPack</a:t>
             </a:r>
             <a:endParaRPr lang="en-US" altLang="en-US" sz="6000" b="1" dirty="0">
               <a:solidFill>
@@ -8860,6 +12608,418 @@
     <p:extLst>
       <p:ext uri="{BB962C8B-B14F-4D97-AF65-F5344CB8AC3E}">
         <p14:creationId xmlns:p14="http://schemas.microsoft.com/office/powerpoint/2010/main" val="3961097776"/>
+      </p:ext>
+    </p:extLst>
+  </p:cSld>
+  <p:clrMapOvr>
+    <a:masterClrMapping/>
+  </p:clrMapOvr>
+  <mc:AlternateContent xmlns:mc="http://schemas.openxmlformats.org/markup-compatibility/2006" xmlns:p14="http://schemas.microsoft.com/office/powerpoint/2010/main">
+    <mc:Choice Requires="p14">
+      <p:transition spd="med" p14:dur="700">
+        <p:fade/>
+      </p:transition>
+    </mc:Choice>
+    <mc:Fallback xmlns="">
+      <p:transition xmlns:p14="http://schemas.microsoft.com/office/powerpoint/2010/main" spd="med">
+        <p:fade/>
+      </p:transition>
+    </mc:Fallback>
+  </mc:AlternateContent>
+</p:sld>
+</file>
+
+<file path=ppt/slides/slide17.xml><?xml version="1.0" encoding="utf-8"?>
+<p:sld xmlns:a="http://schemas.openxmlformats.org/drawingml/2006/main" xmlns:r="http://schemas.openxmlformats.org/officeDocument/2006/relationships" xmlns:p="http://schemas.openxmlformats.org/presentationml/2006/main">
+  <p:cSld>
+    <p:spTree>
+      <p:nvGrpSpPr>
+        <p:cNvPr id="1" name=""/>
+        <p:cNvGrpSpPr/>
+        <p:nvPr/>
+      </p:nvGrpSpPr>
+      <p:grpSpPr>
+        <a:xfrm>
+          <a:off x="0" y="0"/>
+          <a:ext cx="0" cy="0"/>
+          <a:chOff x="0" y="0"/>
+          <a:chExt cx="0" cy="0"/>
+        </a:xfrm>
+      </p:grpSpPr>
+      <p:sp>
+        <p:nvSpPr>
+          <p:cNvPr id="6" name="Rectangle 5"/>
+          <p:cNvSpPr/>
+          <p:nvPr/>
+        </p:nvSpPr>
+        <p:spPr>
+          <a:xfrm>
+            <a:off x="-215115" y="0"/>
+            <a:ext cx="12407115" cy="6858000"/>
+          </a:xfrm>
+          <a:prstGeom prst="rect">
+            <a:avLst/>
+          </a:prstGeom>
+          <a:solidFill>
+            <a:schemeClr val="accent1">
+              <a:lumMod val="75000"/>
+            </a:schemeClr>
+          </a:solidFill>
+          <a:ln>
+            <a:noFill/>
+          </a:ln>
+        </p:spPr>
+        <p:style>
+          <a:lnRef idx="1">
+            <a:schemeClr val="accent1"/>
+          </a:lnRef>
+          <a:fillRef idx="3">
+            <a:schemeClr val="accent1"/>
+          </a:fillRef>
+          <a:effectRef idx="2">
+            <a:schemeClr val="accent1"/>
+          </a:effectRef>
+          <a:fontRef idx="minor">
+            <a:schemeClr val="lt1"/>
+          </a:fontRef>
+        </p:style>
+        <p:txBody>
+          <a:bodyPr rtlCol="0" anchor="ctr"/>
+          <a:lstStyle/>
+          <a:p>
+            <a:pPr algn="ctr"/>
+            <a:endParaRPr lang="en-US" sz="2400"/>
+          </a:p>
+        </p:txBody>
+      </p:sp>
+      <p:sp>
+        <p:nvSpPr>
+          <p:cNvPr id="24" name="Title 1"/>
+          <p:cNvSpPr>
+            <a:spLocks noGrp="1"/>
+          </p:cNvSpPr>
+          <p:nvPr>
+            <p:ph type="title"/>
+          </p:nvPr>
+        </p:nvSpPr>
+        <p:spPr>
+          <a:xfrm>
+            <a:off x="502042" y="1936377"/>
+            <a:ext cx="10972800" cy="2985246"/>
+          </a:xfrm>
+        </p:spPr>
+        <p:txBody>
+          <a:bodyPr>
+            <a:noAutofit/>
+          </a:bodyPr>
+          <a:lstStyle/>
+          <a:p>
+            <a:pPr algn="ctr" rtl="0" eaLnBrk="0" fontAlgn="base" hangingPunct="0">
+              <a:spcAft>
+                <a:spcPct val="0"/>
+              </a:spcAft>
+            </a:pPr>
+            <a:r>
+              <a:rPr lang="en-US" sz="6000" dirty="0" err="1">
+                <a:solidFill>
+                  <a:schemeClr val="bg1"/>
+                </a:solidFill>
+              </a:rPr>
+              <a:t>WebPack</a:t>
+            </a:r>
+            <a:r>
+              <a:rPr lang="en-US" sz="6000" dirty="0">
+                <a:solidFill>
+                  <a:schemeClr val="bg1"/>
+                </a:solidFill>
+              </a:rPr>
+              <a:t> vs Gulp vs Grunt</a:t>
+            </a:r>
+            <a:endParaRPr lang="en-US" altLang="en-US" sz="6000" b="1" dirty="0">
+              <a:solidFill>
+                <a:schemeClr val="bg1"/>
+              </a:solidFill>
+              <a:latin typeface="Calibri (Body)"/>
+            </a:endParaRPr>
+          </a:p>
+        </p:txBody>
+      </p:sp>
+    </p:spTree>
+    <p:extLst>
+      <p:ext uri="{BB962C8B-B14F-4D97-AF65-F5344CB8AC3E}">
+        <p14:creationId xmlns:p14="http://schemas.microsoft.com/office/powerpoint/2010/main" val="2030246191"/>
+      </p:ext>
+    </p:extLst>
+  </p:cSld>
+  <p:clrMapOvr>
+    <a:masterClrMapping/>
+  </p:clrMapOvr>
+  <mc:AlternateContent xmlns:mc="http://schemas.openxmlformats.org/markup-compatibility/2006" xmlns:p14="http://schemas.microsoft.com/office/powerpoint/2010/main">
+    <mc:Choice Requires="p14">
+      <p:transition spd="med" p14:dur="700">
+        <p:fade/>
+      </p:transition>
+    </mc:Choice>
+    <mc:Fallback xmlns="">
+      <p:transition xmlns:p14="http://schemas.microsoft.com/office/powerpoint/2010/main" spd="med">
+        <p:fade/>
+      </p:transition>
+    </mc:Fallback>
+  </mc:AlternateContent>
+</p:sld>
+</file>
+
+<file path=ppt/slides/slide18.xml><?xml version="1.0" encoding="utf-8"?>
+<p:sld xmlns:a="http://schemas.openxmlformats.org/drawingml/2006/main" xmlns:r="http://schemas.openxmlformats.org/officeDocument/2006/relationships" xmlns:p="http://schemas.openxmlformats.org/presentationml/2006/main">
+  <p:cSld>
+    <p:spTree>
+      <p:nvGrpSpPr>
+        <p:cNvPr id="1" name=""/>
+        <p:cNvGrpSpPr/>
+        <p:nvPr/>
+      </p:nvGrpSpPr>
+      <p:grpSpPr>
+        <a:xfrm>
+          <a:off x="0" y="0"/>
+          <a:ext cx="0" cy="0"/>
+          <a:chOff x="0" y="0"/>
+          <a:chExt cx="0" cy="0"/>
+        </a:xfrm>
+      </p:grpSpPr>
+      <p:sp>
+        <p:nvSpPr>
+          <p:cNvPr id="6" name="Rectangle 5"/>
+          <p:cNvSpPr/>
+          <p:nvPr/>
+        </p:nvSpPr>
+        <p:spPr>
+          <a:xfrm>
+            <a:off x="-215115" y="0"/>
+            <a:ext cx="12407115" cy="6858000"/>
+          </a:xfrm>
+          <a:prstGeom prst="rect">
+            <a:avLst/>
+          </a:prstGeom>
+          <a:solidFill>
+            <a:schemeClr val="accent1">
+              <a:lumMod val="75000"/>
+            </a:schemeClr>
+          </a:solidFill>
+          <a:ln>
+            <a:noFill/>
+          </a:ln>
+        </p:spPr>
+        <p:style>
+          <a:lnRef idx="1">
+            <a:schemeClr val="accent1"/>
+          </a:lnRef>
+          <a:fillRef idx="3">
+            <a:schemeClr val="accent1"/>
+          </a:fillRef>
+          <a:effectRef idx="2">
+            <a:schemeClr val="accent1"/>
+          </a:effectRef>
+          <a:fontRef idx="minor">
+            <a:schemeClr val="lt1"/>
+          </a:fontRef>
+        </p:style>
+        <p:txBody>
+          <a:bodyPr rtlCol="0" anchor="ctr"/>
+          <a:lstStyle/>
+          <a:p>
+            <a:pPr algn="ctr"/>
+            <a:endParaRPr lang="en-US" sz="2400"/>
+          </a:p>
+        </p:txBody>
+      </p:sp>
+      <p:sp>
+        <p:nvSpPr>
+          <p:cNvPr id="24" name="Title 1"/>
+          <p:cNvSpPr>
+            <a:spLocks noGrp="1"/>
+          </p:cNvSpPr>
+          <p:nvPr>
+            <p:ph type="title"/>
+          </p:nvPr>
+        </p:nvSpPr>
+        <p:spPr>
+          <a:xfrm>
+            <a:off x="502042" y="1936377"/>
+            <a:ext cx="10972800" cy="2985246"/>
+          </a:xfrm>
+        </p:spPr>
+        <p:txBody>
+          <a:bodyPr>
+            <a:noAutofit/>
+          </a:bodyPr>
+          <a:lstStyle/>
+          <a:p>
+            <a:pPr algn="ctr" rtl="0" eaLnBrk="0" fontAlgn="base" hangingPunct="0">
+              <a:spcAft>
+                <a:spcPct val="0"/>
+              </a:spcAft>
+            </a:pPr>
+            <a:r>
+              <a:rPr lang="en-US" sz="6000" dirty="0" err="1">
+                <a:solidFill>
+                  <a:schemeClr val="bg1"/>
+                </a:solidFill>
+              </a:rPr>
+              <a:t>EverGreen</a:t>
+            </a:r>
+            <a:r>
+              <a:rPr lang="en-US" sz="6000" dirty="0">
+                <a:solidFill>
+                  <a:schemeClr val="bg1"/>
+                </a:solidFill>
+              </a:rPr>
+              <a:t> Browsers</a:t>
+            </a:r>
+            <a:endParaRPr lang="en-US" altLang="en-US" sz="6000" b="1" dirty="0">
+              <a:solidFill>
+                <a:schemeClr val="bg1"/>
+              </a:solidFill>
+              <a:latin typeface="Calibri (Body)"/>
+            </a:endParaRPr>
+          </a:p>
+        </p:txBody>
+      </p:sp>
+    </p:spTree>
+    <p:extLst>
+      <p:ext uri="{BB962C8B-B14F-4D97-AF65-F5344CB8AC3E}">
+        <p14:creationId xmlns:p14="http://schemas.microsoft.com/office/powerpoint/2010/main" val="2608843343"/>
+      </p:ext>
+    </p:extLst>
+  </p:cSld>
+  <p:clrMapOvr>
+    <a:masterClrMapping/>
+  </p:clrMapOvr>
+  <mc:AlternateContent xmlns:mc="http://schemas.openxmlformats.org/markup-compatibility/2006" xmlns:p14="http://schemas.microsoft.com/office/powerpoint/2010/main">
+    <mc:Choice Requires="p14">
+      <p:transition spd="med" p14:dur="700">
+        <p:fade/>
+      </p:transition>
+    </mc:Choice>
+    <mc:Fallback xmlns="">
+      <p:transition xmlns:p14="http://schemas.microsoft.com/office/powerpoint/2010/main" spd="med">
+        <p:fade/>
+      </p:transition>
+    </mc:Fallback>
+  </mc:AlternateContent>
+</p:sld>
+</file>
+
+<file path=ppt/slides/slide19.xml><?xml version="1.0" encoding="utf-8"?>
+<p:sld xmlns:a="http://schemas.openxmlformats.org/drawingml/2006/main" xmlns:r="http://schemas.openxmlformats.org/officeDocument/2006/relationships" xmlns:p="http://schemas.openxmlformats.org/presentationml/2006/main">
+  <p:cSld>
+    <p:spTree>
+      <p:nvGrpSpPr>
+        <p:cNvPr id="1" name=""/>
+        <p:cNvGrpSpPr/>
+        <p:nvPr/>
+      </p:nvGrpSpPr>
+      <p:grpSpPr>
+        <a:xfrm>
+          <a:off x="0" y="0"/>
+          <a:ext cx="0" cy="0"/>
+          <a:chOff x="0" y="0"/>
+          <a:chExt cx="0" cy="0"/>
+        </a:xfrm>
+      </p:grpSpPr>
+      <p:sp>
+        <p:nvSpPr>
+          <p:cNvPr id="6" name="Rectangle 5"/>
+          <p:cNvSpPr/>
+          <p:nvPr/>
+        </p:nvSpPr>
+        <p:spPr>
+          <a:xfrm>
+            <a:off x="-215115" y="0"/>
+            <a:ext cx="12407115" cy="6858000"/>
+          </a:xfrm>
+          <a:prstGeom prst="rect">
+            <a:avLst/>
+          </a:prstGeom>
+          <a:solidFill>
+            <a:schemeClr val="accent1">
+              <a:lumMod val="75000"/>
+            </a:schemeClr>
+          </a:solidFill>
+          <a:ln>
+            <a:noFill/>
+          </a:ln>
+        </p:spPr>
+        <p:style>
+          <a:lnRef idx="1">
+            <a:schemeClr val="accent1"/>
+          </a:lnRef>
+          <a:fillRef idx="3">
+            <a:schemeClr val="accent1"/>
+          </a:fillRef>
+          <a:effectRef idx="2">
+            <a:schemeClr val="accent1"/>
+          </a:effectRef>
+          <a:fontRef idx="minor">
+            <a:schemeClr val="lt1"/>
+          </a:fontRef>
+        </p:style>
+        <p:txBody>
+          <a:bodyPr rtlCol="0" anchor="ctr"/>
+          <a:lstStyle/>
+          <a:p>
+            <a:pPr algn="ctr"/>
+            <a:endParaRPr lang="en-US" sz="2400"/>
+          </a:p>
+        </p:txBody>
+      </p:sp>
+      <p:sp>
+        <p:nvSpPr>
+          <p:cNvPr id="24" name="Title 1"/>
+          <p:cNvSpPr>
+            <a:spLocks noGrp="1"/>
+          </p:cNvSpPr>
+          <p:nvPr>
+            <p:ph type="title"/>
+          </p:nvPr>
+        </p:nvSpPr>
+        <p:spPr>
+          <a:xfrm>
+            <a:off x="502042" y="1936377"/>
+            <a:ext cx="10972800" cy="2985246"/>
+          </a:xfrm>
+        </p:spPr>
+        <p:txBody>
+          <a:bodyPr>
+            <a:noAutofit/>
+          </a:bodyPr>
+          <a:lstStyle/>
+          <a:p>
+            <a:pPr algn="ctr" rtl="0" eaLnBrk="0" fontAlgn="base" hangingPunct="0">
+              <a:spcAft>
+                <a:spcPct val="0"/>
+              </a:spcAft>
+            </a:pPr>
+            <a:r>
+              <a:rPr lang="en-US" sz="6000" dirty="0">
+                <a:solidFill>
+                  <a:schemeClr val="bg1"/>
+                </a:solidFill>
+              </a:rPr>
+              <a:t>NPM</a:t>
+            </a:r>
+            <a:endParaRPr lang="en-US" altLang="en-US" sz="6000" b="1" dirty="0">
+              <a:solidFill>
+                <a:schemeClr val="bg1"/>
+              </a:solidFill>
+              <a:latin typeface="Calibri (Body)"/>
+            </a:endParaRPr>
+          </a:p>
+        </p:txBody>
+      </p:sp>
+    </p:spTree>
+    <p:extLst>
+      <p:ext uri="{BB962C8B-B14F-4D97-AF65-F5344CB8AC3E}">
+        <p14:creationId xmlns:p14="http://schemas.microsoft.com/office/powerpoint/2010/main" val="3504853626"/>
       </p:ext>
     </p:extLst>
   </p:cSld>
@@ -9080,6 +13240,542 @@
       </p:par>
     </p:tnLst>
   </p:timing>
+</p:sld>
+</file>
+
+<file path=ppt/slides/slide20.xml><?xml version="1.0" encoding="utf-8"?>
+<p:sld xmlns:a="http://schemas.openxmlformats.org/drawingml/2006/main" xmlns:r="http://schemas.openxmlformats.org/officeDocument/2006/relationships" xmlns:p="http://schemas.openxmlformats.org/presentationml/2006/main">
+  <p:cSld>
+    <p:spTree>
+      <p:nvGrpSpPr>
+        <p:cNvPr id="1" name=""/>
+        <p:cNvGrpSpPr/>
+        <p:nvPr/>
+      </p:nvGrpSpPr>
+      <p:grpSpPr>
+        <a:xfrm>
+          <a:off x="0" y="0"/>
+          <a:ext cx="0" cy="0"/>
+          <a:chOff x="0" y="0"/>
+          <a:chExt cx="0" cy="0"/>
+        </a:xfrm>
+      </p:grpSpPr>
+      <p:sp>
+        <p:nvSpPr>
+          <p:cNvPr id="6" name="Rectangle 5"/>
+          <p:cNvSpPr/>
+          <p:nvPr/>
+        </p:nvSpPr>
+        <p:spPr>
+          <a:xfrm>
+            <a:off x="-215115" y="0"/>
+            <a:ext cx="12407115" cy="6858000"/>
+          </a:xfrm>
+          <a:prstGeom prst="rect">
+            <a:avLst/>
+          </a:prstGeom>
+          <a:solidFill>
+            <a:schemeClr val="accent1">
+              <a:lumMod val="75000"/>
+            </a:schemeClr>
+          </a:solidFill>
+          <a:ln>
+            <a:noFill/>
+          </a:ln>
+        </p:spPr>
+        <p:style>
+          <a:lnRef idx="1">
+            <a:schemeClr val="accent1"/>
+          </a:lnRef>
+          <a:fillRef idx="3">
+            <a:schemeClr val="accent1"/>
+          </a:fillRef>
+          <a:effectRef idx="2">
+            <a:schemeClr val="accent1"/>
+          </a:effectRef>
+          <a:fontRef idx="minor">
+            <a:schemeClr val="lt1"/>
+          </a:fontRef>
+        </p:style>
+        <p:txBody>
+          <a:bodyPr rtlCol="0" anchor="ctr"/>
+          <a:lstStyle/>
+          <a:p>
+            <a:pPr algn="ctr"/>
+            <a:endParaRPr lang="en-US" sz="2400"/>
+          </a:p>
+        </p:txBody>
+      </p:sp>
+      <p:sp>
+        <p:nvSpPr>
+          <p:cNvPr id="24" name="Title 1"/>
+          <p:cNvSpPr>
+            <a:spLocks noGrp="1"/>
+          </p:cNvSpPr>
+          <p:nvPr>
+            <p:ph type="title"/>
+          </p:nvPr>
+        </p:nvSpPr>
+        <p:spPr>
+          <a:xfrm>
+            <a:off x="502042" y="1936377"/>
+            <a:ext cx="10972800" cy="2985246"/>
+          </a:xfrm>
+        </p:spPr>
+        <p:txBody>
+          <a:bodyPr>
+            <a:noAutofit/>
+          </a:bodyPr>
+          <a:lstStyle/>
+          <a:p>
+            <a:pPr algn="ctr" rtl="0" eaLnBrk="0" fontAlgn="base" hangingPunct="0">
+              <a:spcAft>
+                <a:spcPct val="0"/>
+              </a:spcAft>
+            </a:pPr>
+            <a:r>
+              <a:rPr lang="en-US" sz="6000" dirty="0">
+                <a:solidFill>
+                  <a:schemeClr val="bg1"/>
+                </a:solidFill>
+              </a:rPr>
+              <a:t>NPM vs Yarn</a:t>
+            </a:r>
+            <a:endParaRPr lang="en-US" altLang="en-US" sz="6000" b="1" dirty="0">
+              <a:solidFill>
+                <a:schemeClr val="bg1"/>
+              </a:solidFill>
+              <a:latin typeface="Calibri (Body)"/>
+            </a:endParaRPr>
+          </a:p>
+        </p:txBody>
+      </p:sp>
+    </p:spTree>
+    <p:extLst>
+      <p:ext uri="{BB962C8B-B14F-4D97-AF65-F5344CB8AC3E}">
+        <p14:creationId xmlns:p14="http://schemas.microsoft.com/office/powerpoint/2010/main" val="3602586072"/>
+      </p:ext>
+    </p:extLst>
+  </p:cSld>
+  <p:clrMapOvr>
+    <a:masterClrMapping/>
+  </p:clrMapOvr>
+  <mc:AlternateContent xmlns:mc="http://schemas.openxmlformats.org/markup-compatibility/2006" xmlns:p14="http://schemas.microsoft.com/office/powerpoint/2010/main">
+    <mc:Choice Requires="p14">
+      <p:transition spd="med" p14:dur="700">
+        <p:fade/>
+      </p:transition>
+    </mc:Choice>
+    <mc:Fallback xmlns="">
+      <p:transition xmlns:p14="http://schemas.microsoft.com/office/powerpoint/2010/main" spd="med">
+        <p:fade/>
+      </p:transition>
+    </mc:Fallback>
+  </mc:AlternateContent>
+</p:sld>
+</file>
+
+<file path=ppt/slides/slide21.xml><?xml version="1.0" encoding="utf-8"?>
+<p:sld xmlns:a="http://schemas.openxmlformats.org/drawingml/2006/main" xmlns:r="http://schemas.openxmlformats.org/officeDocument/2006/relationships" xmlns:p="http://schemas.openxmlformats.org/presentationml/2006/main">
+  <p:cSld>
+    <p:spTree>
+      <p:nvGrpSpPr>
+        <p:cNvPr id="1" name=""/>
+        <p:cNvGrpSpPr/>
+        <p:nvPr/>
+      </p:nvGrpSpPr>
+      <p:grpSpPr>
+        <a:xfrm>
+          <a:off x="0" y="0"/>
+          <a:ext cx="0" cy="0"/>
+          <a:chOff x="0" y="0"/>
+          <a:chExt cx="0" cy="0"/>
+        </a:xfrm>
+      </p:grpSpPr>
+      <p:sp>
+        <p:nvSpPr>
+          <p:cNvPr id="6" name="Rectangle 5"/>
+          <p:cNvSpPr/>
+          <p:nvPr/>
+        </p:nvSpPr>
+        <p:spPr>
+          <a:xfrm>
+            <a:off x="-215115" y="0"/>
+            <a:ext cx="12407115" cy="6858000"/>
+          </a:xfrm>
+          <a:prstGeom prst="rect">
+            <a:avLst/>
+          </a:prstGeom>
+          <a:solidFill>
+            <a:schemeClr val="accent1">
+              <a:lumMod val="75000"/>
+            </a:schemeClr>
+          </a:solidFill>
+          <a:ln>
+            <a:noFill/>
+          </a:ln>
+        </p:spPr>
+        <p:style>
+          <a:lnRef idx="1">
+            <a:schemeClr val="accent1"/>
+          </a:lnRef>
+          <a:fillRef idx="3">
+            <a:schemeClr val="accent1"/>
+          </a:fillRef>
+          <a:effectRef idx="2">
+            <a:schemeClr val="accent1"/>
+          </a:effectRef>
+          <a:fontRef idx="minor">
+            <a:schemeClr val="lt1"/>
+          </a:fontRef>
+        </p:style>
+        <p:txBody>
+          <a:bodyPr rtlCol="0" anchor="ctr"/>
+          <a:lstStyle/>
+          <a:p>
+            <a:pPr algn="ctr"/>
+            <a:endParaRPr lang="en-US" sz="2400"/>
+          </a:p>
+        </p:txBody>
+      </p:sp>
+      <p:sp>
+        <p:nvSpPr>
+          <p:cNvPr id="24" name="Title 1"/>
+          <p:cNvSpPr>
+            <a:spLocks noGrp="1"/>
+          </p:cNvSpPr>
+          <p:nvPr>
+            <p:ph type="title"/>
+          </p:nvPr>
+        </p:nvSpPr>
+        <p:spPr>
+          <a:xfrm>
+            <a:off x="502042" y="1936377"/>
+            <a:ext cx="10972800" cy="2985246"/>
+          </a:xfrm>
+        </p:spPr>
+        <p:txBody>
+          <a:bodyPr>
+            <a:noAutofit/>
+          </a:bodyPr>
+          <a:lstStyle/>
+          <a:p>
+            <a:pPr algn="ctr" rtl="0" eaLnBrk="0" fontAlgn="base" hangingPunct="0">
+              <a:spcAft>
+                <a:spcPct val="0"/>
+              </a:spcAft>
+            </a:pPr>
+            <a:r>
+              <a:rPr lang="en-US" sz="6000" dirty="0">
+                <a:solidFill>
+                  <a:schemeClr val="bg1"/>
+                </a:solidFill>
+              </a:rPr>
+              <a:t>.</a:t>
+            </a:r>
+            <a:r>
+              <a:rPr lang="en-US" sz="6000" dirty="0" err="1">
+                <a:solidFill>
+                  <a:schemeClr val="bg1"/>
+                </a:solidFill>
+              </a:rPr>
+              <a:t>lockfile</a:t>
+            </a:r>
+            <a:endParaRPr lang="en-US" altLang="en-US" sz="6000" b="1" dirty="0">
+              <a:solidFill>
+                <a:schemeClr val="bg1"/>
+              </a:solidFill>
+              <a:latin typeface="Calibri (Body)"/>
+            </a:endParaRPr>
+          </a:p>
+        </p:txBody>
+      </p:sp>
+    </p:spTree>
+    <p:extLst>
+      <p:ext uri="{BB962C8B-B14F-4D97-AF65-F5344CB8AC3E}">
+        <p14:creationId xmlns:p14="http://schemas.microsoft.com/office/powerpoint/2010/main" val="1395792074"/>
+      </p:ext>
+    </p:extLst>
+  </p:cSld>
+  <p:clrMapOvr>
+    <a:masterClrMapping/>
+  </p:clrMapOvr>
+  <mc:AlternateContent xmlns:mc="http://schemas.openxmlformats.org/markup-compatibility/2006" xmlns:p14="http://schemas.microsoft.com/office/powerpoint/2010/main">
+    <mc:Choice Requires="p14">
+      <p:transition spd="med" p14:dur="700">
+        <p:fade/>
+      </p:transition>
+    </mc:Choice>
+    <mc:Fallback xmlns="">
+      <p:transition xmlns:p14="http://schemas.microsoft.com/office/powerpoint/2010/main" spd="med">
+        <p:fade/>
+      </p:transition>
+    </mc:Fallback>
+  </mc:AlternateContent>
+</p:sld>
+</file>
+
+<file path=ppt/slides/slide22.xml><?xml version="1.0" encoding="utf-8"?>
+<p:sld xmlns:a="http://schemas.openxmlformats.org/drawingml/2006/main" xmlns:r="http://schemas.openxmlformats.org/officeDocument/2006/relationships" xmlns:p="http://schemas.openxmlformats.org/presentationml/2006/main">
+  <p:cSld>
+    <p:spTree>
+      <p:nvGrpSpPr>
+        <p:cNvPr id="1" name=""/>
+        <p:cNvGrpSpPr/>
+        <p:nvPr/>
+      </p:nvGrpSpPr>
+      <p:grpSpPr>
+        <a:xfrm>
+          <a:off x="0" y="0"/>
+          <a:ext cx="0" cy="0"/>
+          <a:chOff x="0" y="0"/>
+          <a:chExt cx="0" cy="0"/>
+        </a:xfrm>
+      </p:grpSpPr>
+      <p:sp>
+        <p:nvSpPr>
+          <p:cNvPr id="6" name="Rectangle 5"/>
+          <p:cNvSpPr/>
+          <p:nvPr/>
+        </p:nvSpPr>
+        <p:spPr>
+          <a:xfrm>
+            <a:off x="-215115" y="0"/>
+            <a:ext cx="12407115" cy="6858000"/>
+          </a:xfrm>
+          <a:prstGeom prst="rect">
+            <a:avLst/>
+          </a:prstGeom>
+          <a:solidFill>
+            <a:schemeClr val="accent1">
+              <a:lumMod val="75000"/>
+            </a:schemeClr>
+          </a:solidFill>
+          <a:ln>
+            <a:noFill/>
+          </a:ln>
+        </p:spPr>
+        <p:style>
+          <a:lnRef idx="1">
+            <a:schemeClr val="accent1"/>
+          </a:lnRef>
+          <a:fillRef idx="3">
+            <a:schemeClr val="accent1"/>
+          </a:fillRef>
+          <a:effectRef idx="2">
+            <a:schemeClr val="accent1"/>
+          </a:effectRef>
+          <a:fontRef idx="minor">
+            <a:schemeClr val="lt1"/>
+          </a:fontRef>
+        </p:style>
+        <p:txBody>
+          <a:bodyPr rtlCol="0" anchor="ctr"/>
+          <a:lstStyle/>
+          <a:p>
+            <a:pPr algn="ctr"/>
+            <a:endParaRPr lang="en-US" sz="2400"/>
+          </a:p>
+        </p:txBody>
+      </p:sp>
+      <p:sp>
+        <p:nvSpPr>
+          <p:cNvPr id="24" name="Title 1"/>
+          <p:cNvSpPr>
+            <a:spLocks noGrp="1"/>
+          </p:cNvSpPr>
+          <p:nvPr>
+            <p:ph type="title"/>
+          </p:nvPr>
+        </p:nvSpPr>
+        <p:spPr>
+          <a:xfrm>
+            <a:off x="502042" y="1936377"/>
+            <a:ext cx="10972800" cy="2985246"/>
+          </a:xfrm>
+        </p:spPr>
+        <p:txBody>
+          <a:bodyPr>
+            <a:noAutofit/>
+          </a:bodyPr>
+          <a:lstStyle/>
+          <a:p>
+            <a:pPr algn="ctr" rtl="0" eaLnBrk="0" fontAlgn="base" hangingPunct="0">
+              <a:spcAft>
+                <a:spcPct val="0"/>
+              </a:spcAft>
+            </a:pPr>
+            <a:r>
+              <a:rPr lang="en-US" sz="6000" dirty="0">
+                <a:solidFill>
+                  <a:schemeClr val="bg1"/>
+                </a:solidFill>
+              </a:rPr>
+              <a:t>Yarn link</a:t>
+            </a:r>
+            <a:endParaRPr lang="en-US" altLang="en-US" sz="6000" b="1" dirty="0">
+              <a:solidFill>
+                <a:schemeClr val="bg1"/>
+              </a:solidFill>
+              <a:latin typeface="Calibri (Body)"/>
+            </a:endParaRPr>
+          </a:p>
+        </p:txBody>
+      </p:sp>
+    </p:spTree>
+    <p:extLst>
+      <p:ext uri="{BB962C8B-B14F-4D97-AF65-F5344CB8AC3E}">
+        <p14:creationId xmlns:p14="http://schemas.microsoft.com/office/powerpoint/2010/main" val="1909122222"/>
+      </p:ext>
+    </p:extLst>
+  </p:cSld>
+  <p:clrMapOvr>
+    <a:masterClrMapping/>
+  </p:clrMapOvr>
+  <mc:AlternateContent xmlns:mc="http://schemas.openxmlformats.org/markup-compatibility/2006" xmlns:p14="http://schemas.microsoft.com/office/powerpoint/2010/main">
+    <mc:Choice Requires="p14">
+      <p:transition spd="med" p14:dur="700">
+        <p:fade/>
+      </p:transition>
+    </mc:Choice>
+    <mc:Fallback xmlns="">
+      <p:transition xmlns:p14="http://schemas.microsoft.com/office/powerpoint/2010/main" spd="med">
+        <p:fade/>
+      </p:transition>
+    </mc:Fallback>
+  </mc:AlternateContent>
+</p:sld>
+</file>
+
+<file path=ppt/slides/slide23.xml><?xml version="1.0" encoding="utf-8"?>
+<p:sld xmlns:a="http://schemas.openxmlformats.org/drawingml/2006/main" xmlns:r="http://schemas.openxmlformats.org/officeDocument/2006/relationships" xmlns:p="http://schemas.openxmlformats.org/presentationml/2006/main">
+  <p:cSld>
+    <p:spTree>
+      <p:nvGrpSpPr>
+        <p:cNvPr id="1" name=""/>
+        <p:cNvGrpSpPr/>
+        <p:nvPr/>
+      </p:nvGrpSpPr>
+      <p:grpSpPr>
+        <a:xfrm>
+          <a:off x="0" y="0"/>
+          <a:ext cx="0" cy="0"/>
+          <a:chOff x="0" y="0"/>
+          <a:chExt cx="0" cy="0"/>
+        </a:xfrm>
+      </p:grpSpPr>
+      <p:sp>
+        <p:nvSpPr>
+          <p:cNvPr id="6" name="Rectangle 5"/>
+          <p:cNvSpPr/>
+          <p:nvPr/>
+        </p:nvSpPr>
+        <p:spPr>
+          <a:xfrm>
+            <a:off x="-215115" y="0"/>
+            <a:ext cx="12407115" cy="6858000"/>
+          </a:xfrm>
+          <a:prstGeom prst="rect">
+            <a:avLst/>
+          </a:prstGeom>
+          <a:solidFill>
+            <a:schemeClr val="accent1">
+              <a:lumMod val="75000"/>
+            </a:schemeClr>
+          </a:solidFill>
+          <a:ln>
+            <a:noFill/>
+          </a:ln>
+        </p:spPr>
+        <p:style>
+          <a:lnRef idx="1">
+            <a:schemeClr val="accent1"/>
+          </a:lnRef>
+          <a:fillRef idx="3">
+            <a:schemeClr val="accent1"/>
+          </a:fillRef>
+          <a:effectRef idx="2">
+            <a:schemeClr val="accent1"/>
+          </a:effectRef>
+          <a:fontRef idx="minor">
+            <a:schemeClr val="lt1"/>
+          </a:fontRef>
+        </p:style>
+        <p:txBody>
+          <a:bodyPr rtlCol="0" anchor="ctr"/>
+          <a:lstStyle/>
+          <a:p>
+            <a:pPr algn="ctr"/>
+            <a:endParaRPr lang="en-US" sz="2400"/>
+          </a:p>
+        </p:txBody>
+      </p:sp>
+      <p:sp>
+        <p:nvSpPr>
+          <p:cNvPr id="24" name="Title 1"/>
+          <p:cNvSpPr>
+            <a:spLocks noGrp="1"/>
+          </p:cNvSpPr>
+          <p:nvPr>
+            <p:ph type="title"/>
+          </p:nvPr>
+        </p:nvSpPr>
+        <p:spPr>
+          <a:xfrm>
+            <a:off x="502042" y="1936377"/>
+            <a:ext cx="10972800" cy="2985246"/>
+          </a:xfrm>
+        </p:spPr>
+        <p:txBody>
+          <a:bodyPr>
+            <a:noAutofit/>
+          </a:bodyPr>
+          <a:lstStyle/>
+          <a:p>
+            <a:pPr algn="ctr" rtl="0" eaLnBrk="0" fontAlgn="base" hangingPunct="0">
+              <a:spcAft>
+                <a:spcPct val="0"/>
+              </a:spcAft>
+            </a:pPr>
+            <a:r>
+              <a:rPr lang="en-US" sz="6000" dirty="0">
+                <a:solidFill>
+                  <a:schemeClr val="bg1"/>
+                </a:solidFill>
+              </a:rPr>
+              <a:t>Chapter 2</a:t>
+            </a:r>
+            <a:endParaRPr lang="en-US" altLang="en-US" sz="6000" b="1" dirty="0">
+              <a:solidFill>
+                <a:schemeClr val="bg1"/>
+              </a:solidFill>
+              <a:latin typeface="Calibri (Body)"/>
+            </a:endParaRPr>
+          </a:p>
+        </p:txBody>
+      </p:sp>
+    </p:spTree>
+    <p:extLst>
+      <p:ext uri="{BB962C8B-B14F-4D97-AF65-F5344CB8AC3E}">
+        <p14:creationId xmlns:p14="http://schemas.microsoft.com/office/powerpoint/2010/main" val="3166540082"/>
+      </p:ext>
+    </p:extLst>
+  </p:cSld>
+  <p:clrMapOvr>
+    <a:masterClrMapping/>
+  </p:clrMapOvr>
+  <mc:AlternateContent xmlns:mc="http://schemas.openxmlformats.org/markup-compatibility/2006" xmlns:p14="http://schemas.microsoft.com/office/powerpoint/2010/main">
+    <mc:Choice Requires="p14">
+      <p:transition spd="med" p14:dur="700">
+        <p:fade/>
+      </p:transition>
+    </mc:Choice>
+    <mc:Fallback xmlns="">
+      <p:transition xmlns:p14="http://schemas.microsoft.com/office/powerpoint/2010/main" spd="med">
+        <p:fade/>
+      </p:transition>
+    </mc:Fallback>
+  </mc:AlternateContent>
 </p:sld>
 </file>
 

</xml_diff>

<commit_message>
- add yarn link - add vue installation
</commit_message>
<xml_diff>
--- a/presentations/Practical Web Dev.pptx
+++ b/presentations/Practical Web Dev.pptx
@@ -5,7 +5,7 @@
     <p:sldMasterId id="2147483648" r:id="rId1"/>
   </p:sldMasterIdLst>
   <p:notesMasterIdLst>
-    <p:notesMasterId r:id="rId25"/>
+    <p:notesMasterId r:id="rId26"/>
   </p:notesMasterIdLst>
   <p:sldIdLst>
     <p:sldId id="256" r:id="rId2"/>
@@ -30,7 +30,8 @@
     <p:sldId id="385" r:id="rId21"/>
     <p:sldId id="386" r:id="rId22"/>
     <p:sldId id="387" r:id="rId23"/>
-    <p:sldId id="381" r:id="rId24"/>
+    <p:sldId id="388" r:id="rId24"/>
+    <p:sldId id="381" r:id="rId25"/>
   </p:sldIdLst>
   <p:sldSz cx="12192000" cy="6858000"/>
   <p:notesSz cx="6858000" cy="9144000"/>
@@ -156,6 +157,7 @@
             <p14:sldId id="385"/>
             <p14:sldId id="386"/>
             <p14:sldId id="387"/>
+            <p14:sldId id="388"/>
             <p14:sldId id="381"/>
           </p14:sldIdLst>
         </p14:section>
@@ -5830,6 +5832,37 @@
             </a:endParaRPr>
           </a:p>
           <a:p>
+            <a:pPr marL="171450" marR="0" lvl="0" indent="-171450" algn="l" defTabSz="914400" rtl="0" eaLnBrk="1" fontAlgn="auto" latinLnBrk="0" hangingPunct="1">
+              <a:lnSpc>
+                <a:spcPct val="100000"/>
+              </a:lnSpc>
+              <a:spcBef>
+                <a:spcPts val="0"/>
+              </a:spcBef>
+              <a:spcAft>
+                <a:spcPts val="0"/>
+              </a:spcAft>
+              <a:buClrTx/>
+              <a:buSzTx/>
+              <a:buFontTx/>
+              <a:buChar char="-"/>
+              <a:tabLst/>
+              <a:defRPr/>
+            </a:pPr>
+            <a:r>
+              <a:rPr lang="en-US" sz="1200" b="0" i="0" kern="1200" dirty="0">
+                <a:solidFill>
+                  <a:schemeClr val="tx1"/>
+                </a:solidFill>
+                <a:effectLst/>
+                <a:latin typeface="+mn-lt"/>
+                <a:ea typeface="+mn-ea"/>
+                <a:cs typeface="+mn-cs"/>
+              </a:rPr>
+              <a:t>https://medium.com/dailyjs/how-to-use-npm-link-7375b6219557</a:t>
+            </a:r>
+          </a:p>
+          <a:p>
             <a:pPr marL="171450" indent="-171450" algn="l" rtl="0">
               <a:buFontTx/>
               <a:buChar char="-"/>
@@ -5863,24 +5896,6 @@
                 <a:cs typeface="+mn-cs"/>
               </a:rPr>
               <a:t>https://yarnpkg.com/lang/en/docs/cli/link/</a:t>
-            </a:r>
-          </a:p>
-          <a:p>
-            <a:pPr marL="171450" indent="-171450" algn="l" rtl="0">
-              <a:buFontTx/>
-              <a:buChar char="-"/>
-            </a:pPr>
-            <a:r>
-              <a:rPr lang="en-US" sz="1200" b="0" i="0" kern="1200" dirty="0">
-                <a:solidFill>
-                  <a:schemeClr val="tx1"/>
-                </a:solidFill>
-                <a:effectLst/>
-                <a:latin typeface="+mn-lt"/>
-                <a:ea typeface="+mn-ea"/>
-                <a:cs typeface="+mn-cs"/>
-              </a:rPr>
-              <a:t>https://medium.com/dailyjs/how-to-use-npm-link-7375b6219557</a:t>
             </a:r>
           </a:p>
           <a:p>
@@ -5996,7 +6011,1062 @@
           <a:lstStyle/>
           <a:p>
             <a:pPr algn="l" rtl="0"/>
-            <a:endParaRPr lang="en-US" b="0" dirty="0"/>
+            <a:r>
+              <a:rPr lang="en-US" sz="1200" b="0" i="0" kern="1200" dirty="0">
+                <a:solidFill>
+                  <a:schemeClr val="tx1"/>
+                </a:solidFill>
+                <a:effectLst/>
+                <a:latin typeface="+mn-lt"/>
+                <a:ea typeface="+mn-ea"/>
+                <a:cs typeface="+mn-cs"/>
+              </a:rPr>
+              <a:t>Clone our basic project</a:t>
+            </a:r>
+          </a:p>
+          <a:p>
+            <a:pPr algn="l" rtl="0"/>
+            <a:endParaRPr lang="en-US" sz="1200" b="0" i="0" kern="1200" dirty="0">
+              <a:solidFill>
+                <a:schemeClr val="tx1"/>
+              </a:solidFill>
+              <a:effectLst/>
+              <a:latin typeface="+mn-lt"/>
+              <a:ea typeface="+mn-ea"/>
+              <a:cs typeface="+mn-cs"/>
+            </a:endParaRPr>
+          </a:p>
+          <a:p>
+            <a:pPr algn="l" rtl="0"/>
+            <a:r>
+              <a:rPr lang="en-US" sz="1200" b="0" i="0" kern="1200" dirty="0">
+                <a:solidFill>
+                  <a:schemeClr val="tx1"/>
+                </a:solidFill>
+                <a:effectLst/>
+                <a:latin typeface="+mn-lt"/>
+                <a:ea typeface="+mn-ea"/>
+                <a:cs typeface="+mn-cs"/>
+              </a:rPr>
+              <a:t>Pre </a:t>
+            </a:r>
+            <a:r>
+              <a:rPr lang="en-US" sz="1200" b="0" i="0" kern="1200" dirty="0" err="1">
+                <a:solidFill>
+                  <a:schemeClr val="tx1"/>
+                </a:solidFill>
+                <a:effectLst/>
+                <a:latin typeface="+mn-lt"/>
+                <a:ea typeface="+mn-ea"/>
+                <a:cs typeface="+mn-cs"/>
+              </a:rPr>
+              <a:t>requsits</a:t>
+            </a:r>
+            <a:r>
+              <a:rPr lang="en-US" sz="1200" b="0" i="0" kern="1200" dirty="0">
+                <a:solidFill>
+                  <a:schemeClr val="tx1"/>
+                </a:solidFill>
+                <a:effectLst/>
+                <a:latin typeface="+mn-lt"/>
+                <a:ea typeface="+mn-ea"/>
+                <a:cs typeface="+mn-cs"/>
+              </a:rPr>
+              <a:t>:</a:t>
+            </a:r>
+          </a:p>
+          <a:p>
+            <a:pPr algn="l" rtl="0"/>
+            <a:r>
+              <a:rPr lang="en-US" sz="1200" b="0" i="0" kern="1200" dirty="0">
+                <a:solidFill>
+                  <a:schemeClr val="tx1"/>
+                </a:solidFill>
+                <a:effectLst/>
+                <a:latin typeface="+mn-lt"/>
+                <a:ea typeface="+mn-ea"/>
+                <a:cs typeface="+mn-cs"/>
+              </a:rPr>
+              <a:t>Git &amp; ide (VS code/</a:t>
+            </a:r>
+            <a:r>
+              <a:rPr lang="en-US" sz="1200" b="0" i="0" kern="1200" dirty="0" err="1">
+                <a:solidFill>
+                  <a:schemeClr val="tx1"/>
+                </a:solidFill>
+                <a:effectLst/>
+                <a:latin typeface="+mn-lt"/>
+                <a:ea typeface="+mn-ea"/>
+                <a:cs typeface="+mn-cs"/>
+              </a:rPr>
+              <a:t>webstorm</a:t>
+            </a:r>
+            <a:r>
+              <a:rPr lang="en-US" sz="1200" b="0" i="0" kern="1200" dirty="0">
+                <a:solidFill>
+                  <a:schemeClr val="tx1"/>
+                </a:solidFill>
+                <a:effectLst/>
+                <a:latin typeface="+mn-lt"/>
+                <a:ea typeface="+mn-ea"/>
+                <a:cs typeface="+mn-cs"/>
+              </a:rPr>
+              <a:t>)</a:t>
+            </a:r>
+          </a:p>
+          <a:p>
+            <a:pPr algn="l" rtl="0"/>
+            <a:endParaRPr lang="en-US" sz="1200" b="0" i="0" kern="1200" dirty="0">
+              <a:solidFill>
+                <a:schemeClr val="tx1"/>
+              </a:solidFill>
+              <a:effectLst/>
+              <a:latin typeface="+mn-lt"/>
+              <a:ea typeface="+mn-ea"/>
+              <a:cs typeface="+mn-cs"/>
+            </a:endParaRPr>
+          </a:p>
+          <a:p>
+            <a:pPr algn="l" rtl="0"/>
+            <a:r>
+              <a:rPr lang="en-US" sz="1200" b="0" i="0" kern="1200" dirty="0" err="1">
+                <a:solidFill>
+                  <a:schemeClr val="tx1"/>
+                </a:solidFill>
+                <a:effectLst/>
+                <a:latin typeface="+mn-lt"/>
+                <a:ea typeface="+mn-ea"/>
+                <a:cs typeface="+mn-cs"/>
+              </a:rPr>
+              <a:t>Comands</a:t>
+            </a:r>
+            <a:r>
+              <a:rPr lang="en-US" sz="1200" b="0" i="0" kern="1200" dirty="0">
+                <a:solidFill>
+                  <a:schemeClr val="tx1"/>
+                </a:solidFill>
+                <a:effectLst/>
+                <a:latin typeface="+mn-lt"/>
+                <a:ea typeface="+mn-ea"/>
+                <a:cs typeface="+mn-cs"/>
+              </a:rPr>
+              <a:t> to clone </a:t>
+            </a:r>
+            <a:r>
+              <a:rPr lang="en-US" sz="1200" b="0" i="0" kern="1200" dirty="0" err="1">
+                <a:solidFill>
+                  <a:schemeClr val="tx1"/>
+                </a:solidFill>
+                <a:effectLst/>
+                <a:latin typeface="+mn-lt"/>
+                <a:ea typeface="+mn-ea"/>
+                <a:cs typeface="+mn-cs"/>
+              </a:rPr>
+              <a:t>ourbase</a:t>
+            </a:r>
+            <a:r>
+              <a:rPr lang="en-US" sz="1200" b="0" i="0" kern="1200" dirty="0">
+                <a:solidFill>
+                  <a:schemeClr val="tx1"/>
+                </a:solidFill>
+                <a:effectLst/>
+                <a:latin typeface="+mn-lt"/>
+                <a:ea typeface="+mn-ea"/>
+                <a:cs typeface="+mn-cs"/>
+              </a:rPr>
+              <a:t> project</a:t>
+            </a:r>
+          </a:p>
+          <a:p>
+            <a:pPr algn="l" rtl="0"/>
+            <a:endParaRPr lang="en-US" sz="1200" b="0" i="0" kern="1200" dirty="0">
+              <a:solidFill>
+                <a:schemeClr val="tx1"/>
+              </a:solidFill>
+              <a:effectLst/>
+              <a:latin typeface="+mn-lt"/>
+              <a:ea typeface="+mn-ea"/>
+              <a:cs typeface="+mn-cs"/>
+            </a:endParaRPr>
+          </a:p>
+          <a:p>
+            <a:pPr algn="l" rtl="0"/>
+            <a:endParaRPr lang="en-US" sz="1200" b="0" i="0" kern="1200" dirty="0">
+              <a:solidFill>
+                <a:schemeClr val="tx1"/>
+              </a:solidFill>
+              <a:effectLst/>
+              <a:latin typeface="+mn-lt"/>
+              <a:ea typeface="+mn-ea"/>
+              <a:cs typeface="+mn-cs"/>
+            </a:endParaRPr>
+          </a:p>
+          <a:p>
+            <a:pPr algn="l" rtl="0"/>
+            <a:r>
+              <a:rPr lang="en-US" sz="1200" b="0" i="0" kern="1200" dirty="0">
+                <a:solidFill>
+                  <a:schemeClr val="tx1"/>
+                </a:solidFill>
+                <a:effectLst/>
+                <a:latin typeface="+mn-lt"/>
+                <a:ea typeface="+mn-ea"/>
+                <a:cs typeface="+mn-cs"/>
+              </a:rPr>
+              <a:t>Install </a:t>
+            </a:r>
+            <a:r>
+              <a:rPr lang="en-US" sz="1200" b="0" i="0" kern="1200" dirty="0" err="1">
+                <a:solidFill>
+                  <a:schemeClr val="tx1"/>
+                </a:solidFill>
+                <a:effectLst/>
+                <a:latin typeface="+mn-lt"/>
+                <a:ea typeface="+mn-ea"/>
+                <a:cs typeface="+mn-cs"/>
+              </a:rPr>
+              <a:t>vue</a:t>
+            </a:r>
+            <a:r>
+              <a:rPr lang="en-US" sz="1200" b="0" i="0" kern="1200" dirty="0">
+                <a:solidFill>
+                  <a:schemeClr val="tx1"/>
+                </a:solidFill>
+                <a:effectLst/>
+                <a:latin typeface="+mn-lt"/>
+                <a:ea typeface="+mn-ea"/>
+                <a:cs typeface="+mn-cs"/>
+              </a:rPr>
+              <a:t>:</a:t>
+            </a:r>
+          </a:p>
+          <a:p>
+            <a:pPr algn="l" rtl="0"/>
+            <a:r>
+              <a:rPr lang="en-US" sz="1200" b="0" i="0" kern="1200" dirty="0" err="1">
+                <a:solidFill>
+                  <a:schemeClr val="tx1"/>
+                </a:solidFill>
+                <a:effectLst/>
+                <a:latin typeface="+mn-lt"/>
+                <a:ea typeface="+mn-ea"/>
+                <a:cs typeface="+mn-cs"/>
+              </a:rPr>
+              <a:t>npm</a:t>
+            </a:r>
+            <a:r>
+              <a:rPr lang="en-US" sz="1200" b="0" i="0" kern="1200" dirty="0">
+                <a:solidFill>
+                  <a:schemeClr val="tx1"/>
+                </a:solidFill>
+                <a:effectLst/>
+                <a:latin typeface="+mn-lt"/>
+                <a:ea typeface="+mn-ea"/>
+                <a:cs typeface="+mn-cs"/>
+              </a:rPr>
+              <a:t> install -g @</a:t>
+            </a:r>
+            <a:r>
+              <a:rPr lang="en-US" sz="1200" b="0" i="0" kern="1200" dirty="0" err="1">
+                <a:solidFill>
+                  <a:schemeClr val="tx1"/>
+                </a:solidFill>
+                <a:effectLst/>
+                <a:latin typeface="+mn-lt"/>
+                <a:ea typeface="+mn-ea"/>
+                <a:cs typeface="+mn-cs"/>
+              </a:rPr>
+              <a:t>vue</a:t>
+            </a:r>
+            <a:r>
+              <a:rPr lang="en-US" sz="1200" b="0" i="0" kern="1200" dirty="0">
+                <a:solidFill>
+                  <a:schemeClr val="tx1"/>
+                </a:solidFill>
+                <a:effectLst/>
+                <a:latin typeface="+mn-lt"/>
+                <a:ea typeface="+mn-ea"/>
+                <a:cs typeface="+mn-cs"/>
+              </a:rPr>
+              <a:t>/cli</a:t>
+            </a:r>
+          </a:p>
+          <a:p>
+            <a:pPr algn="l" rtl="0"/>
+            <a:endParaRPr lang="en-US" sz="1200" b="0" i="0" kern="1200" dirty="0">
+              <a:solidFill>
+                <a:schemeClr val="tx1"/>
+              </a:solidFill>
+              <a:effectLst/>
+              <a:latin typeface="+mn-lt"/>
+              <a:ea typeface="+mn-ea"/>
+              <a:cs typeface="+mn-cs"/>
+            </a:endParaRPr>
+          </a:p>
+          <a:p>
+            <a:pPr algn="l" rtl="0"/>
+            <a:r>
+              <a:rPr lang="en-US" sz="1200" b="0" i="0" kern="1200" dirty="0">
+                <a:solidFill>
+                  <a:schemeClr val="tx1"/>
+                </a:solidFill>
+                <a:effectLst/>
+                <a:latin typeface="+mn-lt"/>
+                <a:ea typeface="+mn-ea"/>
+                <a:cs typeface="+mn-cs"/>
+              </a:rPr>
+              <a:t>C:\git&gt;vue create cat-finder</a:t>
+            </a:r>
+          </a:p>
+          <a:p>
+            <a:pPr algn="l" rtl="0"/>
+            <a:r>
+              <a:rPr lang="en-US" sz="1200" b="0" i="0" kern="1200" dirty="0" err="1">
+                <a:solidFill>
+                  <a:schemeClr val="tx1"/>
+                </a:solidFill>
+                <a:effectLst/>
+                <a:latin typeface="+mn-lt"/>
+                <a:ea typeface="+mn-ea"/>
+                <a:cs typeface="+mn-cs"/>
+              </a:rPr>
+              <a:t>Vue</a:t>
+            </a:r>
+            <a:r>
+              <a:rPr lang="en-US" sz="1200" b="0" i="0" kern="1200" dirty="0">
+                <a:solidFill>
+                  <a:schemeClr val="tx1"/>
+                </a:solidFill>
+                <a:effectLst/>
+                <a:latin typeface="+mn-lt"/>
+                <a:ea typeface="+mn-ea"/>
+                <a:cs typeface="+mn-cs"/>
+              </a:rPr>
+              <a:t> CLI v3.4.1</a:t>
+            </a:r>
+          </a:p>
+          <a:p>
+            <a:pPr algn="l" rtl="0"/>
+            <a:r>
+              <a:rPr lang="en-US" sz="1200" b="0" i="0" kern="1200" dirty="0">
+                <a:solidFill>
+                  <a:schemeClr val="tx1"/>
+                </a:solidFill>
+                <a:effectLst/>
+                <a:latin typeface="+mn-lt"/>
+                <a:ea typeface="+mn-ea"/>
+                <a:cs typeface="+mn-cs"/>
+              </a:rPr>
+              <a:t>? Please pick a preset: </a:t>
+            </a:r>
+            <a:r>
+              <a:rPr lang="en-US" sz="1200" b="1" i="0" kern="1200" dirty="0">
+                <a:solidFill>
+                  <a:schemeClr val="tx1"/>
+                </a:solidFill>
+                <a:effectLst/>
+                <a:latin typeface="+mn-lt"/>
+                <a:ea typeface="+mn-ea"/>
+                <a:cs typeface="+mn-cs"/>
+              </a:rPr>
+              <a:t>Manually select features</a:t>
+            </a:r>
+          </a:p>
+          <a:p>
+            <a:pPr algn="l" rtl="0"/>
+            <a:r>
+              <a:rPr lang="en-US" sz="1200" b="0" i="0" kern="1200" dirty="0">
+                <a:solidFill>
+                  <a:schemeClr val="tx1"/>
+                </a:solidFill>
+                <a:effectLst/>
+                <a:latin typeface="+mn-lt"/>
+                <a:ea typeface="+mn-ea"/>
+                <a:cs typeface="+mn-cs"/>
+              </a:rPr>
+              <a:t>? Check the features needed for your project: </a:t>
+            </a:r>
+            <a:r>
+              <a:rPr lang="en-US" sz="1200" b="1" i="0" kern="1200" dirty="0">
+                <a:solidFill>
+                  <a:schemeClr val="tx1"/>
+                </a:solidFill>
+                <a:effectLst/>
+                <a:latin typeface="+mn-lt"/>
+                <a:ea typeface="+mn-ea"/>
+                <a:cs typeface="+mn-cs"/>
+              </a:rPr>
+              <a:t>Babel, TS, PWA, Router, </a:t>
+            </a:r>
+            <a:r>
+              <a:rPr lang="en-US" sz="1200" b="1" i="0" kern="1200" dirty="0" err="1">
+                <a:solidFill>
+                  <a:schemeClr val="tx1"/>
+                </a:solidFill>
+                <a:effectLst/>
+                <a:latin typeface="+mn-lt"/>
+                <a:ea typeface="+mn-ea"/>
+                <a:cs typeface="+mn-cs"/>
+              </a:rPr>
+              <a:t>Vuex</a:t>
+            </a:r>
+            <a:r>
+              <a:rPr lang="en-US" sz="1200" b="1" i="0" kern="1200" dirty="0">
+                <a:solidFill>
+                  <a:schemeClr val="tx1"/>
+                </a:solidFill>
+                <a:effectLst/>
+                <a:latin typeface="+mn-lt"/>
+                <a:ea typeface="+mn-ea"/>
+                <a:cs typeface="+mn-cs"/>
+              </a:rPr>
+              <a:t>, CSS Pre-processors, Linter, Unit</a:t>
+            </a:r>
+          </a:p>
+          <a:p>
+            <a:pPr algn="l" rtl="0"/>
+            <a:r>
+              <a:rPr lang="en-US" sz="1200" b="0" i="0" kern="1200" dirty="0">
+                <a:solidFill>
+                  <a:schemeClr val="tx1"/>
+                </a:solidFill>
+                <a:effectLst/>
+                <a:latin typeface="+mn-lt"/>
+                <a:ea typeface="+mn-ea"/>
+                <a:cs typeface="+mn-cs"/>
+              </a:rPr>
+              <a:t>? Use class-style component syntax? </a:t>
+            </a:r>
+            <a:r>
+              <a:rPr lang="en-US" sz="1200" b="1" i="0" kern="1200" dirty="0">
+                <a:solidFill>
+                  <a:schemeClr val="tx1"/>
+                </a:solidFill>
+                <a:effectLst/>
+                <a:latin typeface="+mn-lt"/>
+                <a:ea typeface="+mn-ea"/>
+                <a:cs typeface="+mn-cs"/>
+              </a:rPr>
+              <a:t>Yes</a:t>
+            </a:r>
+          </a:p>
+          <a:p>
+            <a:pPr algn="l" rtl="0"/>
+            <a:r>
+              <a:rPr lang="en-US" sz="1200" b="0" i="0" kern="1200" dirty="0">
+                <a:solidFill>
+                  <a:schemeClr val="tx1"/>
+                </a:solidFill>
+                <a:effectLst/>
+                <a:latin typeface="+mn-lt"/>
+                <a:ea typeface="+mn-ea"/>
+                <a:cs typeface="+mn-cs"/>
+              </a:rPr>
+              <a:t>? Use Babel alongside TypeScript for auto-detected </a:t>
+            </a:r>
+            <a:r>
+              <a:rPr lang="en-US" sz="1200" b="0" i="0" kern="1200" dirty="0" err="1">
+                <a:solidFill>
+                  <a:schemeClr val="tx1"/>
+                </a:solidFill>
+                <a:effectLst/>
+                <a:latin typeface="+mn-lt"/>
+                <a:ea typeface="+mn-ea"/>
+                <a:cs typeface="+mn-cs"/>
+              </a:rPr>
+              <a:t>polyfills</a:t>
+            </a:r>
+            <a:r>
+              <a:rPr lang="en-US" sz="1200" b="0" i="0" kern="1200" dirty="0">
+                <a:solidFill>
+                  <a:schemeClr val="tx1"/>
+                </a:solidFill>
+                <a:effectLst/>
+                <a:latin typeface="+mn-lt"/>
+                <a:ea typeface="+mn-ea"/>
+                <a:cs typeface="+mn-cs"/>
+              </a:rPr>
+              <a:t>? </a:t>
+            </a:r>
+            <a:r>
+              <a:rPr lang="en-US" sz="1200" b="1" i="0" kern="1200" dirty="0">
+                <a:solidFill>
+                  <a:schemeClr val="tx1"/>
+                </a:solidFill>
+                <a:effectLst/>
+                <a:latin typeface="+mn-lt"/>
+                <a:ea typeface="+mn-ea"/>
+                <a:cs typeface="+mn-cs"/>
+              </a:rPr>
+              <a:t>Yes</a:t>
+            </a:r>
+          </a:p>
+          <a:p>
+            <a:pPr algn="l" rtl="0"/>
+            <a:r>
+              <a:rPr lang="en-US" sz="1200" b="0" i="0" kern="1200" dirty="0">
+                <a:solidFill>
+                  <a:schemeClr val="tx1"/>
+                </a:solidFill>
+                <a:effectLst/>
+                <a:latin typeface="+mn-lt"/>
+                <a:ea typeface="+mn-ea"/>
+                <a:cs typeface="+mn-cs"/>
+              </a:rPr>
+              <a:t>? Use history mode for router? (Requires proper server setup for index fallback in production) </a:t>
+            </a:r>
+            <a:r>
+              <a:rPr lang="en-US" sz="1200" b="1" i="0" kern="1200" dirty="0">
+                <a:solidFill>
+                  <a:schemeClr val="tx1"/>
+                </a:solidFill>
+                <a:effectLst/>
+                <a:latin typeface="+mn-lt"/>
+                <a:ea typeface="+mn-ea"/>
+                <a:cs typeface="+mn-cs"/>
+              </a:rPr>
+              <a:t>Yes</a:t>
+            </a:r>
+          </a:p>
+          <a:p>
+            <a:pPr algn="l" rtl="0"/>
+            <a:r>
+              <a:rPr lang="en-US" sz="1200" b="0" i="0" kern="1200" dirty="0">
+                <a:solidFill>
+                  <a:schemeClr val="tx1"/>
+                </a:solidFill>
+                <a:effectLst/>
+                <a:latin typeface="+mn-lt"/>
+                <a:ea typeface="+mn-ea"/>
+                <a:cs typeface="+mn-cs"/>
+              </a:rPr>
+              <a:t>? Pick a CSS pre-processor (</a:t>
+            </a:r>
+            <a:r>
+              <a:rPr lang="en-US" sz="1200" b="0" i="0" kern="1200" dirty="0" err="1">
+                <a:solidFill>
+                  <a:schemeClr val="tx1"/>
+                </a:solidFill>
+                <a:effectLst/>
+                <a:latin typeface="+mn-lt"/>
+                <a:ea typeface="+mn-ea"/>
+                <a:cs typeface="+mn-cs"/>
+              </a:rPr>
+              <a:t>PostCSS</a:t>
+            </a:r>
+            <a:r>
+              <a:rPr lang="en-US" sz="1200" b="0" i="0" kern="1200" dirty="0">
+                <a:solidFill>
+                  <a:schemeClr val="tx1"/>
+                </a:solidFill>
+                <a:effectLst/>
+                <a:latin typeface="+mn-lt"/>
+                <a:ea typeface="+mn-ea"/>
+                <a:cs typeface="+mn-cs"/>
+              </a:rPr>
+              <a:t>, </a:t>
+            </a:r>
+            <a:r>
+              <a:rPr lang="en-US" sz="1200" b="0" i="0" kern="1200" dirty="0" err="1">
+                <a:solidFill>
+                  <a:schemeClr val="tx1"/>
+                </a:solidFill>
+                <a:effectLst/>
+                <a:latin typeface="+mn-lt"/>
+                <a:ea typeface="+mn-ea"/>
+                <a:cs typeface="+mn-cs"/>
+              </a:rPr>
+              <a:t>Autoprefixer</a:t>
+            </a:r>
+            <a:r>
+              <a:rPr lang="en-US" sz="1200" b="0" i="0" kern="1200" dirty="0">
+                <a:solidFill>
+                  <a:schemeClr val="tx1"/>
+                </a:solidFill>
+                <a:effectLst/>
+                <a:latin typeface="+mn-lt"/>
+                <a:ea typeface="+mn-ea"/>
+                <a:cs typeface="+mn-cs"/>
+              </a:rPr>
+              <a:t> and CSS Modules are supported by default): </a:t>
+            </a:r>
+            <a:r>
+              <a:rPr lang="en-US" sz="1200" b="1" i="0" kern="1200" dirty="0">
+                <a:solidFill>
+                  <a:schemeClr val="tx1"/>
+                </a:solidFill>
+                <a:effectLst/>
+                <a:latin typeface="+mn-lt"/>
+                <a:ea typeface="+mn-ea"/>
+                <a:cs typeface="+mn-cs"/>
+              </a:rPr>
+              <a:t>Less</a:t>
+            </a:r>
+          </a:p>
+          <a:p>
+            <a:pPr algn="l" rtl="0"/>
+            <a:r>
+              <a:rPr lang="en-US" sz="1200" b="0" i="0" kern="1200" dirty="0">
+                <a:solidFill>
+                  <a:schemeClr val="tx1"/>
+                </a:solidFill>
+                <a:effectLst/>
+                <a:latin typeface="+mn-lt"/>
+                <a:ea typeface="+mn-ea"/>
+                <a:cs typeface="+mn-cs"/>
+              </a:rPr>
+              <a:t>? Pick a linter / formatter config: </a:t>
+            </a:r>
+            <a:r>
+              <a:rPr lang="en-US" sz="1200" b="1" i="0" kern="1200" dirty="0" err="1">
+                <a:solidFill>
+                  <a:schemeClr val="tx1"/>
+                </a:solidFill>
+                <a:effectLst/>
+                <a:latin typeface="+mn-lt"/>
+                <a:ea typeface="+mn-ea"/>
+                <a:cs typeface="+mn-cs"/>
+              </a:rPr>
+              <a:t>TSLint</a:t>
+            </a:r>
+            <a:endParaRPr lang="en-US" sz="1200" b="1" i="0" kern="1200" dirty="0">
+              <a:solidFill>
+                <a:schemeClr val="tx1"/>
+              </a:solidFill>
+              <a:effectLst/>
+              <a:latin typeface="+mn-lt"/>
+              <a:ea typeface="+mn-ea"/>
+              <a:cs typeface="+mn-cs"/>
+            </a:endParaRPr>
+          </a:p>
+          <a:p>
+            <a:pPr algn="l" rtl="0"/>
+            <a:r>
+              <a:rPr lang="en-US" sz="1200" b="0" i="0" kern="1200" dirty="0">
+                <a:solidFill>
+                  <a:schemeClr val="tx1"/>
+                </a:solidFill>
+                <a:effectLst/>
+                <a:latin typeface="+mn-lt"/>
+                <a:ea typeface="+mn-ea"/>
+                <a:cs typeface="+mn-cs"/>
+              </a:rPr>
+              <a:t>? Pick additional lint features: </a:t>
+            </a:r>
+            <a:r>
+              <a:rPr lang="en-US" sz="1200" b="1" i="0" kern="1200" dirty="0">
+                <a:solidFill>
+                  <a:schemeClr val="tx1"/>
+                </a:solidFill>
+                <a:effectLst/>
+                <a:latin typeface="+mn-lt"/>
+                <a:ea typeface="+mn-ea"/>
+                <a:cs typeface="+mn-cs"/>
+              </a:rPr>
+              <a:t>Lint and fix on commit</a:t>
+            </a:r>
+          </a:p>
+          <a:p>
+            <a:pPr algn="l" rtl="0"/>
+            <a:r>
+              <a:rPr lang="en-US" sz="1200" b="0" i="0" kern="1200" dirty="0">
+                <a:solidFill>
+                  <a:schemeClr val="tx1"/>
+                </a:solidFill>
+                <a:effectLst/>
+                <a:latin typeface="+mn-lt"/>
+                <a:ea typeface="+mn-ea"/>
+                <a:cs typeface="+mn-cs"/>
+              </a:rPr>
+              <a:t>? Pick a unit testing solution: </a:t>
+            </a:r>
+            <a:r>
+              <a:rPr lang="en-US" sz="1200" b="1" i="0" kern="1200" dirty="0">
+                <a:solidFill>
+                  <a:schemeClr val="tx1"/>
+                </a:solidFill>
+                <a:effectLst/>
+                <a:latin typeface="+mn-lt"/>
+                <a:ea typeface="+mn-ea"/>
+                <a:cs typeface="+mn-cs"/>
+              </a:rPr>
+              <a:t>Jest</a:t>
+            </a:r>
+          </a:p>
+          <a:p>
+            <a:pPr algn="l" rtl="0"/>
+            <a:r>
+              <a:rPr lang="en-US" sz="1200" b="0" i="0" kern="1200" dirty="0">
+                <a:solidFill>
+                  <a:schemeClr val="tx1"/>
+                </a:solidFill>
+                <a:effectLst/>
+                <a:latin typeface="+mn-lt"/>
+                <a:ea typeface="+mn-ea"/>
+                <a:cs typeface="+mn-cs"/>
+              </a:rPr>
+              <a:t>? Where do you prefer placing config for Babel, </a:t>
+            </a:r>
+            <a:r>
+              <a:rPr lang="en-US" sz="1200" b="0" i="0" kern="1200" dirty="0" err="1">
+                <a:solidFill>
+                  <a:schemeClr val="tx1"/>
+                </a:solidFill>
+                <a:effectLst/>
+                <a:latin typeface="+mn-lt"/>
+                <a:ea typeface="+mn-ea"/>
+                <a:cs typeface="+mn-cs"/>
+              </a:rPr>
+              <a:t>PostCSS</a:t>
+            </a:r>
+            <a:r>
+              <a:rPr lang="en-US" sz="1200" b="0" i="0" kern="1200" dirty="0">
+                <a:solidFill>
+                  <a:schemeClr val="tx1"/>
+                </a:solidFill>
+                <a:effectLst/>
+                <a:latin typeface="+mn-lt"/>
+                <a:ea typeface="+mn-ea"/>
+                <a:cs typeface="+mn-cs"/>
+              </a:rPr>
+              <a:t>, </a:t>
+            </a:r>
+            <a:r>
+              <a:rPr lang="en-US" sz="1200" b="0" i="0" kern="1200" dirty="0" err="1">
+                <a:solidFill>
+                  <a:schemeClr val="tx1"/>
+                </a:solidFill>
+                <a:effectLst/>
+                <a:latin typeface="+mn-lt"/>
+                <a:ea typeface="+mn-ea"/>
+                <a:cs typeface="+mn-cs"/>
+              </a:rPr>
+              <a:t>ESLint</a:t>
+            </a:r>
+            <a:r>
+              <a:rPr lang="en-US" sz="1200" b="0" i="0" kern="1200" dirty="0">
+                <a:solidFill>
+                  <a:schemeClr val="tx1"/>
+                </a:solidFill>
+                <a:effectLst/>
+                <a:latin typeface="+mn-lt"/>
+                <a:ea typeface="+mn-ea"/>
+                <a:cs typeface="+mn-cs"/>
+              </a:rPr>
+              <a:t>, etc.?</a:t>
+            </a:r>
+            <a:r>
+              <a:rPr lang="en-US" sz="1200" b="1" i="0" kern="1200" dirty="0">
+                <a:solidFill>
+                  <a:schemeClr val="tx1"/>
+                </a:solidFill>
+                <a:effectLst/>
+                <a:latin typeface="+mn-lt"/>
+                <a:ea typeface="+mn-ea"/>
+                <a:cs typeface="+mn-cs"/>
+              </a:rPr>
+              <a:t> In dedicated config files</a:t>
+            </a:r>
+          </a:p>
+          <a:p>
+            <a:pPr algn="l" rtl="0"/>
+            <a:r>
+              <a:rPr lang="en-US" sz="1200" b="0" i="0" kern="1200" dirty="0">
+                <a:solidFill>
+                  <a:schemeClr val="tx1"/>
+                </a:solidFill>
+                <a:effectLst/>
+                <a:latin typeface="+mn-lt"/>
+                <a:ea typeface="+mn-ea"/>
+                <a:cs typeface="+mn-cs"/>
+              </a:rPr>
+              <a:t>? Save this as a preset for future projects? </a:t>
+            </a:r>
+            <a:r>
+              <a:rPr lang="en-US" sz="1200" b="1" i="0" kern="1200" dirty="0">
+                <a:solidFill>
+                  <a:schemeClr val="tx1"/>
+                </a:solidFill>
+                <a:effectLst/>
+                <a:latin typeface="+mn-lt"/>
+                <a:ea typeface="+mn-ea"/>
+                <a:cs typeface="+mn-cs"/>
+              </a:rPr>
+              <a:t>No</a:t>
+            </a:r>
+          </a:p>
+          <a:p>
+            <a:pPr algn="l" rtl="0"/>
+            <a:r>
+              <a:rPr lang="en-US" sz="1200" b="0" i="0" kern="1200" dirty="0">
+                <a:solidFill>
+                  <a:schemeClr val="tx1"/>
+                </a:solidFill>
+                <a:effectLst/>
+                <a:latin typeface="+mn-lt"/>
+                <a:ea typeface="+mn-ea"/>
+                <a:cs typeface="+mn-cs"/>
+              </a:rPr>
+              <a:t>? Pick the package manager to use when installing dependencies: </a:t>
+            </a:r>
+            <a:r>
+              <a:rPr lang="en-US" sz="1200" b="1" i="0" kern="1200" dirty="0">
+                <a:solidFill>
+                  <a:schemeClr val="tx1"/>
+                </a:solidFill>
+                <a:effectLst/>
+                <a:latin typeface="+mn-lt"/>
+                <a:ea typeface="+mn-ea"/>
+                <a:cs typeface="+mn-cs"/>
+              </a:rPr>
+              <a:t>Yarn</a:t>
+            </a:r>
+          </a:p>
+          <a:p>
+            <a:pPr algn="l" rtl="0"/>
+            <a:endParaRPr lang="en-US" sz="1200" b="0" i="0" kern="1200" dirty="0">
+              <a:solidFill>
+                <a:schemeClr val="tx1"/>
+              </a:solidFill>
+              <a:effectLst/>
+              <a:latin typeface="+mn-lt"/>
+              <a:ea typeface="+mn-ea"/>
+              <a:cs typeface="+mn-cs"/>
+            </a:endParaRPr>
+          </a:p>
+          <a:p>
+            <a:pPr algn="l" rtl="0"/>
+            <a:r>
+              <a:rPr lang="en-US" sz="1200" b="0" i="0" kern="1200" dirty="0">
+                <a:solidFill>
+                  <a:schemeClr val="tx1"/>
+                </a:solidFill>
+                <a:effectLst/>
+                <a:latin typeface="+mn-lt"/>
+                <a:ea typeface="+mn-ea"/>
+                <a:cs typeface="+mn-cs"/>
+              </a:rPr>
+              <a:t>Add HMR:</a:t>
+            </a:r>
+          </a:p>
+          <a:p>
+            <a:pPr algn="l" rtl="0"/>
+            <a:r>
+              <a:rPr lang="en-US" sz="1200" b="0" i="0" kern="1200" dirty="0">
+                <a:solidFill>
+                  <a:schemeClr val="tx1"/>
+                </a:solidFill>
+                <a:effectLst/>
+                <a:latin typeface="+mn-lt"/>
+                <a:ea typeface="+mn-ea"/>
+                <a:cs typeface="+mn-cs"/>
+              </a:rPr>
+              <a:t>vue.config.js:</a:t>
+            </a:r>
+          </a:p>
+          <a:p>
+            <a:pPr algn="l" rtl="0"/>
+            <a:r>
+              <a:rPr lang="en-US" sz="1200" b="0" i="0" kern="1200" dirty="0" err="1">
+                <a:solidFill>
+                  <a:schemeClr val="tx1"/>
+                </a:solidFill>
+                <a:effectLst/>
+                <a:latin typeface="+mn-lt"/>
+                <a:ea typeface="+mn-ea"/>
+                <a:cs typeface="+mn-cs"/>
+              </a:rPr>
+              <a:t>module.exports</a:t>
+            </a:r>
+            <a:r>
+              <a:rPr lang="en-US" sz="1200" b="0" i="0" kern="1200" dirty="0">
+                <a:solidFill>
+                  <a:schemeClr val="tx1"/>
+                </a:solidFill>
+                <a:effectLst/>
+                <a:latin typeface="+mn-lt"/>
+                <a:ea typeface="+mn-ea"/>
+                <a:cs typeface="+mn-cs"/>
+              </a:rPr>
+              <a:t> = {  </a:t>
+            </a:r>
+            <a:r>
+              <a:rPr lang="en-US" sz="1200" b="0" i="0" kern="1200" dirty="0" err="1">
+                <a:solidFill>
+                  <a:schemeClr val="tx1"/>
+                </a:solidFill>
+                <a:effectLst/>
+                <a:latin typeface="+mn-lt"/>
+                <a:ea typeface="+mn-ea"/>
+                <a:cs typeface="+mn-cs"/>
+              </a:rPr>
+              <a:t>lintOnSave</a:t>
+            </a:r>
+            <a:r>
+              <a:rPr lang="en-US" sz="1200" b="0" i="0" kern="1200" dirty="0">
+                <a:solidFill>
+                  <a:schemeClr val="tx1"/>
+                </a:solidFill>
+                <a:effectLst/>
+                <a:latin typeface="+mn-lt"/>
+                <a:ea typeface="+mn-ea"/>
+                <a:cs typeface="+mn-cs"/>
+              </a:rPr>
+              <a:t>: false,  </a:t>
+            </a:r>
+            <a:r>
+              <a:rPr lang="en-US" sz="1200" b="1" i="0" kern="1200" dirty="0" err="1">
+                <a:solidFill>
+                  <a:schemeClr val="tx1"/>
+                </a:solidFill>
+                <a:effectLst/>
+                <a:latin typeface="+mn-lt"/>
+                <a:ea typeface="+mn-ea"/>
+                <a:cs typeface="+mn-cs"/>
+              </a:rPr>
+              <a:t>configureWebpack</a:t>
+            </a:r>
+            <a:r>
+              <a:rPr lang="en-US" sz="1200" b="1" i="0" kern="1200" dirty="0">
+                <a:solidFill>
+                  <a:schemeClr val="tx1"/>
+                </a:solidFill>
+                <a:effectLst/>
+                <a:latin typeface="+mn-lt"/>
+                <a:ea typeface="+mn-ea"/>
+                <a:cs typeface="+mn-cs"/>
+              </a:rPr>
+              <a:t>: {        </a:t>
+            </a:r>
+            <a:r>
+              <a:rPr lang="en-US" sz="1200" b="1" i="0" kern="1200" dirty="0" err="1">
+                <a:solidFill>
+                  <a:schemeClr val="tx1"/>
+                </a:solidFill>
+                <a:effectLst/>
+                <a:latin typeface="+mn-lt"/>
+                <a:ea typeface="+mn-ea"/>
+                <a:cs typeface="+mn-cs"/>
+              </a:rPr>
+              <a:t>devServer</a:t>
+            </a:r>
+            <a:r>
+              <a:rPr lang="en-US" sz="1200" b="1" i="0" kern="1200" dirty="0">
+                <a:solidFill>
+                  <a:schemeClr val="tx1"/>
+                </a:solidFill>
+                <a:effectLst/>
+                <a:latin typeface="+mn-lt"/>
+                <a:ea typeface="+mn-ea"/>
+                <a:cs typeface="+mn-cs"/>
+              </a:rPr>
+              <a:t>: {            </a:t>
+            </a:r>
+            <a:r>
+              <a:rPr lang="en-US" sz="1200" b="1" i="0" kern="1200" dirty="0" err="1">
+                <a:solidFill>
+                  <a:schemeClr val="tx1"/>
+                </a:solidFill>
+                <a:effectLst/>
+                <a:latin typeface="+mn-lt"/>
+                <a:ea typeface="+mn-ea"/>
+                <a:cs typeface="+mn-cs"/>
+              </a:rPr>
+              <a:t>clientLogLevel</a:t>
+            </a:r>
+            <a:r>
+              <a:rPr lang="en-US" sz="1200" b="1" i="0" kern="1200" dirty="0">
+                <a:solidFill>
+                  <a:schemeClr val="tx1"/>
+                </a:solidFill>
+                <a:effectLst/>
+                <a:latin typeface="+mn-lt"/>
+                <a:ea typeface="+mn-ea"/>
+                <a:cs typeface="+mn-cs"/>
+              </a:rPr>
+              <a:t>: 'info',            </a:t>
+            </a:r>
+            <a:r>
+              <a:rPr lang="en-US" sz="1200" b="1" i="0" kern="1200" dirty="0" err="1">
+                <a:solidFill>
+                  <a:schemeClr val="tx1"/>
+                </a:solidFill>
+                <a:effectLst/>
+                <a:latin typeface="+mn-lt"/>
+                <a:ea typeface="+mn-ea"/>
+                <a:cs typeface="+mn-cs"/>
+              </a:rPr>
+              <a:t>watchOptions</a:t>
+            </a:r>
+            <a:r>
+              <a:rPr lang="en-US" sz="1200" b="1" i="0" kern="1200" dirty="0">
+                <a:solidFill>
+                  <a:schemeClr val="tx1"/>
+                </a:solidFill>
+                <a:effectLst/>
+                <a:latin typeface="+mn-lt"/>
+                <a:ea typeface="+mn-ea"/>
+                <a:cs typeface="+mn-cs"/>
+              </a:rPr>
+              <a:t>: {                poll: true            }        }    }</a:t>
+            </a:r>
+            <a:r>
+              <a:rPr lang="en-US" sz="1200" b="0" i="0" kern="1200" dirty="0">
+                <a:solidFill>
+                  <a:schemeClr val="tx1"/>
+                </a:solidFill>
+                <a:effectLst/>
+                <a:latin typeface="+mn-lt"/>
+                <a:ea typeface="+mn-ea"/>
+                <a:cs typeface="+mn-cs"/>
+              </a:rPr>
+              <a:t>}</a:t>
+            </a:r>
+          </a:p>
+          <a:p>
+            <a:pPr algn="l" rtl="0"/>
+            <a:endParaRPr lang="en-US" sz="1200" b="0" i="0" kern="1200" dirty="0">
+              <a:solidFill>
+                <a:schemeClr val="tx1"/>
+              </a:solidFill>
+              <a:effectLst/>
+              <a:latin typeface="+mn-lt"/>
+              <a:ea typeface="+mn-ea"/>
+              <a:cs typeface="+mn-cs"/>
+            </a:endParaRPr>
+          </a:p>
+          <a:p>
+            <a:pPr marL="171450" indent="-171450" algn="l" rtl="0">
+              <a:buFontTx/>
+              <a:buChar char="-"/>
+            </a:pPr>
+            <a:r>
+              <a:rPr lang="en-US" sz="1200" b="0" i="0" kern="1200" dirty="0">
+                <a:solidFill>
+                  <a:schemeClr val="tx1"/>
+                </a:solidFill>
+                <a:effectLst/>
+                <a:latin typeface="+mn-lt"/>
+                <a:ea typeface="+mn-ea"/>
+                <a:cs typeface="+mn-cs"/>
+              </a:rPr>
+              <a:t>https://css-tricks.com/vue-typescript-a-match-made-in-your-code-editor/</a:t>
+            </a:r>
+          </a:p>
+          <a:p>
+            <a:pPr marL="171450" indent="-171450" algn="l" rtl="0">
+              <a:buFontTx/>
+              <a:buChar char="-"/>
+            </a:pPr>
+            <a:endParaRPr lang="en-US" sz="1200" b="0" i="0" kern="1200" dirty="0">
+              <a:solidFill>
+                <a:schemeClr val="tx1"/>
+              </a:solidFill>
+              <a:effectLst/>
+              <a:latin typeface="+mn-lt"/>
+              <a:ea typeface="+mn-ea"/>
+              <a:cs typeface="+mn-cs"/>
+            </a:endParaRPr>
           </a:p>
         </p:txBody>
       </p:sp>
@@ -6018,6 +7088,91 @@
             <a:fld id="{595D0871-5AD0-4670-BDA8-FBE649F625DD}" type="slidenum">
               <a:rPr lang="he-IL" smtClean="0"/>
               <a:t>23</a:t>
+            </a:fld>
+            <a:endParaRPr lang="he-IL"/>
+          </a:p>
+        </p:txBody>
+      </p:sp>
+    </p:spTree>
+    <p:extLst>
+      <p:ext uri="{BB962C8B-B14F-4D97-AF65-F5344CB8AC3E}">
+        <p14:creationId xmlns:p14="http://schemas.microsoft.com/office/powerpoint/2010/main" val="2572092690"/>
+      </p:ext>
+    </p:extLst>
+  </p:cSld>
+  <p:clrMapOvr>
+    <a:masterClrMapping/>
+  </p:clrMapOvr>
+</p:notes>
+</file>
+
+<file path=ppt/notesSlides/notesSlide22.xml><?xml version="1.0" encoding="utf-8"?>
+<p:notes xmlns:a="http://schemas.openxmlformats.org/drawingml/2006/main" xmlns:r="http://schemas.openxmlformats.org/officeDocument/2006/relationships" xmlns:p="http://schemas.openxmlformats.org/presentationml/2006/main">
+  <p:cSld>
+    <p:spTree>
+      <p:nvGrpSpPr>
+        <p:cNvPr id="1" name=""/>
+        <p:cNvGrpSpPr/>
+        <p:nvPr/>
+      </p:nvGrpSpPr>
+      <p:grpSpPr>
+        <a:xfrm>
+          <a:off x="0" y="0"/>
+          <a:ext cx="0" cy="0"/>
+          <a:chOff x="0" y="0"/>
+          <a:chExt cx="0" cy="0"/>
+        </a:xfrm>
+      </p:grpSpPr>
+      <p:sp>
+        <p:nvSpPr>
+          <p:cNvPr id="2" name="Slide Image Placeholder 1"/>
+          <p:cNvSpPr>
+            <a:spLocks noGrp="1" noRot="1" noChangeAspect="1"/>
+          </p:cNvSpPr>
+          <p:nvPr>
+            <p:ph type="sldImg"/>
+          </p:nvPr>
+        </p:nvSpPr>
+        <p:spPr/>
+      </p:sp>
+      <p:sp>
+        <p:nvSpPr>
+          <p:cNvPr id="3" name="Notes Placeholder 2"/>
+          <p:cNvSpPr>
+            <a:spLocks noGrp="1"/>
+          </p:cNvSpPr>
+          <p:nvPr>
+            <p:ph type="body" idx="1"/>
+          </p:nvPr>
+        </p:nvSpPr>
+        <p:spPr/>
+        <p:txBody>
+          <a:bodyPr/>
+          <a:lstStyle/>
+          <a:p>
+            <a:pPr algn="l" rtl="0"/>
+            <a:endParaRPr lang="en-US" b="0" dirty="0"/>
+          </a:p>
+        </p:txBody>
+      </p:sp>
+      <p:sp>
+        <p:nvSpPr>
+          <p:cNvPr id="4" name="Slide Number Placeholder 3"/>
+          <p:cNvSpPr>
+            <a:spLocks noGrp="1"/>
+          </p:cNvSpPr>
+          <p:nvPr>
+            <p:ph type="sldNum" sz="quarter" idx="10"/>
+          </p:nvPr>
+        </p:nvSpPr>
+        <p:spPr/>
+        <p:txBody>
+          <a:bodyPr/>
+          <a:lstStyle/>
+          <a:p>
+            <a:fld id="{595D0871-5AD0-4670-BDA8-FBE649F625DD}" type="slidenum">
+              <a:rPr lang="he-IL" smtClean="0"/>
+              <a:t>24</a:t>
             </a:fld>
             <a:endParaRPr lang="he-IL"/>
           </a:p>
@@ -13648,6 +14803,138 @@
 </file>
 
 <file path=ppt/slides/slide23.xml><?xml version="1.0" encoding="utf-8"?>
+<p:sld xmlns:a="http://schemas.openxmlformats.org/drawingml/2006/main" xmlns:r="http://schemas.openxmlformats.org/officeDocument/2006/relationships" xmlns:p="http://schemas.openxmlformats.org/presentationml/2006/main">
+  <p:cSld>
+    <p:spTree>
+      <p:nvGrpSpPr>
+        <p:cNvPr id="1" name=""/>
+        <p:cNvGrpSpPr/>
+        <p:nvPr/>
+      </p:nvGrpSpPr>
+      <p:grpSpPr>
+        <a:xfrm>
+          <a:off x="0" y="0"/>
+          <a:ext cx="0" cy="0"/>
+          <a:chOff x="0" y="0"/>
+          <a:chExt cx="0" cy="0"/>
+        </a:xfrm>
+      </p:grpSpPr>
+      <p:sp>
+        <p:nvSpPr>
+          <p:cNvPr id="6" name="Rectangle 5"/>
+          <p:cNvSpPr/>
+          <p:nvPr/>
+        </p:nvSpPr>
+        <p:spPr>
+          <a:xfrm>
+            <a:off x="-215115" y="0"/>
+            <a:ext cx="12407115" cy="6858000"/>
+          </a:xfrm>
+          <a:prstGeom prst="rect">
+            <a:avLst/>
+          </a:prstGeom>
+          <a:solidFill>
+            <a:schemeClr val="accent1">
+              <a:lumMod val="75000"/>
+            </a:schemeClr>
+          </a:solidFill>
+          <a:ln>
+            <a:noFill/>
+          </a:ln>
+        </p:spPr>
+        <p:style>
+          <a:lnRef idx="1">
+            <a:schemeClr val="accent1"/>
+          </a:lnRef>
+          <a:fillRef idx="3">
+            <a:schemeClr val="accent1"/>
+          </a:fillRef>
+          <a:effectRef idx="2">
+            <a:schemeClr val="accent1"/>
+          </a:effectRef>
+          <a:fontRef idx="minor">
+            <a:schemeClr val="lt1"/>
+          </a:fontRef>
+        </p:style>
+        <p:txBody>
+          <a:bodyPr rtlCol="0" anchor="ctr"/>
+          <a:lstStyle/>
+          <a:p>
+            <a:pPr algn="ctr"/>
+            <a:endParaRPr lang="en-US" sz="2400"/>
+          </a:p>
+        </p:txBody>
+      </p:sp>
+      <p:sp>
+        <p:nvSpPr>
+          <p:cNvPr id="24" name="Title 1"/>
+          <p:cNvSpPr>
+            <a:spLocks noGrp="1"/>
+          </p:cNvSpPr>
+          <p:nvPr>
+            <p:ph type="title"/>
+          </p:nvPr>
+        </p:nvSpPr>
+        <p:spPr>
+          <a:xfrm>
+            <a:off x="502042" y="1936377"/>
+            <a:ext cx="10972800" cy="2985246"/>
+          </a:xfrm>
+        </p:spPr>
+        <p:txBody>
+          <a:bodyPr>
+            <a:noAutofit/>
+          </a:bodyPr>
+          <a:lstStyle/>
+          <a:p>
+            <a:pPr algn="ctr" rtl="0" eaLnBrk="0" fontAlgn="base" hangingPunct="0">
+              <a:spcAft>
+                <a:spcPct val="0"/>
+              </a:spcAft>
+            </a:pPr>
+            <a:r>
+              <a:rPr lang="en-US" sz="6000" dirty="0">
+                <a:solidFill>
+                  <a:schemeClr val="bg1"/>
+                </a:solidFill>
+              </a:rPr>
+              <a:t>Hand zone</a:t>
+            </a:r>
+            <a:endParaRPr lang="en-US" altLang="en-US" sz="6000" b="1" dirty="0">
+              <a:solidFill>
+                <a:schemeClr val="bg1"/>
+              </a:solidFill>
+              <a:latin typeface="Calibri (Body)"/>
+            </a:endParaRPr>
+          </a:p>
+        </p:txBody>
+      </p:sp>
+    </p:spTree>
+    <p:extLst>
+      <p:ext uri="{BB962C8B-B14F-4D97-AF65-F5344CB8AC3E}">
+        <p14:creationId xmlns:p14="http://schemas.microsoft.com/office/powerpoint/2010/main" val="4153673833"/>
+      </p:ext>
+    </p:extLst>
+  </p:cSld>
+  <p:clrMapOvr>
+    <a:masterClrMapping/>
+  </p:clrMapOvr>
+  <mc:AlternateContent xmlns:mc="http://schemas.openxmlformats.org/markup-compatibility/2006" xmlns:p14="http://schemas.microsoft.com/office/powerpoint/2010/main">
+    <mc:Choice Requires="p14">
+      <p:transition spd="med" p14:dur="700">
+        <p:fade/>
+      </p:transition>
+    </mc:Choice>
+    <mc:Fallback xmlns="">
+      <p:transition xmlns:p14="http://schemas.microsoft.com/office/powerpoint/2010/main" spd="med">
+        <p:fade/>
+      </p:transition>
+    </mc:Fallback>
+  </mc:AlternateContent>
+</p:sld>
+</file>
+
+<file path=ppt/slides/slide24.xml><?xml version="1.0" encoding="utf-8"?>
 <p:sld xmlns:a="http://schemas.openxmlformats.org/drawingml/2006/main" xmlns:r="http://schemas.openxmlformats.org/officeDocument/2006/relationships" xmlns:p="http://schemas.openxmlformats.org/presentationml/2006/main">
   <p:cSld>
     <p:spTree>

</xml_diff>

<commit_message>
- JS OOP - second commit
</commit_message>
<xml_diff>
--- a/presentations/Practical Web Dev.pptx
+++ b/presentations/Practical Web Dev.pptx
@@ -5,7 +5,7 @@
     <p:sldMasterId id="2147483648" r:id="rId1"/>
   </p:sldMasterIdLst>
   <p:notesMasterIdLst>
-    <p:notesMasterId r:id="rId62"/>
+    <p:notesMasterId r:id="rId63"/>
   </p:notesMasterIdLst>
   <p:sldIdLst>
     <p:sldId id="256" r:id="rId2"/>
@@ -64,10 +64,11 @@
     <p:sldId id="413" r:id="rId55"/>
     <p:sldId id="422" r:id="rId56"/>
     <p:sldId id="414" r:id="rId57"/>
-    <p:sldId id="423" r:id="rId58"/>
-    <p:sldId id="424" r:id="rId59"/>
-    <p:sldId id="421" r:id="rId60"/>
-    <p:sldId id="411" r:id="rId61"/>
+    <p:sldId id="426" r:id="rId58"/>
+    <p:sldId id="423" r:id="rId59"/>
+    <p:sldId id="424" r:id="rId60"/>
+    <p:sldId id="421" r:id="rId61"/>
+    <p:sldId id="411" r:id="rId62"/>
   </p:sldIdLst>
   <p:sldSz cx="12192000" cy="6858000"/>
   <p:notesSz cx="6858000" cy="9144000"/>
@@ -231,6 +232,7 @@
             <p14:sldId id="413"/>
             <p14:sldId id="422"/>
             <p14:sldId id="414"/>
+            <p14:sldId id="426"/>
             <p14:sldId id="423"/>
             <p14:sldId id="424"/>
             <p14:sldId id="421"/>
@@ -12079,7 +12081,7 @@
                 <a:ea typeface="+mn-ea"/>
                 <a:cs typeface="+mn-cs"/>
               </a:rPr>
-              <a:t>How we can create a OOP in JS?</a:t>
+              <a:t>How we can create an OOP in JS?</a:t>
             </a:r>
           </a:p>
           <a:p>
@@ -12138,31 +12140,7 @@
                 <a:ea typeface="+mn-ea"/>
                 <a:cs typeface="+mn-cs"/>
               </a:rPr>
-              <a:t>Well, today with ES6 &amp; typescript it’s much </a:t>
-            </a:r>
-            <a:r>
-              <a:rPr lang="en-US" sz="1200" b="0" i="0" kern="1200" dirty="0" err="1">
-                <a:solidFill>
-                  <a:schemeClr val="tx1"/>
-                </a:solidFill>
-                <a:effectLst/>
-                <a:latin typeface="+mn-lt"/>
-                <a:ea typeface="+mn-ea"/>
-                <a:cs typeface="+mn-cs"/>
-              </a:rPr>
-              <a:t>much</a:t>
-            </a:r>
-            <a:r>
-              <a:rPr lang="en-US" sz="1200" b="0" i="0" kern="1200" dirty="0">
-                <a:solidFill>
-                  <a:schemeClr val="tx1"/>
-                </a:solidFill>
-                <a:effectLst/>
-                <a:latin typeface="+mn-lt"/>
-                <a:ea typeface="+mn-ea"/>
-                <a:cs typeface="+mn-cs"/>
-              </a:rPr>
-              <a:t> easier,</a:t>
+              <a:t>Well, today with ES6 &amp; typescript it’s much, much easier,</a:t>
             </a:r>
           </a:p>
           <a:p>
@@ -13208,6 +13186,37 @@
               <a:tabLst/>
               <a:defRPr/>
             </a:pPr>
+            <a:r>
+              <a:rPr lang="en-US" b="0" dirty="0"/>
+              <a:t>Like we said, We have just </a:t>
+            </a:r>
+            <a:r>
+              <a:rPr lang="en-US" b="1" dirty="0"/>
+              <a:t>one</a:t>
+            </a:r>
+            <a:r>
+              <a:rPr lang="en-US" b="0" dirty="0"/>
+              <a:t> scope!</a:t>
+            </a:r>
+          </a:p>
+          <a:p>
+            <a:pPr marL="0" marR="0" lvl="0" indent="0" algn="l" defTabSz="914400" rtl="0" eaLnBrk="1" fontAlgn="auto" latinLnBrk="0" hangingPunct="1">
+              <a:lnSpc>
+                <a:spcPct val="100000"/>
+              </a:lnSpc>
+              <a:spcBef>
+                <a:spcPts val="0"/>
+              </a:spcBef>
+              <a:spcAft>
+                <a:spcPts val="0"/>
+              </a:spcAft>
+              <a:buClrTx/>
+              <a:buSzTx/>
+              <a:buFontTx/>
+              <a:buNone/>
+              <a:tabLst/>
+              <a:defRPr/>
+            </a:pPr>
             <a:endParaRPr lang="en-US" b="0" dirty="0"/>
           </a:p>
         </p:txBody>
@@ -13639,7 +13648,23 @@
                 <a:ea typeface="+mn-ea"/>
                 <a:cs typeface="+mn-cs"/>
               </a:rPr>
-              <a:t>Each function creates a new scope.</a:t>
+              <a:t>Each function creates a new scope (</a:t>
+            </a:r>
+            <a:r>
+              <a:rPr lang="en-US" b="0" dirty="0"/>
+              <a:t>Function scope called also local scope</a:t>
+            </a:r>
+            <a:r>
+              <a:rPr lang="en-US" sz="1200" b="0" i="0" kern="1200" dirty="0">
+                <a:solidFill>
+                  <a:schemeClr val="tx1"/>
+                </a:solidFill>
+                <a:effectLst/>
+                <a:latin typeface="+mn-lt"/>
+                <a:ea typeface="+mn-ea"/>
+                <a:cs typeface="+mn-cs"/>
+              </a:rPr>
+              <a:t>).</a:t>
             </a:r>
           </a:p>
           <a:p>
@@ -13933,7 +13958,7 @@
             </a:r>
             <a:r>
               <a:rPr lang="en-US" dirty="0"/>
-              <a:t>Self Invoking Function :</a:t>
+              <a:t>Self Invoking Function:</a:t>
             </a:r>
           </a:p>
           <a:p>
@@ -14523,6 +14548,164 @@
               <a:tabLst/>
               <a:defRPr/>
             </a:pPr>
+            <a:r>
+              <a:rPr lang="en-US" sz="1200" b="0" i="0" kern="1200" dirty="0">
+                <a:solidFill>
+                  <a:schemeClr val="tx1"/>
+                </a:solidFill>
+                <a:effectLst/>
+                <a:latin typeface="+mn-lt"/>
+                <a:ea typeface="+mn-ea"/>
+                <a:cs typeface="+mn-cs"/>
+              </a:rPr>
+              <a:t>What is Hoisting?</a:t>
+            </a:r>
+          </a:p>
+          <a:p>
+            <a:pPr marL="0" marR="0" lvl="0" indent="0" algn="l" defTabSz="914400" rtl="0" eaLnBrk="1" fontAlgn="auto" latinLnBrk="0" hangingPunct="1">
+              <a:lnSpc>
+                <a:spcPct val="100000"/>
+              </a:lnSpc>
+              <a:spcBef>
+                <a:spcPts val="0"/>
+              </a:spcBef>
+              <a:spcAft>
+                <a:spcPts val="0"/>
+              </a:spcAft>
+              <a:buClrTx/>
+              <a:buSzTx/>
+              <a:buFontTx/>
+              <a:buNone/>
+              <a:tabLst/>
+              <a:defRPr/>
+            </a:pPr>
+            <a:r>
+              <a:rPr lang="en-US" sz="1200" b="0" i="0" kern="1200" dirty="0">
+                <a:solidFill>
+                  <a:schemeClr val="tx1"/>
+                </a:solidFill>
+                <a:effectLst/>
+                <a:latin typeface="+mn-lt"/>
+                <a:ea typeface="+mn-ea"/>
+                <a:cs typeface="+mn-cs"/>
+              </a:rPr>
+              <a:t>Hoisting is JavaScript's default behavior of moving declarations to the top.</a:t>
+            </a:r>
+          </a:p>
+          <a:p>
+            <a:pPr algn="l"/>
+            <a:r>
+              <a:rPr lang="en-US" sz="1200" b="0" i="0" kern="1200" dirty="0">
+                <a:solidFill>
+                  <a:schemeClr val="tx1"/>
+                </a:solidFill>
+                <a:effectLst/>
+                <a:latin typeface="+mn-lt"/>
+                <a:ea typeface="+mn-ea"/>
+                <a:cs typeface="+mn-cs"/>
+              </a:rPr>
+              <a:t>In JavaScript, a variable can be declared after it has been used.</a:t>
+            </a:r>
+          </a:p>
+          <a:p>
+            <a:pPr algn="l"/>
+            <a:r>
+              <a:rPr lang="en-US" sz="1200" b="0" i="0" kern="1200" dirty="0">
+                <a:solidFill>
+                  <a:schemeClr val="tx1"/>
+                </a:solidFill>
+                <a:effectLst/>
+                <a:latin typeface="+mn-lt"/>
+                <a:ea typeface="+mn-ea"/>
+                <a:cs typeface="+mn-cs"/>
+              </a:rPr>
+              <a:t>In other words; a variable can be used before it has been declared.</a:t>
+            </a:r>
+          </a:p>
+          <a:p>
+            <a:pPr marL="0" marR="0" lvl="0" indent="0" algn="l" defTabSz="914400" rtl="0" eaLnBrk="1" fontAlgn="auto" latinLnBrk="0" hangingPunct="1">
+              <a:lnSpc>
+                <a:spcPct val="100000"/>
+              </a:lnSpc>
+              <a:spcBef>
+                <a:spcPts val="0"/>
+              </a:spcBef>
+              <a:spcAft>
+                <a:spcPts val="0"/>
+              </a:spcAft>
+              <a:buClrTx/>
+              <a:buSzTx/>
+              <a:buFontTx/>
+              <a:buNone/>
+              <a:tabLst/>
+              <a:defRPr/>
+            </a:pPr>
+            <a:endParaRPr lang="en-US" b="0" dirty="0"/>
+          </a:p>
+          <a:p>
+            <a:pPr marL="171450" marR="0" lvl="0" indent="-171450" algn="l" defTabSz="914400" rtl="0" eaLnBrk="1" fontAlgn="auto" latinLnBrk="0" hangingPunct="1">
+              <a:lnSpc>
+                <a:spcPct val="100000"/>
+              </a:lnSpc>
+              <a:spcBef>
+                <a:spcPts val="0"/>
+              </a:spcBef>
+              <a:spcAft>
+                <a:spcPts val="0"/>
+              </a:spcAft>
+              <a:buClrTx/>
+              <a:buSzTx/>
+              <a:buFontTx/>
+              <a:buChar char="-"/>
+              <a:tabLst/>
+              <a:defRPr/>
+            </a:pPr>
+            <a:r>
+              <a:rPr lang="en-US" b="0" dirty="0"/>
+              <a:t>https://www.w3schools.com/js/js_hoisting.asp</a:t>
+            </a:r>
+          </a:p>
+          <a:p>
+            <a:pPr marL="171450" marR="0" lvl="0" indent="-171450" algn="l" defTabSz="914400" rtl="0" eaLnBrk="1" fontAlgn="auto" latinLnBrk="0" hangingPunct="1">
+              <a:lnSpc>
+                <a:spcPct val="100000"/>
+              </a:lnSpc>
+              <a:spcBef>
+                <a:spcPts val="0"/>
+              </a:spcBef>
+              <a:spcAft>
+                <a:spcPts val="0"/>
+              </a:spcAft>
+              <a:buClrTx/>
+              <a:buSzTx/>
+              <a:buFontTx/>
+              <a:buChar char="-"/>
+              <a:tabLst/>
+              <a:defRPr/>
+            </a:pPr>
+            <a:r>
+              <a:rPr lang="en-US" b="0" dirty="0"/>
+              <a:t>https://codeburst.io/javascript-what-is-hoisting-dfa84512dd28</a:t>
+            </a:r>
+          </a:p>
+          <a:p>
+            <a:pPr marL="171450" marR="0" lvl="0" indent="-171450" algn="l" defTabSz="914400" rtl="0" eaLnBrk="1" fontAlgn="auto" latinLnBrk="0" hangingPunct="1">
+              <a:lnSpc>
+                <a:spcPct val="100000"/>
+              </a:lnSpc>
+              <a:spcBef>
+                <a:spcPts val="0"/>
+              </a:spcBef>
+              <a:spcAft>
+                <a:spcPts val="0"/>
+              </a:spcAft>
+              <a:buClrTx/>
+              <a:buSzTx/>
+              <a:buFontTx/>
+              <a:buChar char="-"/>
+              <a:tabLst/>
+              <a:defRPr/>
+            </a:pPr>
             <a:endParaRPr lang="en-US" b="0" dirty="0"/>
           </a:p>
         </p:txBody>
@@ -14607,6 +14790,99 @@
           <a:bodyPr/>
           <a:lstStyle/>
           <a:p>
+            <a:pPr marL="171450" marR="0" lvl="0" indent="-171450" algn="l" defTabSz="914400" rtl="0" eaLnBrk="1" fontAlgn="auto" latinLnBrk="0" hangingPunct="1">
+              <a:lnSpc>
+                <a:spcPct val="100000"/>
+              </a:lnSpc>
+              <a:spcBef>
+                <a:spcPts val="0"/>
+              </a:spcBef>
+              <a:spcAft>
+                <a:spcPts val="0"/>
+              </a:spcAft>
+              <a:buClrTx/>
+              <a:buSzTx/>
+              <a:buFont typeface="Arial" panose="020B0604020202020204" pitchFamily="34" charset="0"/>
+              <a:buChar char="•"/>
+              <a:tabLst/>
+              <a:defRPr/>
+            </a:pPr>
+            <a:r>
+              <a:rPr lang="en-US" sz="1200" b="0" i="0" kern="1200" dirty="0">
+                <a:solidFill>
+                  <a:schemeClr val="tx1"/>
+                </a:solidFill>
+                <a:effectLst/>
+                <a:latin typeface="+mn-lt"/>
+                <a:ea typeface="+mn-ea"/>
+                <a:cs typeface="+mn-cs"/>
+              </a:rPr>
+              <a:t>First Example</a:t>
+            </a:r>
+          </a:p>
+          <a:p>
+            <a:pPr marL="228600" marR="0" lvl="0" indent="-228600" algn="l" defTabSz="914400" rtl="0" eaLnBrk="1" fontAlgn="auto" latinLnBrk="0" hangingPunct="1">
+              <a:lnSpc>
+                <a:spcPct val="100000"/>
+              </a:lnSpc>
+              <a:spcBef>
+                <a:spcPts val="0"/>
+              </a:spcBef>
+              <a:spcAft>
+                <a:spcPts val="0"/>
+              </a:spcAft>
+              <a:buClrTx/>
+              <a:buSzTx/>
+              <a:buFontTx/>
+              <a:buAutoNum type="arabicParenR"/>
+              <a:tabLst/>
+              <a:defRPr/>
+            </a:pPr>
+            <a:r>
+              <a:rPr lang="en-US" sz="1200" b="0" i="0" kern="1200" dirty="0">
+                <a:solidFill>
+                  <a:schemeClr val="tx1"/>
+                </a:solidFill>
+                <a:effectLst/>
+                <a:latin typeface="+mn-lt"/>
+                <a:ea typeface="+mn-ea"/>
+                <a:cs typeface="+mn-cs"/>
+              </a:rPr>
+              <a:t>A side: declaring X -&gt; assign 5 to X -&gt; printing X value</a:t>
+            </a:r>
+          </a:p>
+          <a:p>
+            <a:pPr marL="228600" marR="0" lvl="0" indent="-228600" algn="l" defTabSz="914400" rtl="0" eaLnBrk="1" fontAlgn="auto" latinLnBrk="0" hangingPunct="1">
+              <a:lnSpc>
+                <a:spcPct val="100000"/>
+              </a:lnSpc>
+              <a:spcBef>
+                <a:spcPts val="0"/>
+              </a:spcBef>
+              <a:spcAft>
+                <a:spcPts val="0"/>
+              </a:spcAft>
+              <a:buClrTx/>
+              <a:buSzTx/>
+              <a:buFontTx/>
+              <a:buAutoNum type="arabicParenR"/>
+              <a:tabLst/>
+              <a:defRPr/>
+            </a:pPr>
+            <a:r>
+              <a:rPr lang="en-US" sz="1200" b="0" i="0" kern="1200" dirty="0">
+                <a:solidFill>
+                  <a:schemeClr val="tx1"/>
+                </a:solidFill>
+                <a:effectLst/>
+                <a:latin typeface="+mn-lt"/>
+                <a:ea typeface="+mn-ea"/>
+                <a:cs typeface="+mn-cs"/>
+              </a:rPr>
+              <a:t>B side: assign 5 to X -&gt; printing X value -&gt; declaring X</a:t>
+            </a:r>
+          </a:p>
+          <a:p>
             <a:pPr marL="0" marR="0" lvl="0" indent="0" algn="l" defTabSz="914400" rtl="0" eaLnBrk="1" fontAlgn="auto" latinLnBrk="0" hangingPunct="1">
               <a:lnSpc>
                 <a:spcPct val="100000"/>
@@ -14624,7 +14900,1241 @@
               <a:tabLst/>
               <a:defRPr/>
             </a:pPr>
+            <a:endParaRPr lang="en-US" sz="1200" b="0" i="0" kern="1200" dirty="0">
+              <a:solidFill>
+                <a:schemeClr val="tx1"/>
+              </a:solidFill>
+              <a:effectLst/>
+              <a:latin typeface="+mn-lt"/>
+              <a:ea typeface="+mn-ea"/>
+              <a:cs typeface="+mn-cs"/>
+            </a:endParaRPr>
+          </a:p>
+          <a:p>
+            <a:pPr marL="0" marR="0" lvl="0" indent="0" algn="l" defTabSz="914400" rtl="0" eaLnBrk="1" fontAlgn="auto" latinLnBrk="0" hangingPunct="1">
+              <a:lnSpc>
+                <a:spcPct val="100000"/>
+              </a:lnSpc>
+              <a:spcBef>
+                <a:spcPts val="0"/>
+              </a:spcBef>
+              <a:spcAft>
+                <a:spcPts val="0"/>
+              </a:spcAft>
+              <a:buClrTx/>
+              <a:buSzTx/>
+              <a:buFontTx/>
+              <a:buNone/>
+              <a:tabLst/>
+              <a:defRPr/>
+            </a:pPr>
+            <a:r>
+              <a:rPr lang="en-US" sz="1200" b="0" i="0" kern="1200" dirty="0">
+                <a:solidFill>
+                  <a:schemeClr val="tx1"/>
+                </a:solidFill>
+                <a:effectLst/>
+                <a:latin typeface="+mn-lt"/>
+                <a:ea typeface="+mn-ea"/>
+                <a:cs typeface="+mn-cs"/>
+              </a:rPr>
+              <a:t>In both examples we will receive the same output/result, why?</a:t>
+            </a:r>
+          </a:p>
+          <a:p>
+            <a:pPr marL="0" marR="0" lvl="0" indent="0" algn="l" defTabSz="914400" rtl="0" eaLnBrk="1" fontAlgn="auto" latinLnBrk="0" hangingPunct="1">
+              <a:lnSpc>
+                <a:spcPct val="100000"/>
+              </a:lnSpc>
+              <a:spcBef>
+                <a:spcPts val="0"/>
+              </a:spcBef>
+              <a:spcAft>
+                <a:spcPts val="0"/>
+              </a:spcAft>
+              <a:buClrTx/>
+              <a:buSzTx/>
+              <a:buFontTx/>
+              <a:buNone/>
+              <a:tabLst/>
+              <a:defRPr/>
+            </a:pPr>
+            <a:r>
+              <a:rPr lang="en-US" sz="1200" b="0" i="0" kern="1200" dirty="0">
+                <a:solidFill>
+                  <a:schemeClr val="tx1"/>
+                </a:solidFill>
+                <a:effectLst/>
+                <a:latin typeface="+mn-lt"/>
+                <a:ea typeface="+mn-ea"/>
+                <a:cs typeface="+mn-cs"/>
+              </a:rPr>
+              <a:t>Because hoisting behavior</a:t>
+            </a:r>
+          </a:p>
+          <a:p>
+            <a:pPr marL="0" marR="0" lvl="0" indent="0" algn="l" defTabSz="914400" rtl="0" eaLnBrk="1" fontAlgn="auto" latinLnBrk="0" hangingPunct="1">
+              <a:lnSpc>
+                <a:spcPct val="100000"/>
+              </a:lnSpc>
+              <a:spcBef>
+                <a:spcPts val="0"/>
+              </a:spcBef>
+              <a:spcAft>
+                <a:spcPts val="0"/>
+              </a:spcAft>
+              <a:buClrTx/>
+              <a:buSzTx/>
+              <a:buFontTx/>
+              <a:buNone/>
+              <a:tabLst/>
+              <a:defRPr/>
+            </a:pPr>
+            <a:endParaRPr lang="en-US" sz="1200" b="0" i="0" kern="1200" dirty="0">
+              <a:solidFill>
+                <a:schemeClr val="tx1"/>
+              </a:solidFill>
+              <a:effectLst/>
+              <a:latin typeface="+mn-lt"/>
+              <a:ea typeface="+mn-ea"/>
+              <a:cs typeface="+mn-cs"/>
+            </a:endParaRPr>
+          </a:p>
+          <a:p>
+            <a:pPr marL="171450" marR="0" lvl="0" indent="-171450" algn="l" defTabSz="914400" rtl="0" eaLnBrk="1" fontAlgn="auto" latinLnBrk="0" hangingPunct="1">
+              <a:lnSpc>
+                <a:spcPct val="100000"/>
+              </a:lnSpc>
+              <a:spcBef>
+                <a:spcPts val="0"/>
+              </a:spcBef>
+              <a:spcAft>
+                <a:spcPts val="0"/>
+              </a:spcAft>
+              <a:buClrTx/>
+              <a:buSzTx/>
+              <a:buFont typeface="Arial" panose="020B0604020202020204" pitchFamily="34" charset="0"/>
+              <a:buChar char="•"/>
+              <a:tabLst/>
+              <a:defRPr/>
+            </a:pPr>
+            <a:r>
+              <a:rPr lang="en-US" sz="1200" b="0" i="0" kern="1200" dirty="0">
+                <a:solidFill>
+                  <a:schemeClr val="tx1"/>
+                </a:solidFill>
+                <a:effectLst/>
+                <a:latin typeface="+mn-lt"/>
+                <a:ea typeface="+mn-ea"/>
+                <a:cs typeface="+mn-cs"/>
+              </a:rPr>
+              <a:t>Second Example:</a:t>
+            </a:r>
+          </a:p>
+          <a:p>
+            <a:pPr marL="0" marR="0" lvl="0" indent="0" algn="l" defTabSz="914400" rtl="0" eaLnBrk="1" fontAlgn="auto" latinLnBrk="0" hangingPunct="1">
+              <a:lnSpc>
+                <a:spcPct val="100000"/>
+              </a:lnSpc>
+              <a:spcBef>
+                <a:spcPts val="0"/>
+              </a:spcBef>
+              <a:spcAft>
+                <a:spcPts val="0"/>
+              </a:spcAft>
+              <a:buClrTx/>
+              <a:buSzTx/>
+              <a:buFontTx/>
+              <a:buNone/>
+              <a:tabLst/>
+              <a:defRPr/>
+            </a:pPr>
+            <a:r>
+              <a:rPr lang="en-US" sz="1200" b="0" i="0" kern="1200" dirty="0">
+                <a:solidFill>
+                  <a:schemeClr val="tx1"/>
+                </a:solidFill>
+                <a:effectLst/>
+                <a:latin typeface="+mn-lt"/>
+                <a:ea typeface="+mn-ea"/>
+                <a:cs typeface="+mn-cs"/>
+              </a:rPr>
+              <a:t>Let see another example</a:t>
+            </a:r>
+          </a:p>
+          <a:p>
+            <a:pPr marL="228600" marR="0" lvl="0" indent="-228600" algn="l" defTabSz="914400" rtl="0" eaLnBrk="1" fontAlgn="auto" latinLnBrk="0" hangingPunct="1">
+              <a:lnSpc>
+                <a:spcPct val="100000"/>
+              </a:lnSpc>
+              <a:spcBef>
+                <a:spcPts val="0"/>
+              </a:spcBef>
+              <a:spcAft>
+                <a:spcPts val="0"/>
+              </a:spcAft>
+              <a:buClrTx/>
+              <a:buSzTx/>
+              <a:buFontTx/>
+              <a:buAutoNum type="arabicParenR"/>
+              <a:tabLst/>
+              <a:defRPr/>
+            </a:pPr>
+            <a:r>
+              <a:rPr lang="en-US" sz="1200" b="0" i="0" kern="1200" dirty="0">
+                <a:solidFill>
+                  <a:schemeClr val="tx1"/>
+                </a:solidFill>
+                <a:effectLst/>
+                <a:latin typeface="+mn-lt"/>
+                <a:ea typeface="+mn-ea"/>
+                <a:cs typeface="+mn-cs"/>
+              </a:rPr>
+              <a:t>A side: printing X value -&gt; declaring X &amp; assign 5 value</a:t>
+            </a:r>
+            <a:br>
+              <a:rPr lang="en-US" sz="1200" b="0" i="0" kern="1200" dirty="0">
+                <a:solidFill>
+                  <a:schemeClr val="tx1"/>
+                </a:solidFill>
+                <a:effectLst/>
+                <a:latin typeface="+mn-lt"/>
+                <a:ea typeface="+mn-ea"/>
+                <a:cs typeface="+mn-cs"/>
+              </a:rPr>
+            </a:br>
+            <a:r>
+              <a:rPr lang="en-US" sz="1200" b="0" i="0" kern="1200" dirty="0">
+                <a:solidFill>
+                  <a:schemeClr val="tx1"/>
+                </a:solidFill>
+                <a:effectLst/>
+                <a:latin typeface="+mn-lt"/>
+                <a:ea typeface="+mn-ea"/>
+                <a:cs typeface="+mn-cs"/>
+              </a:rPr>
+              <a:t>What will be the output?</a:t>
+            </a:r>
+            <a:br>
+              <a:rPr lang="en-US" sz="1200" b="0" i="0" kern="1200" dirty="0">
+                <a:solidFill>
+                  <a:schemeClr val="tx1"/>
+                </a:solidFill>
+                <a:effectLst/>
+                <a:latin typeface="+mn-lt"/>
+                <a:ea typeface="+mn-ea"/>
+                <a:cs typeface="+mn-cs"/>
+              </a:rPr>
+            </a:br>
+            <a:r>
+              <a:rPr lang="en-US" sz="1200" b="0" i="0" kern="1200" dirty="0">
+                <a:solidFill>
+                  <a:schemeClr val="tx1"/>
+                </a:solidFill>
+                <a:effectLst/>
+                <a:latin typeface="+mn-lt"/>
+                <a:ea typeface="+mn-ea"/>
+                <a:cs typeface="+mn-cs"/>
+              </a:rPr>
+              <a:t>Undefined, why?</a:t>
+            </a:r>
+          </a:p>
+          <a:p>
+            <a:pPr marL="0" marR="0" lvl="0" indent="0" algn="l" defTabSz="914400" rtl="0" eaLnBrk="1" fontAlgn="auto" latinLnBrk="0" hangingPunct="1">
+              <a:lnSpc>
+                <a:spcPct val="100000"/>
+              </a:lnSpc>
+              <a:spcBef>
+                <a:spcPts val="0"/>
+              </a:spcBef>
+              <a:spcAft>
+                <a:spcPts val="0"/>
+              </a:spcAft>
+              <a:buClrTx/>
+              <a:buSzTx/>
+              <a:buFontTx/>
+              <a:buNone/>
+              <a:tabLst/>
+              <a:defRPr/>
+            </a:pPr>
+            <a:r>
+              <a:rPr lang="en-US" sz="1200" b="0" i="0" kern="1200" dirty="0">
+                <a:solidFill>
+                  <a:schemeClr val="tx1"/>
+                </a:solidFill>
+                <a:effectLst/>
+                <a:latin typeface="+mn-lt"/>
+                <a:ea typeface="+mn-ea"/>
+                <a:cs typeface="+mn-cs"/>
+              </a:rPr>
+              <a:t>What is happing behind the scene?</a:t>
+            </a:r>
+            <a:br>
+              <a:rPr lang="en-US" sz="1200" b="0" i="0" kern="1200" dirty="0">
+                <a:solidFill>
+                  <a:schemeClr val="tx1"/>
+                </a:solidFill>
+                <a:effectLst/>
+                <a:latin typeface="+mn-lt"/>
+                <a:ea typeface="+mn-ea"/>
+                <a:cs typeface="+mn-cs"/>
+              </a:rPr>
+            </a:br>
+            <a:r>
+              <a:rPr lang="en-US" sz="1200" b="0" i="0" kern="1200" dirty="0">
+                <a:solidFill>
+                  <a:schemeClr val="tx1"/>
+                </a:solidFill>
+                <a:effectLst/>
+                <a:latin typeface="+mn-lt"/>
+                <a:ea typeface="+mn-ea"/>
+                <a:cs typeface="+mn-cs"/>
+              </a:rPr>
+              <a:t>Let see what happened in B side</a:t>
+            </a:r>
+          </a:p>
+          <a:p>
+            <a:pPr marL="0" marR="0" lvl="0" indent="0" algn="l" defTabSz="914400" rtl="0" eaLnBrk="1" fontAlgn="auto" latinLnBrk="0" hangingPunct="1">
+              <a:lnSpc>
+                <a:spcPct val="100000"/>
+              </a:lnSpc>
+              <a:spcBef>
+                <a:spcPts val="0"/>
+              </a:spcBef>
+              <a:spcAft>
+                <a:spcPts val="0"/>
+              </a:spcAft>
+              <a:buClrTx/>
+              <a:buSzTx/>
+              <a:buFontTx/>
+              <a:buNone/>
+              <a:tabLst/>
+              <a:defRPr/>
+            </a:pPr>
+            <a:r>
+              <a:rPr lang="en-US" sz="1200" b="0" i="0" kern="1200" dirty="0">
+                <a:solidFill>
+                  <a:schemeClr val="tx1"/>
+                </a:solidFill>
+                <a:effectLst/>
+                <a:latin typeface="+mn-lt"/>
+                <a:ea typeface="+mn-ea"/>
+                <a:cs typeface="+mn-cs"/>
+              </a:rPr>
+              <a:t>2) B side:  declaring X -&gt; printing X value -&gt; assign 5 to X </a:t>
+            </a:r>
+          </a:p>
+          <a:p>
+            <a:pPr marL="0" marR="0" lvl="0" indent="0" algn="l" defTabSz="914400" rtl="0" eaLnBrk="1" fontAlgn="auto" latinLnBrk="0" hangingPunct="1">
+              <a:lnSpc>
+                <a:spcPct val="100000"/>
+              </a:lnSpc>
+              <a:spcBef>
+                <a:spcPts val="0"/>
+              </a:spcBef>
+              <a:spcAft>
+                <a:spcPts val="0"/>
+              </a:spcAft>
+              <a:buClrTx/>
+              <a:buSzTx/>
+              <a:buFontTx/>
+              <a:buNone/>
+              <a:tabLst/>
+              <a:defRPr/>
+            </a:pPr>
+            <a:r>
+              <a:rPr lang="en-US" sz="1200" b="0" i="0" kern="1200" dirty="0">
+                <a:solidFill>
+                  <a:schemeClr val="tx1"/>
+                </a:solidFill>
+                <a:effectLst/>
+                <a:latin typeface="+mn-lt"/>
+                <a:ea typeface="+mn-ea"/>
+                <a:cs typeface="+mn-cs"/>
+              </a:rPr>
+              <a:t>So basically we are declaring x but not populating it, after the declaring we are printing x value and this is way we receive undefined</a:t>
+            </a:r>
+          </a:p>
+          <a:p>
+            <a:pPr marL="0" marR="0" lvl="0" indent="0" algn="l" defTabSz="914400" rtl="0" eaLnBrk="1" fontAlgn="auto" latinLnBrk="0" hangingPunct="1">
+              <a:lnSpc>
+                <a:spcPct val="100000"/>
+              </a:lnSpc>
+              <a:spcBef>
+                <a:spcPts val="0"/>
+              </a:spcBef>
+              <a:spcAft>
+                <a:spcPts val="0"/>
+              </a:spcAft>
+              <a:buClrTx/>
+              <a:buSzTx/>
+              <a:buFontTx/>
+              <a:buNone/>
+              <a:tabLst/>
+              <a:defRPr/>
+            </a:pPr>
+            <a:endParaRPr lang="en-US" sz="1200" b="0" i="0" kern="1200" dirty="0">
+              <a:solidFill>
+                <a:schemeClr val="tx1"/>
+              </a:solidFill>
+              <a:effectLst/>
+              <a:latin typeface="+mn-lt"/>
+              <a:ea typeface="+mn-ea"/>
+              <a:cs typeface="+mn-cs"/>
+            </a:endParaRPr>
+          </a:p>
+          <a:p>
+            <a:pPr marL="171450" marR="0" lvl="0" indent="-171450" algn="l" defTabSz="914400" rtl="0" eaLnBrk="1" fontAlgn="auto" latinLnBrk="0" hangingPunct="1">
+              <a:lnSpc>
+                <a:spcPct val="100000"/>
+              </a:lnSpc>
+              <a:spcBef>
+                <a:spcPts val="0"/>
+              </a:spcBef>
+              <a:spcAft>
+                <a:spcPts val="0"/>
+              </a:spcAft>
+              <a:buClrTx/>
+              <a:buSzTx/>
+              <a:buFont typeface="Arial" panose="020B0604020202020204" pitchFamily="34" charset="0"/>
+              <a:buChar char="•"/>
+              <a:tabLst/>
+              <a:defRPr/>
+            </a:pPr>
+            <a:r>
+              <a:rPr lang="en-US" sz="1200" b="0" i="0" kern="1200" dirty="0">
+                <a:solidFill>
+                  <a:schemeClr val="tx1"/>
+                </a:solidFill>
+                <a:effectLst/>
+                <a:latin typeface="+mn-lt"/>
+                <a:ea typeface="+mn-ea"/>
+                <a:cs typeface="+mn-cs"/>
+              </a:rPr>
+              <a:t>Third Example:</a:t>
+            </a:r>
+            <a:br>
+              <a:rPr lang="en-US" sz="1200" b="0" i="0" kern="1200" dirty="0">
+                <a:solidFill>
+                  <a:schemeClr val="tx1"/>
+                </a:solidFill>
+                <a:effectLst/>
+                <a:latin typeface="+mn-lt"/>
+                <a:ea typeface="+mn-ea"/>
+                <a:cs typeface="+mn-cs"/>
+              </a:rPr>
+            </a:br>
+            <a:r>
+              <a:rPr lang="en-US" sz="1200" b="0" i="0" kern="1200" dirty="0">
+                <a:solidFill>
+                  <a:schemeClr val="tx1"/>
+                </a:solidFill>
+                <a:effectLst/>
+                <a:latin typeface="+mn-lt"/>
+                <a:ea typeface="+mn-ea"/>
+                <a:cs typeface="+mn-cs"/>
+              </a:rPr>
+              <a:t>Same behavior is happened for functions,</a:t>
+            </a:r>
+          </a:p>
+          <a:p>
+            <a:pPr marL="0" marR="0" lvl="0" indent="0" algn="l" defTabSz="914400" rtl="0" eaLnBrk="1" fontAlgn="auto" latinLnBrk="0" hangingPunct="1">
+              <a:lnSpc>
+                <a:spcPct val="100000"/>
+              </a:lnSpc>
+              <a:spcBef>
+                <a:spcPts val="0"/>
+              </a:spcBef>
+              <a:spcAft>
+                <a:spcPts val="0"/>
+              </a:spcAft>
+              <a:buClrTx/>
+              <a:buSzTx/>
+              <a:buFontTx/>
+              <a:buNone/>
+              <a:tabLst/>
+              <a:defRPr/>
+            </a:pPr>
+            <a:r>
+              <a:rPr lang="en-US" sz="1200" b="0" i="0" kern="1200" dirty="0">
+                <a:solidFill>
+                  <a:schemeClr val="tx1"/>
+                </a:solidFill>
+                <a:effectLst/>
+                <a:latin typeface="+mn-lt"/>
+                <a:ea typeface="+mn-ea"/>
+                <a:cs typeface="+mn-cs"/>
+              </a:rPr>
+              <a:t>Let see an example:</a:t>
+            </a:r>
+          </a:p>
+          <a:p>
+            <a:pPr marL="228600" marR="0" lvl="0" indent="-228600" algn="l" defTabSz="914400" rtl="0" eaLnBrk="1" fontAlgn="auto" latinLnBrk="0" hangingPunct="1">
+              <a:lnSpc>
+                <a:spcPct val="100000"/>
+              </a:lnSpc>
+              <a:spcBef>
+                <a:spcPts val="0"/>
+              </a:spcBef>
+              <a:spcAft>
+                <a:spcPts val="0"/>
+              </a:spcAft>
+              <a:buClrTx/>
+              <a:buSzTx/>
+              <a:buFontTx/>
+              <a:buAutoNum type="arabicParenR"/>
+              <a:tabLst/>
+              <a:defRPr/>
+            </a:pPr>
+            <a:r>
+              <a:rPr lang="en-US" sz="1200" b="0" i="0" kern="1200" dirty="0">
+                <a:solidFill>
+                  <a:schemeClr val="tx1"/>
+                </a:solidFill>
+                <a:effectLst/>
+                <a:latin typeface="+mn-lt"/>
+                <a:ea typeface="+mn-ea"/>
+                <a:cs typeface="+mn-cs"/>
+              </a:rPr>
+              <a:t>A side: declaring </a:t>
+            </a:r>
+            <a:r>
+              <a:rPr lang="en-US" sz="1200" b="0" i="0" kern="1200" dirty="0" err="1">
+                <a:solidFill>
+                  <a:schemeClr val="tx1"/>
+                </a:solidFill>
+                <a:effectLst/>
+                <a:latin typeface="+mn-lt"/>
+                <a:ea typeface="+mn-ea"/>
+                <a:cs typeface="+mn-cs"/>
+              </a:rPr>
+              <a:t>cowSays</a:t>
+            </a:r>
+            <a:r>
+              <a:rPr lang="en-US" sz="1200" b="0" i="0" kern="1200" dirty="0">
+                <a:solidFill>
+                  <a:schemeClr val="tx1"/>
+                </a:solidFill>
+                <a:effectLst/>
+                <a:latin typeface="+mn-lt"/>
+                <a:ea typeface="+mn-ea"/>
+                <a:cs typeface="+mn-cs"/>
+              </a:rPr>
+              <a:t> function-&gt; invoking </a:t>
+            </a:r>
+            <a:r>
+              <a:rPr lang="en-US" sz="1200" b="0" i="0" kern="1200" dirty="0" err="1">
+                <a:solidFill>
+                  <a:schemeClr val="tx1"/>
+                </a:solidFill>
+                <a:effectLst/>
+                <a:latin typeface="+mn-lt"/>
+                <a:ea typeface="+mn-ea"/>
+                <a:cs typeface="+mn-cs"/>
+              </a:rPr>
+              <a:t>cowSays</a:t>
+            </a:r>
+            <a:r>
+              <a:rPr lang="en-US" sz="1200" b="0" i="0" kern="1200" dirty="0">
+                <a:solidFill>
+                  <a:schemeClr val="tx1"/>
+                </a:solidFill>
+                <a:effectLst/>
+                <a:latin typeface="+mn-lt"/>
+                <a:ea typeface="+mn-ea"/>
+                <a:cs typeface="+mn-cs"/>
+              </a:rPr>
+              <a:t> function</a:t>
+            </a:r>
+          </a:p>
+          <a:p>
+            <a:pPr marL="228600" marR="0" lvl="0" indent="-228600" algn="l" defTabSz="914400" rtl="0" eaLnBrk="1" fontAlgn="auto" latinLnBrk="0" hangingPunct="1">
+              <a:lnSpc>
+                <a:spcPct val="100000"/>
+              </a:lnSpc>
+              <a:spcBef>
+                <a:spcPts val="0"/>
+              </a:spcBef>
+              <a:spcAft>
+                <a:spcPts val="0"/>
+              </a:spcAft>
+              <a:buClrTx/>
+              <a:buSzTx/>
+              <a:buFontTx/>
+              <a:buAutoNum type="arabicParenR"/>
+              <a:tabLst/>
+              <a:defRPr/>
+            </a:pPr>
+            <a:r>
+              <a:rPr lang="en-US" sz="1200" b="0" i="0" kern="1200" dirty="0">
+                <a:solidFill>
+                  <a:schemeClr val="tx1"/>
+                </a:solidFill>
+                <a:effectLst/>
+                <a:latin typeface="+mn-lt"/>
+                <a:ea typeface="+mn-ea"/>
+                <a:cs typeface="+mn-cs"/>
+              </a:rPr>
+              <a:t>B side: invoking </a:t>
+            </a:r>
+            <a:r>
+              <a:rPr lang="en-US" sz="1200" b="0" i="0" kern="1200" dirty="0" err="1">
+                <a:solidFill>
+                  <a:schemeClr val="tx1"/>
+                </a:solidFill>
+                <a:effectLst/>
+                <a:latin typeface="+mn-lt"/>
+                <a:ea typeface="+mn-ea"/>
+                <a:cs typeface="+mn-cs"/>
+              </a:rPr>
+              <a:t>cowSays</a:t>
+            </a:r>
+            <a:r>
+              <a:rPr lang="en-US" sz="1200" b="0" i="0" kern="1200" dirty="0">
+                <a:solidFill>
+                  <a:schemeClr val="tx1"/>
+                </a:solidFill>
+                <a:effectLst/>
+                <a:latin typeface="+mn-lt"/>
+                <a:ea typeface="+mn-ea"/>
+                <a:cs typeface="+mn-cs"/>
+              </a:rPr>
+              <a:t> function -&gt; declaring </a:t>
+            </a:r>
+            <a:r>
+              <a:rPr lang="en-US" sz="1200" b="0" i="0" kern="1200" dirty="0" err="1">
+                <a:solidFill>
+                  <a:schemeClr val="tx1"/>
+                </a:solidFill>
+                <a:effectLst/>
+                <a:latin typeface="+mn-lt"/>
+                <a:ea typeface="+mn-ea"/>
+                <a:cs typeface="+mn-cs"/>
+              </a:rPr>
+              <a:t>cowSays</a:t>
+            </a:r>
+            <a:r>
+              <a:rPr lang="en-US" sz="1200" b="0" i="0" kern="1200" dirty="0">
+                <a:solidFill>
+                  <a:schemeClr val="tx1"/>
+                </a:solidFill>
+                <a:effectLst/>
+                <a:latin typeface="+mn-lt"/>
+                <a:ea typeface="+mn-ea"/>
+                <a:cs typeface="+mn-cs"/>
+              </a:rPr>
+              <a:t> function</a:t>
+            </a:r>
+          </a:p>
+          <a:p>
+            <a:pPr marL="0" marR="0" lvl="0" indent="0" algn="l" defTabSz="914400" rtl="0" eaLnBrk="1" fontAlgn="auto" latinLnBrk="0" hangingPunct="1">
+              <a:lnSpc>
+                <a:spcPct val="100000"/>
+              </a:lnSpc>
+              <a:spcBef>
+                <a:spcPts val="0"/>
+              </a:spcBef>
+              <a:spcAft>
+                <a:spcPts val="0"/>
+              </a:spcAft>
+              <a:buClrTx/>
+              <a:buSzTx/>
+              <a:buFontTx/>
+              <a:buNone/>
+              <a:tabLst/>
+              <a:defRPr/>
+            </a:pPr>
+            <a:r>
+              <a:rPr lang="en-US" sz="1200" b="0" i="0" kern="1200" dirty="0">
+                <a:solidFill>
+                  <a:schemeClr val="tx1"/>
+                </a:solidFill>
+                <a:effectLst/>
+                <a:latin typeface="+mn-lt"/>
+                <a:ea typeface="+mn-ea"/>
+                <a:cs typeface="+mn-cs"/>
+              </a:rPr>
+              <a:t>We will receive the same result? Why? Because like variables, also function declaration are hoisted to the top of the scope, so basically B side is transfer to A side.</a:t>
+            </a:r>
+          </a:p>
+          <a:p>
+            <a:pPr marL="0" marR="0" lvl="0" indent="0" algn="l" defTabSz="914400" rtl="0" eaLnBrk="1" fontAlgn="auto" latinLnBrk="0" hangingPunct="1">
+              <a:lnSpc>
+                <a:spcPct val="100000"/>
+              </a:lnSpc>
+              <a:spcBef>
+                <a:spcPts val="0"/>
+              </a:spcBef>
+              <a:spcAft>
+                <a:spcPts val="0"/>
+              </a:spcAft>
+              <a:buClrTx/>
+              <a:buSzTx/>
+              <a:buFontTx/>
+              <a:buNone/>
+              <a:tabLst/>
+              <a:defRPr/>
+            </a:pPr>
+            <a:endParaRPr lang="en-US" sz="1200" b="0" i="0" kern="1200" dirty="0">
+              <a:solidFill>
+                <a:schemeClr val="tx1"/>
+              </a:solidFill>
+              <a:effectLst/>
+              <a:latin typeface="+mn-lt"/>
+              <a:ea typeface="+mn-ea"/>
+              <a:cs typeface="+mn-cs"/>
+            </a:endParaRPr>
+          </a:p>
+          <a:p>
+            <a:pPr marL="0" marR="0" lvl="0" indent="0" algn="l" defTabSz="914400" rtl="0" eaLnBrk="1" fontAlgn="auto" latinLnBrk="0" hangingPunct="1">
+              <a:lnSpc>
+                <a:spcPct val="100000"/>
+              </a:lnSpc>
+              <a:spcBef>
+                <a:spcPts val="0"/>
+              </a:spcBef>
+              <a:spcAft>
+                <a:spcPts val="0"/>
+              </a:spcAft>
+              <a:buClrTx/>
+              <a:buSzTx/>
+              <a:buFontTx/>
+              <a:buNone/>
+              <a:tabLst/>
+              <a:defRPr/>
+            </a:pPr>
+            <a:endParaRPr lang="en-US" sz="1200" b="0" i="0" kern="1200" dirty="0">
+              <a:solidFill>
+                <a:schemeClr val="tx1"/>
+              </a:solidFill>
+              <a:effectLst/>
+              <a:latin typeface="+mn-lt"/>
+              <a:ea typeface="+mn-ea"/>
+              <a:cs typeface="+mn-cs"/>
+            </a:endParaRPr>
+          </a:p>
+          <a:p>
+            <a:pPr marL="171450" marR="0" lvl="0" indent="-171450" algn="l" defTabSz="914400" rtl="0" eaLnBrk="1" fontAlgn="auto" latinLnBrk="0" hangingPunct="1">
+              <a:lnSpc>
+                <a:spcPct val="100000"/>
+              </a:lnSpc>
+              <a:spcBef>
+                <a:spcPts val="0"/>
+              </a:spcBef>
+              <a:spcAft>
+                <a:spcPts val="0"/>
+              </a:spcAft>
+              <a:buClrTx/>
+              <a:buSzTx/>
+              <a:buFont typeface="Arial" panose="020B0604020202020204" pitchFamily="34" charset="0"/>
+              <a:buChar char="•"/>
+              <a:tabLst/>
+              <a:defRPr/>
+            </a:pPr>
+            <a:r>
+              <a:rPr lang="en-US" sz="1200" b="0" i="0" kern="1200" dirty="0">
+                <a:solidFill>
+                  <a:schemeClr val="tx1"/>
+                </a:solidFill>
+                <a:effectLst/>
+                <a:latin typeface="+mn-lt"/>
+                <a:ea typeface="+mn-ea"/>
+                <a:cs typeface="+mn-cs"/>
+              </a:rPr>
+              <a:t>Fourth Example:</a:t>
+            </a:r>
+            <a:br>
+              <a:rPr lang="en-US" sz="1200" b="0" i="0" kern="1200" dirty="0">
+                <a:solidFill>
+                  <a:schemeClr val="tx1"/>
+                </a:solidFill>
+                <a:effectLst/>
+                <a:latin typeface="+mn-lt"/>
+                <a:ea typeface="+mn-ea"/>
+                <a:cs typeface="+mn-cs"/>
+              </a:rPr>
+            </a:br>
+            <a:r>
+              <a:rPr lang="en-US" sz="1200" b="0" i="0" kern="1200" dirty="0">
+                <a:solidFill>
+                  <a:schemeClr val="tx1"/>
+                </a:solidFill>
+                <a:effectLst/>
+                <a:latin typeface="+mn-lt"/>
+                <a:ea typeface="+mn-ea"/>
+                <a:cs typeface="+mn-cs"/>
+              </a:rPr>
+              <a:t>What will happened if we are assigning function to a variable? (right side is variable name </a:t>
+            </a:r>
+            <a:r>
+              <a:rPr lang="en-US" sz="1200" b="0" i="0" kern="1200" dirty="0" err="1">
+                <a:solidFill>
+                  <a:schemeClr val="tx1"/>
+                </a:solidFill>
+                <a:effectLst/>
+                <a:latin typeface="+mn-lt"/>
+                <a:ea typeface="+mn-ea"/>
+                <a:cs typeface="+mn-cs"/>
+              </a:rPr>
+              <a:t>cowSays</a:t>
+            </a:r>
+            <a:r>
+              <a:rPr lang="en-US" sz="1200" b="0" i="0" kern="1200" dirty="0">
+                <a:solidFill>
+                  <a:schemeClr val="tx1"/>
+                </a:solidFill>
+                <a:effectLst/>
+                <a:latin typeface="+mn-lt"/>
+                <a:ea typeface="+mn-ea"/>
+                <a:cs typeface="+mn-cs"/>
+              </a:rPr>
+              <a:t> and left side is anonymous function)</a:t>
+            </a:r>
+          </a:p>
+          <a:p>
+            <a:pPr marL="0" marR="0" lvl="0" indent="0" algn="l" defTabSz="914400" rtl="0" eaLnBrk="1" fontAlgn="auto" latinLnBrk="0" hangingPunct="1">
+              <a:lnSpc>
+                <a:spcPct val="100000"/>
+              </a:lnSpc>
+              <a:spcBef>
+                <a:spcPts val="0"/>
+              </a:spcBef>
+              <a:spcAft>
+                <a:spcPts val="0"/>
+              </a:spcAft>
+              <a:buClrTx/>
+              <a:buSzTx/>
+              <a:buFontTx/>
+              <a:buNone/>
+              <a:tabLst/>
+              <a:defRPr/>
+            </a:pPr>
+            <a:r>
+              <a:rPr lang="en-US" b="0" dirty="0"/>
+              <a:t>1) A side – invoking </a:t>
+            </a:r>
+            <a:r>
+              <a:rPr lang="en-US" sz="1200" b="0" i="0" kern="1200" dirty="0" err="1">
+                <a:solidFill>
+                  <a:schemeClr val="tx1"/>
+                </a:solidFill>
+                <a:effectLst/>
+                <a:latin typeface="+mn-lt"/>
+                <a:ea typeface="+mn-ea"/>
+                <a:cs typeface="+mn-cs"/>
+              </a:rPr>
+              <a:t>cowSays</a:t>
+            </a:r>
+            <a:r>
+              <a:rPr lang="en-US" sz="1200" b="0" i="0" kern="1200" dirty="0">
+                <a:solidFill>
+                  <a:schemeClr val="tx1"/>
+                </a:solidFill>
+                <a:effectLst/>
+                <a:latin typeface="+mn-lt"/>
+                <a:ea typeface="+mn-ea"/>
+                <a:cs typeface="+mn-cs"/>
+              </a:rPr>
+              <a:t> function -&gt; declaring on </a:t>
+            </a:r>
+            <a:r>
+              <a:rPr lang="en-US" sz="1200" b="0" i="0" kern="1200" dirty="0" err="1">
+                <a:solidFill>
+                  <a:schemeClr val="tx1"/>
+                </a:solidFill>
+                <a:effectLst/>
+                <a:latin typeface="+mn-lt"/>
+                <a:ea typeface="+mn-ea"/>
+                <a:cs typeface="+mn-cs"/>
+              </a:rPr>
+              <a:t>cowSays</a:t>
+            </a:r>
+            <a:r>
+              <a:rPr lang="en-US" sz="1200" b="0" i="0" kern="1200" dirty="0">
+                <a:solidFill>
+                  <a:schemeClr val="tx1"/>
+                </a:solidFill>
+                <a:effectLst/>
+                <a:latin typeface="+mn-lt"/>
+                <a:ea typeface="+mn-ea"/>
+                <a:cs typeface="+mn-cs"/>
+              </a:rPr>
+              <a:t> variable &amp; </a:t>
+            </a:r>
+            <a:r>
+              <a:rPr lang="en-US" sz="1200" b="0" i="0" kern="1200" dirty="0" err="1">
+                <a:solidFill>
+                  <a:schemeClr val="tx1"/>
+                </a:solidFill>
+                <a:effectLst/>
+                <a:latin typeface="+mn-lt"/>
+                <a:ea typeface="+mn-ea"/>
+                <a:cs typeface="+mn-cs"/>
+              </a:rPr>
+              <a:t>assinning</a:t>
+            </a:r>
+            <a:r>
+              <a:rPr lang="en-US" sz="1200" b="0" i="0" kern="1200" dirty="0">
+                <a:solidFill>
+                  <a:schemeClr val="tx1"/>
+                </a:solidFill>
+                <a:effectLst/>
+                <a:latin typeface="+mn-lt"/>
+                <a:ea typeface="+mn-ea"/>
+                <a:cs typeface="+mn-cs"/>
+              </a:rPr>
+              <a:t> anonymous function.</a:t>
+            </a:r>
+            <a:br>
+              <a:rPr lang="en-US" sz="1200" b="0" i="0" kern="1200" dirty="0">
+                <a:solidFill>
+                  <a:schemeClr val="tx1"/>
+                </a:solidFill>
+                <a:effectLst/>
+                <a:latin typeface="+mn-lt"/>
+                <a:ea typeface="+mn-ea"/>
+                <a:cs typeface="+mn-cs"/>
+              </a:rPr>
+            </a:br>
+            <a:r>
+              <a:rPr lang="en-US" sz="1200" b="0" i="0" kern="1200" dirty="0">
+                <a:solidFill>
+                  <a:schemeClr val="tx1"/>
+                </a:solidFill>
+                <a:effectLst/>
+                <a:latin typeface="+mn-lt"/>
+                <a:ea typeface="+mn-ea"/>
+                <a:cs typeface="+mn-cs"/>
+              </a:rPr>
+              <a:t>We will receive Error, why? Let see what happened behind the scene</a:t>
+            </a:r>
+          </a:p>
+          <a:p>
+            <a:pPr marL="0" marR="0" lvl="0" indent="0" algn="l" defTabSz="914400" rtl="0" eaLnBrk="1" fontAlgn="auto" latinLnBrk="0" hangingPunct="1">
+              <a:lnSpc>
+                <a:spcPct val="100000"/>
+              </a:lnSpc>
+              <a:spcBef>
+                <a:spcPts val="0"/>
+              </a:spcBef>
+              <a:spcAft>
+                <a:spcPts val="0"/>
+              </a:spcAft>
+              <a:buClrTx/>
+              <a:buSzTx/>
+              <a:buFontTx/>
+              <a:buNone/>
+              <a:tabLst/>
+              <a:defRPr/>
+            </a:pPr>
+            <a:r>
+              <a:rPr lang="en-US" sz="1200" b="0" i="0" kern="1200" dirty="0">
+                <a:solidFill>
+                  <a:schemeClr val="tx1"/>
+                </a:solidFill>
+                <a:effectLst/>
+                <a:latin typeface="+mn-lt"/>
+                <a:ea typeface="+mn-ea"/>
+                <a:cs typeface="+mn-cs"/>
+              </a:rPr>
+              <a:t>2) B side – </a:t>
+            </a:r>
+            <a:r>
+              <a:rPr lang="en-US" sz="1200" b="0" i="0" kern="1200" dirty="0" err="1">
+                <a:solidFill>
+                  <a:schemeClr val="tx1"/>
+                </a:solidFill>
+                <a:effectLst/>
+                <a:latin typeface="+mn-lt"/>
+                <a:ea typeface="+mn-ea"/>
+                <a:cs typeface="+mn-cs"/>
+              </a:rPr>
+              <a:t>decleration</a:t>
+            </a:r>
+            <a:r>
+              <a:rPr lang="en-US" sz="1200" b="0" i="0" kern="1200" dirty="0">
+                <a:solidFill>
+                  <a:schemeClr val="tx1"/>
+                </a:solidFill>
+                <a:effectLst/>
+                <a:latin typeface="+mn-lt"/>
+                <a:ea typeface="+mn-ea"/>
+                <a:cs typeface="+mn-cs"/>
+              </a:rPr>
+              <a:t> of </a:t>
+            </a:r>
+            <a:r>
+              <a:rPr lang="en-US" sz="1200" b="0" i="0" kern="1200" dirty="0" err="1">
+                <a:solidFill>
+                  <a:schemeClr val="tx1"/>
+                </a:solidFill>
+                <a:effectLst/>
+                <a:latin typeface="+mn-lt"/>
+                <a:ea typeface="+mn-ea"/>
+                <a:cs typeface="+mn-cs"/>
+              </a:rPr>
+              <a:t>cowSays</a:t>
+            </a:r>
+            <a:r>
+              <a:rPr lang="en-US" sz="1200" b="0" i="0" kern="1200" dirty="0">
+                <a:solidFill>
+                  <a:schemeClr val="tx1"/>
+                </a:solidFill>
+                <a:effectLst/>
+                <a:latin typeface="+mn-lt"/>
+                <a:ea typeface="+mn-ea"/>
+                <a:cs typeface="+mn-cs"/>
+              </a:rPr>
+              <a:t>  is hoisted to the top -&gt; </a:t>
+            </a:r>
+            <a:r>
+              <a:rPr lang="en-US" b="0" dirty="0"/>
+              <a:t>invoking </a:t>
+            </a:r>
+            <a:r>
+              <a:rPr lang="en-US" sz="1200" b="0" i="0" kern="1200" dirty="0" err="1">
+                <a:solidFill>
+                  <a:schemeClr val="tx1"/>
+                </a:solidFill>
+                <a:effectLst/>
+                <a:latin typeface="+mn-lt"/>
+                <a:ea typeface="+mn-ea"/>
+                <a:cs typeface="+mn-cs"/>
+              </a:rPr>
+              <a:t>cowSays</a:t>
+            </a:r>
+            <a:r>
+              <a:rPr lang="en-US" sz="1200" b="0" i="0" kern="1200" dirty="0">
+                <a:solidFill>
+                  <a:schemeClr val="tx1"/>
+                </a:solidFill>
+                <a:effectLst/>
+                <a:latin typeface="+mn-lt"/>
+                <a:ea typeface="+mn-ea"/>
+                <a:cs typeface="+mn-cs"/>
+              </a:rPr>
+              <a:t> function -&gt; </a:t>
+            </a:r>
+            <a:r>
+              <a:rPr lang="en-US" sz="1200" b="0" i="0" kern="1200" dirty="0" err="1">
+                <a:solidFill>
+                  <a:schemeClr val="tx1"/>
+                </a:solidFill>
+                <a:effectLst/>
+                <a:latin typeface="+mn-lt"/>
+                <a:ea typeface="+mn-ea"/>
+                <a:cs typeface="+mn-cs"/>
+              </a:rPr>
+              <a:t>assinning</a:t>
+            </a:r>
+            <a:r>
+              <a:rPr lang="en-US" sz="1200" b="0" i="0" kern="1200" dirty="0">
+                <a:solidFill>
+                  <a:schemeClr val="tx1"/>
+                </a:solidFill>
+                <a:effectLst/>
+                <a:latin typeface="+mn-lt"/>
+                <a:ea typeface="+mn-ea"/>
+                <a:cs typeface="+mn-cs"/>
+              </a:rPr>
+              <a:t> anonymous function to variable </a:t>
+            </a:r>
+            <a:r>
+              <a:rPr lang="en-US" sz="1200" b="0" i="0" kern="1200" dirty="0" err="1">
+                <a:solidFill>
+                  <a:schemeClr val="tx1"/>
+                </a:solidFill>
+                <a:effectLst/>
+                <a:latin typeface="+mn-lt"/>
+                <a:ea typeface="+mn-ea"/>
+                <a:cs typeface="+mn-cs"/>
+              </a:rPr>
+              <a:t>cowSays</a:t>
+            </a:r>
+            <a:br>
+              <a:rPr lang="en-US" sz="1200" b="0" i="0" kern="1200" dirty="0">
+                <a:solidFill>
+                  <a:schemeClr val="tx1"/>
+                </a:solidFill>
+                <a:effectLst/>
+                <a:latin typeface="+mn-lt"/>
+                <a:ea typeface="+mn-ea"/>
+                <a:cs typeface="+mn-cs"/>
+              </a:rPr>
+            </a:br>
+            <a:endParaRPr lang="en-US" sz="1200" b="0" i="0" kern="1200" dirty="0">
+              <a:solidFill>
+                <a:schemeClr val="tx1"/>
+              </a:solidFill>
+              <a:effectLst/>
+              <a:latin typeface="+mn-lt"/>
+              <a:ea typeface="+mn-ea"/>
+              <a:cs typeface="+mn-cs"/>
+            </a:endParaRPr>
+          </a:p>
+          <a:p>
+            <a:pPr marL="0" marR="0" lvl="0" indent="0" algn="l" defTabSz="914400" rtl="0" eaLnBrk="1" fontAlgn="auto" latinLnBrk="0" hangingPunct="1">
+              <a:lnSpc>
+                <a:spcPct val="100000"/>
+              </a:lnSpc>
+              <a:spcBef>
+                <a:spcPts val="0"/>
+              </a:spcBef>
+              <a:spcAft>
+                <a:spcPts val="0"/>
+              </a:spcAft>
+              <a:buClrTx/>
+              <a:buSzTx/>
+              <a:buFontTx/>
+              <a:buNone/>
+              <a:tabLst/>
+              <a:defRPr/>
+            </a:pPr>
+            <a:r>
+              <a:rPr lang="en-US" sz="1200" b="0" i="0" kern="1200" dirty="0">
+                <a:solidFill>
+                  <a:schemeClr val="tx1"/>
+                </a:solidFill>
+                <a:effectLst/>
+                <a:latin typeface="+mn-lt"/>
+                <a:ea typeface="+mn-ea"/>
+                <a:cs typeface="+mn-cs"/>
+              </a:rPr>
+              <a:t>As we can see we are trying to invoke </a:t>
+            </a:r>
+            <a:r>
+              <a:rPr lang="en-US" sz="1200" b="0" i="0" u="none" strike="noStrike" kern="1200" baseline="0" dirty="0" err="1">
+                <a:solidFill>
+                  <a:schemeClr val="tx1"/>
+                </a:solidFill>
+                <a:latin typeface="+mn-lt"/>
+                <a:ea typeface="+mn-ea"/>
+                <a:cs typeface="+mn-cs"/>
+              </a:rPr>
+              <a:t>cowSays</a:t>
+            </a:r>
+            <a:r>
+              <a:rPr lang="en-US" sz="1200" b="0" i="0" u="none" strike="noStrike" kern="1200" baseline="0" dirty="0">
+                <a:solidFill>
+                  <a:schemeClr val="tx1"/>
+                </a:solidFill>
+                <a:latin typeface="+mn-lt"/>
+                <a:ea typeface="+mn-ea"/>
+                <a:cs typeface="+mn-cs"/>
+              </a:rPr>
+              <a:t> function but we didn’t assign it yet to this variable.</a:t>
+            </a:r>
+          </a:p>
+          <a:p>
+            <a:pPr marL="0" marR="0" lvl="0" indent="0" algn="l" defTabSz="914400" rtl="0" eaLnBrk="1" fontAlgn="auto" latinLnBrk="0" hangingPunct="1">
+              <a:lnSpc>
+                <a:spcPct val="100000"/>
+              </a:lnSpc>
+              <a:spcBef>
+                <a:spcPts val="0"/>
+              </a:spcBef>
+              <a:spcAft>
+                <a:spcPts val="0"/>
+              </a:spcAft>
+              <a:buClrTx/>
+              <a:buSzTx/>
+              <a:buFontTx/>
+              <a:buNone/>
+              <a:tabLst/>
+              <a:defRPr/>
+            </a:pPr>
+            <a:endParaRPr lang="en-US" sz="1200" b="0" i="0" u="none" strike="noStrike" kern="1200" baseline="0" dirty="0">
+              <a:solidFill>
+                <a:schemeClr val="tx1"/>
+              </a:solidFill>
+              <a:latin typeface="+mn-lt"/>
+              <a:ea typeface="+mn-ea"/>
+              <a:cs typeface="+mn-cs"/>
+            </a:endParaRPr>
+          </a:p>
+          <a:p>
+            <a:pPr marL="171450" marR="0" lvl="0" indent="-171450" algn="l" defTabSz="914400" rtl="0" eaLnBrk="1" fontAlgn="auto" latinLnBrk="0" hangingPunct="1">
+              <a:lnSpc>
+                <a:spcPct val="100000"/>
+              </a:lnSpc>
+              <a:spcBef>
+                <a:spcPts val="0"/>
+              </a:spcBef>
+              <a:spcAft>
+                <a:spcPts val="0"/>
+              </a:spcAft>
+              <a:buClrTx/>
+              <a:buSzTx/>
+              <a:buFont typeface="Arial" panose="020B0604020202020204" pitchFamily="34" charset="0"/>
+              <a:buChar char="•"/>
+              <a:tabLst/>
+              <a:defRPr/>
+            </a:pPr>
+            <a:r>
+              <a:rPr lang="en-US" sz="1200" b="0" i="0" u="none" strike="noStrike" kern="1200" baseline="0" dirty="0">
+                <a:solidFill>
+                  <a:schemeClr val="tx1"/>
+                </a:solidFill>
+                <a:latin typeface="+mn-lt"/>
+                <a:ea typeface="+mn-ea"/>
+                <a:cs typeface="+mn-cs"/>
+              </a:rPr>
+              <a:t>Fifth Example:</a:t>
+            </a:r>
+          </a:p>
+          <a:p>
+            <a:pPr marL="0" marR="0" lvl="0" indent="0" algn="l" defTabSz="914400" rtl="0" eaLnBrk="1" fontAlgn="auto" latinLnBrk="0" hangingPunct="1">
+              <a:lnSpc>
+                <a:spcPct val="100000"/>
+              </a:lnSpc>
+              <a:spcBef>
+                <a:spcPts val="0"/>
+              </a:spcBef>
+              <a:spcAft>
+                <a:spcPts val="0"/>
+              </a:spcAft>
+              <a:buClrTx/>
+              <a:buSzTx/>
+              <a:buFont typeface="Arial" panose="020B0604020202020204" pitchFamily="34" charset="0"/>
+              <a:buNone/>
+              <a:tabLst/>
+              <a:defRPr/>
+            </a:pPr>
+            <a:r>
+              <a:rPr lang="en-US" sz="1200" b="0" i="0" u="none" strike="noStrike" kern="1200" baseline="0" dirty="0">
+                <a:solidFill>
+                  <a:schemeClr val="tx1"/>
+                </a:solidFill>
+                <a:latin typeface="+mn-lt"/>
+                <a:ea typeface="+mn-ea"/>
+                <a:cs typeface="+mn-cs"/>
+              </a:rPr>
+              <a:t>But, how code inside function will behaved?</a:t>
+            </a:r>
             <a:endParaRPr lang="en-US" b="0" dirty="0"/>
+          </a:p>
+          <a:p>
+            <a:pPr marL="0" marR="0" lvl="0" indent="0" algn="l" defTabSz="914400" rtl="0" eaLnBrk="1" fontAlgn="auto" latinLnBrk="0" hangingPunct="1">
+              <a:lnSpc>
+                <a:spcPct val="100000"/>
+              </a:lnSpc>
+              <a:spcBef>
+                <a:spcPts val="0"/>
+              </a:spcBef>
+              <a:spcAft>
+                <a:spcPts val="0"/>
+              </a:spcAft>
+              <a:buClrTx/>
+              <a:buSzTx/>
+              <a:buFontTx/>
+              <a:buNone/>
+              <a:tabLst/>
+              <a:defRPr/>
+            </a:pPr>
+            <a:r>
+              <a:rPr lang="en-US" b="0" dirty="0"/>
+              <a:t>In function we have internal scope so it will behave same as before but just inside the function, if we will take a look at left side then message declaration will move to the top of function scope -&gt; then we will print message -&gt; assigning string to the message</a:t>
+            </a:r>
           </a:p>
         </p:txBody>
       </p:sp>
@@ -14654,7 +16164,7 @@
     </p:spTree>
     <p:extLst>
       <p:ext uri="{BB962C8B-B14F-4D97-AF65-F5344CB8AC3E}">
-        <p14:creationId xmlns:p14="http://schemas.microsoft.com/office/powerpoint/2010/main" val="3568349639"/>
+        <p14:creationId xmlns:p14="http://schemas.microsoft.com/office/powerpoint/2010/main" val="2282709534"/>
       </p:ext>
     </p:extLst>
   </p:cSld>
@@ -14725,6 +16235,1137 @@
               <a:tabLst/>
               <a:defRPr/>
             </a:pPr>
+            <a:r>
+              <a:rPr lang="en-US" b="0" dirty="0"/>
+              <a:t>JS unlike Java is a weak typing, which means we don’t need to declare the type of the variable,</a:t>
+            </a:r>
+          </a:p>
+          <a:p>
+            <a:pPr marL="0" marR="0" lvl="0" indent="0" algn="l" defTabSz="914400" rtl="0" eaLnBrk="1" fontAlgn="auto" latinLnBrk="0" hangingPunct="1">
+              <a:lnSpc>
+                <a:spcPct val="100000"/>
+              </a:lnSpc>
+              <a:spcBef>
+                <a:spcPts val="0"/>
+              </a:spcBef>
+              <a:spcAft>
+                <a:spcPts val="0"/>
+              </a:spcAft>
+              <a:buClrTx/>
+              <a:buSzTx/>
+              <a:buFontTx/>
+              <a:buNone/>
+              <a:tabLst/>
+              <a:defRPr/>
+            </a:pPr>
+            <a:r>
+              <a:rPr lang="en-US" b="0" dirty="0"/>
+              <a:t>In java for example we have string, </a:t>
+            </a:r>
+            <a:r>
+              <a:rPr lang="en-US" b="0" dirty="0" err="1"/>
+              <a:t>init</a:t>
+            </a:r>
+            <a:r>
+              <a:rPr lang="en-US" b="0" dirty="0"/>
+              <a:t>, double, etc.</a:t>
+            </a:r>
+          </a:p>
+          <a:p>
+            <a:pPr marL="0" marR="0" lvl="0" indent="0" algn="l" defTabSz="914400" rtl="0" eaLnBrk="1" fontAlgn="auto" latinLnBrk="0" hangingPunct="1">
+              <a:lnSpc>
+                <a:spcPct val="100000"/>
+              </a:lnSpc>
+              <a:spcBef>
+                <a:spcPts val="0"/>
+              </a:spcBef>
+              <a:spcAft>
+                <a:spcPts val="0"/>
+              </a:spcAft>
+              <a:buClrTx/>
+              <a:buSzTx/>
+              <a:buFontTx/>
+              <a:buNone/>
+              <a:tabLst/>
+              <a:defRPr/>
+            </a:pPr>
+            <a:r>
+              <a:rPr lang="en-US" b="0" dirty="0"/>
+              <a:t>In JS we have just </a:t>
+            </a:r>
+            <a:r>
+              <a:rPr lang="en-US" b="0" dirty="0" err="1"/>
+              <a:t>var</a:t>
+            </a:r>
+            <a:r>
+              <a:rPr lang="en-US" b="0" dirty="0"/>
+              <a:t>,</a:t>
+            </a:r>
+          </a:p>
+          <a:p>
+            <a:pPr marL="0" marR="0" lvl="0" indent="0" algn="l" defTabSz="914400" rtl="0" eaLnBrk="1" fontAlgn="auto" latinLnBrk="0" hangingPunct="1">
+              <a:lnSpc>
+                <a:spcPct val="100000"/>
+              </a:lnSpc>
+              <a:spcBef>
+                <a:spcPts val="0"/>
+              </a:spcBef>
+              <a:spcAft>
+                <a:spcPts val="0"/>
+              </a:spcAft>
+              <a:buClrTx/>
+              <a:buSzTx/>
+              <a:buFontTx/>
+              <a:buNone/>
+              <a:tabLst/>
+              <a:defRPr/>
+            </a:pPr>
+            <a:r>
+              <a:rPr lang="en-US" b="0" dirty="0"/>
+              <a:t>And this is was the case until ES6, over there was added 2 more </a:t>
+            </a:r>
+            <a:r>
+              <a:rPr lang="en-US" sz="1200" b="0" i="0" kern="1200" dirty="0">
+                <a:solidFill>
+                  <a:schemeClr val="tx1"/>
+                </a:solidFill>
+                <a:effectLst/>
+                <a:latin typeface="+mn-lt"/>
+                <a:ea typeface="+mn-ea"/>
+                <a:cs typeface="+mn-cs"/>
+              </a:rPr>
+              <a:t>keyword</a:t>
+            </a:r>
+            <a:r>
+              <a:rPr lang="en-US" b="0" dirty="0"/>
+              <a:t>, let &amp; const.</a:t>
+            </a:r>
+          </a:p>
+          <a:p>
+            <a:pPr marL="0" marR="0" lvl="0" indent="0" algn="l" defTabSz="914400" rtl="0" eaLnBrk="1" fontAlgn="auto" latinLnBrk="0" hangingPunct="1">
+              <a:lnSpc>
+                <a:spcPct val="100000"/>
+              </a:lnSpc>
+              <a:spcBef>
+                <a:spcPts val="0"/>
+              </a:spcBef>
+              <a:spcAft>
+                <a:spcPts val="0"/>
+              </a:spcAft>
+              <a:buClrTx/>
+              <a:buSzTx/>
+              <a:buFontTx/>
+              <a:buNone/>
+              <a:tabLst/>
+              <a:defRPr/>
+            </a:pPr>
+            <a:endParaRPr lang="en-US" b="0" dirty="0"/>
+          </a:p>
+          <a:p>
+            <a:pPr marL="0" marR="0" lvl="0" indent="0" algn="l" defTabSz="914400" rtl="0" eaLnBrk="1" fontAlgn="auto" latinLnBrk="0" hangingPunct="1">
+              <a:lnSpc>
+                <a:spcPct val="100000"/>
+              </a:lnSpc>
+              <a:spcBef>
+                <a:spcPts val="0"/>
+              </a:spcBef>
+              <a:spcAft>
+                <a:spcPts val="0"/>
+              </a:spcAft>
+              <a:buClrTx/>
+              <a:buSzTx/>
+              <a:buFontTx/>
+              <a:buNone/>
+              <a:tabLst/>
+              <a:defRPr/>
+            </a:pPr>
+            <a:r>
+              <a:rPr lang="en-US" b="0" dirty="0"/>
+              <a:t>So what is the different between them?</a:t>
+            </a:r>
+          </a:p>
+          <a:p>
+            <a:pPr marL="0" marR="0" lvl="0" indent="0" algn="l" defTabSz="914400" rtl="0" eaLnBrk="1" fontAlgn="auto" latinLnBrk="0" hangingPunct="1">
+              <a:lnSpc>
+                <a:spcPct val="100000"/>
+              </a:lnSpc>
+              <a:spcBef>
+                <a:spcPts val="0"/>
+              </a:spcBef>
+              <a:spcAft>
+                <a:spcPts val="0"/>
+              </a:spcAft>
+              <a:buClrTx/>
+              <a:buSzTx/>
+              <a:buFontTx/>
+              <a:buNone/>
+              <a:tabLst/>
+              <a:defRPr/>
+            </a:pPr>
+            <a:endParaRPr lang="en-US" b="0" dirty="0"/>
+          </a:p>
+          <a:p>
+            <a:pPr marL="0" marR="0" lvl="0" indent="0" algn="l" defTabSz="914400" rtl="0" eaLnBrk="1" fontAlgn="auto" latinLnBrk="0" hangingPunct="1">
+              <a:lnSpc>
+                <a:spcPct val="100000"/>
+              </a:lnSpc>
+              <a:spcBef>
+                <a:spcPts val="0"/>
+              </a:spcBef>
+              <a:spcAft>
+                <a:spcPts val="0"/>
+              </a:spcAft>
+              <a:buClrTx/>
+              <a:buSzTx/>
+              <a:buFontTx/>
+              <a:buNone/>
+              <a:tabLst/>
+              <a:defRPr/>
+            </a:pPr>
+            <a:r>
+              <a:rPr lang="en-US" b="0" dirty="0"/>
+              <a:t>So let recap, we have global scope &amp; we have function scope (local scope), when es6 was introduce we have also </a:t>
+            </a:r>
+            <a:r>
+              <a:rPr lang="en-US" sz="1200" b="0" i="0" kern="1200" dirty="0">
+                <a:solidFill>
+                  <a:schemeClr val="tx1"/>
+                </a:solidFill>
+                <a:effectLst/>
+                <a:latin typeface="+mn-lt"/>
+                <a:ea typeface="+mn-ea"/>
+                <a:cs typeface="+mn-cs"/>
+              </a:rPr>
+              <a:t>block scoped.</a:t>
+            </a:r>
+          </a:p>
+          <a:p>
+            <a:pPr marL="0" marR="0" lvl="0" indent="0" algn="l" defTabSz="914400" rtl="0" eaLnBrk="1" fontAlgn="auto" latinLnBrk="0" hangingPunct="1">
+              <a:lnSpc>
+                <a:spcPct val="100000"/>
+              </a:lnSpc>
+              <a:spcBef>
+                <a:spcPts val="0"/>
+              </a:spcBef>
+              <a:spcAft>
+                <a:spcPts val="0"/>
+              </a:spcAft>
+              <a:buClrTx/>
+              <a:buSzTx/>
+              <a:buFontTx/>
+              <a:buNone/>
+              <a:tabLst/>
+              <a:defRPr/>
+            </a:pPr>
+            <a:endParaRPr lang="en-US" b="0" dirty="0"/>
+          </a:p>
+          <a:p>
+            <a:pPr marL="0" marR="0" lvl="0" indent="0" algn="l" defTabSz="914400" rtl="0" eaLnBrk="1" fontAlgn="auto" latinLnBrk="0" hangingPunct="1">
+              <a:lnSpc>
+                <a:spcPct val="100000"/>
+              </a:lnSpc>
+              <a:spcBef>
+                <a:spcPts val="0"/>
+              </a:spcBef>
+              <a:spcAft>
+                <a:spcPts val="0"/>
+              </a:spcAft>
+              <a:buClrTx/>
+              <a:buSzTx/>
+              <a:buFontTx/>
+              <a:buNone/>
+              <a:tabLst/>
+              <a:defRPr/>
+            </a:pPr>
+            <a:r>
+              <a:rPr lang="en-US" b="0" dirty="0"/>
+              <a:t>Let:</a:t>
+            </a:r>
+          </a:p>
+          <a:p>
+            <a:pPr marL="0" marR="0" lvl="0" indent="0" algn="l" defTabSz="914400" rtl="0" eaLnBrk="1" fontAlgn="auto" latinLnBrk="0" hangingPunct="1">
+              <a:lnSpc>
+                <a:spcPct val="100000"/>
+              </a:lnSpc>
+              <a:spcBef>
+                <a:spcPts val="0"/>
+              </a:spcBef>
+              <a:spcAft>
+                <a:spcPts val="0"/>
+              </a:spcAft>
+              <a:buClrTx/>
+              <a:buSzTx/>
+              <a:buFontTx/>
+              <a:buNone/>
+              <a:tabLst/>
+              <a:defRPr/>
+            </a:pPr>
+            <a:r>
+              <a:rPr lang="en-US" sz="1200" b="0" i="0" kern="1200" dirty="0">
+                <a:solidFill>
+                  <a:schemeClr val="tx1"/>
+                </a:solidFill>
+                <a:effectLst/>
+                <a:latin typeface="+mn-lt"/>
+                <a:ea typeface="+mn-ea"/>
+                <a:cs typeface="+mn-cs"/>
+              </a:rPr>
+              <a:t>Unlike variables declared with </a:t>
+            </a:r>
+            <a:r>
+              <a:rPr lang="en-US" dirty="0" err="1"/>
+              <a:t>var</a:t>
+            </a:r>
+            <a:r>
+              <a:rPr lang="en-US" sz="1200" b="0" i="0" kern="1200" dirty="0">
+                <a:solidFill>
+                  <a:schemeClr val="tx1"/>
+                </a:solidFill>
+                <a:effectLst/>
+                <a:latin typeface="+mn-lt"/>
+                <a:ea typeface="+mn-ea"/>
+                <a:cs typeface="+mn-cs"/>
+              </a:rPr>
+              <a:t> that are function-scoped, variables declared with </a:t>
+            </a:r>
+            <a:r>
+              <a:rPr lang="en-US" dirty="0"/>
+              <a:t>let</a:t>
+            </a:r>
+            <a:r>
+              <a:rPr lang="en-US" sz="1200" b="0" i="0" kern="1200" dirty="0">
+                <a:solidFill>
+                  <a:schemeClr val="tx1"/>
+                </a:solidFill>
+                <a:effectLst/>
+                <a:latin typeface="+mn-lt"/>
+                <a:ea typeface="+mn-ea"/>
+                <a:cs typeface="+mn-cs"/>
+              </a:rPr>
+              <a:t> are block-scoped: they only exist in the block they are defined in.</a:t>
+            </a:r>
+          </a:p>
+          <a:p>
+            <a:pPr marL="171450" marR="0" lvl="0" indent="-171450" algn="l" defTabSz="914400" rtl="0" eaLnBrk="1" fontAlgn="auto" latinLnBrk="0" hangingPunct="1">
+              <a:lnSpc>
+                <a:spcPct val="100000"/>
+              </a:lnSpc>
+              <a:spcBef>
+                <a:spcPts val="0"/>
+              </a:spcBef>
+              <a:spcAft>
+                <a:spcPts val="0"/>
+              </a:spcAft>
+              <a:buClrTx/>
+              <a:buSzTx/>
+              <a:buFont typeface="Arial" panose="020B0604020202020204" pitchFamily="34" charset="0"/>
+              <a:buChar char="•"/>
+              <a:tabLst/>
+              <a:defRPr/>
+            </a:pPr>
+            <a:r>
+              <a:rPr lang="en-US" sz="1200" b="0" i="0" kern="1200" dirty="0">
+                <a:solidFill>
+                  <a:schemeClr val="tx1"/>
+                </a:solidFill>
+                <a:effectLst/>
+                <a:latin typeface="+mn-lt"/>
+                <a:ea typeface="+mn-ea"/>
+                <a:cs typeface="+mn-cs"/>
+              </a:rPr>
+              <a:t>Declares a local variable in block scope</a:t>
+            </a:r>
+          </a:p>
+          <a:p>
+            <a:pPr marL="171450" marR="0" lvl="0" indent="-171450" algn="l" defTabSz="914400" rtl="0" eaLnBrk="1" fontAlgn="auto" latinLnBrk="0" hangingPunct="1">
+              <a:lnSpc>
+                <a:spcPct val="100000"/>
+              </a:lnSpc>
+              <a:spcBef>
+                <a:spcPts val="0"/>
+              </a:spcBef>
+              <a:spcAft>
+                <a:spcPts val="0"/>
+              </a:spcAft>
+              <a:buClrTx/>
+              <a:buSzTx/>
+              <a:buFont typeface="Arial" panose="020B0604020202020204" pitchFamily="34" charset="0"/>
+              <a:buChar char="•"/>
+              <a:tabLst/>
+              <a:defRPr/>
+            </a:pPr>
+            <a:r>
+              <a:rPr lang="en-US" sz="1200" b="0" i="0" kern="1200" dirty="0">
+                <a:solidFill>
+                  <a:schemeClr val="tx1"/>
+                </a:solidFill>
+                <a:effectLst/>
+                <a:latin typeface="+mn-lt"/>
+                <a:ea typeface="+mn-ea"/>
+                <a:cs typeface="+mn-cs"/>
+              </a:rPr>
+              <a:t>Can declared only once, but value can be changes </a:t>
+            </a:r>
+          </a:p>
+          <a:p>
+            <a:pPr marL="171450" marR="0" lvl="0" indent="-171450" algn="l" defTabSz="914400" rtl="0" eaLnBrk="1" fontAlgn="auto" latinLnBrk="0" hangingPunct="1">
+              <a:lnSpc>
+                <a:spcPct val="100000"/>
+              </a:lnSpc>
+              <a:spcBef>
+                <a:spcPts val="0"/>
+              </a:spcBef>
+              <a:spcAft>
+                <a:spcPts val="0"/>
+              </a:spcAft>
+              <a:buClrTx/>
+              <a:buSzTx/>
+              <a:buFont typeface="Arial" panose="020B0604020202020204" pitchFamily="34" charset="0"/>
+              <a:buChar char="•"/>
+              <a:tabLst/>
+              <a:defRPr/>
+            </a:pPr>
+            <a:r>
+              <a:rPr lang="en-US" sz="1200" b="0" i="0" kern="1200" dirty="0">
+                <a:solidFill>
+                  <a:schemeClr val="tx1"/>
+                </a:solidFill>
+                <a:effectLst/>
+                <a:latin typeface="+mn-lt"/>
+                <a:ea typeface="+mn-ea"/>
+                <a:cs typeface="+mn-cs"/>
+              </a:rPr>
+              <a:t>It’s not hoisted</a:t>
+            </a:r>
+          </a:p>
+          <a:p>
+            <a:pPr marL="171450" marR="0" lvl="0" indent="-171450" algn="l" defTabSz="914400" rtl="0" eaLnBrk="1" fontAlgn="auto" latinLnBrk="0" hangingPunct="1">
+              <a:lnSpc>
+                <a:spcPct val="100000"/>
+              </a:lnSpc>
+              <a:spcBef>
+                <a:spcPts val="0"/>
+              </a:spcBef>
+              <a:spcAft>
+                <a:spcPts val="0"/>
+              </a:spcAft>
+              <a:buClrTx/>
+              <a:buSzTx/>
+              <a:buFont typeface="Arial" panose="020B0604020202020204" pitchFamily="34" charset="0"/>
+              <a:buChar char="•"/>
+              <a:tabLst/>
+              <a:defRPr/>
+            </a:pPr>
+            <a:endParaRPr lang="en-US" sz="1200" b="0" i="0" kern="1200" dirty="0">
+              <a:solidFill>
+                <a:schemeClr val="tx1"/>
+              </a:solidFill>
+              <a:effectLst/>
+              <a:latin typeface="+mn-lt"/>
+              <a:ea typeface="+mn-ea"/>
+              <a:cs typeface="+mn-cs"/>
+            </a:endParaRPr>
+          </a:p>
+          <a:p>
+            <a:pPr marL="0" marR="0" lvl="0" indent="0" algn="l" defTabSz="914400" rtl="0" eaLnBrk="1" fontAlgn="auto" latinLnBrk="0" hangingPunct="1">
+              <a:lnSpc>
+                <a:spcPct val="100000"/>
+              </a:lnSpc>
+              <a:spcBef>
+                <a:spcPts val="0"/>
+              </a:spcBef>
+              <a:spcAft>
+                <a:spcPts val="0"/>
+              </a:spcAft>
+              <a:buClrTx/>
+              <a:buSzTx/>
+              <a:buFont typeface="Arial" panose="020B0604020202020204" pitchFamily="34" charset="0"/>
+              <a:buNone/>
+              <a:tabLst/>
+              <a:defRPr/>
+            </a:pPr>
+            <a:r>
+              <a:rPr lang="en-US" sz="1200" b="0" i="0" kern="1200" dirty="0" err="1">
+                <a:solidFill>
+                  <a:schemeClr val="tx1"/>
+                </a:solidFill>
+                <a:effectLst/>
+                <a:latin typeface="+mn-lt"/>
+                <a:ea typeface="+mn-ea"/>
+                <a:cs typeface="+mn-cs"/>
+              </a:rPr>
+              <a:t>Const</a:t>
+            </a:r>
+            <a:r>
+              <a:rPr lang="en-US" sz="1200" b="0" i="0" kern="1200" dirty="0">
+                <a:solidFill>
+                  <a:schemeClr val="tx1"/>
+                </a:solidFill>
+                <a:effectLst/>
+                <a:latin typeface="+mn-lt"/>
+                <a:ea typeface="+mn-ea"/>
+                <a:cs typeface="+mn-cs"/>
+              </a:rPr>
+              <a:t>:</a:t>
+            </a:r>
+          </a:p>
+          <a:p>
+            <a:pPr marL="0" marR="0" lvl="0" indent="0" algn="l" defTabSz="914400" rtl="0" eaLnBrk="1" fontAlgn="auto" latinLnBrk="0" hangingPunct="1">
+              <a:lnSpc>
+                <a:spcPct val="100000"/>
+              </a:lnSpc>
+              <a:spcBef>
+                <a:spcPts val="0"/>
+              </a:spcBef>
+              <a:spcAft>
+                <a:spcPts val="0"/>
+              </a:spcAft>
+              <a:buClrTx/>
+              <a:buSzTx/>
+              <a:buFont typeface="Arial" panose="020B0604020202020204" pitchFamily="34" charset="0"/>
+              <a:buNone/>
+              <a:tabLst/>
+              <a:defRPr/>
+            </a:pPr>
+            <a:r>
+              <a:rPr lang="en-US" sz="1200" b="0" i="0" kern="1200" dirty="0" err="1">
+                <a:solidFill>
+                  <a:schemeClr val="tx1"/>
+                </a:solidFill>
+                <a:effectLst/>
+                <a:latin typeface="+mn-lt"/>
+                <a:ea typeface="+mn-ea"/>
+                <a:cs typeface="+mn-cs"/>
+              </a:rPr>
+              <a:t>Const</a:t>
+            </a:r>
+            <a:r>
+              <a:rPr lang="en-US" sz="1200" b="0" i="0" kern="1200" dirty="0">
+                <a:solidFill>
+                  <a:schemeClr val="tx1"/>
+                </a:solidFill>
+                <a:effectLst/>
+                <a:latin typeface="+mn-lt"/>
+                <a:ea typeface="+mn-ea"/>
+                <a:cs typeface="+mn-cs"/>
+              </a:rPr>
+              <a:t> behaves in a very similar way to let, however, one key difference. Once variable declared using </a:t>
+            </a:r>
+            <a:r>
+              <a:rPr lang="en-US" sz="1200" b="0" i="0" kern="1200" dirty="0" err="1">
+                <a:solidFill>
+                  <a:schemeClr val="tx1"/>
+                </a:solidFill>
+                <a:effectLst/>
+                <a:latin typeface="+mn-lt"/>
+                <a:ea typeface="+mn-ea"/>
+                <a:cs typeface="+mn-cs"/>
+              </a:rPr>
+              <a:t>const</a:t>
+            </a:r>
+            <a:r>
+              <a:rPr lang="en-US" sz="1200" b="0" i="0" kern="1200" dirty="0">
+                <a:solidFill>
+                  <a:schemeClr val="tx1"/>
+                </a:solidFill>
+                <a:effectLst/>
+                <a:latin typeface="+mn-lt"/>
+                <a:ea typeface="+mn-ea"/>
+                <a:cs typeface="+mn-cs"/>
+              </a:rPr>
+              <a:t> keyword is assigned a value, you cannot reassign it.  You also need to initialize the variable immediately when declaring it.</a:t>
+            </a:r>
+          </a:p>
+          <a:p>
+            <a:pPr marL="171450" marR="0" lvl="0" indent="-171450" algn="l" defTabSz="914400" rtl="0" eaLnBrk="1" fontAlgn="auto" latinLnBrk="0" hangingPunct="1">
+              <a:lnSpc>
+                <a:spcPct val="100000"/>
+              </a:lnSpc>
+              <a:spcBef>
+                <a:spcPts val="0"/>
+              </a:spcBef>
+              <a:spcAft>
+                <a:spcPts val="0"/>
+              </a:spcAft>
+              <a:buClrTx/>
+              <a:buSzTx/>
+              <a:buFont typeface="Arial" panose="020B0604020202020204" pitchFamily="34" charset="0"/>
+              <a:buChar char="•"/>
+              <a:tabLst/>
+              <a:defRPr/>
+            </a:pPr>
+            <a:r>
+              <a:rPr lang="en-US" sz="1200" b="0" i="0" kern="1200" dirty="0">
+                <a:solidFill>
+                  <a:schemeClr val="tx1"/>
+                </a:solidFill>
+                <a:effectLst/>
+                <a:latin typeface="+mn-lt"/>
+                <a:ea typeface="+mn-ea"/>
+                <a:cs typeface="+mn-cs"/>
+              </a:rPr>
+              <a:t>Declares a local variable in block scope</a:t>
+            </a:r>
+          </a:p>
+          <a:p>
+            <a:pPr marL="171450" marR="0" lvl="0" indent="-171450" algn="l" defTabSz="914400" rtl="0" eaLnBrk="1" fontAlgn="auto" latinLnBrk="0" hangingPunct="1">
+              <a:lnSpc>
+                <a:spcPct val="100000"/>
+              </a:lnSpc>
+              <a:spcBef>
+                <a:spcPts val="0"/>
+              </a:spcBef>
+              <a:spcAft>
+                <a:spcPts val="0"/>
+              </a:spcAft>
+              <a:buClrTx/>
+              <a:buSzTx/>
+              <a:buFont typeface="Arial" panose="020B0604020202020204" pitchFamily="34" charset="0"/>
+              <a:buChar char="•"/>
+              <a:tabLst/>
+              <a:defRPr/>
+            </a:pPr>
+            <a:r>
+              <a:rPr lang="en-US" sz="1200" b="0" i="0" kern="1200" dirty="0">
+                <a:solidFill>
+                  <a:schemeClr val="tx1"/>
+                </a:solidFill>
+                <a:effectLst/>
+                <a:latin typeface="+mn-lt"/>
+                <a:ea typeface="+mn-ea"/>
+                <a:cs typeface="+mn-cs"/>
+              </a:rPr>
+              <a:t>Can declared only once &amp; value must be assigned</a:t>
+            </a:r>
+          </a:p>
+          <a:p>
+            <a:pPr marL="171450" marR="0" lvl="0" indent="-171450" algn="l" defTabSz="914400" rtl="0" eaLnBrk="1" fontAlgn="auto" latinLnBrk="0" hangingPunct="1">
+              <a:lnSpc>
+                <a:spcPct val="100000"/>
+              </a:lnSpc>
+              <a:spcBef>
+                <a:spcPts val="0"/>
+              </a:spcBef>
+              <a:spcAft>
+                <a:spcPts val="0"/>
+              </a:spcAft>
+              <a:buClrTx/>
+              <a:buSzTx/>
+              <a:buFont typeface="Arial" panose="020B0604020202020204" pitchFamily="34" charset="0"/>
+              <a:buChar char="•"/>
+              <a:tabLst/>
+              <a:defRPr/>
+            </a:pPr>
+            <a:r>
+              <a:rPr lang="en-US" sz="1200" b="0" i="0" kern="1200" dirty="0">
+                <a:solidFill>
+                  <a:schemeClr val="tx1"/>
+                </a:solidFill>
+                <a:effectLst/>
+                <a:latin typeface="+mn-lt"/>
+                <a:ea typeface="+mn-ea"/>
+                <a:cs typeface="+mn-cs"/>
+              </a:rPr>
+              <a:t>It’s not hoisted</a:t>
+            </a:r>
+          </a:p>
+          <a:p>
+            <a:pPr marL="171450" marR="0" lvl="0" indent="-171450" algn="l" defTabSz="914400" rtl="0" eaLnBrk="1" fontAlgn="auto" latinLnBrk="0" hangingPunct="1">
+              <a:lnSpc>
+                <a:spcPct val="100000"/>
+              </a:lnSpc>
+              <a:spcBef>
+                <a:spcPts val="0"/>
+              </a:spcBef>
+              <a:spcAft>
+                <a:spcPts val="0"/>
+              </a:spcAft>
+              <a:buClrTx/>
+              <a:buSzTx/>
+              <a:buFont typeface="Arial" panose="020B0604020202020204" pitchFamily="34" charset="0"/>
+              <a:buChar char="•"/>
+              <a:tabLst/>
+              <a:defRPr/>
+            </a:pPr>
+            <a:r>
+              <a:rPr lang="en-US" sz="1200" b="0" i="0" kern="1200" dirty="0">
+                <a:solidFill>
+                  <a:schemeClr val="tx1"/>
+                </a:solidFill>
+                <a:effectLst/>
+                <a:latin typeface="+mn-lt"/>
+                <a:ea typeface="+mn-ea"/>
+                <a:cs typeface="+mn-cs"/>
+              </a:rPr>
+              <a:t>It’s only reference locked but you can change nested object values</a:t>
+            </a:r>
+          </a:p>
+          <a:p>
+            <a:pPr marL="0" marR="0" lvl="0" indent="0" algn="l" defTabSz="914400" rtl="0" eaLnBrk="1" fontAlgn="auto" latinLnBrk="0" hangingPunct="1">
+              <a:lnSpc>
+                <a:spcPct val="100000"/>
+              </a:lnSpc>
+              <a:spcBef>
+                <a:spcPts val="0"/>
+              </a:spcBef>
+              <a:spcAft>
+                <a:spcPts val="0"/>
+              </a:spcAft>
+              <a:buClrTx/>
+              <a:buSzTx/>
+              <a:buFontTx/>
+              <a:buNone/>
+              <a:tabLst/>
+              <a:defRPr/>
+            </a:pPr>
+            <a:endParaRPr lang="en-US" sz="1200" b="0" i="0" kern="1200" dirty="0">
+              <a:solidFill>
+                <a:schemeClr val="tx1"/>
+              </a:solidFill>
+              <a:effectLst/>
+              <a:latin typeface="+mn-lt"/>
+              <a:ea typeface="+mn-ea"/>
+              <a:cs typeface="+mn-cs"/>
+            </a:endParaRPr>
+          </a:p>
+          <a:p>
+            <a:pPr marL="0" marR="0" lvl="0" indent="0" algn="l" defTabSz="914400" rtl="0" eaLnBrk="1" fontAlgn="auto" latinLnBrk="0" hangingPunct="1">
+              <a:lnSpc>
+                <a:spcPct val="100000"/>
+              </a:lnSpc>
+              <a:spcBef>
+                <a:spcPts val="0"/>
+              </a:spcBef>
+              <a:spcAft>
+                <a:spcPts val="0"/>
+              </a:spcAft>
+              <a:buClrTx/>
+              <a:buSzTx/>
+              <a:buFontTx/>
+              <a:buNone/>
+              <a:tabLst/>
+              <a:defRPr/>
+            </a:pPr>
+            <a:r>
+              <a:rPr lang="en-US" sz="1200" b="0" i="0" kern="1200" dirty="0">
+                <a:solidFill>
+                  <a:schemeClr val="tx1"/>
+                </a:solidFill>
+                <a:effectLst/>
+                <a:latin typeface="+mn-lt"/>
+                <a:ea typeface="+mn-ea"/>
+                <a:cs typeface="+mn-cs"/>
+              </a:rPr>
+              <a:t>To make a real </a:t>
+            </a:r>
+            <a:r>
+              <a:rPr lang="en-US" sz="1200" b="0" i="0" kern="1200" dirty="0" err="1">
+                <a:solidFill>
+                  <a:schemeClr val="tx1"/>
+                </a:solidFill>
+                <a:effectLst/>
+                <a:latin typeface="+mn-lt"/>
+                <a:ea typeface="+mn-ea"/>
+                <a:cs typeface="+mn-cs"/>
+              </a:rPr>
+              <a:t>const</a:t>
+            </a:r>
+            <a:r>
+              <a:rPr lang="en-US" sz="1200" b="0" i="0" kern="1200" dirty="0">
+                <a:solidFill>
+                  <a:schemeClr val="tx1"/>
+                </a:solidFill>
+                <a:effectLst/>
+                <a:latin typeface="+mn-lt"/>
+                <a:ea typeface="+mn-ea"/>
+                <a:cs typeface="+mn-cs"/>
+              </a:rPr>
+              <a:t> object just use </a:t>
+            </a:r>
+            <a:r>
+              <a:rPr lang="en-US" sz="1200" b="0" i="0" kern="1200" dirty="0" err="1">
+                <a:solidFill>
+                  <a:schemeClr val="tx1"/>
+                </a:solidFill>
+                <a:effectLst/>
+                <a:latin typeface="+mn-lt"/>
+                <a:ea typeface="+mn-ea"/>
+                <a:cs typeface="+mn-cs"/>
+              </a:rPr>
+              <a:t>Object.freeze</a:t>
+            </a:r>
+            <a:r>
+              <a:rPr lang="en-US" sz="1200" b="0" i="0" kern="1200" dirty="0">
+                <a:solidFill>
+                  <a:schemeClr val="tx1"/>
+                </a:solidFill>
+                <a:effectLst/>
+                <a:latin typeface="+mn-lt"/>
+                <a:ea typeface="+mn-ea"/>
+                <a:cs typeface="+mn-cs"/>
+              </a:rPr>
+              <a:t> method.</a:t>
+            </a:r>
+          </a:p>
+          <a:p>
+            <a:pPr marL="0" marR="0" lvl="0" indent="0" algn="l" defTabSz="914400" rtl="0" eaLnBrk="1" fontAlgn="auto" latinLnBrk="0" hangingPunct="1">
+              <a:lnSpc>
+                <a:spcPct val="100000"/>
+              </a:lnSpc>
+              <a:spcBef>
+                <a:spcPts val="0"/>
+              </a:spcBef>
+              <a:spcAft>
+                <a:spcPts val="0"/>
+              </a:spcAft>
+              <a:buClrTx/>
+              <a:buSzTx/>
+              <a:buFontTx/>
+              <a:buNone/>
+              <a:tabLst/>
+              <a:defRPr/>
+            </a:pPr>
+            <a:r>
+              <a:rPr lang="en-US" sz="1200" b="0" i="0" kern="1200" dirty="0">
+                <a:solidFill>
+                  <a:schemeClr val="tx1"/>
+                </a:solidFill>
+                <a:effectLst/>
+                <a:latin typeface="+mn-lt"/>
+                <a:ea typeface="+mn-ea"/>
+                <a:cs typeface="+mn-cs"/>
+              </a:rPr>
+              <a:t>The </a:t>
+            </a:r>
+            <a:r>
+              <a:rPr lang="en-US" b="1" dirty="0" err="1">
+                <a:effectLst/>
+              </a:rPr>
+              <a:t>Object.freeze</a:t>
+            </a:r>
+            <a:r>
+              <a:rPr lang="en-US" b="1" dirty="0">
+                <a:effectLst/>
+              </a:rPr>
+              <a:t>()</a:t>
+            </a:r>
+            <a:r>
+              <a:rPr lang="en-US" sz="1200" b="0" i="0" kern="1200" dirty="0">
+                <a:solidFill>
+                  <a:schemeClr val="tx1"/>
+                </a:solidFill>
+                <a:effectLst/>
+                <a:latin typeface="+mn-lt"/>
+                <a:ea typeface="+mn-ea"/>
+                <a:cs typeface="+mn-cs"/>
+              </a:rPr>
+              <a:t> method </a:t>
+            </a:r>
+            <a:r>
+              <a:rPr lang="en-US" sz="1200" b="1" i="0" kern="1200" dirty="0">
+                <a:solidFill>
+                  <a:schemeClr val="tx1"/>
+                </a:solidFill>
+                <a:effectLst/>
+                <a:latin typeface="+mn-lt"/>
+                <a:ea typeface="+mn-ea"/>
+                <a:cs typeface="+mn-cs"/>
+              </a:rPr>
+              <a:t>freezes</a:t>
+            </a:r>
+            <a:r>
+              <a:rPr lang="en-US" sz="1200" b="0" i="0" kern="1200" dirty="0">
+                <a:solidFill>
+                  <a:schemeClr val="tx1"/>
+                </a:solidFill>
+                <a:effectLst/>
+                <a:latin typeface="+mn-lt"/>
+                <a:ea typeface="+mn-ea"/>
+                <a:cs typeface="+mn-cs"/>
+              </a:rPr>
+              <a:t> an object. A frozen object can no longer be changed; freezing an object prevents new properties from being added to it, existing properties from being removed, prevents changing the enumerability, configurability, or writability of existing properties, and prevents the values of existing properties from being changed. In addition, freezing an object also prevents its prototype from being changed. </a:t>
+            </a:r>
+            <a:r>
+              <a:rPr lang="en-US" dirty="0"/>
+              <a:t>freeze()</a:t>
+            </a:r>
+            <a:r>
+              <a:rPr lang="en-US" sz="1200" b="0" i="0" kern="1200" dirty="0">
+                <a:solidFill>
+                  <a:schemeClr val="tx1"/>
+                </a:solidFill>
+                <a:effectLst/>
+                <a:latin typeface="+mn-lt"/>
+                <a:ea typeface="+mn-ea"/>
+                <a:cs typeface="+mn-cs"/>
+              </a:rPr>
+              <a:t> returns the same object that was passed in.</a:t>
+            </a:r>
+          </a:p>
+          <a:p>
+            <a:pPr marL="0" marR="0" lvl="0" indent="0" algn="l" defTabSz="914400" rtl="0" eaLnBrk="1" fontAlgn="auto" latinLnBrk="0" hangingPunct="1">
+              <a:lnSpc>
+                <a:spcPct val="100000"/>
+              </a:lnSpc>
+              <a:spcBef>
+                <a:spcPts val="0"/>
+              </a:spcBef>
+              <a:spcAft>
+                <a:spcPts val="0"/>
+              </a:spcAft>
+              <a:buClrTx/>
+              <a:buSzTx/>
+              <a:buFontTx/>
+              <a:buNone/>
+              <a:tabLst/>
+              <a:defRPr/>
+            </a:pPr>
+            <a:endParaRPr lang="en-US" b="0" dirty="0"/>
+          </a:p>
+          <a:p>
+            <a:pPr marL="0" marR="0" lvl="0" indent="0" algn="l" defTabSz="914400" rtl="0" eaLnBrk="1" fontAlgn="auto" latinLnBrk="0" hangingPunct="1">
+              <a:lnSpc>
+                <a:spcPct val="100000"/>
+              </a:lnSpc>
+              <a:spcBef>
+                <a:spcPts val="0"/>
+              </a:spcBef>
+              <a:spcAft>
+                <a:spcPts val="0"/>
+              </a:spcAft>
+              <a:buClrTx/>
+              <a:buSzTx/>
+              <a:buFontTx/>
+              <a:buNone/>
+              <a:tabLst/>
+              <a:defRPr/>
+            </a:pPr>
+            <a:endParaRPr lang="en-US" b="0" dirty="0"/>
+          </a:p>
+          <a:p>
+            <a:pPr marL="0" marR="0" lvl="0" indent="0" algn="l" defTabSz="914400" rtl="0" eaLnBrk="1" fontAlgn="auto" latinLnBrk="0" hangingPunct="1">
+              <a:lnSpc>
+                <a:spcPct val="100000"/>
+              </a:lnSpc>
+              <a:spcBef>
+                <a:spcPts val="0"/>
+              </a:spcBef>
+              <a:spcAft>
+                <a:spcPts val="0"/>
+              </a:spcAft>
+              <a:buClrTx/>
+              <a:buSzTx/>
+              <a:buFontTx/>
+              <a:buNone/>
+              <a:tabLst/>
+              <a:defRPr/>
+            </a:pPr>
+            <a:r>
+              <a:rPr lang="en-US" b="0" dirty="0"/>
+              <a:t>As best practice, DON’T use </a:t>
+            </a:r>
+            <a:r>
+              <a:rPr lang="en-US" b="0" dirty="0" err="1"/>
+              <a:t>var</a:t>
+            </a:r>
+            <a:r>
+              <a:rPr lang="en-US" b="0" dirty="0"/>
+              <a:t>, only let &amp; const.</a:t>
+            </a:r>
+          </a:p>
+          <a:p>
+            <a:pPr marL="0" marR="0" lvl="0" indent="0" algn="l" defTabSz="914400" rtl="0" eaLnBrk="1" fontAlgn="auto" latinLnBrk="0" hangingPunct="1">
+              <a:lnSpc>
+                <a:spcPct val="100000"/>
+              </a:lnSpc>
+              <a:spcBef>
+                <a:spcPts val="0"/>
+              </a:spcBef>
+              <a:spcAft>
+                <a:spcPts val="0"/>
+              </a:spcAft>
+              <a:buClrTx/>
+              <a:buSzTx/>
+              <a:buFontTx/>
+              <a:buNone/>
+              <a:tabLst/>
+              <a:defRPr/>
+            </a:pPr>
+            <a:endParaRPr lang="en-US" b="0" dirty="0"/>
+          </a:p>
+          <a:p>
+            <a:pPr marL="0" marR="0" lvl="0" indent="0" algn="l" defTabSz="914400" rtl="0" eaLnBrk="1" fontAlgn="auto" latinLnBrk="0" hangingPunct="1">
+              <a:lnSpc>
+                <a:spcPct val="100000"/>
+              </a:lnSpc>
+              <a:spcBef>
+                <a:spcPts val="0"/>
+              </a:spcBef>
+              <a:spcAft>
+                <a:spcPts val="0"/>
+              </a:spcAft>
+              <a:buClrTx/>
+              <a:buSzTx/>
+              <a:buFontTx/>
+              <a:buNone/>
+              <a:tabLst/>
+              <a:defRPr/>
+            </a:pPr>
+            <a:endParaRPr lang="en-US" b="0" dirty="0"/>
+          </a:p>
+          <a:p>
+            <a:pPr marL="0" marR="0" lvl="0" indent="0" algn="l" defTabSz="914400" rtl="0" eaLnBrk="1" fontAlgn="auto" latinLnBrk="0" hangingPunct="1">
+              <a:lnSpc>
+                <a:spcPct val="100000"/>
+              </a:lnSpc>
+              <a:spcBef>
+                <a:spcPts val="0"/>
+              </a:spcBef>
+              <a:spcAft>
+                <a:spcPts val="0"/>
+              </a:spcAft>
+              <a:buClrTx/>
+              <a:buSzTx/>
+              <a:buFontTx/>
+              <a:buNone/>
+              <a:tabLst/>
+              <a:defRPr/>
+            </a:pPr>
+            <a:endParaRPr lang="en-US" b="0" dirty="0"/>
+          </a:p>
+          <a:p>
+            <a:pPr marL="171450" marR="0" lvl="0" indent="-171450" algn="l" defTabSz="914400" rtl="0" eaLnBrk="1" fontAlgn="auto" latinLnBrk="0" hangingPunct="1">
+              <a:lnSpc>
+                <a:spcPct val="100000"/>
+              </a:lnSpc>
+              <a:spcBef>
+                <a:spcPts val="0"/>
+              </a:spcBef>
+              <a:spcAft>
+                <a:spcPts val="0"/>
+              </a:spcAft>
+              <a:buClrTx/>
+              <a:buSzTx/>
+              <a:buFontTx/>
+              <a:buChar char="-"/>
+              <a:tabLst/>
+              <a:defRPr/>
+            </a:pPr>
+            <a:r>
+              <a:rPr lang="en-US" b="0" dirty="0"/>
+              <a:t>https://www.w3schools.com/js/js_let.asp</a:t>
+            </a:r>
+          </a:p>
+          <a:p>
+            <a:pPr marL="171450" marR="0" lvl="0" indent="-171450" algn="l" defTabSz="914400" rtl="0" eaLnBrk="1" fontAlgn="auto" latinLnBrk="0" hangingPunct="1">
+              <a:lnSpc>
+                <a:spcPct val="100000"/>
+              </a:lnSpc>
+              <a:spcBef>
+                <a:spcPts val="0"/>
+              </a:spcBef>
+              <a:spcAft>
+                <a:spcPts val="0"/>
+              </a:spcAft>
+              <a:buClrTx/>
+              <a:buSzTx/>
+              <a:buFontTx/>
+              <a:buChar char="-"/>
+              <a:tabLst/>
+              <a:defRPr/>
+            </a:pPr>
+            <a:r>
+              <a:rPr lang="en-US" b="0" dirty="0"/>
+              <a:t>http://ccoenraets.github.io/es6-tutorial/let/</a:t>
+            </a:r>
+          </a:p>
+          <a:p>
+            <a:pPr marL="171450" marR="0" lvl="0" indent="-171450" algn="l" defTabSz="914400" rtl="0" eaLnBrk="1" fontAlgn="auto" latinLnBrk="0" hangingPunct="1">
+              <a:lnSpc>
+                <a:spcPct val="100000"/>
+              </a:lnSpc>
+              <a:spcBef>
+                <a:spcPts val="0"/>
+              </a:spcBef>
+              <a:spcAft>
+                <a:spcPts val="0"/>
+              </a:spcAft>
+              <a:buClrTx/>
+              <a:buSzTx/>
+              <a:buFontTx/>
+              <a:buChar char="-"/>
+              <a:tabLst/>
+              <a:defRPr/>
+            </a:pPr>
+            <a:r>
+              <a:rPr lang="en-US" b="0" dirty="0"/>
+              <a:t>https://scotch.io/tutorials/understanding-hoisting-in-javascript</a:t>
+            </a:r>
+          </a:p>
+          <a:p>
+            <a:pPr marL="171450" marR="0" lvl="0" indent="-171450" algn="l" defTabSz="914400" rtl="0" eaLnBrk="1" fontAlgn="auto" latinLnBrk="0" hangingPunct="1">
+              <a:lnSpc>
+                <a:spcPct val="100000"/>
+              </a:lnSpc>
+              <a:spcBef>
+                <a:spcPts val="0"/>
+              </a:spcBef>
+              <a:spcAft>
+                <a:spcPts val="0"/>
+              </a:spcAft>
+              <a:buClrTx/>
+              <a:buSzTx/>
+              <a:buFontTx/>
+              <a:buChar char="-"/>
+              <a:tabLst/>
+              <a:defRPr/>
+            </a:pPr>
+            <a:r>
+              <a:rPr lang="en-US" b="0" dirty="0"/>
+              <a:t>https://www.geekboots.com/story/let-vs-const-vs-var-in-javascript</a:t>
+            </a:r>
+          </a:p>
+          <a:p>
+            <a:pPr marL="171450" marR="0" lvl="0" indent="-171450" algn="l" defTabSz="914400" rtl="0" eaLnBrk="1" fontAlgn="auto" latinLnBrk="0" hangingPunct="1">
+              <a:lnSpc>
+                <a:spcPct val="100000"/>
+              </a:lnSpc>
+              <a:spcBef>
+                <a:spcPts val="0"/>
+              </a:spcBef>
+              <a:spcAft>
+                <a:spcPts val="0"/>
+              </a:spcAft>
+              <a:buClrTx/>
+              <a:buSzTx/>
+              <a:buFontTx/>
+              <a:buChar char="-"/>
+              <a:tabLst/>
+              <a:defRPr/>
+            </a:pPr>
+            <a:r>
+              <a:rPr lang="en-US" b="0" dirty="0"/>
+              <a:t>https://developer.mozilla.org/en-US/docs/Web/JavaScript/Reference/Global_Objects/Object/freeze</a:t>
+            </a:r>
+          </a:p>
+          <a:p>
+            <a:pPr marL="171450" marR="0" lvl="0" indent="-171450" algn="l" defTabSz="914400" rtl="0" eaLnBrk="1" fontAlgn="auto" latinLnBrk="0" hangingPunct="1">
+              <a:lnSpc>
+                <a:spcPct val="100000"/>
+              </a:lnSpc>
+              <a:spcBef>
+                <a:spcPts val="0"/>
+              </a:spcBef>
+              <a:spcAft>
+                <a:spcPts val="0"/>
+              </a:spcAft>
+              <a:buClrTx/>
+              <a:buSzTx/>
+              <a:buFontTx/>
+              <a:buChar char="-"/>
+              <a:tabLst/>
+              <a:defRPr/>
+            </a:pPr>
             <a:endParaRPr lang="en-US" b="0" dirty="0"/>
           </a:p>
         </p:txBody>
@@ -14755,7 +17396,7 @@
     </p:spTree>
     <p:extLst>
       <p:ext uri="{BB962C8B-B14F-4D97-AF65-F5344CB8AC3E}">
-        <p14:creationId xmlns:p14="http://schemas.microsoft.com/office/powerpoint/2010/main" val="1853370644"/>
+        <p14:creationId xmlns:p14="http://schemas.microsoft.com/office/powerpoint/2010/main" val="3568349639"/>
       </p:ext>
     </p:extLst>
   </p:cSld>
@@ -14827,17 +17468,36 @@
               <a:defRPr/>
             </a:pPr>
             <a:r>
-              <a:rPr lang="en-US" sz="1200" b="1" i="0" kern="1200" dirty="0">
-                <a:solidFill>
-                  <a:schemeClr val="tx1"/>
-                </a:solidFill>
-                <a:effectLst/>
-                <a:latin typeface="+mn-lt"/>
-                <a:ea typeface="+mn-ea"/>
-                <a:cs typeface="+mn-cs"/>
-              </a:rPr>
-              <a:t>IIFE - Immediately Invoked Function Expression</a:t>
-            </a:r>
+              <a:rPr lang="en-US" sz="1200" b="0" i="0" kern="1200" dirty="0">
+                <a:solidFill>
+                  <a:schemeClr val="tx1"/>
+                </a:solidFill>
+                <a:effectLst/>
+                <a:latin typeface="+mn-lt"/>
+                <a:ea typeface="+mn-ea"/>
+                <a:cs typeface="+mn-cs"/>
+              </a:rPr>
+              <a:t>What is arrow function?</a:t>
+            </a:r>
+          </a:p>
+          <a:p>
+            <a:pPr marL="0" marR="0" lvl="0" indent="0" algn="l" defTabSz="914400" rtl="0" eaLnBrk="1" fontAlgn="auto" latinLnBrk="0" hangingPunct="1">
+              <a:lnSpc>
+                <a:spcPct val="100000"/>
+              </a:lnSpc>
+              <a:spcBef>
+                <a:spcPts val="0"/>
+              </a:spcBef>
+              <a:spcAft>
+                <a:spcPts val="0"/>
+              </a:spcAft>
+              <a:buClrTx/>
+              <a:buSzTx/>
+              <a:buFontTx/>
+              <a:buNone/>
+              <a:tabLst/>
+              <a:defRPr/>
+            </a:pPr>
             <a:endParaRPr lang="en-US" sz="1200" b="0" i="0" kern="1200" dirty="0">
               <a:solidFill>
                 <a:schemeClr val="tx1"/>
@@ -14866,15 +17526,70 @@
               <a:tabLst/>
               <a:defRPr/>
             </a:pPr>
-            <a:endParaRPr lang="en-US" sz="1200" b="0" i="0" kern="1200" dirty="0">
-              <a:solidFill>
-                <a:schemeClr val="tx1"/>
-              </a:solidFill>
-              <a:effectLst/>
-              <a:latin typeface="+mn-lt"/>
-              <a:ea typeface="+mn-ea"/>
-              <a:cs typeface="+mn-cs"/>
-            </a:endParaRPr>
+            <a:r>
+              <a:rPr lang="en-US" sz="1200" b="0" i="0" kern="1200" dirty="0">
+                <a:solidFill>
+                  <a:schemeClr val="tx1"/>
+                </a:solidFill>
+                <a:effectLst/>
+                <a:latin typeface="+mn-lt"/>
+                <a:ea typeface="+mn-ea"/>
+                <a:cs typeface="+mn-cs"/>
+              </a:rPr>
+              <a:t>The ECMAScript 6 arrow function syntax is a shorthand for the ECMAScript 5 function syntax. It supports both block and expression bodies. The value of </a:t>
+            </a:r>
+            <a:r>
+              <a:rPr lang="en-US" dirty="0"/>
+              <a:t>this</a:t>
+            </a:r>
+            <a:r>
+              <a:rPr lang="en-US" sz="1200" b="0" i="0" kern="1200" dirty="0">
+                <a:solidFill>
+                  <a:schemeClr val="tx1"/>
+                </a:solidFill>
+                <a:effectLst/>
+                <a:latin typeface="+mn-lt"/>
+                <a:ea typeface="+mn-ea"/>
+                <a:cs typeface="+mn-cs"/>
+              </a:rPr>
+              <a:t> inside the function is not altered: it is the same as the value of </a:t>
+            </a:r>
+            <a:r>
+              <a:rPr lang="en-US" dirty="0"/>
+              <a:t>this</a:t>
+            </a:r>
+            <a:r>
+              <a:rPr lang="en-US" sz="1200" b="0" i="0" kern="1200" dirty="0">
+                <a:solidFill>
+                  <a:schemeClr val="tx1"/>
+                </a:solidFill>
+                <a:effectLst/>
+                <a:latin typeface="+mn-lt"/>
+                <a:ea typeface="+mn-ea"/>
+                <a:cs typeface="+mn-cs"/>
+              </a:rPr>
+              <a:t> outside the function. No more </a:t>
+            </a:r>
+            <a:r>
+              <a:rPr lang="en-US" dirty="0" err="1"/>
+              <a:t>var</a:t>
+            </a:r>
+            <a:r>
+              <a:rPr lang="en-US" dirty="0"/>
+              <a:t> self = this</a:t>
+            </a:r>
+            <a:r>
+              <a:rPr lang="en-US" sz="1200" b="0" i="0" kern="1200" dirty="0">
+                <a:solidFill>
+                  <a:schemeClr val="tx1"/>
+                </a:solidFill>
+                <a:effectLst/>
+                <a:latin typeface="+mn-lt"/>
+                <a:ea typeface="+mn-ea"/>
+                <a:cs typeface="+mn-cs"/>
+              </a:rPr>
+              <a:t> to keep track of the current scope.</a:t>
+            </a:r>
           </a:p>
           <a:p>
             <a:pPr marL="0" marR="0" lvl="0" indent="0" algn="l" defTabSz="914400" rtl="0" eaLnBrk="1" fontAlgn="auto" latinLnBrk="0" hangingPunct="1">
@@ -14894,22 +17609,7 @@
               <a:tabLst/>
               <a:defRPr/>
             </a:pPr>
-            <a:r>
-              <a:rPr lang="en-US" sz="1200" b="0" i="0" kern="1200" dirty="0">
-                <a:solidFill>
-                  <a:schemeClr val="tx1"/>
-                </a:solidFill>
-                <a:effectLst/>
-                <a:latin typeface="+mn-lt"/>
-                <a:ea typeface="+mn-ea"/>
-                <a:cs typeface="+mn-cs"/>
-              </a:rPr>
-              <a:t>In other words, </a:t>
-            </a:r>
-            <a:r>
-              <a:rPr lang="en-US" dirty="0"/>
-              <a:t>Self Invoking Function :</a:t>
-            </a:r>
+            <a:endParaRPr lang="en-US" b="0" dirty="0"/>
           </a:p>
           <a:p>
             <a:pPr marL="0" marR="0" lvl="0" indent="0" algn="l" defTabSz="914400" rtl="0" eaLnBrk="1" fontAlgn="auto" latinLnBrk="0" hangingPunct="1">
@@ -14930,16 +17630,8 @@
               <a:defRPr/>
             </a:pPr>
             <a:r>
-              <a:rPr lang="en-US" dirty="0"/>
-              <a:t>It’s a </a:t>
-            </a:r>
-            <a:r>
-              <a:rPr lang="en-US" sz="1200" dirty="0"/>
-              <a:t>method</a:t>
-            </a:r>
-            <a:r>
-              <a:rPr lang="en-US" dirty="0"/>
-              <a:t> who invoking itself,</a:t>
+              <a:rPr lang="en-US" b="0" dirty="0"/>
+              <a:t>Let’s take a look at the syntax.</a:t>
             </a:r>
           </a:p>
           <a:p>
@@ -14960,7 +17652,7 @@
               <a:tabLst/>
               <a:defRPr/>
             </a:pPr>
-            <a:endParaRPr lang="en-US" dirty="0"/>
+            <a:endParaRPr lang="en-US" b="0" dirty="0"/>
           </a:p>
           <a:p>
             <a:pPr marL="0" marR="0" lvl="0" indent="0" algn="l" defTabSz="914400" rtl="0" eaLnBrk="1" fontAlgn="auto" latinLnBrk="0" hangingPunct="1">
@@ -14980,10 +17672,7 @@
               <a:tabLst/>
               <a:defRPr/>
             </a:pPr>
-            <a:r>
-              <a:rPr lang="en-US" sz="2400" dirty="0"/>
-              <a:t>Why do we need it?</a:t>
-            </a:r>
+            <a:endParaRPr lang="en-US" b="0" dirty="0"/>
           </a:p>
           <a:p>
             <a:pPr marL="0" marR="0" lvl="0" indent="0" algn="l" defTabSz="914400" rtl="0" eaLnBrk="1" fontAlgn="auto" latinLnBrk="0" hangingPunct="1">
@@ -15003,10 +17692,7 @@
               <a:tabLst/>
               <a:defRPr/>
             </a:pPr>
-            <a:r>
-              <a:rPr lang="en-US" sz="2400" dirty="0"/>
-              <a:t>What issue it’s coming to solve?</a:t>
-            </a:r>
+            <a:endParaRPr lang="en-US" b="0" dirty="0"/>
           </a:p>
           <a:p>
             <a:pPr marL="0" marR="0" lvl="0" indent="0" algn="l" defTabSz="914400" rtl="0" eaLnBrk="1" fontAlgn="auto" latinLnBrk="0" hangingPunct="1">
@@ -15027,8 +17713,8 @@
               <a:defRPr/>
             </a:pPr>
             <a:r>
-              <a:rPr lang="en-US" sz="2400" dirty="0"/>
-              <a:t>This technique is useful for isolating code from the global scope.</a:t>
+              <a:rPr lang="en-US" b="0" dirty="0"/>
+              <a:t>Now,</a:t>
             </a:r>
           </a:p>
           <a:p>
@@ -15049,7 +17735,359 @@
               <a:tabLst/>
               <a:defRPr/>
             </a:pPr>
+            <a:r>
+              <a:rPr lang="en-US" b="0" dirty="0"/>
+              <a:t>A lot of developers, usually new but also experience are using the arrow function without understanding why?</a:t>
+            </a:r>
+          </a:p>
+          <a:p>
+            <a:pPr marL="0" marR="0" lvl="0" indent="0" algn="l" defTabSz="914400" rtl="0" eaLnBrk="1" fontAlgn="auto" latinLnBrk="0" hangingPunct="1">
+              <a:lnSpc>
+                <a:spcPct val="100000"/>
+              </a:lnSpc>
+              <a:spcBef>
+                <a:spcPts val="0"/>
+              </a:spcBef>
+              <a:spcAft>
+                <a:spcPts val="0"/>
+              </a:spcAft>
+              <a:buClrTx/>
+              <a:buSzTx/>
+              <a:buFontTx/>
+              <a:buNone/>
+              <a:tabLst/>
+              <a:defRPr/>
+            </a:pPr>
+            <a:r>
+              <a:rPr lang="en-US" b="0" dirty="0"/>
+              <a:t>What issue it’s coming to solve?</a:t>
+            </a:r>
+          </a:p>
+          <a:p>
+            <a:pPr marL="0" marR="0" lvl="0" indent="0" algn="l" defTabSz="914400" rtl="0" eaLnBrk="1" fontAlgn="auto" latinLnBrk="0" hangingPunct="1">
+              <a:lnSpc>
+                <a:spcPct val="100000"/>
+              </a:lnSpc>
+              <a:spcBef>
+                <a:spcPts val="0"/>
+              </a:spcBef>
+              <a:spcAft>
+                <a:spcPts val="0"/>
+              </a:spcAft>
+              <a:buClrTx/>
+              <a:buSzTx/>
+              <a:buFontTx/>
+              <a:buNone/>
+              <a:tabLst/>
+              <a:defRPr/>
+            </a:pPr>
+            <a:r>
+              <a:rPr lang="en-US" b="0" dirty="0"/>
+              <a:t>Let’s take a look at example:</a:t>
+            </a:r>
+          </a:p>
+          <a:p>
+            <a:pPr marL="0" marR="0" lvl="0" indent="0" algn="l" defTabSz="914400" rtl="0" eaLnBrk="1" fontAlgn="auto" latinLnBrk="0" hangingPunct="1">
+              <a:lnSpc>
+                <a:spcPct val="100000"/>
+              </a:lnSpc>
+              <a:spcBef>
+                <a:spcPts val="0"/>
+              </a:spcBef>
+              <a:spcAft>
+                <a:spcPts val="0"/>
+              </a:spcAft>
+              <a:buClrTx/>
+              <a:buSzTx/>
+              <a:buFontTx/>
+              <a:buNone/>
+              <a:tabLst/>
+              <a:defRPr/>
+            </a:pPr>
+            <a:r>
+              <a:rPr lang="en-US" b="0" dirty="0"/>
+              <a:t>We have an object, when invoking counter function, we are setting a timeout, what will be `this` in callback function?</a:t>
+            </a:r>
+          </a:p>
+          <a:p>
+            <a:pPr marL="0" marR="0" lvl="0" indent="0" algn="l" defTabSz="914400" rtl="0" eaLnBrk="1" fontAlgn="auto" latinLnBrk="0" hangingPunct="1">
+              <a:lnSpc>
+                <a:spcPct val="100000"/>
+              </a:lnSpc>
+              <a:spcBef>
+                <a:spcPts val="0"/>
+              </a:spcBef>
+              <a:spcAft>
+                <a:spcPts val="0"/>
+              </a:spcAft>
+              <a:buClrTx/>
+              <a:buSzTx/>
+              <a:buFontTx/>
+              <a:buNone/>
+              <a:tabLst/>
+              <a:defRPr/>
+            </a:pPr>
+            <a:r>
+              <a:rPr lang="en-US" b="0" dirty="0"/>
+              <a:t>It will be the window,</a:t>
+            </a:r>
+          </a:p>
+          <a:p>
+            <a:pPr marL="0" marR="0" lvl="0" indent="0" algn="l" defTabSz="914400" rtl="0" eaLnBrk="1" fontAlgn="auto" latinLnBrk="0" hangingPunct="1">
+              <a:lnSpc>
+                <a:spcPct val="100000"/>
+              </a:lnSpc>
+              <a:spcBef>
+                <a:spcPts val="0"/>
+              </a:spcBef>
+              <a:spcAft>
+                <a:spcPts val="0"/>
+              </a:spcAft>
+              <a:buClrTx/>
+              <a:buSzTx/>
+              <a:buFontTx/>
+              <a:buNone/>
+              <a:tabLst/>
+              <a:defRPr/>
+            </a:pPr>
+            <a:r>
+              <a:rPr lang="en-US" b="0" dirty="0"/>
+              <a:t>How did we solve it in the past? There are 2 familiar ways, use `that` or use `bind` function</a:t>
+            </a:r>
+          </a:p>
+          <a:p>
+            <a:pPr marL="0" marR="0" lvl="0" indent="0" algn="l" defTabSz="914400" rtl="0" eaLnBrk="1" fontAlgn="auto" latinLnBrk="0" hangingPunct="1">
+              <a:lnSpc>
+                <a:spcPct val="100000"/>
+              </a:lnSpc>
+              <a:spcBef>
+                <a:spcPts val="0"/>
+              </a:spcBef>
+              <a:spcAft>
+                <a:spcPts val="0"/>
+              </a:spcAft>
+              <a:buClrTx/>
+              <a:buSzTx/>
+              <a:buFontTx/>
+              <a:buNone/>
+              <a:tabLst/>
+              <a:defRPr/>
+            </a:pPr>
+            <a:r>
+              <a:rPr lang="en-US" b="0" dirty="0"/>
+              <a:t>But with arrow function it will do that for us automatically</a:t>
+            </a:r>
+          </a:p>
+          <a:p>
+            <a:pPr marL="0" marR="0" lvl="0" indent="0" algn="l" defTabSz="914400" rtl="0" eaLnBrk="1" fontAlgn="auto" latinLnBrk="0" hangingPunct="1">
+              <a:lnSpc>
+                <a:spcPct val="100000"/>
+              </a:lnSpc>
+              <a:spcBef>
+                <a:spcPts val="0"/>
+              </a:spcBef>
+              <a:spcAft>
+                <a:spcPts val="0"/>
+              </a:spcAft>
+              <a:buClrTx/>
+              <a:buSzTx/>
+              <a:buFontTx/>
+              <a:buNone/>
+              <a:tabLst/>
+              <a:defRPr/>
+            </a:pPr>
             <a:endParaRPr lang="en-US" b="0" dirty="0"/>
+          </a:p>
+          <a:p>
+            <a:pPr marL="0" marR="0" lvl="0" indent="0" algn="l" defTabSz="914400" rtl="0" eaLnBrk="1" fontAlgn="auto" latinLnBrk="0" hangingPunct="1">
+              <a:lnSpc>
+                <a:spcPct val="100000"/>
+              </a:lnSpc>
+              <a:spcBef>
+                <a:spcPts val="0"/>
+              </a:spcBef>
+              <a:spcAft>
+                <a:spcPts val="0"/>
+              </a:spcAft>
+              <a:buClrTx/>
+              <a:buSzTx/>
+              <a:buFontTx/>
+              <a:buNone/>
+              <a:tabLst/>
+              <a:defRPr/>
+            </a:pPr>
+            <a:r>
+              <a:rPr lang="en-US" b="0" dirty="0"/>
+              <a:t>What other cases we might want to use arrow function?</a:t>
+            </a:r>
+          </a:p>
+          <a:p>
+            <a:pPr marL="0" marR="0" lvl="0" indent="0" algn="l" defTabSz="914400" rtl="0" eaLnBrk="1" fontAlgn="auto" latinLnBrk="0" hangingPunct="1">
+              <a:lnSpc>
+                <a:spcPct val="100000"/>
+              </a:lnSpc>
+              <a:spcBef>
+                <a:spcPts val="0"/>
+              </a:spcBef>
+              <a:spcAft>
+                <a:spcPts val="0"/>
+              </a:spcAft>
+              <a:buClrTx/>
+              <a:buSzTx/>
+              <a:buFontTx/>
+              <a:buNone/>
+              <a:tabLst/>
+              <a:defRPr/>
+            </a:pPr>
+            <a:r>
+              <a:rPr lang="en-US" b="0" dirty="0"/>
+              <a:t>Callback function for </a:t>
+            </a:r>
+            <a:r>
+              <a:rPr lang="en-US" b="0" dirty="0" err="1"/>
+              <a:t>dom</a:t>
+            </a:r>
+            <a:r>
+              <a:rPr lang="en-US" b="0" dirty="0"/>
+              <a:t> events,</a:t>
+            </a:r>
+          </a:p>
+          <a:p>
+            <a:pPr marL="0" marR="0" lvl="0" indent="0" algn="l" defTabSz="914400" rtl="0" eaLnBrk="1" fontAlgn="auto" latinLnBrk="0" hangingPunct="1">
+              <a:lnSpc>
+                <a:spcPct val="100000"/>
+              </a:lnSpc>
+              <a:spcBef>
+                <a:spcPts val="0"/>
+              </a:spcBef>
+              <a:spcAft>
+                <a:spcPts val="0"/>
+              </a:spcAft>
+              <a:buClrTx/>
+              <a:buSzTx/>
+              <a:buFontTx/>
+              <a:buNone/>
+              <a:tabLst/>
+              <a:defRPr/>
+            </a:pPr>
+            <a:r>
+              <a:rPr lang="en-US" b="0" dirty="0"/>
+              <a:t>Callback function for iteration function like map or </a:t>
+            </a:r>
+            <a:r>
+              <a:rPr lang="en-US" sz="1200" b="0" i="0" kern="1200" dirty="0">
+                <a:solidFill>
+                  <a:schemeClr val="tx1"/>
+                </a:solidFill>
+                <a:effectLst/>
+                <a:latin typeface="+mn-lt"/>
+                <a:ea typeface="+mn-ea"/>
+                <a:cs typeface="+mn-cs"/>
+              </a:rPr>
+              <a:t>reduce, </a:t>
+            </a:r>
+            <a:r>
+              <a:rPr lang="en-US" b="0" dirty="0" err="1"/>
+              <a:t>forEach</a:t>
+            </a:r>
+            <a:r>
+              <a:rPr lang="en-US" b="0" dirty="0"/>
+              <a:t>.</a:t>
+            </a:r>
+          </a:p>
+          <a:p>
+            <a:pPr marL="0" marR="0" lvl="0" indent="0" algn="l" defTabSz="914400" rtl="0" eaLnBrk="1" fontAlgn="auto" latinLnBrk="0" hangingPunct="1">
+              <a:lnSpc>
+                <a:spcPct val="100000"/>
+              </a:lnSpc>
+              <a:spcBef>
+                <a:spcPts val="0"/>
+              </a:spcBef>
+              <a:spcAft>
+                <a:spcPts val="0"/>
+              </a:spcAft>
+              <a:buClrTx/>
+              <a:buSzTx/>
+              <a:buFontTx/>
+              <a:buNone/>
+              <a:tabLst/>
+              <a:defRPr/>
+            </a:pPr>
+            <a:endParaRPr lang="en-US" b="0" dirty="0"/>
+          </a:p>
+          <a:p>
+            <a:pPr marL="171450" marR="0" lvl="0" indent="-171450" algn="l" defTabSz="914400" rtl="0" eaLnBrk="1" fontAlgn="auto" latinLnBrk="0" hangingPunct="1">
+              <a:lnSpc>
+                <a:spcPct val="100000"/>
+              </a:lnSpc>
+              <a:spcBef>
+                <a:spcPts val="0"/>
+              </a:spcBef>
+              <a:spcAft>
+                <a:spcPts val="0"/>
+              </a:spcAft>
+              <a:buClrTx/>
+              <a:buSzTx/>
+              <a:buFontTx/>
+              <a:buChar char="-"/>
+              <a:tabLst/>
+              <a:defRPr/>
+            </a:pPr>
+            <a:r>
+              <a:rPr lang="en-US" b="0" dirty="0"/>
+              <a:t>https://medium.freecodecamp.org/when-and-why-you-should-use-es6-arrow-functions-and-when-you-shouldnt-3d851d7f0b26</a:t>
+            </a:r>
+          </a:p>
+          <a:p>
+            <a:pPr marL="171450" marR="0" lvl="0" indent="-171450" algn="l" defTabSz="914400" rtl="0" eaLnBrk="1" fontAlgn="auto" latinLnBrk="0" hangingPunct="1">
+              <a:lnSpc>
+                <a:spcPct val="100000"/>
+              </a:lnSpc>
+              <a:spcBef>
+                <a:spcPts val="0"/>
+              </a:spcBef>
+              <a:spcAft>
+                <a:spcPts val="0"/>
+              </a:spcAft>
+              <a:buClrTx/>
+              <a:buSzTx/>
+              <a:buFontTx/>
+              <a:buChar char="-"/>
+              <a:tabLst/>
+              <a:defRPr/>
+            </a:pPr>
+            <a:r>
+              <a:rPr lang="en-US" b="0" dirty="0"/>
+              <a:t>https://developer.mozilla.org/en-US/docs/Web/JavaScript/Reference/Functions/Arrow</a:t>
+            </a:r>
+            <a:r>
+              <a:rPr lang="en-US" b="0"/>
+              <a:t>_functions</a:t>
+            </a:r>
+            <a:endParaRPr lang="en-US" b="0" dirty="0"/>
+          </a:p>
+          <a:p>
+            <a:pPr marL="171450" marR="0" lvl="0" indent="-171450" algn="l" defTabSz="914400" rtl="0" eaLnBrk="1" fontAlgn="auto" latinLnBrk="0" hangingPunct="1">
+              <a:lnSpc>
+                <a:spcPct val="100000"/>
+              </a:lnSpc>
+              <a:spcBef>
+                <a:spcPts val="0"/>
+              </a:spcBef>
+              <a:spcAft>
+                <a:spcPts val="0"/>
+              </a:spcAft>
+              <a:buClrTx/>
+              <a:buSzTx/>
+              <a:buFontTx/>
+              <a:buChar char="-"/>
+              <a:tabLst/>
+              <a:defRPr/>
+            </a:pPr>
+            <a:r>
+              <a:rPr lang="en-US" b="0" dirty="0"/>
+              <a:t>http://ccoenraets.github.io/es6-tutorial/arrow-functions/</a:t>
+            </a:r>
           </a:p>
         </p:txBody>
       </p:sp>
@@ -15079,7 +18117,7 @@
     </p:spTree>
     <p:extLst>
       <p:ext uri="{BB962C8B-B14F-4D97-AF65-F5344CB8AC3E}">
-        <p14:creationId xmlns:p14="http://schemas.microsoft.com/office/powerpoint/2010/main" val="3635942883"/>
+        <p14:creationId xmlns:p14="http://schemas.microsoft.com/office/powerpoint/2010/main" val="1853370644"/>
       </p:ext>
     </p:extLst>
   </p:cSld>
@@ -15151,17 +18189,26 @@
               <a:defRPr/>
             </a:pPr>
             <a:r>
-              <a:rPr lang="en-US" sz="1200" b="0" i="0" kern="1200" dirty="0">
-                <a:solidFill>
-                  <a:schemeClr val="tx1"/>
-                </a:solidFill>
-                <a:effectLst/>
-                <a:latin typeface="+mn-lt"/>
-                <a:ea typeface="+mn-ea"/>
-                <a:cs typeface="+mn-cs"/>
-              </a:rPr>
-              <a:t>In the past, how we create class in JS?</a:t>
-            </a:r>
+              <a:rPr lang="en-US" sz="1200" b="1" i="0" kern="1200" dirty="0">
+                <a:solidFill>
+                  <a:schemeClr val="tx1"/>
+                </a:solidFill>
+                <a:effectLst/>
+                <a:latin typeface="+mn-lt"/>
+                <a:ea typeface="+mn-ea"/>
+                <a:cs typeface="+mn-cs"/>
+              </a:rPr>
+              <a:t>IIFE - Immediately Invoked Function Expression</a:t>
+            </a:r>
+            <a:endParaRPr lang="en-US" sz="1200" b="0" i="0" kern="1200" dirty="0">
+              <a:solidFill>
+                <a:schemeClr val="tx1"/>
+              </a:solidFill>
+              <a:effectLst/>
+              <a:latin typeface="+mn-lt"/>
+              <a:ea typeface="+mn-ea"/>
+              <a:cs typeface="+mn-cs"/>
+            </a:endParaRPr>
           </a:p>
           <a:p>
             <a:pPr marL="0" marR="0" lvl="0" indent="0" algn="l" defTabSz="914400" rtl="0" eaLnBrk="1" fontAlgn="auto" latinLnBrk="0" hangingPunct="1">
@@ -15181,7 +18228,15 @@
               <a:tabLst/>
               <a:defRPr/>
             </a:pPr>
-            <a:endParaRPr lang="en-US" b="0" dirty="0"/>
+            <a:endParaRPr lang="en-US" sz="1200" b="0" i="0" kern="1200" dirty="0">
+              <a:solidFill>
+                <a:schemeClr val="tx1"/>
+              </a:solidFill>
+              <a:effectLst/>
+              <a:latin typeface="+mn-lt"/>
+              <a:ea typeface="+mn-ea"/>
+              <a:cs typeface="+mn-cs"/>
+            </a:endParaRPr>
           </a:p>
           <a:p>
             <a:pPr marL="0" marR="0" lvl="0" indent="0" algn="l" defTabSz="914400" rtl="0" eaLnBrk="1" fontAlgn="auto" latinLnBrk="0" hangingPunct="1">
@@ -15202,8 +18257,20 @@
               <a:defRPr/>
             </a:pPr>
             <a:r>
-              <a:rPr lang="en-US" b="0" dirty="0"/>
-              <a:t>In JS, we don’t have classes, so how did we make one?</a:t>
+              <a:rPr lang="en-US" sz="1200" b="0" i="0" kern="1200" dirty="0">
+                <a:solidFill>
+                  <a:schemeClr val="tx1"/>
+                </a:solidFill>
+                <a:effectLst/>
+                <a:latin typeface="+mn-lt"/>
+                <a:ea typeface="+mn-ea"/>
+                <a:cs typeface="+mn-cs"/>
+              </a:rPr>
+              <a:t>In other words, </a:t>
+            </a:r>
+            <a:r>
+              <a:rPr lang="en-US" dirty="0"/>
+              <a:t>Self Invoking Function :</a:t>
             </a:r>
           </a:p>
           <a:p>
@@ -15225,8 +18292,16 @@
               <a:defRPr/>
             </a:pPr>
             <a:r>
-              <a:rPr lang="en-US" sz="2400" dirty="0"/>
-              <a:t>Although the standard syntax is missing the language can still be manipulated to act as one.</a:t>
+              <a:rPr lang="en-US" dirty="0"/>
+              <a:t>It’s a </a:t>
+            </a:r>
+            <a:r>
+              <a:rPr lang="en-US" sz="1200" dirty="0"/>
+              <a:t>method</a:t>
+            </a:r>
+            <a:r>
+              <a:rPr lang="en-US" dirty="0"/>
+              <a:t> who invoking itself,</a:t>
             </a:r>
           </a:p>
           <a:p>
@@ -15247,7 +18322,7 @@
               <a:tabLst/>
               <a:defRPr/>
             </a:pPr>
-            <a:endParaRPr lang="en-US" sz="2400" dirty="0"/>
+            <a:endParaRPr lang="en-US" dirty="0"/>
           </a:p>
           <a:p>
             <a:pPr marL="0" marR="0" lvl="0" indent="0" algn="l" defTabSz="914400" rtl="0" eaLnBrk="1" fontAlgn="auto" latinLnBrk="0" hangingPunct="1">
@@ -15269,55 +18344,7 @@
             </a:pPr>
             <a:r>
               <a:rPr lang="en-US" sz="2400" dirty="0"/>
-              <a:t>The </a:t>
-            </a:r>
-            <a:r>
-              <a:rPr lang="en-US" sz="2400" b="1" dirty="0"/>
-              <a:t>function</a:t>
-            </a:r>
-            <a:r>
-              <a:rPr lang="en-US" sz="2400" dirty="0"/>
-              <a:t> keyword creates an object of Function type. This object can be used as a normal function or as a </a:t>
-            </a:r>
-            <a:r>
-              <a:rPr lang="en-US" sz="2400" b="1" dirty="0"/>
-              <a:t>class</a:t>
-            </a:r>
-            <a:r>
-              <a:rPr lang="en-US" sz="2400" dirty="0"/>
-              <a:t> </a:t>
-            </a:r>
-            <a:r>
-              <a:rPr lang="en-US" sz="2400" b="1" dirty="0"/>
-              <a:t>object </a:t>
-            </a:r>
-            <a:r>
-              <a:rPr lang="en-US" sz="2400" dirty="0"/>
-              <a:t>which defines the class</a:t>
-            </a:r>
-            <a:r>
-              <a:rPr lang="en-US" sz="2400" b="1" dirty="0"/>
-              <a:t> </a:t>
-            </a:r>
-            <a:r>
-              <a:rPr lang="en-US" sz="2400" b="1" dirty="0">
-                <a:solidFill>
-                  <a:schemeClr val="tx1"/>
-                </a:solidFill>
-              </a:rPr>
-              <a:t>constructor</a:t>
-            </a:r>
-            <a:r>
-              <a:rPr lang="en-US" sz="2400" dirty="0">
-                <a:solidFill>
-                  <a:schemeClr val="tx1"/>
-                </a:solidFill>
-              </a:rPr>
-              <a:t> </a:t>
-            </a:r>
-            <a:r>
-              <a:rPr lang="en-US" sz="2400" dirty="0"/>
-              <a:t>method.</a:t>
+              <a:t>Why do we need it?</a:t>
             </a:r>
           </a:p>
           <a:p>
@@ -15340,48 +18367,51 @@
             </a:pPr>
             <a:r>
               <a:rPr lang="en-US" sz="2400" dirty="0"/>
-              <a:t>When using the </a:t>
-            </a:r>
-            <a:r>
-              <a:rPr lang="en-US" sz="2400" b="1" dirty="0">
-                <a:solidFill>
-                  <a:schemeClr val="tx1"/>
-                </a:solidFill>
-              </a:rPr>
-              <a:t>new</a:t>
-            </a:r>
-            <a:r>
-              <a:rPr lang="en-US" sz="2400" dirty="0">
-                <a:solidFill>
-                  <a:schemeClr val="tx1"/>
-                </a:solidFill>
-              </a:rPr>
-              <a:t> </a:t>
-            </a:r>
+              <a:t>What issue it’s coming to solve?</a:t>
+            </a:r>
+          </a:p>
+          <a:p>
+            <a:pPr marL="0" marR="0" lvl="0" indent="0" algn="l" defTabSz="914400" rtl="0" eaLnBrk="1" fontAlgn="auto" latinLnBrk="0" hangingPunct="1">
+              <a:lnSpc>
+                <a:spcPct val="100000"/>
+              </a:lnSpc>
+              <a:spcBef>
+                <a:spcPts val="0"/>
+              </a:spcBef>
+              <a:spcAft>
+                <a:spcPts val="0"/>
+              </a:spcAft>
+              <a:buClrTx/>
+              <a:buSzTx/>
+              <a:buFontTx/>
+              <a:buNone/>
+              <a:tabLst/>
+              <a:defRPr/>
+            </a:pPr>
             <a:r>
               <a:rPr lang="en-US" sz="2400" dirty="0"/>
-              <a:t>keyword on the </a:t>
-            </a:r>
-            <a:r>
-              <a:rPr lang="en-US" sz="2400" b="1" dirty="0"/>
-              <a:t>class object </a:t>
-            </a:r>
-            <a:r>
-              <a:rPr lang="en-US" sz="2400" dirty="0"/>
-              <a:t>a new instance of the class will be created and will be send to the </a:t>
-            </a:r>
-            <a:r>
-              <a:rPr lang="en-US" sz="2400" b="1" dirty="0">
-                <a:solidFill>
-                  <a:schemeClr val="tx1"/>
-                </a:solidFill>
-              </a:rPr>
-              <a:t>constructor</a:t>
-            </a:r>
-            <a:r>
-              <a:rPr lang="en-US" sz="2400" dirty="0"/>
-              <a:t> method.</a:t>
-            </a:r>
+              <a:t>This technique is useful for isolating code from the global scope.</a:t>
+            </a:r>
+          </a:p>
+          <a:p>
+            <a:pPr marL="0" marR="0" lvl="0" indent="0" algn="l" defTabSz="914400" rtl="0" eaLnBrk="1" fontAlgn="auto" latinLnBrk="0" hangingPunct="1">
+              <a:lnSpc>
+                <a:spcPct val="100000"/>
+              </a:lnSpc>
+              <a:spcBef>
+                <a:spcPts val="0"/>
+              </a:spcBef>
+              <a:spcAft>
+                <a:spcPts val="0"/>
+              </a:spcAft>
+              <a:buClrTx/>
+              <a:buSzTx/>
+              <a:buFontTx/>
+              <a:buNone/>
+              <a:tabLst/>
+              <a:defRPr/>
+            </a:pPr>
+            <a:endParaRPr lang="en-US" b="0" dirty="0"/>
           </a:p>
         </p:txBody>
       </p:sp>
@@ -15403,6 +18433,338 @@
             <a:fld id="{595D0871-5AD0-4670-BDA8-FBE649F625DD}" type="slidenum">
               <a:rPr lang="he-IL" smtClean="0"/>
               <a:t>60</a:t>
+            </a:fld>
+            <a:endParaRPr lang="he-IL"/>
+          </a:p>
+        </p:txBody>
+      </p:sp>
+    </p:spTree>
+    <p:extLst>
+      <p:ext uri="{BB962C8B-B14F-4D97-AF65-F5344CB8AC3E}">
+        <p14:creationId xmlns:p14="http://schemas.microsoft.com/office/powerpoint/2010/main" val="3635942883"/>
+      </p:ext>
+    </p:extLst>
+  </p:cSld>
+  <p:clrMapOvr>
+    <a:masterClrMapping/>
+  </p:clrMapOvr>
+</p:notes>
+</file>
+
+<file path=ppt/notesSlides/notesSlide59.xml><?xml version="1.0" encoding="utf-8"?>
+<p:notes xmlns:a="http://schemas.openxmlformats.org/drawingml/2006/main" xmlns:r="http://schemas.openxmlformats.org/officeDocument/2006/relationships" xmlns:p="http://schemas.openxmlformats.org/presentationml/2006/main">
+  <p:cSld>
+    <p:spTree>
+      <p:nvGrpSpPr>
+        <p:cNvPr id="1" name=""/>
+        <p:cNvGrpSpPr/>
+        <p:nvPr/>
+      </p:nvGrpSpPr>
+      <p:grpSpPr>
+        <a:xfrm>
+          <a:off x="0" y="0"/>
+          <a:ext cx="0" cy="0"/>
+          <a:chOff x="0" y="0"/>
+          <a:chExt cx="0" cy="0"/>
+        </a:xfrm>
+      </p:grpSpPr>
+      <p:sp>
+        <p:nvSpPr>
+          <p:cNvPr id="2" name="Slide Image Placeholder 1"/>
+          <p:cNvSpPr>
+            <a:spLocks noGrp="1" noRot="1" noChangeAspect="1"/>
+          </p:cNvSpPr>
+          <p:nvPr>
+            <p:ph type="sldImg"/>
+          </p:nvPr>
+        </p:nvSpPr>
+        <p:spPr/>
+      </p:sp>
+      <p:sp>
+        <p:nvSpPr>
+          <p:cNvPr id="3" name="Notes Placeholder 2"/>
+          <p:cNvSpPr>
+            <a:spLocks noGrp="1"/>
+          </p:cNvSpPr>
+          <p:nvPr>
+            <p:ph type="body" idx="1"/>
+          </p:nvPr>
+        </p:nvSpPr>
+        <p:spPr/>
+        <p:txBody>
+          <a:bodyPr/>
+          <a:lstStyle/>
+          <a:p>
+            <a:pPr marL="0" marR="0" lvl="0" indent="0" algn="l" defTabSz="914400" rtl="0" eaLnBrk="1" fontAlgn="auto" latinLnBrk="0" hangingPunct="1">
+              <a:lnSpc>
+                <a:spcPct val="100000"/>
+              </a:lnSpc>
+              <a:spcBef>
+                <a:spcPts val="0"/>
+              </a:spcBef>
+              <a:spcAft>
+                <a:spcPts val="0"/>
+              </a:spcAft>
+              <a:buClrTx/>
+              <a:buSzTx/>
+              <a:buFontTx/>
+              <a:buNone/>
+              <a:tabLst/>
+              <a:defRPr/>
+            </a:pPr>
+            <a:r>
+              <a:rPr lang="en-US" sz="1200" b="0" i="0" kern="1200" dirty="0">
+                <a:solidFill>
+                  <a:schemeClr val="tx1"/>
+                </a:solidFill>
+                <a:effectLst/>
+                <a:latin typeface="+mn-lt"/>
+                <a:ea typeface="+mn-ea"/>
+                <a:cs typeface="+mn-cs"/>
+              </a:rPr>
+              <a:t>In the past, how we create class in JS?</a:t>
+            </a:r>
+          </a:p>
+          <a:p>
+            <a:pPr marL="0" marR="0" lvl="0" indent="0" algn="l" defTabSz="914400" rtl="0" eaLnBrk="1" fontAlgn="auto" latinLnBrk="0" hangingPunct="1">
+              <a:lnSpc>
+                <a:spcPct val="100000"/>
+              </a:lnSpc>
+              <a:spcBef>
+                <a:spcPts val="0"/>
+              </a:spcBef>
+              <a:spcAft>
+                <a:spcPts val="0"/>
+              </a:spcAft>
+              <a:buClrTx/>
+              <a:buSzTx/>
+              <a:buFontTx/>
+              <a:buNone/>
+              <a:tabLst/>
+              <a:defRPr/>
+            </a:pPr>
+            <a:endParaRPr lang="en-US" b="0" dirty="0"/>
+          </a:p>
+          <a:p>
+            <a:pPr marL="0" marR="0" lvl="0" indent="0" algn="l" defTabSz="914400" rtl="0" eaLnBrk="1" fontAlgn="auto" latinLnBrk="0" hangingPunct="1">
+              <a:lnSpc>
+                <a:spcPct val="100000"/>
+              </a:lnSpc>
+              <a:spcBef>
+                <a:spcPts val="0"/>
+              </a:spcBef>
+              <a:spcAft>
+                <a:spcPts val="0"/>
+              </a:spcAft>
+              <a:buClrTx/>
+              <a:buSzTx/>
+              <a:buFontTx/>
+              <a:buNone/>
+              <a:tabLst/>
+              <a:defRPr/>
+            </a:pPr>
+            <a:r>
+              <a:rPr lang="en-US" b="0" dirty="0"/>
+              <a:t>In JS, we don’t have classes, so how did we make one?</a:t>
+            </a:r>
+          </a:p>
+          <a:p>
+            <a:pPr marL="0" marR="0" lvl="0" indent="0" algn="l" defTabSz="914400" rtl="0" eaLnBrk="1" fontAlgn="auto" latinLnBrk="0" hangingPunct="1">
+              <a:lnSpc>
+                <a:spcPct val="100000"/>
+              </a:lnSpc>
+              <a:spcBef>
+                <a:spcPts val="0"/>
+              </a:spcBef>
+              <a:spcAft>
+                <a:spcPts val="0"/>
+              </a:spcAft>
+              <a:buClrTx/>
+              <a:buSzTx/>
+              <a:buFontTx/>
+              <a:buNone/>
+              <a:tabLst/>
+              <a:defRPr/>
+            </a:pPr>
+            <a:r>
+              <a:rPr lang="en-US" sz="2400" dirty="0"/>
+              <a:t>Although the standard syntax is missing the language can still be manipulated to act as one.</a:t>
+            </a:r>
+          </a:p>
+          <a:p>
+            <a:pPr marL="0" marR="0" lvl="0" indent="0" algn="l" defTabSz="914400" rtl="0" eaLnBrk="1" fontAlgn="auto" latinLnBrk="0" hangingPunct="1">
+              <a:lnSpc>
+                <a:spcPct val="100000"/>
+              </a:lnSpc>
+              <a:spcBef>
+                <a:spcPts val="0"/>
+              </a:spcBef>
+              <a:spcAft>
+                <a:spcPts val="0"/>
+              </a:spcAft>
+              <a:buClrTx/>
+              <a:buSzTx/>
+              <a:buFontTx/>
+              <a:buNone/>
+              <a:tabLst/>
+              <a:defRPr/>
+            </a:pPr>
+            <a:endParaRPr lang="en-US" sz="2400" dirty="0"/>
+          </a:p>
+          <a:p>
+            <a:pPr marL="0" marR="0" lvl="0" indent="0" algn="l" defTabSz="914400" rtl="0" eaLnBrk="1" fontAlgn="auto" latinLnBrk="0" hangingPunct="1">
+              <a:lnSpc>
+                <a:spcPct val="100000"/>
+              </a:lnSpc>
+              <a:spcBef>
+                <a:spcPts val="0"/>
+              </a:spcBef>
+              <a:spcAft>
+                <a:spcPts val="0"/>
+              </a:spcAft>
+              <a:buClrTx/>
+              <a:buSzTx/>
+              <a:buFontTx/>
+              <a:buNone/>
+              <a:tabLst/>
+              <a:defRPr/>
+            </a:pPr>
+            <a:r>
+              <a:rPr lang="en-US" sz="2400" dirty="0"/>
+              <a:t>The </a:t>
+            </a:r>
+            <a:r>
+              <a:rPr lang="en-US" sz="2400" b="1" dirty="0"/>
+              <a:t>function</a:t>
+            </a:r>
+            <a:r>
+              <a:rPr lang="en-US" sz="2400" dirty="0"/>
+              <a:t> keyword creates an object of Function type. This object can be used as a normal function or as a </a:t>
+            </a:r>
+            <a:r>
+              <a:rPr lang="en-US" sz="2400" b="1" dirty="0"/>
+              <a:t>class</a:t>
+            </a:r>
+            <a:r>
+              <a:rPr lang="en-US" sz="2400" dirty="0"/>
+              <a:t> </a:t>
+            </a:r>
+            <a:r>
+              <a:rPr lang="en-US" sz="2400" b="1" dirty="0"/>
+              <a:t>object </a:t>
+            </a:r>
+            <a:r>
+              <a:rPr lang="en-US" sz="2400" dirty="0"/>
+              <a:t>which defines the class</a:t>
+            </a:r>
+            <a:r>
+              <a:rPr lang="en-US" sz="2400" b="1" dirty="0"/>
+              <a:t> </a:t>
+            </a:r>
+            <a:r>
+              <a:rPr lang="en-US" sz="2400" b="1" dirty="0">
+                <a:solidFill>
+                  <a:schemeClr val="tx1"/>
+                </a:solidFill>
+              </a:rPr>
+              <a:t>constructor</a:t>
+            </a:r>
+            <a:r>
+              <a:rPr lang="en-US" sz="2400" dirty="0">
+                <a:solidFill>
+                  <a:schemeClr val="tx1"/>
+                </a:solidFill>
+              </a:rPr>
+              <a:t> </a:t>
+            </a:r>
+            <a:r>
+              <a:rPr lang="en-US" sz="2400" dirty="0"/>
+              <a:t>method.</a:t>
+            </a:r>
+          </a:p>
+          <a:p>
+            <a:pPr marL="0" marR="0" lvl="0" indent="0" algn="l" defTabSz="914400" rtl="0" eaLnBrk="1" fontAlgn="auto" latinLnBrk="0" hangingPunct="1">
+              <a:lnSpc>
+                <a:spcPct val="100000"/>
+              </a:lnSpc>
+              <a:spcBef>
+                <a:spcPts val="0"/>
+              </a:spcBef>
+              <a:spcAft>
+                <a:spcPts val="0"/>
+              </a:spcAft>
+              <a:buClrTx/>
+              <a:buSzTx/>
+              <a:buFontTx/>
+              <a:buNone/>
+              <a:tabLst/>
+              <a:defRPr/>
+            </a:pPr>
+            <a:r>
+              <a:rPr lang="en-US" sz="2400" dirty="0"/>
+              <a:t>When using the </a:t>
+            </a:r>
+            <a:r>
+              <a:rPr lang="en-US" sz="2400" b="1" dirty="0">
+                <a:solidFill>
+                  <a:schemeClr val="tx1"/>
+                </a:solidFill>
+              </a:rPr>
+              <a:t>new</a:t>
+            </a:r>
+            <a:r>
+              <a:rPr lang="en-US" sz="2400" dirty="0">
+                <a:solidFill>
+                  <a:schemeClr val="tx1"/>
+                </a:solidFill>
+              </a:rPr>
+              <a:t> </a:t>
+            </a:r>
+            <a:r>
+              <a:rPr lang="en-US" sz="2400" dirty="0"/>
+              <a:t>keyword on the </a:t>
+            </a:r>
+            <a:r>
+              <a:rPr lang="en-US" sz="2400" b="1" dirty="0"/>
+              <a:t>class object </a:t>
+            </a:r>
+            <a:r>
+              <a:rPr lang="en-US" sz="2400" dirty="0"/>
+              <a:t>a new instance of the class will be created and will be send to the </a:t>
+            </a:r>
+            <a:r>
+              <a:rPr lang="en-US" sz="2400" b="1" dirty="0">
+                <a:solidFill>
+                  <a:schemeClr val="tx1"/>
+                </a:solidFill>
+              </a:rPr>
+              <a:t>constructor</a:t>
+            </a:r>
+            <a:r>
+              <a:rPr lang="en-US" sz="2400" dirty="0"/>
+              <a:t> method.</a:t>
+            </a:r>
+          </a:p>
+        </p:txBody>
+      </p:sp>
+      <p:sp>
+        <p:nvSpPr>
+          <p:cNvPr id="4" name="Slide Number Placeholder 3"/>
+          <p:cNvSpPr>
+            <a:spLocks noGrp="1"/>
+          </p:cNvSpPr>
+          <p:nvPr>
+            <p:ph type="sldNum" sz="quarter" idx="10"/>
+          </p:nvPr>
+        </p:nvSpPr>
+        <p:spPr/>
+        <p:txBody>
+          <a:bodyPr/>
+          <a:lstStyle/>
+          <a:p>
+            <a:fld id="{595D0871-5AD0-4670-BDA8-FBE649F625DD}" type="slidenum">
+              <a:rPr lang="he-IL" smtClean="0"/>
+              <a:t>61</a:t>
             </a:fld>
             <a:endParaRPr lang="he-IL"/>
           </a:p>
@@ -27683,23 +31045,7 @@
                   <a:schemeClr val="bg1"/>
                 </a:solidFill>
               </a:rPr>
-              <a:t>Var let </a:t>
-            </a:r>
-            <a:r>
-              <a:rPr lang="en-US" sz="6000" dirty="0" err="1">
-                <a:solidFill>
-                  <a:schemeClr val="bg1"/>
-                </a:solidFill>
-              </a:rPr>
-              <a:t>const</a:t>
-            </a:r>
-            <a:r>
-              <a:rPr lang="en-US" sz="6000" dirty="0">
-                <a:solidFill>
-                  <a:schemeClr val="bg1"/>
-                </a:solidFill>
-              </a:rPr>
-              <a:t>, freeze</a:t>
+              <a:t>Hoisting Examples</a:t>
             </a:r>
             <a:endParaRPr lang="en-US" altLang="en-US" sz="6000" b="1" dirty="0">
               <a:solidFill>
@@ -27713,7 +31059,7 @@
     </p:spTree>
     <p:extLst>
       <p:ext uri="{BB962C8B-B14F-4D97-AF65-F5344CB8AC3E}">
-        <p14:creationId xmlns:p14="http://schemas.microsoft.com/office/powerpoint/2010/main" val="4021379442"/>
+        <p14:creationId xmlns:p14="http://schemas.microsoft.com/office/powerpoint/2010/main" val="3170921739"/>
       </p:ext>
     </p:extLst>
   </p:cSld>
@@ -27831,7 +31177,23 @@
                   <a:schemeClr val="bg1"/>
                 </a:solidFill>
               </a:rPr>
-              <a:t>Arrow function</a:t>
+              <a:t>Var, let, </a:t>
+            </a:r>
+            <a:r>
+              <a:rPr lang="en-US" sz="6000" dirty="0" err="1">
+                <a:solidFill>
+                  <a:schemeClr val="bg1"/>
+                </a:solidFill>
+              </a:rPr>
+              <a:t>const</a:t>
+            </a:r>
+            <a:r>
+              <a:rPr lang="en-US" sz="6000" dirty="0">
+                <a:solidFill>
+                  <a:schemeClr val="bg1"/>
+                </a:solidFill>
+              </a:rPr>
+              <a:t>, freeze</a:t>
             </a:r>
             <a:endParaRPr lang="en-US" altLang="en-US" sz="6000" b="1" dirty="0">
               <a:solidFill>
@@ -27845,7 +31207,7 @@
     </p:spTree>
     <p:extLst>
       <p:ext uri="{BB962C8B-B14F-4D97-AF65-F5344CB8AC3E}">
-        <p14:creationId xmlns:p14="http://schemas.microsoft.com/office/powerpoint/2010/main" val="1741453719"/>
+        <p14:creationId xmlns:p14="http://schemas.microsoft.com/office/powerpoint/2010/main" val="4021379442"/>
       </p:ext>
     </p:extLst>
   </p:cSld>
@@ -27963,7 +31325,7 @@
                   <a:schemeClr val="bg1"/>
                 </a:solidFill>
               </a:rPr>
-              <a:t>Html modules for scoping</a:t>
+              <a:t>Arrow function</a:t>
             </a:r>
             <a:endParaRPr lang="en-US" altLang="en-US" sz="6000" b="1" dirty="0">
               <a:solidFill>
@@ -27977,7 +31339,7 @@
     </p:spTree>
     <p:extLst>
       <p:ext uri="{BB962C8B-B14F-4D97-AF65-F5344CB8AC3E}">
-        <p14:creationId xmlns:p14="http://schemas.microsoft.com/office/powerpoint/2010/main" val="1693568435"/>
+        <p14:creationId xmlns:p14="http://schemas.microsoft.com/office/powerpoint/2010/main" val="1741453719"/>
       </p:ext>
     </p:extLst>
   </p:cSld>
@@ -28262,6 +31624,138 @@
 </file>
 
 <file path=ppt/slides/slide60.xml><?xml version="1.0" encoding="utf-8"?>
+<p:sld xmlns:a="http://schemas.openxmlformats.org/drawingml/2006/main" xmlns:r="http://schemas.openxmlformats.org/officeDocument/2006/relationships" xmlns:p="http://schemas.openxmlformats.org/presentationml/2006/main">
+  <p:cSld>
+    <p:spTree>
+      <p:nvGrpSpPr>
+        <p:cNvPr id="1" name=""/>
+        <p:cNvGrpSpPr/>
+        <p:nvPr/>
+      </p:nvGrpSpPr>
+      <p:grpSpPr>
+        <a:xfrm>
+          <a:off x="0" y="0"/>
+          <a:ext cx="0" cy="0"/>
+          <a:chOff x="0" y="0"/>
+          <a:chExt cx="0" cy="0"/>
+        </a:xfrm>
+      </p:grpSpPr>
+      <p:sp>
+        <p:nvSpPr>
+          <p:cNvPr id="6" name="Rectangle 5"/>
+          <p:cNvSpPr/>
+          <p:nvPr/>
+        </p:nvSpPr>
+        <p:spPr>
+          <a:xfrm>
+            <a:off x="-215115" y="0"/>
+            <a:ext cx="12407115" cy="6858000"/>
+          </a:xfrm>
+          <a:prstGeom prst="rect">
+            <a:avLst/>
+          </a:prstGeom>
+          <a:solidFill>
+            <a:schemeClr val="accent1">
+              <a:lumMod val="75000"/>
+            </a:schemeClr>
+          </a:solidFill>
+          <a:ln>
+            <a:noFill/>
+          </a:ln>
+        </p:spPr>
+        <p:style>
+          <a:lnRef idx="1">
+            <a:schemeClr val="accent1"/>
+          </a:lnRef>
+          <a:fillRef idx="3">
+            <a:schemeClr val="accent1"/>
+          </a:fillRef>
+          <a:effectRef idx="2">
+            <a:schemeClr val="accent1"/>
+          </a:effectRef>
+          <a:fontRef idx="minor">
+            <a:schemeClr val="lt1"/>
+          </a:fontRef>
+        </p:style>
+        <p:txBody>
+          <a:bodyPr rtlCol="0" anchor="ctr"/>
+          <a:lstStyle/>
+          <a:p>
+            <a:pPr algn="ctr"/>
+            <a:endParaRPr lang="en-US" sz="2400"/>
+          </a:p>
+        </p:txBody>
+      </p:sp>
+      <p:sp>
+        <p:nvSpPr>
+          <p:cNvPr id="24" name="Title 1"/>
+          <p:cNvSpPr>
+            <a:spLocks noGrp="1"/>
+          </p:cNvSpPr>
+          <p:nvPr>
+            <p:ph type="title"/>
+          </p:nvPr>
+        </p:nvSpPr>
+        <p:spPr>
+          <a:xfrm>
+            <a:off x="502042" y="1936377"/>
+            <a:ext cx="10972800" cy="2985246"/>
+          </a:xfrm>
+        </p:spPr>
+        <p:txBody>
+          <a:bodyPr>
+            <a:noAutofit/>
+          </a:bodyPr>
+          <a:lstStyle/>
+          <a:p>
+            <a:pPr algn="ctr" rtl="0" eaLnBrk="0" fontAlgn="base" hangingPunct="0">
+              <a:spcAft>
+                <a:spcPct val="0"/>
+              </a:spcAft>
+            </a:pPr>
+            <a:r>
+              <a:rPr lang="en-US" sz="6000" dirty="0">
+                <a:solidFill>
+                  <a:schemeClr val="bg1"/>
+                </a:solidFill>
+              </a:rPr>
+              <a:t>Html modules for scoping</a:t>
+            </a:r>
+            <a:endParaRPr lang="en-US" altLang="en-US" sz="6000" b="1" dirty="0">
+              <a:solidFill>
+                <a:schemeClr val="bg1"/>
+              </a:solidFill>
+              <a:latin typeface="Calibri (Body)"/>
+            </a:endParaRPr>
+          </a:p>
+        </p:txBody>
+      </p:sp>
+    </p:spTree>
+    <p:extLst>
+      <p:ext uri="{BB962C8B-B14F-4D97-AF65-F5344CB8AC3E}">
+        <p14:creationId xmlns:p14="http://schemas.microsoft.com/office/powerpoint/2010/main" val="1693568435"/>
+      </p:ext>
+    </p:extLst>
+  </p:cSld>
+  <p:clrMapOvr>
+    <a:masterClrMapping/>
+  </p:clrMapOvr>
+  <mc:AlternateContent xmlns:mc="http://schemas.openxmlformats.org/markup-compatibility/2006" xmlns:p14="http://schemas.microsoft.com/office/powerpoint/2010/main">
+    <mc:Choice Requires="p14">
+      <p:transition spd="med" p14:dur="700">
+        <p:fade/>
+      </p:transition>
+    </mc:Choice>
+    <mc:Fallback xmlns="">
+      <p:transition xmlns:p14="http://schemas.microsoft.com/office/powerpoint/2010/main" spd="med">
+        <p:fade/>
+      </p:transition>
+    </mc:Fallback>
+  </mc:AlternateContent>
+</p:sld>
+</file>
+
+<file path=ppt/slides/slide61.xml><?xml version="1.0" encoding="utf-8"?>
 <p:sld xmlns:a="http://schemas.openxmlformats.org/drawingml/2006/main" xmlns:r="http://schemas.openxmlformats.org/officeDocument/2006/relationships" xmlns:p="http://schemas.openxmlformats.org/presentationml/2006/main">
   <p:cSld>
     <p:spTree>

</xml_diff>